<commit_message>
added assignment 3. Updated lectures.
</commit_message>
<xml_diff>
--- a/Lectures/3 Data Storage.pptx
+++ b/Lectures/3 Data Storage.pptx
@@ -5,10 +5,10 @@
     <p:sldMasterId id="2147483648" r:id="rId1"/>
   </p:sldMasterIdLst>
   <p:notesMasterIdLst>
-    <p:notesMasterId r:id="rId26"/>
+    <p:notesMasterId r:id="rId35"/>
   </p:notesMasterIdLst>
   <p:handoutMasterIdLst>
-    <p:handoutMasterId r:id="rId27"/>
+    <p:handoutMasterId r:id="rId36"/>
   </p:handoutMasterIdLst>
   <p:sldIdLst>
     <p:sldId id="256" r:id="rId2"/>
@@ -21,20 +21,29 @@
     <p:sldId id="389" r:id="rId9"/>
     <p:sldId id="390" r:id="rId10"/>
     <p:sldId id="392" r:id="rId11"/>
-    <p:sldId id="393" r:id="rId12"/>
-    <p:sldId id="276" r:id="rId13"/>
-    <p:sldId id="394" r:id="rId14"/>
-    <p:sldId id="395" r:id="rId15"/>
-    <p:sldId id="396" r:id="rId16"/>
-    <p:sldId id="397" r:id="rId17"/>
-    <p:sldId id="398" r:id="rId18"/>
-    <p:sldId id="399" r:id="rId19"/>
-    <p:sldId id="409" r:id="rId20"/>
-    <p:sldId id="402" r:id="rId21"/>
-    <p:sldId id="407" r:id="rId22"/>
-    <p:sldId id="408" r:id="rId23"/>
-    <p:sldId id="410" r:id="rId24"/>
-    <p:sldId id="411" r:id="rId25"/>
+    <p:sldId id="412" r:id="rId12"/>
+    <p:sldId id="394" r:id="rId13"/>
+    <p:sldId id="395" r:id="rId14"/>
+    <p:sldId id="396" r:id="rId15"/>
+    <p:sldId id="397" r:id="rId16"/>
+    <p:sldId id="413" r:id="rId17"/>
+    <p:sldId id="416" r:id="rId18"/>
+    <p:sldId id="417" r:id="rId19"/>
+    <p:sldId id="418" r:id="rId20"/>
+    <p:sldId id="419" r:id="rId21"/>
+    <p:sldId id="420" r:id="rId22"/>
+    <p:sldId id="421" r:id="rId23"/>
+    <p:sldId id="422" r:id="rId24"/>
+    <p:sldId id="414" r:id="rId25"/>
+    <p:sldId id="399" r:id="rId26"/>
+    <p:sldId id="424" r:id="rId27"/>
+    <p:sldId id="409" r:id="rId28"/>
+    <p:sldId id="402" r:id="rId29"/>
+    <p:sldId id="407" r:id="rId30"/>
+    <p:sldId id="408" r:id="rId31"/>
+    <p:sldId id="410" r:id="rId32"/>
+    <p:sldId id="423" r:id="rId33"/>
+    <p:sldId id="411" r:id="rId34"/>
   </p:sldIdLst>
   <p:sldSz cx="9144000" cy="6858000" type="screen4x3"/>
   <p:notesSz cx="6858000" cy="9144000"/>
@@ -218,7 +227,7 @@
           <a:p>
             <a:fld id="{D3AAB66F-B1B7-D045-B4E8-4F60236F228D}" type="datetimeFigureOut">
               <a:rPr lang="en-US" smtClean="0"/>
-              <a:t>1/10/14</a:t>
+              <a:t>1/16/14</a:t>
             </a:fld>
             <a:endParaRPr lang="en-US"/>
           </a:p>
@@ -384,7 +393,7 @@
           <a:p>
             <a:fld id="{BCCF8E76-06A6-164E-A6FA-EC32C13EB232}" type="datetimeFigureOut">
               <a:rPr lang="en-US" smtClean="0"/>
-              <a:t>1/10/14</a:t>
+              <a:t>1/16/14</a:t>
             </a:fld>
             <a:endParaRPr lang="en-US"/>
           </a:p>
@@ -837,18 +846,6 @@
           <a:bodyPr/>
           <a:lstStyle/>
           <a:p>
-            <a:r>
-              <a:rPr lang="en-US" dirty="0" smtClean="0"/>
-              <a:t>Have special structure that makes this type of data easier to handle .. .but we deal with it all the time outside of these tools</a:t>
-            </a:r>
-          </a:p>
-          <a:p>
-            <a:r>
-              <a:rPr lang="en-US" dirty="0" smtClean="0"/>
-              <a:t>Lots of complexity here</a:t>
-            </a:r>
-          </a:p>
-          <a:p>
             <a:endParaRPr lang="en-US" dirty="0"/>
           </a:p>
         </p:txBody>
@@ -871,6 +868,479 @@
             <a:fld id="{FD66F34B-9C4D-8640-BB34-4C24A79C9FFB}" type="slidenum">
               <a:rPr lang="en-US" smtClean="0"/>
               <a:t>23</a:t>
+            </a:fld>
+            <a:endParaRPr lang="en-US"/>
+          </a:p>
+        </p:txBody>
+      </p:sp>
+    </p:spTree>
+    <p:extLst>
+      <p:ext uri="{BB962C8B-B14F-4D97-AF65-F5344CB8AC3E}">
+        <p14:creationId xmlns:p14="http://schemas.microsoft.com/office/powerpoint/2010/main" val="3813499597"/>
+      </p:ext>
+    </p:extLst>
+  </p:cSld>
+  <p:clrMapOvr>
+    <a:masterClrMapping/>
+  </p:clrMapOvr>
+</p:notes>
+</file>
+
+<file path=ppt/notesSlides/notesSlide11.xml><?xml version="1.0" encoding="utf-8"?>
+<p:notes xmlns:a="http://schemas.openxmlformats.org/drawingml/2006/main" xmlns:r="http://schemas.openxmlformats.org/officeDocument/2006/relationships" xmlns:p="http://schemas.openxmlformats.org/presentationml/2006/main">
+  <p:cSld>
+    <p:spTree>
+      <p:nvGrpSpPr>
+        <p:cNvPr id="1" name=""/>
+        <p:cNvGrpSpPr/>
+        <p:nvPr/>
+      </p:nvGrpSpPr>
+      <p:grpSpPr>
+        <a:xfrm>
+          <a:off x="0" y="0"/>
+          <a:ext cx="0" cy="0"/>
+          <a:chOff x="0" y="0"/>
+          <a:chExt cx="0" cy="0"/>
+        </a:xfrm>
+      </p:grpSpPr>
+      <p:sp>
+        <p:nvSpPr>
+          <p:cNvPr id="2" name="Slide Image Placeholder 1"/>
+          <p:cNvSpPr>
+            <a:spLocks noGrp="1" noRot="1" noChangeAspect="1"/>
+          </p:cNvSpPr>
+          <p:nvPr>
+            <p:ph type="sldImg"/>
+          </p:nvPr>
+        </p:nvSpPr>
+        <p:spPr/>
+      </p:sp>
+      <p:sp>
+        <p:nvSpPr>
+          <p:cNvPr id="3" name="Notes Placeholder 2"/>
+          <p:cNvSpPr>
+            <a:spLocks noGrp="1"/>
+          </p:cNvSpPr>
+          <p:nvPr>
+            <p:ph type="body" idx="1"/>
+          </p:nvPr>
+        </p:nvSpPr>
+        <p:spPr/>
+        <p:txBody>
+          <a:bodyPr/>
+          <a:lstStyle/>
+          <a:p>
+            <a:r>
+              <a:rPr lang="en-US" dirty="0" smtClean="0"/>
+              <a:t>Borrowed: Collections of information</a:t>
+            </a:r>
+          </a:p>
+          <a:p>
+            <a:r>
+              <a:rPr lang="en-US" dirty="0" smtClean="0"/>
+              <a:t>Created with logical structures</a:t>
+            </a:r>
+          </a:p>
+          <a:p>
+            <a:r>
+              <a:rPr lang="en-US" dirty="0" smtClean="0"/>
+              <a:t>With logical ties within the information</a:t>
+            </a:r>
+          </a:p>
+          <a:p>
+            <a:r>
+              <a:rPr lang="en-US" dirty="0" smtClean="0"/>
+              <a:t>With built-in integrity constraints</a:t>
+            </a:r>
+          </a:p>
+          <a:p>
+            <a:endParaRPr lang="en-US" dirty="0"/>
+          </a:p>
+        </p:txBody>
+      </p:sp>
+      <p:sp>
+        <p:nvSpPr>
+          <p:cNvPr id="4" name="Slide Number Placeholder 3"/>
+          <p:cNvSpPr>
+            <a:spLocks noGrp="1"/>
+          </p:cNvSpPr>
+          <p:nvPr>
+            <p:ph type="sldNum" sz="quarter" idx="10"/>
+          </p:nvPr>
+        </p:nvSpPr>
+        <p:spPr/>
+        <p:txBody>
+          <a:bodyPr/>
+          <a:lstStyle/>
+          <a:p>
+            <a:fld id="{FD66F34B-9C4D-8640-BB34-4C24A79C9FFB}" type="slidenum">
+              <a:rPr lang="en-US" smtClean="0"/>
+              <a:t>24</a:t>
+            </a:fld>
+            <a:endParaRPr lang="en-US"/>
+          </a:p>
+        </p:txBody>
+      </p:sp>
+    </p:spTree>
+    <p:extLst>
+      <p:ext uri="{BB962C8B-B14F-4D97-AF65-F5344CB8AC3E}">
+        <p14:creationId xmlns:p14="http://schemas.microsoft.com/office/powerpoint/2010/main" val="3653120636"/>
+      </p:ext>
+    </p:extLst>
+  </p:cSld>
+  <p:clrMapOvr>
+    <a:masterClrMapping/>
+  </p:clrMapOvr>
+</p:notes>
+</file>
+
+<file path=ppt/notesSlides/notesSlide12.xml><?xml version="1.0" encoding="utf-8"?>
+<p:notes xmlns:a="http://schemas.openxmlformats.org/drawingml/2006/main" xmlns:r="http://schemas.openxmlformats.org/officeDocument/2006/relationships" xmlns:p="http://schemas.openxmlformats.org/presentationml/2006/main">
+  <p:cSld>
+    <p:spTree>
+      <p:nvGrpSpPr>
+        <p:cNvPr id="1" name=""/>
+        <p:cNvGrpSpPr/>
+        <p:nvPr/>
+      </p:nvGrpSpPr>
+      <p:grpSpPr>
+        <a:xfrm>
+          <a:off x="0" y="0"/>
+          <a:ext cx="0" cy="0"/>
+          <a:chOff x="0" y="0"/>
+          <a:chExt cx="0" cy="0"/>
+        </a:xfrm>
+      </p:grpSpPr>
+      <p:sp>
+        <p:nvSpPr>
+          <p:cNvPr id="2" name="Slide Image Placeholder 1"/>
+          <p:cNvSpPr>
+            <a:spLocks noGrp="1" noRot="1" noChangeAspect="1"/>
+          </p:cNvSpPr>
+          <p:nvPr>
+            <p:ph type="sldImg"/>
+          </p:nvPr>
+        </p:nvSpPr>
+        <p:spPr/>
+      </p:sp>
+      <p:sp>
+        <p:nvSpPr>
+          <p:cNvPr id="3" name="Notes Placeholder 2"/>
+          <p:cNvSpPr>
+            <a:spLocks noGrp="1"/>
+          </p:cNvSpPr>
+          <p:nvPr>
+            <p:ph type="body" idx="1"/>
+          </p:nvPr>
+        </p:nvSpPr>
+        <p:spPr/>
+        <p:txBody>
+          <a:bodyPr/>
+          <a:lstStyle/>
+          <a:p>
+            <a:r>
+              <a:rPr lang="en-US" dirty="0" smtClean="0"/>
+              <a:t>Have special structure that makes this type of data easier to handle .. .but we deal with it all the time outside of these tools</a:t>
+            </a:r>
+            <a:endParaRPr lang="en-US" dirty="0"/>
+          </a:p>
+        </p:txBody>
+      </p:sp>
+      <p:sp>
+        <p:nvSpPr>
+          <p:cNvPr id="4" name="Slide Number Placeholder 3"/>
+          <p:cNvSpPr>
+            <a:spLocks noGrp="1"/>
+          </p:cNvSpPr>
+          <p:nvPr>
+            <p:ph type="sldNum" sz="quarter" idx="10"/>
+          </p:nvPr>
+        </p:nvSpPr>
+        <p:spPr/>
+        <p:txBody>
+          <a:bodyPr/>
+          <a:lstStyle/>
+          <a:p>
+            <a:fld id="{FD66F34B-9C4D-8640-BB34-4C24A79C9FFB}" type="slidenum">
+              <a:rPr lang="en-US" smtClean="0"/>
+              <a:t>27</a:t>
+            </a:fld>
+            <a:endParaRPr lang="en-US"/>
+          </a:p>
+        </p:txBody>
+      </p:sp>
+    </p:spTree>
+    <p:extLst>
+      <p:ext uri="{BB962C8B-B14F-4D97-AF65-F5344CB8AC3E}">
+        <p14:creationId xmlns:p14="http://schemas.microsoft.com/office/powerpoint/2010/main" val="2841721663"/>
+      </p:ext>
+    </p:extLst>
+  </p:cSld>
+  <p:clrMapOvr>
+    <a:masterClrMapping/>
+  </p:clrMapOvr>
+</p:notes>
+</file>
+
+<file path=ppt/notesSlides/notesSlide13.xml><?xml version="1.0" encoding="utf-8"?>
+<p:notes xmlns:a="http://schemas.openxmlformats.org/drawingml/2006/main" xmlns:r="http://schemas.openxmlformats.org/officeDocument/2006/relationships" xmlns:p="http://schemas.openxmlformats.org/presentationml/2006/main">
+  <p:cSld>
+    <p:spTree>
+      <p:nvGrpSpPr>
+        <p:cNvPr id="1" name=""/>
+        <p:cNvGrpSpPr/>
+        <p:nvPr/>
+      </p:nvGrpSpPr>
+      <p:grpSpPr>
+        <a:xfrm>
+          <a:off x="0" y="0"/>
+          <a:ext cx="0" cy="0"/>
+          <a:chOff x="0" y="0"/>
+          <a:chExt cx="0" cy="0"/>
+        </a:xfrm>
+      </p:grpSpPr>
+      <p:sp>
+        <p:nvSpPr>
+          <p:cNvPr id="2" name="Slide Image Placeholder 1"/>
+          <p:cNvSpPr>
+            <a:spLocks noGrp="1" noRot="1" noChangeAspect="1"/>
+          </p:cNvSpPr>
+          <p:nvPr>
+            <p:ph type="sldImg"/>
+          </p:nvPr>
+        </p:nvSpPr>
+        <p:spPr/>
+      </p:sp>
+      <p:sp>
+        <p:nvSpPr>
+          <p:cNvPr id="3" name="Notes Placeholder 2"/>
+          <p:cNvSpPr>
+            <a:spLocks noGrp="1"/>
+          </p:cNvSpPr>
+          <p:nvPr>
+            <p:ph type="body" idx="1"/>
+          </p:nvPr>
+        </p:nvSpPr>
+        <p:spPr/>
+        <p:txBody>
+          <a:bodyPr/>
+          <a:lstStyle/>
+          <a:p>
+            <a:r>
+              <a:rPr lang="en-US" dirty="0" smtClean="0"/>
+              <a:t>It’s not all about maps!</a:t>
+            </a:r>
+            <a:endParaRPr lang="en-US" dirty="0"/>
+          </a:p>
+        </p:txBody>
+      </p:sp>
+      <p:sp>
+        <p:nvSpPr>
+          <p:cNvPr id="4" name="Slide Number Placeholder 3"/>
+          <p:cNvSpPr>
+            <a:spLocks noGrp="1"/>
+          </p:cNvSpPr>
+          <p:nvPr>
+            <p:ph type="sldNum" sz="quarter" idx="10"/>
+          </p:nvPr>
+        </p:nvSpPr>
+        <p:spPr/>
+        <p:txBody>
+          <a:bodyPr/>
+          <a:lstStyle/>
+          <a:p>
+            <a:fld id="{FD66F34B-9C4D-8640-BB34-4C24A79C9FFB}" type="slidenum">
+              <a:rPr lang="en-US" smtClean="0"/>
+              <a:t>29</a:t>
+            </a:fld>
+            <a:endParaRPr lang="en-US"/>
+          </a:p>
+        </p:txBody>
+      </p:sp>
+    </p:spTree>
+    <p:extLst>
+      <p:ext uri="{BB962C8B-B14F-4D97-AF65-F5344CB8AC3E}">
+        <p14:creationId xmlns:p14="http://schemas.microsoft.com/office/powerpoint/2010/main" val="787802053"/>
+      </p:ext>
+    </p:extLst>
+  </p:cSld>
+  <p:clrMapOvr>
+    <a:masterClrMapping/>
+  </p:clrMapOvr>
+</p:notes>
+</file>
+
+<file path=ppt/notesSlides/notesSlide14.xml><?xml version="1.0" encoding="utf-8"?>
+<p:notes xmlns:a="http://schemas.openxmlformats.org/drawingml/2006/main" xmlns:r="http://schemas.openxmlformats.org/officeDocument/2006/relationships" xmlns:p="http://schemas.openxmlformats.org/presentationml/2006/main">
+  <p:cSld>
+    <p:spTree>
+      <p:nvGrpSpPr>
+        <p:cNvPr id="1" name=""/>
+        <p:cNvGrpSpPr/>
+        <p:nvPr/>
+      </p:nvGrpSpPr>
+      <p:grpSpPr>
+        <a:xfrm>
+          <a:off x="0" y="0"/>
+          <a:ext cx="0" cy="0"/>
+          <a:chOff x="0" y="0"/>
+          <a:chExt cx="0" cy="0"/>
+        </a:xfrm>
+      </p:grpSpPr>
+      <p:sp>
+        <p:nvSpPr>
+          <p:cNvPr id="2" name="Slide Image Placeholder 1"/>
+          <p:cNvSpPr>
+            <a:spLocks noGrp="1" noRot="1" noChangeAspect="1"/>
+          </p:cNvSpPr>
+          <p:nvPr>
+            <p:ph type="sldImg"/>
+          </p:nvPr>
+        </p:nvSpPr>
+        <p:spPr/>
+      </p:sp>
+      <p:sp>
+        <p:nvSpPr>
+          <p:cNvPr id="3" name="Notes Placeholder 2"/>
+          <p:cNvSpPr>
+            <a:spLocks noGrp="1"/>
+          </p:cNvSpPr>
+          <p:nvPr>
+            <p:ph type="body" idx="1"/>
+          </p:nvPr>
+        </p:nvSpPr>
+        <p:spPr/>
+        <p:txBody>
+          <a:bodyPr/>
+          <a:lstStyle/>
+          <a:p>
+            <a:r>
+              <a:rPr lang="en-US" dirty="0" smtClean="0"/>
+              <a:t>Based on this patient's  MRI,  have we treated somebody with a similar condition ?</a:t>
+            </a:r>
+          </a:p>
+          <a:p>
+            <a:endParaRPr lang="en-US" dirty="0" smtClean="0"/>
+          </a:p>
+          <a:p>
+            <a:endParaRPr lang="en-US" dirty="0"/>
+          </a:p>
+        </p:txBody>
+      </p:sp>
+      <p:sp>
+        <p:nvSpPr>
+          <p:cNvPr id="4" name="Slide Number Placeholder 3"/>
+          <p:cNvSpPr>
+            <a:spLocks noGrp="1"/>
+          </p:cNvSpPr>
+          <p:nvPr>
+            <p:ph type="sldNum" sz="quarter" idx="10"/>
+          </p:nvPr>
+        </p:nvSpPr>
+        <p:spPr/>
+        <p:txBody>
+          <a:bodyPr/>
+          <a:lstStyle/>
+          <a:p>
+            <a:fld id="{FD66F34B-9C4D-8640-BB34-4C24A79C9FFB}" type="slidenum">
+              <a:rPr lang="en-US" smtClean="0"/>
+              <a:t>30</a:t>
+            </a:fld>
+            <a:endParaRPr lang="en-US"/>
+          </a:p>
+        </p:txBody>
+      </p:sp>
+    </p:spTree>
+    <p:extLst>
+      <p:ext uri="{BB962C8B-B14F-4D97-AF65-F5344CB8AC3E}">
+        <p14:creationId xmlns:p14="http://schemas.microsoft.com/office/powerpoint/2010/main" val="787802053"/>
+      </p:ext>
+    </p:extLst>
+  </p:cSld>
+  <p:clrMapOvr>
+    <a:masterClrMapping/>
+  </p:clrMapOvr>
+</p:notes>
+</file>
+
+<file path=ppt/notesSlides/notesSlide15.xml><?xml version="1.0" encoding="utf-8"?>
+<p:notes xmlns:a="http://schemas.openxmlformats.org/drawingml/2006/main" xmlns:r="http://schemas.openxmlformats.org/officeDocument/2006/relationships" xmlns:p="http://schemas.openxmlformats.org/presentationml/2006/main">
+  <p:cSld>
+    <p:spTree>
+      <p:nvGrpSpPr>
+        <p:cNvPr id="1" name=""/>
+        <p:cNvGrpSpPr/>
+        <p:nvPr/>
+      </p:nvGrpSpPr>
+      <p:grpSpPr>
+        <a:xfrm>
+          <a:off x="0" y="0"/>
+          <a:ext cx="0" cy="0"/>
+          <a:chOff x="0" y="0"/>
+          <a:chExt cx="0" cy="0"/>
+        </a:xfrm>
+      </p:grpSpPr>
+      <p:sp>
+        <p:nvSpPr>
+          <p:cNvPr id="2" name="Slide Image Placeholder 1"/>
+          <p:cNvSpPr>
+            <a:spLocks noGrp="1" noRot="1" noChangeAspect="1"/>
+          </p:cNvSpPr>
+          <p:nvPr>
+            <p:ph type="sldImg"/>
+          </p:nvPr>
+        </p:nvSpPr>
+        <p:spPr/>
+      </p:sp>
+      <p:sp>
+        <p:nvSpPr>
+          <p:cNvPr id="3" name="Notes Placeholder 2"/>
+          <p:cNvSpPr>
+            <a:spLocks noGrp="1"/>
+          </p:cNvSpPr>
+          <p:nvPr>
+            <p:ph type="body" idx="1"/>
+          </p:nvPr>
+        </p:nvSpPr>
+        <p:spPr/>
+        <p:txBody>
+          <a:bodyPr/>
+          <a:lstStyle/>
+          <a:p>
+            <a:r>
+              <a:rPr lang="en-US" dirty="0" smtClean="0"/>
+              <a:t>Have special structure that makes this type of data easier to handle .. .but we deal with it all the time outside of these tools</a:t>
+            </a:r>
+          </a:p>
+          <a:p>
+            <a:r>
+              <a:rPr lang="en-US" dirty="0" smtClean="0"/>
+              <a:t>Lots of complexity here</a:t>
+            </a:r>
+          </a:p>
+          <a:p>
+            <a:endParaRPr lang="en-US" dirty="0"/>
+          </a:p>
+        </p:txBody>
+      </p:sp>
+      <p:sp>
+        <p:nvSpPr>
+          <p:cNvPr id="4" name="Slide Number Placeholder 3"/>
+          <p:cNvSpPr>
+            <a:spLocks noGrp="1"/>
+          </p:cNvSpPr>
+          <p:nvPr>
+            <p:ph type="sldNum" sz="quarter" idx="10"/>
+          </p:nvPr>
+        </p:nvSpPr>
+        <p:spPr/>
+        <p:txBody>
+          <a:bodyPr/>
+          <a:lstStyle/>
+          <a:p>
+            <a:fld id="{FD66F34B-9C4D-8640-BB34-4C24A79C9FFB}" type="slidenum">
+              <a:rPr lang="en-US" smtClean="0"/>
+              <a:t>31</a:t>
             </a:fld>
             <a:endParaRPr lang="en-US"/>
           </a:p>
@@ -1307,29 +1777,11 @@
           <a:p>
             <a:r>
               <a:rPr lang="en-US" dirty="0" smtClean="0"/>
-              <a:t>Borrowed: Collections of information</a:t>
-            </a:r>
-          </a:p>
-          <a:p>
-            <a:r>
-              <a:rPr lang="en-US" dirty="0" smtClean="0"/>
-              <a:t>Created with logical structures</a:t>
-            </a:r>
-          </a:p>
-          <a:p>
-            <a:r>
-              <a:rPr lang="en-US" dirty="0" smtClean="0"/>
-              <a:t>With logical ties within the information</a:t>
-            </a:r>
-          </a:p>
-          <a:p>
-            <a:r>
-              <a:rPr lang="en-US" smtClean="0"/>
-              <a:t>With built-in integrity constraints</a:t>
-            </a:r>
-          </a:p>
-          <a:p>
-            <a:endParaRPr lang="en-US" dirty="0"/>
+              <a:t>For programs: </a:t>
+            </a:r>
+          </a:p>
+          <a:p>
+            <a:endParaRPr lang="en-US" dirty="0" smtClean="0"/>
           </a:p>
         </p:txBody>
       </p:sp>
@@ -1359,7 +1811,7 @@
     </p:spTree>
     <p:extLst>
       <p:ext uri="{BB962C8B-B14F-4D97-AF65-F5344CB8AC3E}">
-        <p14:creationId xmlns:p14="http://schemas.microsoft.com/office/powerpoint/2010/main" val="3653120636"/>
+        <p14:creationId xmlns:p14="http://schemas.microsoft.com/office/powerpoint/2010/main" val="3681764730"/>
       </p:ext>
     </p:extLst>
   </p:cSld>
@@ -1415,7 +1867,11 @@
           <a:p>
             <a:r>
               <a:rPr lang="en-US" dirty="0" smtClean="0"/>
-              <a:t>Have special structure that makes this type of data easier to handle .. .but we deal with it all the time outside of these tools</a:t>
+              <a:t>Is this an issue</a:t>
+            </a:r>
+            <a:r>
+              <a:rPr lang="en-US" baseline="0" dirty="0" smtClean="0"/>
+              <a:t> when we are just “using” data instead of collecting it?</a:t>
             </a:r>
             <a:endParaRPr lang="en-US" dirty="0"/>
           </a:p>
@@ -1438,7 +1894,7 @@
           <a:p>
             <a:fld id="{FD66F34B-9C4D-8640-BB34-4C24A79C9FFB}" type="slidenum">
               <a:rPr lang="en-US" smtClean="0"/>
-              <a:t>19</a:t>
+              <a:t>20</a:t>
             </a:fld>
             <a:endParaRPr lang="en-US"/>
           </a:p>
@@ -1447,7 +1903,7 @@
     </p:spTree>
     <p:extLst>
       <p:ext uri="{BB962C8B-B14F-4D97-AF65-F5344CB8AC3E}">
-        <p14:creationId xmlns:p14="http://schemas.microsoft.com/office/powerpoint/2010/main" val="2841721663"/>
+        <p14:creationId xmlns:p14="http://schemas.microsoft.com/office/powerpoint/2010/main" val="3813499597"/>
       </p:ext>
     </p:extLst>
   </p:cSld>
@@ -1501,10 +1957,6 @@
           <a:bodyPr/>
           <a:lstStyle/>
           <a:p>
-            <a:r>
-              <a:rPr lang="en-US" dirty="0" smtClean="0"/>
-              <a:t>It’s not all about maps!</a:t>
-            </a:r>
             <a:endParaRPr lang="en-US" dirty="0"/>
           </a:p>
         </p:txBody>
@@ -1535,7 +1987,7 @@
     </p:spTree>
     <p:extLst>
       <p:ext uri="{BB962C8B-B14F-4D97-AF65-F5344CB8AC3E}">
-        <p14:creationId xmlns:p14="http://schemas.microsoft.com/office/powerpoint/2010/main" val="787802053"/>
+        <p14:creationId xmlns:p14="http://schemas.microsoft.com/office/powerpoint/2010/main" val="3813499597"/>
       </p:ext>
     </p:extLst>
   </p:cSld>
@@ -1589,15 +2041,6 @@
           <a:bodyPr/>
           <a:lstStyle/>
           <a:p>
-            <a:r>
-              <a:rPr lang="en-US" dirty="0" smtClean="0"/>
-              <a:t>Based on this patient's  MRI,  have we treated somebody with a similar condition ?</a:t>
-            </a:r>
-          </a:p>
-          <a:p>
-            <a:endParaRPr lang="en-US" dirty="0" smtClean="0"/>
-          </a:p>
-          <a:p>
             <a:endParaRPr lang="en-US" dirty="0"/>
           </a:p>
         </p:txBody>
@@ -1628,7 +2071,7 @@
     </p:spTree>
     <p:extLst>
       <p:ext uri="{BB962C8B-B14F-4D97-AF65-F5344CB8AC3E}">
-        <p14:creationId xmlns:p14="http://schemas.microsoft.com/office/powerpoint/2010/main" val="787802053"/>
+        <p14:creationId xmlns:p14="http://schemas.microsoft.com/office/powerpoint/2010/main" val="3813499597"/>
       </p:ext>
     </p:extLst>
   </p:cSld>
@@ -2155,7 +2598,7 @@
             <a:fld id="{FA3C144B-2939-9A49-B014-915EC3E81866}" type="datetime1">
               <a:rPr lang="en-US" smtClean="0"/>
               <a:pPr/>
-              <a:t>1/10/14</a:t>
+              <a:t>1/16/14</a:t>
             </a:fld>
             <a:endParaRPr lang="en-US" dirty="0"/>
           </a:p>
@@ -2584,7 +3027,7 @@
           <a:p>
             <a:fld id="{76838339-A875-5E45-AB3F-AAABD270346A}" type="datetime1">
               <a:rPr lang="en-US" smtClean="0"/>
-              <a:t>1/10/14</a:t>
+              <a:t>1/16/14</a:t>
             </a:fld>
             <a:endParaRPr lang="en-US"/>
           </a:p>
@@ -2870,7 +3313,7 @@
             <a:fld id="{FA3C144B-2939-9A49-B014-915EC3E81866}" type="datetime1">
               <a:rPr lang="en-US" smtClean="0"/>
               <a:pPr/>
-              <a:t>1/10/14</a:t>
+              <a:t>1/16/14</a:t>
             </a:fld>
             <a:endParaRPr lang="en-US" dirty="0"/>
           </a:p>
@@ -3352,7 +3795,7 @@
           <a:p>
             <a:fld id="{A73F672F-A5FB-5745-934A-1BF51CA5539C}" type="datetime1">
               <a:rPr lang="en-US" smtClean="0"/>
-              <a:t>1/10/14</a:t>
+              <a:t>1/16/14</a:t>
             </a:fld>
             <a:endParaRPr lang="en-US"/>
           </a:p>
@@ -3694,7 +4137,7 @@
             <a:fld id="{FA3C144B-2939-9A49-B014-915EC3E81866}" type="datetime1">
               <a:rPr lang="en-US" smtClean="0"/>
               <a:pPr/>
-              <a:t>1/10/14</a:t>
+              <a:t>1/16/14</a:t>
             </a:fld>
             <a:endParaRPr lang="en-US" dirty="0"/>
           </a:p>
@@ -4158,7 +4601,7 @@
           <a:p>
             <a:fld id="{6AFE6A63-5EBE-3E48-B0AE-DF655A1ECE76}" type="datetime1">
               <a:rPr lang="en-US" smtClean="0"/>
-              <a:t>1/10/14</a:t>
+              <a:t>1/16/14</a:t>
             </a:fld>
             <a:endParaRPr lang="en-US"/>
           </a:p>
@@ -4477,7 +4920,7 @@
           <a:p>
             <a:fld id="{4A019F0C-9D18-B54A-9AC9-18AA74EDB034}" type="datetime1">
               <a:rPr lang="en-US" smtClean="0"/>
-              <a:t>1/10/14</a:t>
+              <a:t>1/16/14</a:t>
             </a:fld>
             <a:endParaRPr lang="en-US"/>
           </a:p>
@@ -4787,7 +5230,7 @@
             <a:fld id="{FA3C144B-2939-9A49-B014-915EC3E81866}" type="datetime1">
               <a:rPr lang="en-US" smtClean="0"/>
               <a:pPr/>
-              <a:t>1/10/14</a:t>
+              <a:t>1/16/14</a:t>
             </a:fld>
             <a:endParaRPr lang="en-US" dirty="0"/>
           </a:p>
@@ -5050,7 +5493,7 @@
           <a:p>
             <a:fld id="{FA3C144B-2939-9A49-B014-915EC3E81866}" type="datetime1">
               <a:rPr lang="en-US" smtClean="0"/>
-              <a:t>1/10/14</a:t>
+              <a:t>1/16/14</a:t>
             </a:fld>
             <a:endParaRPr lang="en-US" dirty="0"/>
           </a:p>
@@ -5418,7 +5861,7 @@
           <a:p>
             <a:fld id="{7053BEFA-1175-F644-B249-7D41D72BD3FF}" type="datetime1">
               <a:rPr lang="en-US" smtClean="0"/>
-              <a:t>1/10/14</a:t>
+              <a:t>1/16/14</a:t>
             </a:fld>
             <a:endParaRPr lang="en-US"/>
           </a:p>
@@ -5537,7 +5980,7 @@
             <a:fld id="{FA3C144B-2939-9A49-B014-915EC3E81866}" type="datetime1">
               <a:rPr lang="en-US" smtClean="0"/>
               <a:pPr/>
-              <a:t>1/10/14</a:t>
+              <a:t>1/16/14</a:t>
             </a:fld>
             <a:endParaRPr lang="en-US" dirty="0"/>
           </a:p>
@@ -5754,7 +6197,7 @@
             <a:fld id="{FA3C144B-2939-9A49-B014-915EC3E81866}" type="datetime1">
               <a:rPr lang="en-US" smtClean="0"/>
               <a:pPr/>
-              <a:t>1/10/14</a:t>
+              <a:t>1/16/14</a:t>
             </a:fld>
             <a:endParaRPr lang="en-US" dirty="0"/>
           </a:p>
@@ -5999,7 +6442,7 @@
             <a:fld id="{FA3C144B-2939-9A49-B014-915EC3E81866}" type="datetime1">
               <a:rPr lang="en-US" smtClean="0"/>
               <a:pPr/>
-              <a:t>1/10/14</a:t>
+              <a:t>1/16/14</a:t>
             </a:fld>
             <a:endParaRPr lang="en-US" dirty="0"/>
           </a:p>
@@ -6377,7 +6820,7 @@
           <a:p>
             <a:fld id="{111EEF3B-ABF2-AA4E-9E24-0C6256942674}" type="datetime1">
               <a:rPr lang="en-US" smtClean="0"/>
-              <a:t>1/10/14</a:t>
+              <a:t>1/16/14</a:t>
             </a:fld>
             <a:endParaRPr lang="en-US"/>
           </a:p>
@@ -6541,7 +6984,7 @@
             <a:fld id="{FA3C144B-2939-9A49-B014-915EC3E81866}" type="datetime1">
               <a:rPr lang="en-US" smtClean="0"/>
               <a:pPr/>
-              <a:t>1/10/14</a:t>
+              <a:t>1/16/14</a:t>
             </a:fld>
             <a:endParaRPr lang="en-US" dirty="0"/>
           </a:p>
@@ -6958,7 +7401,7 @@
             <a:fld id="{FA3C144B-2939-9A49-B014-915EC3E81866}" type="datetime1">
               <a:rPr lang="en-US" smtClean="0"/>
               <a:pPr/>
-              <a:t>1/10/14</a:t>
+              <a:t>1/16/14</a:t>
             </a:fld>
             <a:endParaRPr lang="en-US" dirty="0"/>
           </a:p>
@@ -7274,7 +7717,7 @@
             <a:fld id="{FA3C144B-2939-9A49-B014-915EC3E81866}" type="datetime1">
               <a:rPr lang="en-US" smtClean="0"/>
               <a:pPr/>
-              <a:t>1/10/14</a:t>
+              <a:t>1/16/14</a:t>
             </a:fld>
             <a:endParaRPr lang="en-US" dirty="0"/>
           </a:p>
@@ -7940,7 +8383,7 @@
             <a:fld id="{FA3C144B-2939-9A49-B014-915EC3E81866}" type="datetime1">
               <a:rPr lang="en-US" smtClean="0"/>
               <a:pPr/>
-              <a:t>1/10/14</a:t>
+              <a:t>1/16/14</a:t>
             </a:fld>
             <a:endParaRPr lang="en-US" dirty="0"/>
           </a:p>
@@ -9059,7 +9502,7 @@
           <a:p>
             <a:fld id="{7053BEFA-1175-F644-B249-7D41D72BD3FF}" type="datetime1">
               <a:rPr lang="en-US" smtClean="0"/>
-              <a:t>1/10/14</a:t>
+              <a:t>1/16/14</a:t>
             </a:fld>
             <a:endParaRPr lang="en-US"/>
           </a:p>
@@ -9154,7 +9597,7 @@
           <a:p>
             <a:r>
               <a:rPr lang="en-US" dirty="0" smtClean="0"/>
-              <a:t>What is a Database?</a:t>
+              <a:t>What is a Data Model?</a:t>
             </a:r>
             <a:endParaRPr lang="en-US" dirty="0"/>
           </a:p>
@@ -9179,8 +9622,20 @@
               <a:buNone/>
             </a:pPr>
             <a:r>
-              <a:rPr lang="en-US" dirty="0" smtClean="0"/>
-              <a:t>Stores Information</a:t>
+              <a:rPr lang="en-US" dirty="0"/>
+              <a:t>What data is </a:t>
+            </a:r>
+            <a:r>
+              <a:rPr lang="en-US" dirty="0" smtClean="0"/>
+              <a:t>stored and </a:t>
+            </a:r>
+            <a:r>
+              <a:rPr lang="en-US" dirty="0"/>
+              <a:t>how it is </a:t>
+            </a:r>
+            <a:r>
+              <a:rPr lang="en-US" dirty="0" smtClean="0"/>
+              <a:t>organized</a:t>
             </a:r>
           </a:p>
           <a:p>
@@ -9195,7 +9650,17 @@
             </a:pPr>
             <a:r>
               <a:rPr lang="en-US" dirty="0" smtClean="0"/>
-              <a:t>Separates logical (schema) physical (storage) and control (queries </a:t>
+              <a:t>Key benefits:</a:t>
+            </a:r>
+          </a:p>
+          <a:p>
+            <a:r>
+              <a:rPr lang="en-US" dirty="0" smtClean="0"/>
+              <a:t>Leverage  </a:t>
+            </a:r>
+            <a:r>
+              <a:rPr lang="en-US" dirty="0"/>
+              <a:t>(big impact on programming; cost; </a:t>
             </a:r>
             <a:r>
               <a:rPr lang="en-US" i="1" dirty="0" smtClean="0"/>
@@ -9205,21 +9670,21 @@
               <a:rPr lang="en-US" dirty="0" smtClean="0"/>
               <a:t>)</a:t>
             </a:r>
-          </a:p>
-          <a:p>
-            <a:pPr marL="0" indent="0">
-              <a:buNone/>
-            </a:pPr>
-            <a:endParaRPr lang="en-US" dirty="0" smtClean="0"/>
-          </a:p>
-          <a:p>
-            <a:pPr marL="0" indent="0">
-              <a:buNone/>
-            </a:pPr>
-            <a:r>
-              <a:rPr lang="en-US" dirty="0" smtClean="0"/>
-              <a:t>Other jobs?</a:t>
-            </a:r>
+            <a:endParaRPr lang="en-US" dirty="0"/>
+          </a:p>
+          <a:p>
+            <a:r>
+              <a:rPr lang="en-US" dirty="0"/>
+              <a:t>Conciseness (implies an interaction model)</a:t>
+            </a:r>
+          </a:p>
+          <a:p>
+            <a:r>
+              <a:rPr lang="en-US" dirty="0"/>
+              <a:t>Can encode integrity constraints </a:t>
+            </a:r>
+          </a:p>
+          <a:p>
             <a:endParaRPr lang="en-US" dirty="0"/>
           </a:p>
         </p:txBody>
@@ -9241,7 +9706,7 @@
           <a:p>
             <a:fld id="{7053BEFA-1175-F644-B249-7D41D72BD3FF}" type="datetime1">
               <a:rPr lang="en-US" smtClean="0"/>
-              <a:t>1/10/14</a:t>
+              <a:t>1/16/14</a:t>
             </a:fld>
             <a:endParaRPr lang="en-US"/>
           </a:p>
@@ -9289,10 +9754,36 @@
           </a:p>
         </p:txBody>
       </p:sp>
+      <p:sp>
+        <p:nvSpPr>
+          <p:cNvPr id="7" name="TextBox 6"/>
+          <p:cNvSpPr txBox="1"/>
+          <p:nvPr/>
+        </p:nvSpPr>
+        <p:spPr>
+          <a:xfrm>
+            <a:off x="3362451" y="3473351"/>
+            <a:ext cx="184666" cy="369332"/>
+          </a:xfrm>
+          <a:prstGeom prst="rect">
+            <a:avLst/>
+          </a:prstGeom>
+          <a:noFill/>
+        </p:spPr>
+        <p:txBody>
+          <a:bodyPr wrap="none" rtlCol="0">
+            <a:spAutoFit/>
+          </a:bodyPr>
+          <a:lstStyle/>
+          <a:p>
+            <a:endParaRPr lang="en-US" dirty="0"/>
+          </a:p>
+        </p:txBody>
+      </p:sp>
     </p:spTree>
     <p:extLst>
       <p:ext uri="{BB962C8B-B14F-4D97-AF65-F5344CB8AC3E}">
-        <p14:creationId xmlns:p14="http://schemas.microsoft.com/office/powerpoint/2010/main" val="1672600600"/>
+        <p14:creationId xmlns:p14="http://schemas.microsoft.com/office/powerpoint/2010/main" val="321535194"/>
       </p:ext>
     </p:extLst>
   </p:cSld>
@@ -9336,7 +9827,7 @@
           <a:p>
             <a:r>
               <a:rPr lang="en-US" dirty="0" smtClean="0"/>
-              <a:t>Structured Data – Do you really know what you’re getting?</a:t>
+              <a:t>Common structure</a:t>
             </a:r>
             <a:endParaRPr lang="en-US" dirty="0"/>
           </a:p>
@@ -9357,69 +9848,54 @@
           <a:bodyPr/>
           <a:lstStyle/>
           <a:p>
-            <a:r>
-              <a:rPr lang="en-US" dirty="0" smtClean="0"/>
-              <a:t>How is it structured; if at all?</a:t>
-            </a:r>
-          </a:p>
-          <a:p>
-            <a:r>
-              <a:rPr lang="en-US" dirty="0" smtClean="0"/>
-              <a:t>What are the </a:t>
-            </a:r>
-            <a:r>
-              <a:rPr lang="en-US" i="1" dirty="0" smtClean="0"/>
-              <a:t>fields</a:t>
-            </a:r>
-            <a:r>
-              <a:rPr lang="en-US" dirty="0" smtClean="0"/>
-              <a:t> and </a:t>
-            </a:r>
-            <a:r>
-              <a:rPr lang="en-US" i="1" dirty="0" smtClean="0"/>
-              <a:t>values</a:t>
-            </a:r>
-            <a:r>
-              <a:rPr lang="en-US" dirty="0" smtClean="0"/>
-              <a:t>?</a:t>
-            </a:r>
-          </a:p>
-          <a:p>
-            <a:r>
-              <a:rPr lang="en-US" dirty="0" smtClean="0"/>
-              <a:t>Does it have multiple tables or just one?</a:t>
-            </a:r>
-          </a:p>
-          <a:p>
-            <a:r>
-              <a:rPr lang="en-US" dirty="0" smtClean="0"/>
-              <a:t>Is it designed for machine consumption or human consumption?</a:t>
-            </a:r>
-          </a:p>
-          <a:p>
-            <a:r>
-              <a:rPr lang="en-US" dirty="0" smtClean="0"/>
-              <a:t>Is it in a database? multiple files or one file?</a:t>
-            </a:r>
-          </a:p>
-          <a:p>
             <a:pPr marL="0" indent="0">
               <a:buNone/>
             </a:pPr>
             <a:r>
               <a:rPr lang="en-US" dirty="0" smtClean="0"/>
-              <a:t>Recommended Reading: The Bad Data Handbook (McCallum): O’Reilly</a:t>
-            </a:r>
-            <a:r>
-              <a:rPr lang="en-US" dirty="0"/>
-              <a:t> </a:t>
-            </a:r>
-            <a:r>
-              <a:rPr lang="en-US" dirty="0" smtClean="0"/>
-              <a:t>Press</a:t>
-            </a:r>
-          </a:p>
-          <a:p>
+              <a:t>Tables (rows &amp; columns)</a:t>
+            </a:r>
+          </a:p>
+          <a:p>
+            <a:pPr marL="0" indent="0">
+              <a:buNone/>
+            </a:pPr>
+            <a:r>
+              <a:rPr lang="en-US" dirty="0" smtClean="0"/>
+              <a:t>Example from Byte2: </a:t>
+            </a:r>
+          </a:p>
+          <a:p>
+            <a:pPr lvl="1"/>
+            <a:r>
+              <a:rPr lang="en-US" dirty="0" smtClean="0"/>
+              <a:t>Each row is a pet </a:t>
+            </a:r>
+          </a:p>
+          <a:p>
+            <a:pPr lvl="1"/>
+            <a:r>
+              <a:rPr lang="en-US" dirty="0" smtClean="0"/>
+              <a:t>Columns describe where it was found, breed, color, outcome and so on.</a:t>
+            </a:r>
+          </a:p>
+          <a:p>
+            <a:pPr marL="0" indent="0">
+              <a:buNone/>
+            </a:pPr>
+            <a:r>
+              <a:rPr lang="en-US" dirty="0" smtClean="0"/>
+              <a:t>Many of the data sets we will look at have this form</a:t>
+            </a:r>
+          </a:p>
+          <a:p>
+            <a:pPr marL="0" indent="0">
+              <a:buNone/>
+            </a:pPr>
+            <a:r>
+              <a:rPr lang="en-US" dirty="0" smtClean="0"/>
+              <a:t>But a database is typically far more complex</a:t>
+            </a:r>
             <a:endParaRPr lang="en-US" dirty="0"/>
           </a:p>
         </p:txBody>
@@ -9441,7 +9917,7 @@
           <a:p>
             <a:fld id="{7053BEFA-1175-F644-B249-7D41D72BD3FF}" type="datetime1">
               <a:rPr lang="en-US" smtClean="0"/>
-              <a:t>1/10/14</a:t>
+              <a:t>1/16/14</a:t>
             </a:fld>
             <a:endParaRPr lang="en-US"/>
           </a:p>
@@ -9492,7 +9968,7 @@
     </p:spTree>
     <p:extLst>
       <p:ext uri="{BB962C8B-B14F-4D97-AF65-F5344CB8AC3E}">
-        <p14:creationId xmlns:p14="http://schemas.microsoft.com/office/powerpoint/2010/main" val="1476386649"/>
+        <p14:creationId xmlns:p14="http://schemas.microsoft.com/office/powerpoint/2010/main" val="1224266322"/>
       </p:ext>
     </p:extLst>
   </p:cSld>
@@ -9536,7 +10012,7 @@
           <a:p>
             <a:r>
               <a:rPr lang="en-US" dirty="0" smtClean="0"/>
-              <a:t>Common structure</a:t>
+              <a:t>Complex Schema</a:t>
             </a:r>
             <a:endParaRPr lang="en-US" dirty="0"/>
           </a:p>
@@ -9562,7 +10038,7 @@
             </a:pPr>
             <a:r>
               <a:rPr lang="en-US" dirty="0" smtClean="0"/>
-              <a:t>Tables (rows &amp; columns)</a:t>
+              <a:t>Many tables</a:t>
             </a:r>
           </a:p>
           <a:p>
@@ -9570,22 +10046,12 @@
               <a:buNone/>
             </a:pPr>
             <a:r>
-              <a:rPr lang="en-US" dirty="0" smtClean="0"/>
-              <a:t>Example from Byte2: </a:t>
-            </a:r>
-          </a:p>
-          <a:p>
-            <a:pPr lvl="1"/>
-            <a:r>
-              <a:rPr lang="en-US" dirty="0" smtClean="0"/>
-              <a:t>Each row is a pet </a:t>
-            </a:r>
-          </a:p>
-          <a:p>
-            <a:pPr lvl="1"/>
-            <a:r>
-              <a:rPr lang="en-US" dirty="0" smtClean="0"/>
-              <a:t>Columns describe where it was found, breed, color, outcome and so on.</a:t>
+              <a:rPr lang="en-US" i="1" dirty="0" smtClean="0"/>
+              <a:t>Logically </a:t>
+            </a:r>
+            <a:r>
+              <a:rPr lang="en-US" dirty="0" smtClean="0"/>
+              <a:t>connected </a:t>
             </a:r>
           </a:p>
           <a:p>
@@ -9594,7 +10060,7 @@
             </a:pPr>
             <a:r>
               <a:rPr lang="en-US" dirty="0" smtClean="0"/>
-              <a:t>Many of the data sets we will look at have this form</a:t>
+              <a:t>Connections expressed using special kinds of columns that reflect Ids of other tables (“foreign keys”)</a:t>
             </a:r>
           </a:p>
           <a:p>
@@ -9602,10 +10068,19 @@
               <a:buNone/>
             </a:pPr>
             <a:r>
-              <a:rPr lang="en-US" dirty="0" smtClean="0"/>
-              <a:t>But a database is typically far more complex</a:t>
-            </a:r>
-            <a:endParaRPr lang="en-US" dirty="0"/>
+              <a:rPr lang="en-US" i="1" dirty="0" smtClean="0"/>
+              <a:t>Rules </a:t>
+            </a:r>
+            <a:r>
+              <a:rPr lang="en-US" dirty="0" smtClean="0"/>
+              <a:t>(implicit or explicit) may further govern the integrity of data</a:t>
+            </a:r>
+          </a:p>
+          <a:p>
+            <a:pPr marL="0" indent="0">
+              <a:buNone/>
+            </a:pPr>
+            <a:endParaRPr lang="en-US" dirty="0" smtClean="0"/>
           </a:p>
         </p:txBody>
       </p:sp>
@@ -9626,7 +10101,7 @@
           <a:p>
             <a:fld id="{7053BEFA-1175-F644-B249-7D41D72BD3FF}" type="datetime1">
               <a:rPr lang="en-US" smtClean="0"/>
-              <a:t>1/10/14</a:t>
+              <a:t>1/16/14</a:t>
             </a:fld>
             <a:endParaRPr lang="en-US"/>
           </a:p>
@@ -9677,7 +10152,7 @@
     </p:spTree>
     <p:extLst>
       <p:ext uri="{BB962C8B-B14F-4D97-AF65-F5344CB8AC3E}">
-        <p14:creationId xmlns:p14="http://schemas.microsoft.com/office/powerpoint/2010/main" val="1224266322"/>
+        <p14:creationId xmlns:p14="http://schemas.microsoft.com/office/powerpoint/2010/main" val="3564684317"/>
       </p:ext>
     </p:extLst>
   </p:cSld>
@@ -9721,7 +10196,7 @@
           <a:p>
             <a:r>
               <a:rPr lang="en-US" dirty="0" smtClean="0"/>
-              <a:t>Complex Schema</a:t>
+              <a:t>Example</a:t>
             </a:r>
             <a:endParaRPr lang="en-US" dirty="0"/>
           </a:p>
@@ -9747,49 +10222,14 @@
             </a:pPr>
             <a:r>
               <a:rPr lang="en-US" dirty="0" smtClean="0"/>
-              <a:t>Many tables</a:t>
+              <a:t>What if we had a table of dog breeds</a:t>
             </a:r>
           </a:p>
           <a:p>
             <a:pPr marL="0" indent="0">
               <a:buNone/>
             </a:pPr>
-            <a:r>
-              <a:rPr lang="en-US" i="1" dirty="0" smtClean="0"/>
-              <a:t>Logically </a:t>
-            </a:r>
-            <a:r>
-              <a:rPr lang="en-US" dirty="0" smtClean="0"/>
-              <a:t>connected </a:t>
-            </a:r>
-          </a:p>
-          <a:p>
-            <a:pPr marL="0" indent="0">
-              <a:buNone/>
-            </a:pPr>
-            <a:r>
-              <a:rPr lang="en-US" dirty="0" smtClean="0"/>
-              <a:t>Connections expressed using special kinds of columns that reflect Ids of other tables (“foreign keys”)</a:t>
-            </a:r>
-          </a:p>
-          <a:p>
-            <a:pPr marL="0" indent="0">
-              <a:buNone/>
-            </a:pPr>
-            <a:r>
-              <a:rPr lang="en-US" i="1" dirty="0" smtClean="0"/>
-              <a:t>Rules </a:t>
-            </a:r>
-            <a:r>
-              <a:rPr lang="en-US" dirty="0" smtClean="0"/>
-              <a:t>(implicit or explicit) may further govern the integrity of data</a:t>
-            </a:r>
-          </a:p>
-          <a:p>
-            <a:pPr marL="0" indent="0">
-              <a:buNone/>
-            </a:pPr>
-            <a:endParaRPr lang="en-US" dirty="0" smtClean="0"/>
+            <a:endParaRPr lang="en-US" dirty="0"/>
           </a:p>
         </p:txBody>
       </p:sp>
@@ -9810,7 +10250,7 @@
           <a:p>
             <a:fld id="{7053BEFA-1175-F644-B249-7D41D72BD3FF}" type="datetime1">
               <a:rPr lang="en-US" smtClean="0"/>
-              <a:t>1/10/14</a:t>
+              <a:t>1/16/14</a:t>
             </a:fld>
             <a:endParaRPr lang="en-US"/>
           </a:p>
@@ -9853,155 +10293,6 @@
             <a:fld id="{17E276FA-8F89-B34D-A726-BE3FA1F8DD97}" type="slidenum">
               <a:rPr lang="en-US" smtClean="0"/>
               <a:t>14</a:t>
-            </a:fld>
-            <a:endParaRPr lang="en-US" dirty="0"/>
-          </a:p>
-        </p:txBody>
-      </p:sp>
-    </p:spTree>
-    <p:extLst>
-      <p:ext uri="{BB962C8B-B14F-4D97-AF65-F5344CB8AC3E}">
-        <p14:creationId xmlns:p14="http://schemas.microsoft.com/office/powerpoint/2010/main" val="3564684317"/>
-      </p:ext>
-    </p:extLst>
-  </p:cSld>
-  <p:clrMapOvr>
-    <a:masterClrMapping/>
-  </p:clrMapOvr>
-</p:sld>
-</file>
-
-<file path=ppt/slides/slide15.xml><?xml version="1.0" encoding="utf-8"?>
-<p:sld xmlns:a="http://schemas.openxmlformats.org/drawingml/2006/main" xmlns:r="http://schemas.openxmlformats.org/officeDocument/2006/relationships" xmlns:p="http://schemas.openxmlformats.org/presentationml/2006/main">
-  <p:cSld>
-    <p:spTree>
-      <p:nvGrpSpPr>
-        <p:cNvPr id="1" name=""/>
-        <p:cNvGrpSpPr/>
-        <p:nvPr/>
-      </p:nvGrpSpPr>
-      <p:grpSpPr>
-        <a:xfrm>
-          <a:off x="0" y="0"/>
-          <a:ext cx="0" cy="0"/>
-          <a:chOff x="0" y="0"/>
-          <a:chExt cx="0" cy="0"/>
-        </a:xfrm>
-      </p:grpSpPr>
-      <p:sp>
-        <p:nvSpPr>
-          <p:cNvPr id="2" name="Title 1"/>
-          <p:cNvSpPr>
-            <a:spLocks noGrp="1"/>
-          </p:cNvSpPr>
-          <p:nvPr>
-            <p:ph type="title"/>
-          </p:nvPr>
-        </p:nvSpPr>
-        <p:spPr/>
-        <p:txBody>
-          <a:bodyPr/>
-          <a:lstStyle/>
-          <a:p>
-            <a:r>
-              <a:rPr lang="en-US" dirty="0" smtClean="0"/>
-              <a:t>Example</a:t>
-            </a:r>
-            <a:endParaRPr lang="en-US" dirty="0"/>
-          </a:p>
-        </p:txBody>
-      </p:sp>
-      <p:sp>
-        <p:nvSpPr>
-          <p:cNvPr id="3" name="Content Placeholder 2"/>
-          <p:cNvSpPr>
-            <a:spLocks noGrp="1"/>
-          </p:cNvSpPr>
-          <p:nvPr>
-            <p:ph idx="1"/>
-          </p:nvPr>
-        </p:nvSpPr>
-        <p:spPr/>
-        <p:txBody>
-          <a:bodyPr/>
-          <a:lstStyle/>
-          <a:p>
-            <a:pPr marL="0" indent="0">
-              <a:buNone/>
-            </a:pPr>
-            <a:r>
-              <a:rPr lang="en-US" dirty="0" smtClean="0"/>
-              <a:t>What if we had a table of dog breeds</a:t>
-            </a:r>
-          </a:p>
-          <a:p>
-            <a:pPr marL="0" indent="0">
-              <a:buNone/>
-            </a:pPr>
-            <a:endParaRPr lang="en-US" dirty="0"/>
-          </a:p>
-        </p:txBody>
-      </p:sp>
-      <p:sp>
-        <p:nvSpPr>
-          <p:cNvPr id="4" name="Date Placeholder 3"/>
-          <p:cNvSpPr>
-            <a:spLocks noGrp="1"/>
-          </p:cNvSpPr>
-          <p:nvPr>
-            <p:ph type="dt" sz="half" idx="10"/>
-          </p:nvPr>
-        </p:nvSpPr>
-        <p:spPr/>
-        <p:txBody>
-          <a:bodyPr/>
-          <a:lstStyle/>
-          <a:p>
-            <a:fld id="{7053BEFA-1175-F644-B249-7D41D72BD3FF}" type="datetime1">
-              <a:rPr lang="en-US" smtClean="0"/>
-              <a:t>1/10/14</a:t>
-            </a:fld>
-            <a:endParaRPr lang="en-US"/>
-          </a:p>
-        </p:txBody>
-      </p:sp>
-      <p:sp>
-        <p:nvSpPr>
-          <p:cNvPr id="5" name="Footer Placeholder 4"/>
-          <p:cNvSpPr>
-            <a:spLocks noGrp="1"/>
-          </p:cNvSpPr>
-          <p:nvPr>
-            <p:ph type="ftr" sz="quarter" idx="11"/>
-          </p:nvPr>
-        </p:nvSpPr>
-        <p:spPr/>
-        <p:txBody>
-          <a:bodyPr/>
-          <a:lstStyle/>
-          <a:p>
-            <a:endParaRPr lang="en-US" dirty="0"/>
-          </a:p>
-        </p:txBody>
-      </p:sp>
-      <p:sp>
-        <p:nvSpPr>
-          <p:cNvPr id="6" name="Slide Number Placeholder 5"/>
-          <p:cNvSpPr>
-            <a:spLocks noGrp="1"/>
-          </p:cNvSpPr>
-          <p:nvPr>
-            <p:ph type="sldNum" sz="quarter" idx="12"/>
-          </p:nvPr>
-        </p:nvSpPr>
-        <p:spPr/>
-        <p:txBody>
-          <a:bodyPr/>
-          <a:lstStyle/>
-          <a:p>
-            <a:fld id="{17E276FA-8F89-B34D-A726-BE3FA1F8DD97}" type="slidenum">
-              <a:rPr lang="en-US" smtClean="0"/>
-              <a:t>15</a:t>
             </a:fld>
             <a:endParaRPr lang="en-US" dirty="0"/>
           </a:p>
@@ -10176,7 +10467,7 @@
 </p:sld>
 </file>
 
-<file path=ppt/slides/slide16.xml><?xml version="1.0" encoding="utf-8"?>
+<file path=ppt/slides/slide15.xml><?xml version="1.0" encoding="utf-8"?>
 <p:sld xmlns:a="http://schemas.openxmlformats.org/drawingml/2006/main" xmlns:r="http://schemas.openxmlformats.org/officeDocument/2006/relationships" xmlns:p="http://schemas.openxmlformats.org/presentationml/2006/main">
   <p:cSld>
     <p:spTree>
@@ -10340,7 +10631,7 @@
           <a:p>
             <a:fld id="{7053BEFA-1175-F644-B249-7D41D72BD3FF}" type="datetime1">
               <a:rPr lang="en-US" smtClean="0"/>
-              <a:t>1/10/14</a:t>
+              <a:t>1/16/14</a:t>
             </a:fld>
             <a:endParaRPr lang="en-US"/>
           </a:p>
@@ -10382,7 +10673,7 @@
           <a:p>
             <a:fld id="{17E276FA-8F89-B34D-A726-BE3FA1F8DD97}" type="slidenum">
               <a:rPr lang="en-US" smtClean="0"/>
-              <a:t>16</a:t>
+              <a:t>15</a:t>
             </a:fld>
             <a:endParaRPr lang="en-US" dirty="0"/>
           </a:p>
@@ -10867,6 +11158,157 @@
 </p:sld>
 </file>
 
+<file path=ppt/slides/slide16.xml><?xml version="1.0" encoding="utf-8"?>
+<p:sld xmlns:a="http://schemas.openxmlformats.org/drawingml/2006/main" xmlns:r="http://schemas.openxmlformats.org/officeDocument/2006/relationships" xmlns:p="http://schemas.openxmlformats.org/presentationml/2006/main">
+  <p:cSld>
+    <p:spTree>
+      <p:nvGrpSpPr>
+        <p:cNvPr id="1" name=""/>
+        <p:cNvGrpSpPr/>
+        <p:nvPr/>
+      </p:nvGrpSpPr>
+      <p:grpSpPr>
+        <a:xfrm>
+          <a:off x="0" y="0"/>
+          <a:ext cx="0" cy="0"/>
+          <a:chOff x="0" y="0"/>
+          <a:chExt cx="0" cy="0"/>
+        </a:xfrm>
+      </p:grpSpPr>
+      <p:sp>
+        <p:nvSpPr>
+          <p:cNvPr id="2" name="Title 1"/>
+          <p:cNvSpPr>
+            <a:spLocks noGrp="1"/>
+          </p:cNvSpPr>
+          <p:nvPr>
+            <p:ph type="title"/>
+          </p:nvPr>
+        </p:nvSpPr>
+        <p:spPr/>
+        <p:txBody>
+          <a:bodyPr/>
+          <a:lstStyle/>
+          <a:p>
+            <a:r>
+              <a:rPr lang="en-US" dirty="0" smtClean="0"/>
+              <a:t>What makes a good data model?</a:t>
+            </a:r>
+            <a:endParaRPr lang="en-US" dirty="0"/>
+          </a:p>
+        </p:txBody>
+      </p:sp>
+      <p:sp>
+        <p:nvSpPr>
+          <p:cNvPr id="3" name="Content Placeholder 2"/>
+          <p:cNvSpPr>
+            <a:spLocks noGrp="1"/>
+          </p:cNvSpPr>
+          <p:nvPr>
+            <p:ph idx="1"/>
+          </p:nvPr>
+        </p:nvSpPr>
+        <p:spPr/>
+        <p:txBody>
+          <a:bodyPr/>
+          <a:lstStyle/>
+          <a:p>
+            <a:pPr marL="0" indent="0">
+              <a:buNone/>
+            </a:pPr>
+            <a:r>
+              <a:rPr lang="en-US" dirty="0" smtClean="0"/>
+              <a:t>Completeness – does it support </a:t>
+            </a:r>
+            <a:r>
+              <a:rPr lang="en-US" dirty="0" err="1" smtClean="0"/>
+              <a:t>alll</a:t>
+            </a:r>
+            <a:r>
+              <a:rPr lang="en-US" dirty="0" smtClean="0"/>
+              <a:t> of the data?</a:t>
+            </a:r>
+          </a:p>
+        </p:txBody>
+      </p:sp>
+      <p:sp>
+        <p:nvSpPr>
+          <p:cNvPr id="4" name="Date Placeholder 3"/>
+          <p:cNvSpPr>
+            <a:spLocks noGrp="1"/>
+          </p:cNvSpPr>
+          <p:nvPr>
+            <p:ph type="dt" sz="half" idx="10"/>
+          </p:nvPr>
+        </p:nvSpPr>
+        <p:spPr/>
+        <p:txBody>
+          <a:bodyPr/>
+          <a:lstStyle/>
+          <a:p>
+            <a:fld id="{7053BEFA-1175-F644-B249-7D41D72BD3FF}" type="datetime1">
+              <a:rPr lang="en-US" smtClean="0"/>
+              <a:t>1/16/14</a:t>
+            </a:fld>
+            <a:endParaRPr lang="en-US"/>
+          </a:p>
+        </p:txBody>
+      </p:sp>
+      <p:sp>
+        <p:nvSpPr>
+          <p:cNvPr id="5" name="Footer Placeholder 4"/>
+          <p:cNvSpPr>
+            <a:spLocks noGrp="1"/>
+          </p:cNvSpPr>
+          <p:nvPr>
+            <p:ph type="ftr" sz="quarter" idx="11"/>
+          </p:nvPr>
+        </p:nvSpPr>
+        <p:spPr/>
+        <p:txBody>
+          <a:bodyPr/>
+          <a:lstStyle/>
+          <a:p>
+            <a:endParaRPr lang="en-US" dirty="0"/>
+          </a:p>
+        </p:txBody>
+      </p:sp>
+      <p:sp>
+        <p:nvSpPr>
+          <p:cNvPr id="6" name="Slide Number Placeholder 5"/>
+          <p:cNvSpPr>
+            <a:spLocks noGrp="1"/>
+          </p:cNvSpPr>
+          <p:nvPr>
+            <p:ph type="sldNum" sz="quarter" idx="12"/>
+          </p:nvPr>
+        </p:nvSpPr>
+        <p:spPr/>
+        <p:txBody>
+          <a:bodyPr/>
+          <a:lstStyle/>
+          <a:p>
+            <a:fld id="{17E276FA-8F89-B34D-A726-BE3FA1F8DD97}" type="slidenum">
+              <a:rPr lang="en-US" smtClean="0"/>
+              <a:t>16</a:t>
+            </a:fld>
+            <a:endParaRPr lang="en-US" dirty="0"/>
+          </a:p>
+        </p:txBody>
+      </p:sp>
+    </p:spTree>
+    <p:extLst>
+      <p:ext uri="{BB962C8B-B14F-4D97-AF65-F5344CB8AC3E}">
+        <p14:creationId xmlns:p14="http://schemas.microsoft.com/office/powerpoint/2010/main" val="2240654708"/>
+      </p:ext>
+    </p:extLst>
+  </p:cSld>
+  <p:clrMapOvr>
+    <a:masterClrMapping/>
+  </p:clrMapOvr>
+</p:sld>
+</file>
+
 <file path=ppt/slides/slide17.xml><?xml version="1.0" encoding="utf-8"?>
 <p:sld xmlns:a="http://schemas.openxmlformats.org/drawingml/2006/main" xmlns:r="http://schemas.openxmlformats.org/officeDocument/2006/relationships" xmlns:p="http://schemas.openxmlformats.org/presentationml/2006/main">
   <p:cSld>
@@ -10901,7 +11343,7 @@
           <a:p>
             <a:r>
               <a:rPr lang="en-US" dirty="0" smtClean="0"/>
-              <a:t>Implementation Issues</a:t>
+              <a:t>What makes a good data model?</a:t>
             </a:r>
             <a:endParaRPr lang="en-US" dirty="0"/>
           </a:p>
@@ -10926,12 +11368,8 @@
               <a:buNone/>
             </a:pPr>
             <a:r>
-              <a:rPr lang="en-US" dirty="0"/>
-              <a:t>Schema design affects the kinds of queries we can ask </a:t>
-            </a:r>
-            <a:r>
-              <a:rPr lang="en-US" dirty="0" smtClean="0"/>
-              <a:t>efficiently</a:t>
+              <a:rPr lang="en-US" dirty="0" smtClean="0"/>
+              <a:t>Completeness</a:t>
             </a:r>
           </a:p>
           <a:p>
@@ -10939,53 +11377,31 @@
               <a:buNone/>
             </a:pPr>
             <a:r>
-              <a:rPr lang="en-US" dirty="0" smtClean="0"/>
-              <a:t>So may the underlying engine</a:t>
-            </a:r>
-          </a:p>
-          <a:p>
-            <a:pPr lvl="1"/>
-            <a:r>
-              <a:rPr lang="en-US" dirty="0" smtClean="0"/>
-              <a:t>Ability to handle big data (</a:t>
-            </a:r>
-            <a:r>
-              <a:rPr lang="en-US" i="1" dirty="0" smtClean="0"/>
-              <a:t>e.g. </a:t>
-            </a:r>
-            <a:r>
-              <a:rPr lang="en-US" i="1" dirty="0" err="1" smtClean="0"/>
-              <a:t>mongodb</a:t>
-            </a:r>
-            <a:r>
-              <a:rPr lang="en-US" dirty="0" smtClean="0"/>
-              <a:t>) </a:t>
-            </a:r>
-          </a:p>
-          <a:p>
-            <a:pPr lvl="1"/>
-            <a:r>
               <a:rPr lang="en-US" dirty="0" err="1" smtClean="0"/>
-              <a:t>Debuggability</a:t>
-            </a:r>
-            <a:endParaRPr lang="en-US" dirty="0" smtClean="0"/>
-          </a:p>
-          <a:p>
-            <a:pPr lvl="1"/>
-            <a:r>
-              <a:rPr lang="en-US" dirty="0" smtClean="0"/>
-              <a:t>Accessibility of raw data </a:t>
-            </a:r>
-          </a:p>
-          <a:p>
-            <a:pPr lvl="1"/>
-            <a:r>
-              <a:rPr lang="en-US" dirty="0" smtClean="0"/>
-              <a:t>…</a:t>
-            </a:r>
-            <a:endParaRPr lang="en-US" dirty="0"/>
-          </a:p>
-          <a:p>
+              <a:t>Nonredundancy</a:t>
+            </a:r>
+            <a:r>
+              <a:rPr lang="en-US" dirty="0" smtClean="0"/>
+              <a:t> – Age &amp; Birth Date? </a:t>
+            </a:r>
+          </a:p>
+          <a:p>
+            <a:r>
+              <a:rPr lang="en-US" dirty="0" smtClean="0"/>
+              <a:t>Affects space</a:t>
+            </a:r>
+          </a:p>
+          <a:p>
+            <a:r>
+              <a:rPr lang="en-US" dirty="0" smtClean="0"/>
+              <a:t>Affects processing</a:t>
+            </a:r>
+          </a:p>
+          <a:p>
+            <a:r>
+              <a:rPr lang="en-US" dirty="0" smtClean="0"/>
+              <a:t>Affects consistency!! </a:t>
+            </a:r>
             <a:endParaRPr lang="en-US" dirty="0"/>
           </a:p>
         </p:txBody>
@@ -11007,7 +11423,7 @@
           <a:p>
             <a:fld id="{7053BEFA-1175-F644-B249-7D41D72BD3FF}" type="datetime1">
               <a:rPr lang="en-US" smtClean="0"/>
-              <a:t>1/10/14</a:t>
+              <a:t>1/16/14</a:t>
             </a:fld>
             <a:endParaRPr lang="en-US"/>
           </a:p>
@@ -11058,7 +11474,7 @@
     </p:spTree>
     <p:extLst>
       <p:ext uri="{BB962C8B-B14F-4D97-AF65-F5344CB8AC3E}">
-        <p14:creationId xmlns:p14="http://schemas.microsoft.com/office/powerpoint/2010/main" val="170751272"/>
+        <p14:creationId xmlns:p14="http://schemas.microsoft.com/office/powerpoint/2010/main" val="3038058737"/>
       </p:ext>
     </p:extLst>
   </p:cSld>
@@ -11102,7 +11518,7 @@
           <a:p>
             <a:r>
               <a:rPr lang="en-US" dirty="0" smtClean="0"/>
-              <a:t>Query Language (Typically SQL)</a:t>
+              <a:t>What makes a good data model?</a:t>
             </a:r>
             <a:endParaRPr lang="en-US" dirty="0"/>
           </a:p>
@@ -11128,7 +11544,40 @@
             </a:pPr>
             <a:r>
               <a:rPr lang="en-US" dirty="0" smtClean="0"/>
-              <a:t>Structured language, very widely adopted</a:t>
+              <a:t>Completeness</a:t>
+            </a:r>
+          </a:p>
+          <a:p>
+            <a:pPr marL="0" indent="0">
+              <a:buNone/>
+            </a:pPr>
+            <a:r>
+              <a:rPr lang="en-US" dirty="0" err="1" smtClean="0"/>
+              <a:t>Nonredundancy</a:t>
+            </a:r>
+            <a:endParaRPr lang="en-US" dirty="0" smtClean="0"/>
+          </a:p>
+          <a:p>
+            <a:pPr marL="0" indent="0">
+              <a:buNone/>
+            </a:pPr>
+            <a:r>
+              <a:rPr lang="en-US" dirty="0" smtClean="0"/>
+              <a:t>Enforcement of Rules </a:t>
+            </a:r>
+          </a:p>
+          <a:p>
+            <a:r>
+              <a:rPr lang="en-US" dirty="0" smtClean="0"/>
+              <a:t>Happens across tables by ensuring </a:t>
+            </a:r>
+            <a:r>
+              <a:rPr lang="en-US" i="1" dirty="0" smtClean="0"/>
+              <a:t>e.g. </a:t>
+            </a:r>
+            <a:r>
+              <a:rPr lang="en-US" dirty="0" smtClean="0"/>
+              <a:t>that each dog only has one 2 breeds</a:t>
             </a:r>
             <a:endParaRPr lang="en-US" dirty="0"/>
           </a:p>
@@ -11151,7 +11600,7 @@
           <a:p>
             <a:fld id="{7053BEFA-1175-F644-B249-7D41D72BD3FF}" type="datetime1">
               <a:rPr lang="en-US" smtClean="0"/>
-              <a:t>1/10/14</a:t>
+              <a:t>1/16/14</a:t>
             </a:fld>
             <a:endParaRPr lang="en-US"/>
           </a:p>
@@ -11202,7 +11651,7 @@
     </p:spTree>
     <p:extLst>
       <p:ext uri="{BB962C8B-B14F-4D97-AF65-F5344CB8AC3E}">
-        <p14:creationId xmlns:p14="http://schemas.microsoft.com/office/powerpoint/2010/main" val="4275976873"/>
+        <p14:creationId xmlns:p14="http://schemas.microsoft.com/office/powerpoint/2010/main" val="3461001942"/>
       </p:ext>
     </p:extLst>
   </p:cSld>
@@ -11246,7 +11695,7 @@
           <a:p>
             <a:r>
               <a:rPr lang="en-US" dirty="0" smtClean="0"/>
-              <a:t>Special Kinds of Data</a:t>
+              <a:t>What makes a good data model?</a:t>
             </a:r>
             <a:endParaRPr lang="en-US" dirty="0"/>
           </a:p>
@@ -11272,7 +11721,7 @@
             </a:pPr>
             <a:r>
               <a:rPr lang="en-US" dirty="0" smtClean="0"/>
-              <a:t>Uncertain Data </a:t>
+              <a:t>Completeness</a:t>
             </a:r>
           </a:p>
           <a:p>
@@ -11280,15 +11729,28 @@
               <a:buNone/>
             </a:pPr>
             <a:r>
-              <a:rPr lang="en-US" dirty="0" smtClean="0"/>
-              <a:t>Spatial Data </a:t>
-            </a:r>
+              <a:rPr lang="en-US" dirty="0" err="1" smtClean="0"/>
+              <a:t>Nonredundancy</a:t>
+            </a:r>
+            <a:endParaRPr lang="en-US" dirty="0" smtClean="0"/>
           </a:p>
           <a:p>
             <a:pPr marL="0" indent="0">
               <a:buNone/>
             </a:pPr>
-            <a:endParaRPr lang="en-US" dirty="0"/>
+            <a:r>
+              <a:rPr lang="en-US" dirty="0" smtClean="0"/>
+              <a:t>Enforcement of Rules</a:t>
+            </a:r>
+          </a:p>
+          <a:p>
+            <a:pPr marL="0" indent="0">
+              <a:buNone/>
+            </a:pPr>
+            <a:r>
+              <a:rPr lang="en-US" dirty="0" smtClean="0"/>
+              <a:t>Data Re-usability </a:t>
+            </a:r>
           </a:p>
           <a:p>
             <a:pPr marL="0" indent="0">
@@ -11296,15 +11758,6 @@
             </a:pPr>
             <a:endParaRPr lang="en-US" dirty="0" smtClean="0"/>
           </a:p>
-          <a:p>
-            <a:pPr marL="0" indent="0">
-              <a:buNone/>
-            </a:pPr>
-            <a:r>
-              <a:rPr lang="en-US" dirty="0" smtClean="0"/>
-              <a:t>Pair off: Have you ever used either kind of data? Come up with an example</a:t>
-            </a:r>
-          </a:p>
         </p:txBody>
       </p:sp>
       <p:sp>
@@ -11324,7 +11777,7 @@
           <a:p>
             <a:fld id="{7053BEFA-1175-F644-B249-7D41D72BD3FF}" type="datetime1">
               <a:rPr lang="en-US" smtClean="0"/>
-              <a:t>1/10/14</a:t>
+              <a:t>1/16/14</a:t>
             </a:fld>
             <a:endParaRPr lang="en-US"/>
           </a:p>
@@ -11375,7 +11828,7 @@
     </p:spTree>
     <p:extLst>
       <p:ext uri="{BB962C8B-B14F-4D97-AF65-F5344CB8AC3E}">
-        <p14:creationId xmlns:p14="http://schemas.microsoft.com/office/powerpoint/2010/main" val="1017482662"/>
+        <p14:creationId xmlns:p14="http://schemas.microsoft.com/office/powerpoint/2010/main" val="2092762484"/>
       </p:ext>
     </p:extLst>
   </p:cSld>
@@ -11461,7 +11914,7 @@
           <a:p>
             <a:fld id="{7053BEFA-1175-F644-B249-7D41D72BD3FF}" type="datetime1">
               <a:rPr lang="en-US" smtClean="0"/>
-              <a:t>1/10/14</a:t>
+              <a:t>1/16/14</a:t>
             </a:fld>
             <a:endParaRPr lang="en-US"/>
           </a:p>
@@ -11556,7 +12009,7 @@
           <a:p>
             <a:r>
               <a:rPr lang="en-US" dirty="0" smtClean="0"/>
-              <a:t>Spatial Data</a:t>
+              <a:t>What makes a good data model?</a:t>
             </a:r>
             <a:endParaRPr lang="en-US" dirty="0"/>
           </a:p>
@@ -11577,83 +12030,68 @@
           <a:bodyPr/>
           <a:lstStyle/>
           <a:p>
-            <a:pPr marL="228600" lvl="1" indent="0">
-              <a:lnSpc>
-                <a:spcPct val="150000"/>
-              </a:lnSpc>
+            <a:pPr marL="0" indent="0">
               <a:buNone/>
             </a:pPr>
             <a:r>
-              <a:rPr lang="en-US" sz="2400" dirty="0" smtClean="0"/>
-              <a:t>Census </a:t>
-            </a:r>
-            <a:r>
-              <a:rPr lang="en-US" sz="2400" dirty="0"/>
-              <a:t>Data</a:t>
-            </a:r>
-          </a:p>
-          <a:p>
-            <a:pPr marL="228600" lvl="1" indent="0">
-              <a:lnSpc>
-                <a:spcPct val="150000"/>
-              </a:lnSpc>
+              <a:rPr lang="en-US" dirty="0" smtClean="0"/>
+              <a:t>Completeness</a:t>
+            </a:r>
+          </a:p>
+          <a:p>
+            <a:pPr marL="0" indent="0">
               <a:buNone/>
             </a:pPr>
             <a:r>
-              <a:rPr lang="en-US" sz="2400" dirty="0"/>
-              <a:t>Climate Data </a:t>
-            </a:r>
-          </a:p>
-          <a:p>
-            <a:pPr marL="228600" lvl="1" indent="0">
-              <a:lnSpc>
-                <a:spcPct val="150000"/>
-              </a:lnSpc>
+              <a:rPr lang="en-US" dirty="0" err="1" smtClean="0"/>
+              <a:t>Nonredundancy</a:t>
+            </a:r>
+            <a:endParaRPr lang="en-US" dirty="0" smtClean="0"/>
+          </a:p>
+          <a:p>
+            <a:pPr marL="0" indent="0">
               <a:buNone/>
             </a:pPr>
             <a:r>
-              <a:rPr lang="en-US" sz="2400" dirty="0"/>
-              <a:t>Satellite Images</a:t>
-            </a:r>
-          </a:p>
-          <a:p>
-            <a:pPr marL="228600" lvl="1" indent="0">
-              <a:lnSpc>
-                <a:spcPct val="150000"/>
-              </a:lnSpc>
+              <a:rPr lang="en-US" dirty="0" smtClean="0"/>
+              <a:t>Enforcement of Rules</a:t>
+            </a:r>
+          </a:p>
+          <a:p>
+            <a:pPr marL="0" indent="0">
               <a:buNone/>
             </a:pPr>
             <a:r>
-              <a:rPr lang="en-US" sz="2400" dirty="0"/>
-              <a:t>Byte 2 Data </a:t>
-            </a:r>
-          </a:p>
-          <a:p>
-            <a:pPr marL="228600" lvl="1" indent="0">
-              <a:lnSpc>
-                <a:spcPct val="150000"/>
-              </a:lnSpc>
+              <a:rPr lang="en-US" dirty="0" smtClean="0"/>
+              <a:t>Data Re-usability </a:t>
+            </a:r>
+          </a:p>
+          <a:p>
+            <a:pPr marL="0" indent="0">
               <a:buNone/>
             </a:pPr>
             <a:r>
-              <a:rPr lang="en-US" sz="2400" dirty="0" smtClean="0"/>
-              <a:t>Medical Imaging</a:t>
-            </a:r>
-          </a:p>
-          <a:p>
-            <a:pPr marL="228600" lvl="1" indent="0">
+              <a:rPr lang="en-US" dirty="0" smtClean="0"/>
+              <a:t>Stability &amp; Flexibility</a:t>
+            </a:r>
+          </a:p>
+          <a:p>
+            <a:r>
+              <a:rPr lang="en-US" dirty="0" smtClean="0"/>
+              <a:t>Dog breeds in a separate table allows for adding the concept of “mixed” breeds</a:t>
+            </a:r>
+          </a:p>
+          <a:p>
+            <a:r>
+              <a:rPr lang="en-US" dirty="0" smtClean="0"/>
+              <a:t>But adding many breeds is awkward (how many columns?) -&gt; a new table </a:t>
+            </a:r>
+          </a:p>
+          <a:p>
+            <a:pPr marL="0" indent="0">
               <a:buNone/>
             </a:pPr>
-            <a:endParaRPr lang="en-US" sz="2400" dirty="0"/>
-          </a:p>
-          <a:p>
-            <a:pPr marL="0" indent="0">
-              <a:buNone/>
-            </a:pPr>
-            <a:r>
-              <a:rPr lang="en-US" dirty="0" smtClean="0"/>
-              <a:t> </a:t>
-            </a:r>
+            <a:endParaRPr lang="en-US" dirty="0" smtClean="0"/>
           </a:p>
         </p:txBody>
       </p:sp>
@@ -11674,7 +12112,7 @@
           <a:p>
             <a:fld id="{7053BEFA-1175-F644-B249-7D41D72BD3FF}" type="datetime1">
               <a:rPr lang="en-US" smtClean="0"/>
-              <a:t>1/10/14</a:t>
+              <a:t>1/16/14</a:t>
             </a:fld>
             <a:endParaRPr lang="en-US"/>
           </a:p>
@@ -11725,7 +12163,7 @@
     </p:spTree>
     <p:extLst>
       <p:ext uri="{BB962C8B-B14F-4D97-AF65-F5344CB8AC3E}">
-        <p14:creationId xmlns:p14="http://schemas.microsoft.com/office/powerpoint/2010/main" val="1384093771"/>
+        <p14:creationId xmlns:p14="http://schemas.microsoft.com/office/powerpoint/2010/main" val="319541556"/>
       </p:ext>
     </p:extLst>
   </p:cSld>
@@ -11769,7 +12207,7 @@
           <a:p>
             <a:r>
               <a:rPr lang="en-US" dirty="0" smtClean="0"/>
-              <a:t>Questions you could ask?</a:t>
+              <a:t>What makes a good data model?</a:t>
             </a:r>
             <a:endParaRPr lang="en-US" dirty="0"/>
           </a:p>
@@ -11790,83 +12228,65 @@
           <a:bodyPr/>
           <a:lstStyle/>
           <a:p>
-            <a:pPr marL="228600" lvl="1" indent="0">
-              <a:lnSpc>
-                <a:spcPct val="150000"/>
-              </a:lnSpc>
+            <a:pPr marL="0" indent="0">
               <a:buNone/>
             </a:pPr>
             <a:r>
-              <a:rPr lang="en-US" sz="2400" dirty="0" smtClean="0"/>
-              <a:t>Census </a:t>
-            </a:r>
-            <a:r>
-              <a:rPr lang="en-US" sz="2400" dirty="0"/>
-              <a:t>Data</a:t>
-            </a:r>
-          </a:p>
-          <a:p>
-            <a:pPr marL="228600" lvl="1" indent="0">
-              <a:lnSpc>
-                <a:spcPct val="150000"/>
-              </a:lnSpc>
+              <a:rPr lang="en-US" dirty="0" smtClean="0"/>
+              <a:t>Completeness</a:t>
+            </a:r>
+          </a:p>
+          <a:p>
+            <a:pPr marL="0" indent="0">
               <a:buNone/>
             </a:pPr>
             <a:r>
-              <a:rPr lang="en-US" sz="2400" dirty="0"/>
-              <a:t>Climate Data </a:t>
-            </a:r>
-          </a:p>
-          <a:p>
-            <a:pPr marL="228600" lvl="1" indent="0">
-              <a:lnSpc>
-                <a:spcPct val="150000"/>
-              </a:lnSpc>
+              <a:rPr lang="en-US" dirty="0" err="1" smtClean="0"/>
+              <a:t>Nonredundancy</a:t>
+            </a:r>
+            <a:endParaRPr lang="en-US" dirty="0" smtClean="0"/>
+          </a:p>
+          <a:p>
+            <a:pPr marL="0" indent="0">
               <a:buNone/>
             </a:pPr>
             <a:r>
-              <a:rPr lang="en-US" sz="2400" dirty="0"/>
-              <a:t>Satellite Images</a:t>
-            </a:r>
-          </a:p>
-          <a:p>
-            <a:pPr marL="228600" lvl="1" indent="0">
-              <a:lnSpc>
-                <a:spcPct val="150000"/>
-              </a:lnSpc>
+              <a:rPr lang="en-US" dirty="0" smtClean="0"/>
+              <a:t>Enforcement of Rules</a:t>
+            </a:r>
+          </a:p>
+          <a:p>
+            <a:pPr marL="0" indent="0">
               <a:buNone/>
             </a:pPr>
             <a:r>
-              <a:rPr lang="en-US" sz="2400" dirty="0"/>
-              <a:t>Byte 2 Data </a:t>
-            </a:r>
-          </a:p>
-          <a:p>
-            <a:pPr marL="228600" lvl="1" indent="0">
-              <a:lnSpc>
-                <a:spcPct val="150000"/>
-              </a:lnSpc>
+              <a:rPr lang="en-US" dirty="0" smtClean="0"/>
+              <a:t>Data Re-usability </a:t>
+            </a:r>
+          </a:p>
+          <a:p>
+            <a:pPr marL="0" indent="0">
               <a:buNone/>
             </a:pPr>
             <a:r>
-              <a:rPr lang="en-US" sz="2400" dirty="0"/>
-              <a:t>Medical Imaging</a:t>
-            </a:r>
-          </a:p>
-          <a:p>
-            <a:pPr marL="228600" lvl="1" indent="0">
+              <a:rPr lang="en-US" dirty="0" smtClean="0"/>
+              <a:t>Stability &amp; Flexibility</a:t>
+            </a:r>
+          </a:p>
+          <a:p>
+            <a:pPr marL="0" indent="0">
               <a:buNone/>
             </a:pPr>
-            <a:endParaRPr lang="en-US" sz="2400" dirty="0"/>
+            <a:r>
+              <a:rPr lang="en-US" dirty="0" smtClean="0"/>
+              <a:t>Elegance -&gt; neat &amp; simple &amp; appropriate</a:t>
+            </a:r>
           </a:p>
           <a:p>
             <a:pPr marL="0" indent="0">
               <a:buNone/>
             </a:pPr>
-            <a:r>
-              <a:rPr lang="en-US" dirty="0" smtClean="0"/>
-              <a:t> </a:t>
-            </a:r>
+            <a:endParaRPr lang="en-US" dirty="0" smtClean="0"/>
           </a:p>
         </p:txBody>
       </p:sp>
@@ -11887,7 +12307,7 @@
           <a:p>
             <a:fld id="{7053BEFA-1175-F644-B249-7D41D72BD3FF}" type="datetime1">
               <a:rPr lang="en-US" smtClean="0"/>
-              <a:t>1/10/14</a:t>
+              <a:t>1/16/14</a:t>
             </a:fld>
             <a:endParaRPr lang="en-US"/>
           </a:p>
@@ -11938,7 +12358,7 @@
     </p:spTree>
     <p:extLst>
       <p:ext uri="{BB962C8B-B14F-4D97-AF65-F5344CB8AC3E}">
-        <p14:creationId xmlns:p14="http://schemas.microsoft.com/office/powerpoint/2010/main" val="2408615049"/>
+        <p14:creationId xmlns:p14="http://schemas.microsoft.com/office/powerpoint/2010/main" val="2641636026"/>
       </p:ext>
     </p:extLst>
   </p:cSld>
@@ -11982,7 +12402,7 @@
           <a:p>
             <a:r>
               <a:rPr lang="en-US" dirty="0" smtClean="0"/>
-              <a:t>Questions you could ask?</a:t>
+              <a:t>What makes a good data model?</a:t>
             </a:r>
             <a:endParaRPr lang="en-US" dirty="0"/>
           </a:p>
@@ -12003,71 +12423,59 @@
           <a:bodyPr/>
           <a:lstStyle/>
           <a:p>
-            <a:pPr marL="228600" lvl="1" indent="0">
-              <a:lnSpc>
-                <a:spcPct val="150000"/>
-              </a:lnSpc>
+            <a:pPr marL="0" indent="0">
               <a:buNone/>
             </a:pPr>
             <a:r>
-              <a:rPr lang="en-US" sz="2400" dirty="0" smtClean="0"/>
-              <a:t>Census Data</a:t>
-            </a:r>
-            <a:endParaRPr lang="en-US" sz="2400" dirty="0"/>
-          </a:p>
-          <a:p>
-            <a:pPr marL="228600" lvl="1" indent="0">
-              <a:lnSpc>
-                <a:spcPct val="150000"/>
-              </a:lnSpc>
+              <a:rPr lang="en-US" dirty="0" smtClean="0"/>
+              <a:t>Completeness</a:t>
+            </a:r>
+          </a:p>
+          <a:p>
+            <a:pPr marL="0" indent="0">
               <a:buNone/>
             </a:pPr>
             <a:r>
-              <a:rPr lang="en-US" sz="2400" dirty="0"/>
-              <a:t>Climate Data </a:t>
-            </a:r>
-          </a:p>
-          <a:p>
-            <a:pPr marL="228600" lvl="1" indent="0">
-              <a:lnSpc>
-                <a:spcPct val="150000"/>
-              </a:lnSpc>
+              <a:rPr lang="en-US" dirty="0" err="1" smtClean="0"/>
+              <a:t>Nonredundancy</a:t>
+            </a:r>
+            <a:endParaRPr lang="en-US" dirty="0" smtClean="0"/>
+          </a:p>
+          <a:p>
+            <a:pPr marL="0" indent="0">
               <a:buNone/>
             </a:pPr>
             <a:r>
-              <a:rPr lang="en-US" sz="2400" dirty="0"/>
-              <a:t>Satellite Images</a:t>
-            </a:r>
-          </a:p>
-          <a:p>
-            <a:pPr marL="228600" lvl="1" indent="0">
-              <a:lnSpc>
-                <a:spcPct val="150000"/>
-              </a:lnSpc>
+              <a:rPr lang="en-US" dirty="0" smtClean="0"/>
+              <a:t>Enforcement of Rules</a:t>
+            </a:r>
+          </a:p>
+          <a:p>
+            <a:pPr marL="0" indent="0">
               <a:buNone/>
             </a:pPr>
             <a:r>
-              <a:rPr lang="en-US" sz="2400" dirty="0"/>
-              <a:t>Byte 2 Data </a:t>
-            </a:r>
-          </a:p>
-          <a:p>
-            <a:pPr marL="228600" lvl="1" indent="0">
-              <a:lnSpc>
-                <a:spcPct val="150000"/>
-              </a:lnSpc>
+              <a:rPr lang="en-US" dirty="0" smtClean="0"/>
+              <a:t>Data Re-usability </a:t>
+            </a:r>
+          </a:p>
+          <a:p>
+            <a:pPr marL="0" indent="0">
               <a:buNone/>
             </a:pPr>
             <a:r>
-              <a:rPr lang="en-US" sz="2400" dirty="0"/>
-              <a:t>Medical Imaging</a:t>
-            </a:r>
-          </a:p>
-          <a:p>
-            <a:pPr marL="228600" lvl="1" indent="0">
+              <a:rPr lang="en-US" dirty="0" smtClean="0"/>
+              <a:t>Stability &amp; Flexibility</a:t>
+            </a:r>
+          </a:p>
+          <a:p>
+            <a:pPr marL="0" indent="0">
               <a:buNone/>
             </a:pPr>
-            <a:endParaRPr lang="en-US" sz="2400" dirty="0"/>
+            <a:r>
+              <a:rPr lang="en-US" dirty="0" smtClean="0"/>
+              <a:t>Elegance </a:t>
+            </a:r>
           </a:p>
           <a:p>
             <a:pPr marL="0" indent="0">
@@ -12075,7 +12483,7 @@
             </a:pPr>
             <a:r>
               <a:rPr lang="en-US" dirty="0" smtClean="0"/>
-              <a:t> </a:t>
+              <a:t>Communication (people again!)</a:t>
             </a:r>
           </a:p>
         </p:txBody>
@@ -12097,7 +12505,7 @@
           <a:p>
             <a:fld id="{7053BEFA-1175-F644-B249-7D41D72BD3FF}" type="datetime1">
               <a:rPr lang="en-US" smtClean="0"/>
-              <a:t>1/10/14</a:t>
+              <a:t>1/16/14</a:t>
             </a:fld>
             <a:endParaRPr lang="en-US"/>
           </a:p>
@@ -12145,105 +12553,10 @@
           </a:p>
         </p:txBody>
       </p:sp>
-      <p:sp>
-        <p:nvSpPr>
-          <p:cNvPr id="7" name="TextBox 6"/>
-          <p:cNvSpPr txBox="1"/>
-          <p:nvPr/>
-        </p:nvSpPr>
-        <p:spPr>
-          <a:xfrm>
-            <a:off x="4220977" y="4578976"/>
-            <a:ext cx="4057140" cy="1477328"/>
-          </a:xfrm>
-          <a:prstGeom prst="rect">
-            <a:avLst/>
-          </a:prstGeom>
-          <a:noFill/>
-        </p:spPr>
-        <p:txBody>
-          <a:bodyPr wrap="square" rtlCol="0">
-            <a:spAutoFit/>
-          </a:bodyPr>
-          <a:lstStyle/>
-          <a:p>
-            <a:r>
-              <a:rPr lang="en-US" dirty="0"/>
-              <a:t>Based on this patient's  MRI,  have we treated somebody with a similar condition ?</a:t>
-            </a:r>
-          </a:p>
-          <a:p>
-            <a:endParaRPr lang="en-US" dirty="0"/>
-          </a:p>
-          <a:p>
-            <a:endParaRPr lang="en-US" dirty="0"/>
-          </a:p>
-        </p:txBody>
-      </p:sp>
-      <p:sp>
-        <p:nvSpPr>
-          <p:cNvPr id="8" name="TextBox 7"/>
-          <p:cNvSpPr txBox="1"/>
-          <p:nvPr/>
-        </p:nvSpPr>
-        <p:spPr>
-          <a:xfrm>
-            <a:off x="4219698" y="3948781"/>
-            <a:ext cx="4057140" cy="646331"/>
-          </a:xfrm>
-          <a:prstGeom prst="rect">
-            <a:avLst/>
-          </a:prstGeom>
-          <a:noFill/>
-        </p:spPr>
-        <p:txBody>
-          <a:bodyPr wrap="square" rtlCol="0">
-            <a:spAutoFit/>
-          </a:bodyPr>
-          <a:lstStyle/>
-          <a:p>
-            <a:r>
-              <a:rPr lang="en-US" dirty="0" smtClean="0"/>
-              <a:t>Are certain breeds found more commonly in urban areas?</a:t>
-            </a:r>
-            <a:endParaRPr lang="en-US" dirty="0"/>
-          </a:p>
-        </p:txBody>
-      </p:sp>
-      <p:sp>
-        <p:nvSpPr>
-          <p:cNvPr id="9" name="TextBox 8"/>
-          <p:cNvSpPr txBox="1"/>
-          <p:nvPr/>
-        </p:nvSpPr>
-        <p:spPr>
-          <a:xfrm>
-            <a:off x="4238617" y="3253808"/>
-            <a:ext cx="4057140" cy="646331"/>
-          </a:xfrm>
-          <a:prstGeom prst="rect">
-            <a:avLst/>
-          </a:prstGeom>
-          <a:noFill/>
-        </p:spPr>
-        <p:txBody>
-          <a:bodyPr wrap="square" rtlCol="0">
-            <a:spAutoFit/>
-          </a:bodyPr>
-          <a:lstStyle/>
-          <a:p>
-            <a:r>
-              <a:rPr lang="en-US" dirty="0" smtClean="0"/>
-              <a:t>How do trees affect the prevalence of Lyme disease?</a:t>
-            </a:r>
-            <a:endParaRPr lang="en-US" dirty="0"/>
-          </a:p>
-        </p:txBody>
-      </p:sp>
     </p:spTree>
     <p:extLst>
       <p:ext uri="{BB962C8B-B14F-4D97-AF65-F5344CB8AC3E}">
-        <p14:creationId xmlns:p14="http://schemas.microsoft.com/office/powerpoint/2010/main" val="3702149012"/>
+        <p14:creationId xmlns:p14="http://schemas.microsoft.com/office/powerpoint/2010/main" val="1117071535"/>
       </p:ext>
     </p:extLst>
   </p:cSld>
@@ -12287,7 +12600,7 @@
           <a:p>
             <a:r>
               <a:rPr lang="en-US" dirty="0" smtClean="0"/>
-              <a:t>Specialty Tools</a:t>
+              <a:t>What makes a good data model?</a:t>
             </a:r>
             <a:endParaRPr lang="en-US" dirty="0"/>
           </a:p>
@@ -12313,29 +12626,7 @@
             </a:pPr>
             <a:r>
               <a:rPr lang="en-US" dirty="0" smtClean="0"/>
-              <a:t>Uncertain Data (</a:t>
-            </a:r>
-            <a:r>
-              <a:rPr lang="en-US" i="1" dirty="0" smtClean="0"/>
-              <a:t>e.g., </a:t>
-            </a:r>
-            <a:r>
-              <a:rPr lang="en-US" dirty="0" smtClean="0"/>
-              <a:t>TRIO)</a:t>
-            </a:r>
-          </a:p>
-          <a:p>
-            <a:pPr lvl="1"/>
-            <a:r>
-              <a:rPr lang="en-US" dirty="0" smtClean="0"/>
-              <a:t>Confidence</a:t>
-            </a:r>
-          </a:p>
-          <a:p>
-            <a:pPr lvl="1"/>
-            <a:r>
-              <a:rPr lang="en-US" dirty="0" smtClean="0"/>
-              <a:t>Lineage</a:t>
+              <a:t>Completeness</a:t>
             </a:r>
           </a:p>
           <a:p>
@@ -12343,72 +12634,64 @@
               <a:buNone/>
             </a:pPr>
             <a:r>
-              <a:rPr lang="en-US" dirty="0" smtClean="0"/>
-              <a:t>Spatial Data </a:t>
-            </a:r>
-          </a:p>
-          <a:p>
-            <a:pPr lvl="1"/>
-            <a:r>
-              <a:rPr lang="en-US" dirty="0" smtClean="0"/>
-              <a:t>Polyline support (describe a region)</a:t>
-            </a:r>
-          </a:p>
-          <a:p>
-            <a:pPr lvl="1"/>
-            <a:r>
-              <a:rPr lang="en-US" dirty="0" smtClean="0"/>
-              <a:t>Hierarchy of space (building with floors, rooms, </a:t>
-            </a:r>
-            <a:r>
-              <a:rPr lang="en-US" i="1" dirty="0" smtClean="0"/>
-              <a:t>etc.</a:t>
-            </a:r>
-            <a:r>
-              <a:rPr lang="en-US" dirty="0" smtClean="0"/>
-              <a:t>)</a:t>
-            </a:r>
-          </a:p>
-          <a:p>
-            <a:pPr lvl="1"/>
-            <a:r>
-              <a:rPr lang="en-US" dirty="0" smtClean="0"/>
-              <a:t>Search based on 2d relationship</a:t>
-            </a:r>
-          </a:p>
-          <a:p>
-            <a:pPr lvl="1"/>
-            <a:r>
-              <a:rPr lang="en-US" dirty="0" smtClean="0"/>
-              <a:t>Calculate area</a:t>
-            </a:r>
-          </a:p>
-          <a:p>
-            <a:pPr lvl="1"/>
-            <a:r>
-              <a:rPr lang="en-US" dirty="0" smtClean="0"/>
-              <a:t>Model data in space (</a:t>
-            </a:r>
-            <a:r>
-              <a:rPr lang="en-US" i="1" dirty="0" smtClean="0"/>
-              <a:t>e.g. </a:t>
-            </a:r>
-            <a:r>
-              <a:rPr lang="en-US" dirty="0" smtClean="0"/>
-              <a:t>things may move)</a:t>
-            </a:r>
+              <a:rPr lang="en-US" dirty="0" err="1" smtClean="0"/>
+              <a:t>Nonredundancy</a:t>
+            </a:r>
+            <a:endParaRPr lang="en-US" dirty="0" smtClean="0"/>
           </a:p>
           <a:p>
             <a:pPr marL="0" indent="0">
               <a:buNone/>
             </a:pPr>
-            <a:endParaRPr lang="en-US" dirty="0"/>
+            <a:r>
+              <a:rPr lang="en-US" dirty="0" smtClean="0"/>
+              <a:t>Enforcement of Rules</a:t>
+            </a:r>
           </a:p>
           <a:p>
             <a:pPr marL="0" indent="0">
               <a:buNone/>
             </a:pPr>
-            <a:endParaRPr lang="en-US" dirty="0" smtClean="0"/>
+            <a:r>
+              <a:rPr lang="en-US" dirty="0" smtClean="0"/>
+              <a:t>Data Re-usability </a:t>
+            </a:r>
+          </a:p>
+          <a:p>
+            <a:pPr marL="0" indent="0">
+              <a:buNone/>
+            </a:pPr>
+            <a:r>
+              <a:rPr lang="en-US" dirty="0" smtClean="0"/>
+              <a:t>Stability &amp; Flexibility</a:t>
+            </a:r>
+          </a:p>
+          <a:p>
+            <a:pPr marL="0" indent="0">
+              <a:buNone/>
+            </a:pPr>
+            <a:r>
+              <a:rPr lang="en-US" dirty="0" smtClean="0"/>
+              <a:t>Elegance </a:t>
+            </a:r>
+          </a:p>
+          <a:p>
+            <a:pPr marL="0" indent="0">
+              <a:buNone/>
+            </a:pPr>
+            <a:r>
+              <a:rPr lang="en-US" dirty="0" smtClean="0"/>
+              <a:t>Communication</a:t>
+            </a:r>
+          </a:p>
+          <a:p>
+            <a:pPr marL="0" indent="0">
+              <a:buNone/>
+            </a:pPr>
+            <a:r>
+              <a:rPr lang="en-US" dirty="0" smtClean="0"/>
+              <a:t>Performance? -&gt; more of a software and hardware issue (ideally)</a:t>
+            </a:r>
           </a:p>
         </p:txBody>
       </p:sp>
@@ -12429,7 +12712,7 @@
           <a:p>
             <a:fld id="{7053BEFA-1175-F644-B249-7D41D72BD3FF}" type="datetime1">
               <a:rPr lang="en-US" smtClean="0"/>
-              <a:t>1/10/14</a:t>
+              <a:t>1/16/14</a:t>
             </a:fld>
             <a:endParaRPr lang="en-US"/>
           </a:p>
@@ -12480,7 +12763,7 @@
     </p:spTree>
     <p:extLst>
       <p:ext uri="{BB962C8B-B14F-4D97-AF65-F5344CB8AC3E}">
-        <p14:creationId xmlns:p14="http://schemas.microsoft.com/office/powerpoint/2010/main" val="2382904843"/>
+        <p14:creationId xmlns:p14="http://schemas.microsoft.com/office/powerpoint/2010/main" val="3910965864"/>
       </p:ext>
     </p:extLst>
   </p:cSld>
@@ -12524,7 +12807,7 @@
           <a:p>
             <a:r>
               <a:rPr lang="en-US" dirty="0" smtClean="0"/>
-              <a:t>Data Management is a people issue</a:t>
+              <a:t>What is a Database?</a:t>
             </a:r>
             <a:endParaRPr lang="en-US" dirty="0"/>
           </a:p>
@@ -12549,58 +12832,15 @@
               <a:buNone/>
             </a:pPr>
             <a:r>
-              <a:rPr lang="en-US" dirty="0"/>
-              <a:t>Information is an organizational resource</a:t>
-            </a:r>
-          </a:p>
-          <a:p>
-            <a:pPr lvl="1"/>
-            <a:r>
-              <a:rPr lang="en-US" dirty="0"/>
-              <a:t>Just like people, capital, and equipment</a:t>
-            </a:r>
-          </a:p>
-          <a:p>
-            <a:pPr lvl="1"/>
-            <a:r>
-              <a:rPr lang="en-US" dirty="0"/>
-              <a:t>It must be managed </a:t>
-            </a:r>
-            <a:r>
-              <a:rPr lang="en-US" dirty="0" smtClean="0"/>
-              <a:t>effectively</a:t>
+              <a:rPr lang="en-US" dirty="0" smtClean="0"/>
+              <a:t>Stores Information</a:t>
             </a:r>
           </a:p>
           <a:p>
             <a:pPr marL="0" indent="0">
               <a:buNone/>
             </a:pPr>
-            <a:r>
-              <a:rPr lang="en-US" dirty="0" smtClean="0"/>
-              <a:t>Who should oversee it?</a:t>
-            </a:r>
-          </a:p>
-          <a:p>
-            <a:pPr lvl="1"/>
-            <a:r>
-              <a:rPr lang="en-US" dirty="0" smtClean="0"/>
-              <a:t>Who owns it</a:t>
-            </a:r>
-          </a:p>
-          <a:p>
-            <a:pPr lvl="1"/>
-            <a:r>
-              <a:rPr lang="en-US" dirty="0" smtClean="0"/>
-              <a:t>Who is responsible for the four Cs? (Completeness, Coherence, Correctness, </a:t>
-            </a:r>
-            <a:r>
-              <a:rPr lang="en-US" dirty="0" err="1" smtClean="0"/>
-              <a:t>AcCountability</a:t>
-            </a:r>
-            <a:r>
-              <a:rPr lang="en-US" dirty="0" smtClean="0"/>
-              <a:t>)</a:t>
-            </a:r>
+            <a:endParaRPr lang="en-US" dirty="0" smtClean="0"/>
           </a:p>
           <a:p>
             <a:pPr marL="0" indent="0">
@@ -12608,16 +12848,35 @@
             </a:pPr>
             <a:r>
               <a:rPr lang="en-US" dirty="0" smtClean="0"/>
-              <a:t>Requires lots of attention, over time, regular checks, </a:t>
+              <a:t>Separates logical (schema) physical (storage) and control (queries </a:t>
             </a:r>
             <a:r>
               <a:rPr lang="en-US" i="1" dirty="0" smtClean="0"/>
               <a:t>etc.</a:t>
             </a:r>
-            <a:endParaRPr lang="en-US" dirty="0"/>
-          </a:p>
-          <a:p>
-            <a:endParaRPr lang="en-US" dirty="0"/>
+            <a:r>
+              <a:rPr lang="en-US" dirty="0" smtClean="0"/>
+              <a:t>)</a:t>
+            </a:r>
+          </a:p>
+          <a:p>
+            <a:pPr marL="0" indent="0">
+              <a:buNone/>
+            </a:pPr>
+            <a:endParaRPr lang="en-US" dirty="0" smtClean="0"/>
+          </a:p>
+          <a:p>
+            <a:pPr marL="0" indent="0">
+              <a:buNone/>
+            </a:pPr>
+            <a:r>
+              <a:rPr lang="en-US" dirty="0" smtClean="0"/>
+              <a:t>Other jobs</a:t>
+            </a:r>
+            <a:r>
+              <a:rPr lang="en-US" dirty="0" smtClean="0"/>
+              <a:t>?</a:t>
+            </a:r>
           </a:p>
         </p:txBody>
       </p:sp>
@@ -12638,7 +12897,7 @@
           <a:p>
             <a:fld id="{7053BEFA-1175-F644-B249-7D41D72BD3FF}" type="datetime1">
               <a:rPr lang="en-US" smtClean="0"/>
-              <a:t>1/10/14</a:t>
+              <a:t>1/16/14</a:t>
             </a:fld>
             <a:endParaRPr lang="en-US"/>
           </a:p>
@@ -12689,7 +12948,953 @@
     </p:spTree>
     <p:extLst>
       <p:ext uri="{BB962C8B-B14F-4D97-AF65-F5344CB8AC3E}">
-        <p14:creationId xmlns:p14="http://schemas.microsoft.com/office/powerpoint/2010/main" val="3472991845"/>
+        <p14:creationId xmlns:p14="http://schemas.microsoft.com/office/powerpoint/2010/main" val="99290824"/>
+      </p:ext>
+    </p:extLst>
+  </p:cSld>
+  <p:clrMapOvr>
+    <a:masterClrMapping/>
+  </p:clrMapOvr>
+</p:sld>
+</file>
+
+<file path=ppt/slides/slide25.xml><?xml version="1.0" encoding="utf-8"?>
+<p:sld xmlns:a="http://schemas.openxmlformats.org/drawingml/2006/main" xmlns:r="http://schemas.openxmlformats.org/officeDocument/2006/relationships" xmlns:p="http://schemas.openxmlformats.org/presentationml/2006/main">
+  <p:cSld>
+    <p:spTree>
+      <p:nvGrpSpPr>
+        <p:cNvPr id="1" name=""/>
+        <p:cNvGrpSpPr/>
+        <p:nvPr/>
+      </p:nvGrpSpPr>
+      <p:grpSpPr>
+        <a:xfrm>
+          <a:off x="0" y="0"/>
+          <a:ext cx="0" cy="0"/>
+          <a:chOff x="0" y="0"/>
+          <a:chExt cx="0" cy="0"/>
+        </a:xfrm>
+      </p:grpSpPr>
+      <p:sp>
+        <p:nvSpPr>
+          <p:cNvPr id="2" name="Title 1"/>
+          <p:cNvSpPr>
+            <a:spLocks noGrp="1"/>
+          </p:cNvSpPr>
+          <p:nvPr>
+            <p:ph type="title"/>
+          </p:nvPr>
+        </p:nvSpPr>
+        <p:spPr/>
+        <p:txBody>
+          <a:bodyPr/>
+          <a:lstStyle/>
+          <a:p>
+            <a:r>
+              <a:rPr lang="en-US" dirty="0" smtClean="0"/>
+              <a:t>Query Language (Typically SQL)</a:t>
+            </a:r>
+            <a:endParaRPr lang="en-US" dirty="0"/>
+          </a:p>
+        </p:txBody>
+      </p:sp>
+      <p:sp>
+        <p:nvSpPr>
+          <p:cNvPr id="3" name="Content Placeholder 2"/>
+          <p:cNvSpPr>
+            <a:spLocks noGrp="1"/>
+          </p:cNvSpPr>
+          <p:nvPr>
+            <p:ph idx="1"/>
+          </p:nvPr>
+        </p:nvSpPr>
+        <p:spPr/>
+        <p:txBody>
+          <a:bodyPr/>
+          <a:lstStyle/>
+          <a:p>
+            <a:pPr marL="0" indent="0">
+              <a:buNone/>
+            </a:pPr>
+            <a:r>
+              <a:rPr lang="en-US" dirty="0" smtClean="0"/>
+              <a:t>Structured language, very widely adopted</a:t>
+            </a:r>
+            <a:endParaRPr lang="en-US" dirty="0"/>
+          </a:p>
+        </p:txBody>
+      </p:sp>
+      <p:sp>
+        <p:nvSpPr>
+          <p:cNvPr id="4" name="Date Placeholder 3"/>
+          <p:cNvSpPr>
+            <a:spLocks noGrp="1"/>
+          </p:cNvSpPr>
+          <p:nvPr>
+            <p:ph type="dt" sz="half" idx="10"/>
+          </p:nvPr>
+        </p:nvSpPr>
+        <p:spPr/>
+        <p:txBody>
+          <a:bodyPr/>
+          <a:lstStyle/>
+          <a:p>
+            <a:fld id="{7053BEFA-1175-F644-B249-7D41D72BD3FF}" type="datetime1">
+              <a:rPr lang="en-US" smtClean="0"/>
+              <a:t>1/16/14</a:t>
+            </a:fld>
+            <a:endParaRPr lang="en-US"/>
+          </a:p>
+        </p:txBody>
+      </p:sp>
+      <p:sp>
+        <p:nvSpPr>
+          <p:cNvPr id="5" name="Footer Placeholder 4"/>
+          <p:cNvSpPr>
+            <a:spLocks noGrp="1"/>
+          </p:cNvSpPr>
+          <p:nvPr>
+            <p:ph type="ftr" sz="quarter" idx="11"/>
+          </p:nvPr>
+        </p:nvSpPr>
+        <p:spPr/>
+        <p:txBody>
+          <a:bodyPr/>
+          <a:lstStyle/>
+          <a:p>
+            <a:endParaRPr lang="en-US" dirty="0"/>
+          </a:p>
+        </p:txBody>
+      </p:sp>
+      <p:sp>
+        <p:nvSpPr>
+          <p:cNvPr id="6" name="Slide Number Placeholder 5"/>
+          <p:cNvSpPr>
+            <a:spLocks noGrp="1"/>
+          </p:cNvSpPr>
+          <p:nvPr>
+            <p:ph type="sldNum" sz="quarter" idx="12"/>
+          </p:nvPr>
+        </p:nvSpPr>
+        <p:spPr/>
+        <p:txBody>
+          <a:bodyPr/>
+          <a:lstStyle/>
+          <a:p>
+            <a:fld id="{17E276FA-8F89-B34D-A726-BE3FA1F8DD97}" type="slidenum">
+              <a:rPr lang="en-US" smtClean="0"/>
+              <a:t>25</a:t>
+            </a:fld>
+            <a:endParaRPr lang="en-US" dirty="0"/>
+          </a:p>
+        </p:txBody>
+      </p:sp>
+    </p:spTree>
+    <p:extLst>
+      <p:ext uri="{BB962C8B-B14F-4D97-AF65-F5344CB8AC3E}">
+        <p14:creationId xmlns:p14="http://schemas.microsoft.com/office/powerpoint/2010/main" val="4275976873"/>
+      </p:ext>
+    </p:extLst>
+  </p:cSld>
+  <p:clrMapOvr>
+    <a:masterClrMapping/>
+  </p:clrMapOvr>
+</p:sld>
+</file>
+
+<file path=ppt/slides/slide26.xml><?xml version="1.0" encoding="utf-8"?>
+<p:sld xmlns:a="http://schemas.openxmlformats.org/drawingml/2006/main" xmlns:r="http://schemas.openxmlformats.org/officeDocument/2006/relationships" xmlns:p="http://schemas.openxmlformats.org/presentationml/2006/main">
+  <p:cSld>
+    <p:spTree>
+      <p:nvGrpSpPr>
+        <p:cNvPr id="1" name=""/>
+        <p:cNvGrpSpPr/>
+        <p:nvPr/>
+      </p:nvGrpSpPr>
+      <p:grpSpPr>
+        <a:xfrm>
+          <a:off x="0" y="0"/>
+          <a:ext cx="0" cy="0"/>
+          <a:chOff x="0" y="0"/>
+          <a:chExt cx="0" cy="0"/>
+        </a:xfrm>
+      </p:grpSpPr>
+      <p:sp>
+        <p:nvSpPr>
+          <p:cNvPr id="2" name="Title 1"/>
+          <p:cNvSpPr>
+            <a:spLocks noGrp="1"/>
+          </p:cNvSpPr>
+          <p:nvPr>
+            <p:ph type="title"/>
+          </p:nvPr>
+        </p:nvSpPr>
+        <p:spPr/>
+        <p:txBody>
+          <a:bodyPr/>
+          <a:lstStyle/>
+          <a:p>
+            <a:r>
+              <a:rPr lang="en-US" dirty="0" smtClean="0"/>
+              <a:t>Implementation Issues</a:t>
+            </a:r>
+            <a:endParaRPr lang="en-US" dirty="0"/>
+          </a:p>
+        </p:txBody>
+      </p:sp>
+      <p:sp>
+        <p:nvSpPr>
+          <p:cNvPr id="3" name="Content Placeholder 2"/>
+          <p:cNvSpPr>
+            <a:spLocks noGrp="1"/>
+          </p:cNvSpPr>
+          <p:nvPr>
+            <p:ph idx="1"/>
+          </p:nvPr>
+        </p:nvSpPr>
+        <p:spPr/>
+        <p:txBody>
+          <a:bodyPr/>
+          <a:lstStyle/>
+          <a:p>
+            <a:pPr marL="0" indent="0">
+              <a:buNone/>
+            </a:pPr>
+            <a:r>
+              <a:rPr lang="en-US" dirty="0"/>
+              <a:t>Schema design affects the kinds of queries we can ask </a:t>
+            </a:r>
+            <a:r>
+              <a:rPr lang="en-US" dirty="0" smtClean="0"/>
+              <a:t>efficiently</a:t>
+            </a:r>
+          </a:p>
+          <a:p>
+            <a:pPr marL="0" indent="0">
+              <a:buNone/>
+            </a:pPr>
+            <a:r>
+              <a:rPr lang="en-US" dirty="0" smtClean="0"/>
+              <a:t>So may the underlying </a:t>
+            </a:r>
+            <a:r>
+              <a:rPr lang="en-US" dirty="0" smtClean="0"/>
+              <a:t>engine</a:t>
+            </a:r>
+          </a:p>
+          <a:p>
+            <a:pPr lvl="1"/>
+            <a:r>
+              <a:rPr lang="en-US" dirty="0"/>
+              <a:t>Ability to handle big data (</a:t>
+            </a:r>
+            <a:r>
+              <a:rPr lang="en-US" i="1" dirty="0"/>
+              <a:t>e.g. </a:t>
+            </a:r>
+            <a:r>
+              <a:rPr lang="en-US" i="1" dirty="0" err="1"/>
+              <a:t>mongodb</a:t>
+            </a:r>
+            <a:r>
+              <a:rPr lang="en-US" dirty="0"/>
+              <a:t>) </a:t>
+            </a:r>
+          </a:p>
+          <a:p>
+            <a:pPr lvl="1"/>
+            <a:r>
+              <a:rPr lang="en-US" dirty="0" err="1"/>
+              <a:t>Debuggability</a:t>
+            </a:r>
+            <a:endParaRPr lang="en-US" dirty="0"/>
+          </a:p>
+          <a:p>
+            <a:pPr lvl="1"/>
+            <a:r>
+              <a:rPr lang="en-US" dirty="0"/>
+              <a:t>Accessibility of raw data </a:t>
+            </a:r>
+          </a:p>
+          <a:p>
+            <a:pPr marL="0" indent="0">
+              <a:buNone/>
+            </a:pPr>
+            <a:endParaRPr lang="en-US" dirty="0" smtClean="0"/>
+          </a:p>
+          <a:p>
+            <a:endParaRPr lang="en-US" dirty="0"/>
+          </a:p>
+        </p:txBody>
+      </p:sp>
+      <p:sp>
+        <p:nvSpPr>
+          <p:cNvPr id="4" name="Date Placeholder 3"/>
+          <p:cNvSpPr>
+            <a:spLocks noGrp="1"/>
+          </p:cNvSpPr>
+          <p:nvPr>
+            <p:ph type="dt" sz="half" idx="10"/>
+          </p:nvPr>
+        </p:nvSpPr>
+        <p:spPr/>
+        <p:txBody>
+          <a:bodyPr/>
+          <a:lstStyle/>
+          <a:p>
+            <a:fld id="{7053BEFA-1175-F644-B249-7D41D72BD3FF}" type="datetime1">
+              <a:rPr lang="en-US" smtClean="0"/>
+              <a:t>1/16/14</a:t>
+            </a:fld>
+            <a:endParaRPr lang="en-US"/>
+          </a:p>
+        </p:txBody>
+      </p:sp>
+      <p:sp>
+        <p:nvSpPr>
+          <p:cNvPr id="5" name="Footer Placeholder 4"/>
+          <p:cNvSpPr>
+            <a:spLocks noGrp="1"/>
+          </p:cNvSpPr>
+          <p:nvPr>
+            <p:ph type="ftr" sz="quarter" idx="11"/>
+          </p:nvPr>
+        </p:nvSpPr>
+        <p:spPr/>
+        <p:txBody>
+          <a:bodyPr/>
+          <a:lstStyle/>
+          <a:p>
+            <a:endParaRPr lang="en-US" dirty="0"/>
+          </a:p>
+        </p:txBody>
+      </p:sp>
+      <p:sp>
+        <p:nvSpPr>
+          <p:cNvPr id="6" name="Slide Number Placeholder 5"/>
+          <p:cNvSpPr>
+            <a:spLocks noGrp="1"/>
+          </p:cNvSpPr>
+          <p:nvPr>
+            <p:ph type="sldNum" sz="quarter" idx="12"/>
+          </p:nvPr>
+        </p:nvSpPr>
+        <p:spPr/>
+        <p:txBody>
+          <a:bodyPr/>
+          <a:lstStyle/>
+          <a:p>
+            <a:fld id="{17E276FA-8F89-B34D-A726-BE3FA1F8DD97}" type="slidenum">
+              <a:rPr lang="en-US" smtClean="0"/>
+              <a:t>26</a:t>
+            </a:fld>
+            <a:endParaRPr lang="en-US" dirty="0"/>
+          </a:p>
+        </p:txBody>
+      </p:sp>
+    </p:spTree>
+    <p:extLst>
+      <p:ext uri="{BB962C8B-B14F-4D97-AF65-F5344CB8AC3E}">
+        <p14:creationId xmlns:p14="http://schemas.microsoft.com/office/powerpoint/2010/main" val="401190124"/>
+      </p:ext>
+    </p:extLst>
+  </p:cSld>
+  <p:clrMapOvr>
+    <a:masterClrMapping/>
+  </p:clrMapOvr>
+</p:sld>
+</file>
+
+<file path=ppt/slides/slide27.xml><?xml version="1.0" encoding="utf-8"?>
+<p:sld xmlns:a="http://schemas.openxmlformats.org/drawingml/2006/main" xmlns:r="http://schemas.openxmlformats.org/officeDocument/2006/relationships" xmlns:p="http://schemas.openxmlformats.org/presentationml/2006/main">
+  <p:cSld>
+    <p:spTree>
+      <p:nvGrpSpPr>
+        <p:cNvPr id="1" name=""/>
+        <p:cNvGrpSpPr/>
+        <p:nvPr/>
+      </p:nvGrpSpPr>
+      <p:grpSpPr>
+        <a:xfrm>
+          <a:off x="0" y="0"/>
+          <a:ext cx="0" cy="0"/>
+          <a:chOff x="0" y="0"/>
+          <a:chExt cx="0" cy="0"/>
+        </a:xfrm>
+      </p:grpSpPr>
+      <p:sp>
+        <p:nvSpPr>
+          <p:cNvPr id="2" name="Title 1"/>
+          <p:cNvSpPr>
+            <a:spLocks noGrp="1"/>
+          </p:cNvSpPr>
+          <p:nvPr>
+            <p:ph type="title"/>
+          </p:nvPr>
+        </p:nvSpPr>
+        <p:spPr/>
+        <p:txBody>
+          <a:bodyPr/>
+          <a:lstStyle/>
+          <a:p>
+            <a:r>
+              <a:rPr lang="en-US" dirty="0" smtClean="0"/>
+              <a:t>Special Kinds of Data</a:t>
+            </a:r>
+            <a:endParaRPr lang="en-US" dirty="0"/>
+          </a:p>
+        </p:txBody>
+      </p:sp>
+      <p:sp>
+        <p:nvSpPr>
+          <p:cNvPr id="3" name="Content Placeholder 2"/>
+          <p:cNvSpPr>
+            <a:spLocks noGrp="1"/>
+          </p:cNvSpPr>
+          <p:nvPr>
+            <p:ph idx="1"/>
+          </p:nvPr>
+        </p:nvSpPr>
+        <p:spPr/>
+        <p:txBody>
+          <a:bodyPr/>
+          <a:lstStyle/>
+          <a:p>
+            <a:pPr marL="0" indent="0">
+              <a:buNone/>
+            </a:pPr>
+            <a:r>
+              <a:rPr lang="en-US" dirty="0" smtClean="0"/>
+              <a:t>Uncertain Data </a:t>
+            </a:r>
+          </a:p>
+          <a:p>
+            <a:pPr marL="0" indent="0">
+              <a:buNone/>
+            </a:pPr>
+            <a:r>
+              <a:rPr lang="en-US" dirty="0" smtClean="0"/>
+              <a:t>Spatial Data </a:t>
+            </a:r>
+          </a:p>
+          <a:p>
+            <a:pPr marL="0" indent="0">
+              <a:buNone/>
+            </a:pPr>
+            <a:endParaRPr lang="en-US" dirty="0"/>
+          </a:p>
+          <a:p>
+            <a:pPr marL="0" indent="0">
+              <a:buNone/>
+            </a:pPr>
+            <a:endParaRPr lang="en-US" dirty="0" smtClean="0"/>
+          </a:p>
+          <a:p>
+            <a:pPr marL="0" indent="0">
+              <a:buNone/>
+            </a:pPr>
+            <a:r>
+              <a:rPr lang="en-US" dirty="0" smtClean="0"/>
+              <a:t>Pair off: Have you ever used either kind of data? Come up with an example</a:t>
+            </a:r>
+          </a:p>
+        </p:txBody>
+      </p:sp>
+      <p:sp>
+        <p:nvSpPr>
+          <p:cNvPr id="4" name="Date Placeholder 3"/>
+          <p:cNvSpPr>
+            <a:spLocks noGrp="1"/>
+          </p:cNvSpPr>
+          <p:nvPr>
+            <p:ph type="dt" sz="half" idx="10"/>
+          </p:nvPr>
+        </p:nvSpPr>
+        <p:spPr/>
+        <p:txBody>
+          <a:bodyPr/>
+          <a:lstStyle/>
+          <a:p>
+            <a:fld id="{7053BEFA-1175-F644-B249-7D41D72BD3FF}" type="datetime1">
+              <a:rPr lang="en-US" smtClean="0"/>
+              <a:t>1/16/14</a:t>
+            </a:fld>
+            <a:endParaRPr lang="en-US"/>
+          </a:p>
+        </p:txBody>
+      </p:sp>
+      <p:sp>
+        <p:nvSpPr>
+          <p:cNvPr id="5" name="Footer Placeholder 4"/>
+          <p:cNvSpPr>
+            <a:spLocks noGrp="1"/>
+          </p:cNvSpPr>
+          <p:nvPr>
+            <p:ph type="ftr" sz="quarter" idx="11"/>
+          </p:nvPr>
+        </p:nvSpPr>
+        <p:spPr/>
+        <p:txBody>
+          <a:bodyPr/>
+          <a:lstStyle/>
+          <a:p>
+            <a:endParaRPr lang="en-US" dirty="0"/>
+          </a:p>
+        </p:txBody>
+      </p:sp>
+      <p:sp>
+        <p:nvSpPr>
+          <p:cNvPr id="6" name="Slide Number Placeholder 5"/>
+          <p:cNvSpPr>
+            <a:spLocks noGrp="1"/>
+          </p:cNvSpPr>
+          <p:nvPr>
+            <p:ph type="sldNum" sz="quarter" idx="12"/>
+          </p:nvPr>
+        </p:nvSpPr>
+        <p:spPr/>
+        <p:txBody>
+          <a:bodyPr/>
+          <a:lstStyle/>
+          <a:p>
+            <a:fld id="{17E276FA-8F89-B34D-A726-BE3FA1F8DD97}" type="slidenum">
+              <a:rPr lang="en-US" smtClean="0"/>
+              <a:t>27</a:t>
+            </a:fld>
+            <a:endParaRPr lang="en-US" dirty="0"/>
+          </a:p>
+        </p:txBody>
+      </p:sp>
+    </p:spTree>
+    <p:extLst>
+      <p:ext uri="{BB962C8B-B14F-4D97-AF65-F5344CB8AC3E}">
+        <p14:creationId xmlns:p14="http://schemas.microsoft.com/office/powerpoint/2010/main" val="1017482662"/>
+      </p:ext>
+    </p:extLst>
+  </p:cSld>
+  <p:clrMapOvr>
+    <a:masterClrMapping/>
+  </p:clrMapOvr>
+</p:sld>
+</file>
+
+<file path=ppt/slides/slide28.xml><?xml version="1.0" encoding="utf-8"?>
+<p:sld xmlns:a="http://schemas.openxmlformats.org/drawingml/2006/main" xmlns:r="http://schemas.openxmlformats.org/officeDocument/2006/relationships" xmlns:p="http://schemas.openxmlformats.org/presentationml/2006/main">
+  <p:cSld>
+    <p:spTree>
+      <p:nvGrpSpPr>
+        <p:cNvPr id="1" name=""/>
+        <p:cNvGrpSpPr/>
+        <p:nvPr/>
+      </p:nvGrpSpPr>
+      <p:grpSpPr>
+        <a:xfrm>
+          <a:off x="0" y="0"/>
+          <a:ext cx="0" cy="0"/>
+          <a:chOff x="0" y="0"/>
+          <a:chExt cx="0" cy="0"/>
+        </a:xfrm>
+      </p:grpSpPr>
+      <p:sp>
+        <p:nvSpPr>
+          <p:cNvPr id="2" name="Title 1"/>
+          <p:cNvSpPr>
+            <a:spLocks noGrp="1"/>
+          </p:cNvSpPr>
+          <p:nvPr>
+            <p:ph type="title"/>
+          </p:nvPr>
+        </p:nvSpPr>
+        <p:spPr/>
+        <p:txBody>
+          <a:bodyPr/>
+          <a:lstStyle/>
+          <a:p>
+            <a:r>
+              <a:rPr lang="en-US" dirty="0" smtClean="0"/>
+              <a:t>Spatial Data</a:t>
+            </a:r>
+            <a:endParaRPr lang="en-US" dirty="0"/>
+          </a:p>
+        </p:txBody>
+      </p:sp>
+      <p:sp>
+        <p:nvSpPr>
+          <p:cNvPr id="3" name="Content Placeholder 2"/>
+          <p:cNvSpPr>
+            <a:spLocks noGrp="1"/>
+          </p:cNvSpPr>
+          <p:nvPr>
+            <p:ph idx="1"/>
+          </p:nvPr>
+        </p:nvSpPr>
+        <p:spPr/>
+        <p:txBody>
+          <a:bodyPr/>
+          <a:lstStyle/>
+          <a:p>
+            <a:pPr marL="228600" lvl="1" indent="0">
+              <a:lnSpc>
+                <a:spcPct val="150000"/>
+              </a:lnSpc>
+              <a:buNone/>
+            </a:pPr>
+            <a:r>
+              <a:rPr lang="en-US" sz="2400" dirty="0" smtClean="0"/>
+              <a:t>Census </a:t>
+            </a:r>
+            <a:r>
+              <a:rPr lang="en-US" sz="2400" dirty="0"/>
+              <a:t>Data</a:t>
+            </a:r>
+          </a:p>
+          <a:p>
+            <a:pPr marL="228600" lvl="1" indent="0">
+              <a:lnSpc>
+                <a:spcPct val="150000"/>
+              </a:lnSpc>
+              <a:buNone/>
+            </a:pPr>
+            <a:r>
+              <a:rPr lang="en-US" sz="2400" dirty="0"/>
+              <a:t>Climate Data </a:t>
+            </a:r>
+          </a:p>
+          <a:p>
+            <a:pPr marL="228600" lvl="1" indent="0">
+              <a:lnSpc>
+                <a:spcPct val="150000"/>
+              </a:lnSpc>
+              <a:buNone/>
+            </a:pPr>
+            <a:r>
+              <a:rPr lang="en-US" sz="2400" dirty="0"/>
+              <a:t>Satellite Images</a:t>
+            </a:r>
+          </a:p>
+          <a:p>
+            <a:pPr marL="228600" lvl="1" indent="0">
+              <a:lnSpc>
+                <a:spcPct val="150000"/>
+              </a:lnSpc>
+              <a:buNone/>
+            </a:pPr>
+            <a:r>
+              <a:rPr lang="en-US" sz="2400" dirty="0"/>
+              <a:t>Byte 2 Data </a:t>
+            </a:r>
+          </a:p>
+          <a:p>
+            <a:pPr marL="228600" lvl="1" indent="0">
+              <a:lnSpc>
+                <a:spcPct val="150000"/>
+              </a:lnSpc>
+              <a:buNone/>
+            </a:pPr>
+            <a:r>
+              <a:rPr lang="en-US" sz="2400" dirty="0" smtClean="0"/>
+              <a:t>Medical Imaging</a:t>
+            </a:r>
+          </a:p>
+          <a:p>
+            <a:pPr marL="228600" lvl="1" indent="0">
+              <a:buNone/>
+            </a:pPr>
+            <a:endParaRPr lang="en-US" sz="2400" dirty="0"/>
+          </a:p>
+          <a:p>
+            <a:pPr marL="0" indent="0">
+              <a:buNone/>
+            </a:pPr>
+            <a:r>
+              <a:rPr lang="en-US" dirty="0" smtClean="0"/>
+              <a:t> </a:t>
+            </a:r>
+          </a:p>
+        </p:txBody>
+      </p:sp>
+      <p:sp>
+        <p:nvSpPr>
+          <p:cNvPr id="4" name="Date Placeholder 3"/>
+          <p:cNvSpPr>
+            <a:spLocks noGrp="1"/>
+          </p:cNvSpPr>
+          <p:nvPr>
+            <p:ph type="dt" sz="half" idx="10"/>
+          </p:nvPr>
+        </p:nvSpPr>
+        <p:spPr/>
+        <p:txBody>
+          <a:bodyPr/>
+          <a:lstStyle/>
+          <a:p>
+            <a:fld id="{7053BEFA-1175-F644-B249-7D41D72BD3FF}" type="datetime1">
+              <a:rPr lang="en-US" smtClean="0"/>
+              <a:t>1/16/14</a:t>
+            </a:fld>
+            <a:endParaRPr lang="en-US"/>
+          </a:p>
+        </p:txBody>
+      </p:sp>
+      <p:sp>
+        <p:nvSpPr>
+          <p:cNvPr id="5" name="Footer Placeholder 4"/>
+          <p:cNvSpPr>
+            <a:spLocks noGrp="1"/>
+          </p:cNvSpPr>
+          <p:nvPr>
+            <p:ph type="ftr" sz="quarter" idx="11"/>
+          </p:nvPr>
+        </p:nvSpPr>
+        <p:spPr/>
+        <p:txBody>
+          <a:bodyPr/>
+          <a:lstStyle/>
+          <a:p>
+            <a:endParaRPr lang="en-US" dirty="0"/>
+          </a:p>
+        </p:txBody>
+      </p:sp>
+      <p:sp>
+        <p:nvSpPr>
+          <p:cNvPr id="6" name="Slide Number Placeholder 5"/>
+          <p:cNvSpPr>
+            <a:spLocks noGrp="1"/>
+          </p:cNvSpPr>
+          <p:nvPr>
+            <p:ph type="sldNum" sz="quarter" idx="12"/>
+          </p:nvPr>
+        </p:nvSpPr>
+        <p:spPr/>
+        <p:txBody>
+          <a:bodyPr/>
+          <a:lstStyle/>
+          <a:p>
+            <a:fld id="{17E276FA-8F89-B34D-A726-BE3FA1F8DD97}" type="slidenum">
+              <a:rPr lang="en-US" smtClean="0"/>
+              <a:t>28</a:t>
+            </a:fld>
+            <a:endParaRPr lang="en-US" dirty="0"/>
+          </a:p>
+        </p:txBody>
+      </p:sp>
+    </p:spTree>
+    <p:extLst>
+      <p:ext uri="{BB962C8B-B14F-4D97-AF65-F5344CB8AC3E}">
+        <p14:creationId xmlns:p14="http://schemas.microsoft.com/office/powerpoint/2010/main" val="1384093771"/>
+      </p:ext>
+    </p:extLst>
+  </p:cSld>
+  <p:clrMapOvr>
+    <a:masterClrMapping/>
+  </p:clrMapOvr>
+</p:sld>
+</file>
+
+<file path=ppt/slides/slide29.xml><?xml version="1.0" encoding="utf-8"?>
+<p:sld xmlns:a="http://schemas.openxmlformats.org/drawingml/2006/main" xmlns:r="http://schemas.openxmlformats.org/officeDocument/2006/relationships" xmlns:p="http://schemas.openxmlformats.org/presentationml/2006/main">
+  <p:cSld>
+    <p:spTree>
+      <p:nvGrpSpPr>
+        <p:cNvPr id="1" name=""/>
+        <p:cNvGrpSpPr/>
+        <p:nvPr/>
+      </p:nvGrpSpPr>
+      <p:grpSpPr>
+        <a:xfrm>
+          <a:off x="0" y="0"/>
+          <a:ext cx="0" cy="0"/>
+          <a:chOff x="0" y="0"/>
+          <a:chExt cx="0" cy="0"/>
+        </a:xfrm>
+      </p:grpSpPr>
+      <p:sp>
+        <p:nvSpPr>
+          <p:cNvPr id="2" name="Title 1"/>
+          <p:cNvSpPr>
+            <a:spLocks noGrp="1"/>
+          </p:cNvSpPr>
+          <p:nvPr>
+            <p:ph type="title"/>
+          </p:nvPr>
+        </p:nvSpPr>
+        <p:spPr/>
+        <p:txBody>
+          <a:bodyPr/>
+          <a:lstStyle/>
+          <a:p>
+            <a:r>
+              <a:rPr lang="en-US" dirty="0" smtClean="0"/>
+              <a:t>Questions you could ask?</a:t>
+            </a:r>
+            <a:endParaRPr lang="en-US" dirty="0"/>
+          </a:p>
+        </p:txBody>
+      </p:sp>
+      <p:sp>
+        <p:nvSpPr>
+          <p:cNvPr id="3" name="Content Placeholder 2"/>
+          <p:cNvSpPr>
+            <a:spLocks noGrp="1"/>
+          </p:cNvSpPr>
+          <p:nvPr>
+            <p:ph idx="1"/>
+          </p:nvPr>
+        </p:nvSpPr>
+        <p:spPr/>
+        <p:txBody>
+          <a:bodyPr/>
+          <a:lstStyle/>
+          <a:p>
+            <a:pPr marL="228600" lvl="1" indent="0">
+              <a:lnSpc>
+                <a:spcPct val="150000"/>
+              </a:lnSpc>
+              <a:buNone/>
+            </a:pPr>
+            <a:r>
+              <a:rPr lang="en-US" sz="2400" dirty="0" smtClean="0"/>
+              <a:t>Census </a:t>
+            </a:r>
+            <a:r>
+              <a:rPr lang="en-US" sz="2400" dirty="0"/>
+              <a:t>Data</a:t>
+            </a:r>
+          </a:p>
+          <a:p>
+            <a:pPr marL="228600" lvl="1" indent="0">
+              <a:lnSpc>
+                <a:spcPct val="150000"/>
+              </a:lnSpc>
+              <a:buNone/>
+            </a:pPr>
+            <a:r>
+              <a:rPr lang="en-US" sz="2400" dirty="0"/>
+              <a:t>Climate Data </a:t>
+            </a:r>
+          </a:p>
+          <a:p>
+            <a:pPr marL="228600" lvl="1" indent="0">
+              <a:lnSpc>
+                <a:spcPct val="150000"/>
+              </a:lnSpc>
+              <a:buNone/>
+            </a:pPr>
+            <a:r>
+              <a:rPr lang="en-US" sz="2400" dirty="0"/>
+              <a:t>Satellite Images</a:t>
+            </a:r>
+          </a:p>
+          <a:p>
+            <a:pPr marL="228600" lvl="1" indent="0">
+              <a:lnSpc>
+                <a:spcPct val="150000"/>
+              </a:lnSpc>
+              <a:buNone/>
+            </a:pPr>
+            <a:r>
+              <a:rPr lang="en-US" sz="2400" dirty="0"/>
+              <a:t>Byte 2 Data </a:t>
+            </a:r>
+          </a:p>
+          <a:p>
+            <a:pPr marL="228600" lvl="1" indent="0">
+              <a:lnSpc>
+                <a:spcPct val="150000"/>
+              </a:lnSpc>
+              <a:buNone/>
+            </a:pPr>
+            <a:r>
+              <a:rPr lang="en-US" sz="2400" dirty="0"/>
+              <a:t>Medical Imaging</a:t>
+            </a:r>
+          </a:p>
+          <a:p>
+            <a:pPr marL="228600" lvl="1" indent="0">
+              <a:buNone/>
+            </a:pPr>
+            <a:endParaRPr lang="en-US" sz="2400" dirty="0"/>
+          </a:p>
+          <a:p>
+            <a:pPr marL="0" indent="0">
+              <a:buNone/>
+            </a:pPr>
+            <a:r>
+              <a:rPr lang="en-US" dirty="0" smtClean="0"/>
+              <a:t> </a:t>
+            </a:r>
+          </a:p>
+        </p:txBody>
+      </p:sp>
+      <p:sp>
+        <p:nvSpPr>
+          <p:cNvPr id="4" name="Date Placeholder 3"/>
+          <p:cNvSpPr>
+            <a:spLocks noGrp="1"/>
+          </p:cNvSpPr>
+          <p:nvPr>
+            <p:ph type="dt" sz="half" idx="10"/>
+          </p:nvPr>
+        </p:nvSpPr>
+        <p:spPr/>
+        <p:txBody>
+          <a:bodyPr/>
+          <a:lstStyle/>
+          <a:p>
+            <a:fld id="{7053BEFA-1175-F644-B249-7D41D72BD3FF}" type="datetime1">
+              <a:rPr lang="en-US" smtClean="0"/>
+              <a:t>1/16/14</a:t>
+            </a:fld>
+            <a:endParaRPr lang="en-US"/>
+          </a:p>
+        </p:txBody>
+      </p:sp>
+      <p:sp>
+        <p:nvSpPr>
+          <p:cNvPr id="5" name="Footer Placeholder 4"/>
+          <p:cNvSpPr>
+            <a:spLocks noGrp="1"/>
+          </p:cNvSpPr>
+          <p:nvPr>
+            <p:ph type="ftr" sz="quarter" idx="11"/>
+          </p:nvPr>
+        </p:nvSpPr>
+        <p:spPr/>
+        <p:txBody>
+          <a:bodyPr/>
+          <a:lstStyle/>
+          <a:p>
+            <a:endParaRPr lang="en-US" dirty="0"/>
+          </a:p>
+        </p:txBody>
+      </p:sp>
+      <p:sp>
+        <p:nvSpPr>
+          <p:cNvPr id="6" name="Slide Number Placeholder 5"/>
+          <p:cNvSpPr>
+            <a:spLocks noGrp="1"/>
+          </p:cNvSpPr>
+          <p:nvPr>
+            <p:ph type="sldNum" sz="quarter" idx="12"/>
+          </p:nvPr>
+        </p:nvSpPr>
+        <p:spPr/>
+        <p:txBody>
+          <a:bodyPr/>
+          <a:lstStyle/>
+          <a:p>
+            <a:fld id="{17E276FA-8F89-B34D-A726-BE3FA1F8DD97}" type="slidenum">
+              <a:rPr lang="en-US" smtClean="0"/>
+              <a:t>29</a:t>
+            </a:fld>
+            <a:endParaRPr lang="en-US" dirty="0"/>
+          </a:p>
+        </p:txBody>
+      </p:sp>
+    </p:spTree>
+    <p:extLst>
+      <p:ext uri="{BB962C8B-B14F-4D97-AF65-F5344CB8AC3E}">
+        <p14:creationId xmlns:p14="http://schemas.microsoft.com/office/powerpoint/2010/main" val="2408615049"/>
       </p:ext>
     </p:extLst>
   </p:cSld>
@@ -12815,7 +14020,7 @@
           <a:p>
             <a:fld id="{7053BEFA-1175-F644-B249-7D41D72BD3FF}" type="datetime1">
               <a:rPr lang="en-US" smtClean="0"/>
-              <a:t>1/10/14</a:t>
+              <a:t>1/16/14</a:t>
             </a:fld>
             <a:endParaRPr lang="en-US"/>
           </a:p>
@@ -12867,6 +14072,971 @@
     <p:extLst>
       <p:ext uri="{BB962C8B-B14F-4D97-AF65-F5344CB8AC3E}">
         <p14:creationId xmlns:p14="http://schemas.microsoft.com/office/powerpoint/2010/main" val="1082504122"/>
+      </p:ext>
+    </p:extLst>
+  </p:cSld>
+  <p:clrMapOvr>
+    <a:masterClrMapping/>
+  </p:clrMapOvr>
+</p:sld>
+</file>
+
+<file path=ppt/slides/slide30.xml><?xml version="1.0" encoding="utf-8"?>
+<p:sld xmlns:a="http://schemas.openxmlformats.org/drawingml/2006/main" xmlns:r="http://schemas.openxmlformats.org/officeDocument/2006/relationships" xmlns:p="http://schemas.openxmlformats.org/presentationml/2006/main">
+  <p:cSld>
+    <p:spTree>
+      <p:nvGrpSpPr>
+        <p:cNvPr id="1" name=""/>
+        <p:cNvGrpSpPr/>
+        <p:nvPr/>
+      </p:nvGrpSpPr>
+      <p:grpSpPr>
+        <a:xfrm>
+          <a:off x="0" y="0"/>
+          <a:ext cx="0" cy="0"/>
+          <a:chOff x="0" y="0"/>
+          <a:chExt cx="0" cy="0"/>
+        </a:xfrm>
+      </p:grpSpPr>
+      <p:sp>
+        <p:nvSpPr>
+          <p:cNvPr id="2" name="Title 1"/>
+          <p:cNvSpPr>
+            <a:spLocks noGrp="1"/>
+          </p:cNvSpPr>
+          <p:nvPr>
+            <p:ph type="title"/>
+          </p:nvPr>
+        </p:nvSpPr>
+        <p:spPr/>
+        <p:txBody>
+          <a:bodyPr/>
+          <a:lstStyle/>
+          <a:p>
+            <a:r>
+              <a:rPr lang="en-US" dirty="0" smtClean="0"/>
+              <a:t>Questions you could ask?</a:t>
+            </a:r>
+            <a:endParaRPr lang="en-US" dirty="0"/>
+          </a:p>
+        </p:txBody>
+      </p:sp>
+      <p:sp>
+        <p:nvSpPr>
+          <p:cNvPr id="3" name="Content Placeholder 2"/>
+          <p:cNvSpPr>
+            <a:spLocks noGrp="1"/>
+          </p:cNvSpPr>
+          <p:nvPr>
+            <p:ph idx="1"/>
+          </p:nvPr>
+        </p:nvSpPr>
+        <p:spPr/>
+        <p:txBody>
+          <a:bodyPr/>
+          <a:lstStyle/>
+          <a:p>
+            <a:pPr marL="228600" lvl="1" indent="0">
+              <a:lnSpc>
+                <a:spcPct val="150000"/>
+              </a:lnSpc>
+              <a:buNone/>
+            </a:pPr>
+            <a:r>
+              <a:rPr lang="en-US" sz="2400" dirty="0" smtClean="0"/>
+              <a:t>Census Data</a:t>
+            </a:r>
+            <a:endParaRPr lang="en-US" sz="2400" dirty="0"/>
+          </a:p>
+          <a:p>
+            <a:pPr marL="228600" lvl="1" indent="0">
+              <a:lnSpc>
+                <a:spcPct val="150000"/>
+              </a:lnSpc>
+              <a:buNone/>
+            </a:pPr>
+            <a:r>
+              <a:rPr lang="en-US" sz="2400" dirty="0"/>
+              <a:t>Climate Data </a:t>
+            </a:r>
+          </a:p>
+          <a:p>
+            <a:pPr marL="228600" lvl="1" indent="0">
+              <a:lnSpc>
+                <a:spcPct val="150000"/>
+              </a:lnSpc>
+              <a:buNone/>
+            </a:pPr>
+            <a:r>
+              <a:rPr lang="en-US" sz="2400" dirty="0"/>
+              <a:t>Satellite Images</a:t>
+            </a:r>
+          </a:p>
+          <a:p>
+            <a:pPr marL="228600" lvl="1" indent="0">
+              <a:lnSpc>
+                <a:spcPct val="150000"/>
+              </a:lnSpc>
+              <a:buNone/>
+            </a:pPr>
+            <a:r>
+              <a:rPr lang="en-US" sz="2400" dirty="0"/>
+              <a:t>Byte 2 Data </a:t>
+            </a:r>
+          </a:p>
+          <a:p>
+            <a:pPr marL="228600" lvl="1" indent="0">
+              <a:lnSpc>
+                <a:spcPct val="150000"/>
+              </a:lnSpc>
+              <a:buNone/>
+            </a:pPr>
+            <a:r>
+              <a:rPr lang="en-US" sz="2400" dirty="0"/>
+              <a:t>Medical Imaging</a:t>
+            </a:r>
+          </a:p>
+          <a:p>
+            <a:pPr marL="228600" lvl="1" indent="0">
+              <a:buNone/>
+            </a:pPr>
+            <a:endParaRPr lang="en-US" sz="2400" dirty="0"/>
+          </a:p>
+          <a:p>
+            <a:pPr marL="0" indent="0">
+              <a:buNone/>
+            </a:pPr>
+            <a:r>
+              <a:rPr lang="en-US" dirty="0" smtClean="0"/>
+              <a:t> </a:t>
+            </a:r>
+          </a:p>
+        </p:txBody>
+      </p:sp>
+      <p:sp>
+        <p:nvSpPr>
+          <p:cNvPr id="4" name="Date Placeholder 3"/>
+          <p:cNvSpPr>
+            <a:spLocks noGrp="1"/>
+          </p:cNvSpPr>
+          <p:nvPr>
+            <p:ph type="dt" sz="half" idx="10"/>
+          </p:nvPr>
+        </p:nvSpPr>
+        <p:spPr/>
+        <p:txBody>
+          <a:bodyPr/>
+          <a:lstStyle/>
+          <a:p>
+            <a:fld id="{7053BEFA-1175-F644-B249-7D41D72BD3FF}" type="datetime1">
+              <a:rPr lang="en-US" smtClean="0"/>
+              <a:t>1/16/14</a:t>
+            </a:fld>
+            <a:endParaRPr lang="en-US"/>
+          </a:p>
+        </p:txBody>
+      </p:sp>
+      <p:sp>
+        <p:nvSpPr>
+          <p:cNvPr id="5" name="Footer Placeholder 4"/>
+          <p:cNvSpPr>
+            <a:spLocks noGrp="1"/>
+          </p:cNvSpPr>
+          <p:nvPr>
+            <p:ph type="ftr" sz="quarter" idx="11"/>
+          </p:nvPr>
+        </p:nvSpPr>
+        <p:spPr/>
+        <p:txBody>
+          <a:bodyPr/>
+          <a:lstStyle/>
+          <a:p>
+            <a:endParaRPr lang="en-US" dirty="0"/>
+          </a:p>
+        </p:txBody>
+      </p:sp>
+      <p:sp>
+        <p:nvSpPr>
+          <p:cNvPr id="6" name="Slide Number Placeholder 5"/>
+          <p:cNvSpPr>
+            <a:spLocks noGrp="1"/>
+          </p:cNvSpPr>
+          <p:nvPr>
+            <p:ph type="sldNum" sz="quarter" idx="12"/>
+          </p:nvPr>
+        </p:nvSpPr>
+        <p:spPr/>
+        <p:txBody>
+          <a:bodyPr/>
+          <a:lstStyle/>
+          <a:p>
+            <a:fld id="{17E276FA-8F89-B34D-A726-BE3FA1F8DD97}" type="slidenum">
+              <a:rPr lang="en-US" smtClean="0"/>
+              <a:t>30</a:t>
+            </a:fld>
+            <a:endParaRPr lang="en-US" dirty="0"/>
+          </a:p>
+        </p:txBody>
+      </p:sp>
+      <p:sp>
+        <p:nvSpPr>
+          <p:cNvPr id="7" name="TextBox 6"/>
+          <p:cNvSpPr txBox="1"/>
+          <p:nvPr/>
+        </p:nvSpPr>
+        <p:spPr>
+          <a:xfrm>
+            <a:off x="4220977" y="4578976"/>
+            <a:ext cx="4057140" cy="1477328"/>
+          </a:xfrm>
+          <a:prstGeom prst="rect">
+            <a:avLst/>
+          </a:prstGeom>
+          <a:noFill/>
+        </p:spPr>
+        <p:txBody>
+          <a:bodyPr wrap="square" rtlCol="0">
+            <a:spAutoFit/>
+          </a:bodyPr>
+          <a:lstStyle/>
+          <a:p>
+            <a:r>
+              <a:rPr lang="en-US" dirty="0"/>
+              <a:t>Based on this patient's  MRI,  have we treated somebody with a similar condition ?</a:t>
+            </a:r>
+          </a:p>
+          <a:p>
+            <a:endParaRPr lang="en-US" dirty="0"/>
+          </a:p>
+          <a:p>
+            <a:endParaRPr lang="en-US" dirty="0"/>
+          </a:p>
+        </p:txBody>
+      </p:sp>
+      <p:sp>
+        <p:nvSpPr>
+          <p:cNvPr id="8" name="TextBox 7"/>
+          <p:cNvSpPr txBox="1"/>
+          <p:nvPr/>
+        </p:nvSpPr>
+        <p:spPr>
+          <a:xfrm>
+            <a:off x="4219698" y="3948781"/>
+            <a:ext cx="4057140" cy="646331"/>
+          </a:xfrm>
+          <a:prstGeom prst="rect">
+            <a:avLst/>
+          </a:prstGeom>
+          <a:noFill/>
+        </p:spPr>
+        <p:txBody>
+          <a:bodyPr wrap="square" rtlCol="0">
+            <a:spAutoFit/>
+          </a:bodyPr>
+          <a:lstStyle/>
+          <a:p>
+            <a:r>
+              <a:rPr lang="en-US" dirty="0" smtClean="0"/>
+              <a:t>Are certain breeds found more commonly in urban areas?</a:t>
+            </a:r>
+            <a:endParaRPr lang="en-US" dirty="0"/>
+          </a:p>
+        </p:txBody>
+      </p:sp>
+      <p:sp>
+        <p:nvSpPr>
+          <p:cNvPr id="9" name="TextBox 8"/>
+          <p:cNvSpPr txBox="1"/>
+          <p:nvPr/>
+        </p:nvSpPr>
+        <p:spPr>
+          <a:xfrm>
+            <a:off x="4238617" y="3253808"/>
+            <a:ext cx="4057140" cy="646331"/>
+          </a:xfrm>
+          <a:prstGeom prst="rect">
+            <a:avLst/>
+          </a:prstGeom>
+          <a:noFill/>
+        </p:spPr>
+        <p:txBody>
+          <a:bodyPr wrap="square" rtlCol="0">
+            <a:spAutoFit/>
+          </a:bodyPr>
+          <a:lstStyle/>
+          <a:p>
+            <a:r>
+              <a:rPr lang="en-US" dirty="0" smtClean="0"/>
+              <a:t>How do trees affect the prevalence of Lyme disease?</a:t>
+            </a:r>
+            <a:endParaRPr lang="en-US" dirty="0"/>
+          </a:p>
+        </p:txBody>
+      </p:sp>
+    </p:spTree>
+    <p:extLst>
+      <p:ext uri="{BB962C8B-B14F-4D97-AF65-F5344CB8AC3E}">
+        <p14:creationId xmlns:p14="http://schemas.microsoft.com/office/powerpoint/2010/main" val="3702149012"/>
+      </p:ext>
+    </p:extLst>
+  </p:cSld>
+  <p:clrMapOvr>
+    <a:masterClrMapping/>
+  </p:clrMapOvr>
+</p:sld>
+</file>
+
+<file path=ppt/slides/slide31.xml><?xml version="1.0" encoding="utf-8"?>
+<p:sld xmlns:a="http://schemas.openxmlformats.org/drawingml/2006/main" xmlns:r="http://schemas.openxmlformats.org/officeDocument/2006/relationships" xmlns:p="http://schemas.openxmlformats.org/presentationml/2006/main">
+  <p:cSld>
+    <p:spTree>
+      <p:nvGrpSpPr>
+        <p:cNvPr id="1" name=""/>
+        <p:cNvGrpSpPr/>
+        <p:nvPr/>
+      </p:nvGrpSpPr>
+      <p:grpSpPr>
+        <a:xfrm>
+          <a:off x="0" y="0"/>
+          <a:ext cx="0" cy="0"/>
+          <a:chOff x="0" y="0"/>
+          <a:chExt cx="0" cy="0"/>
+        </a:xfrm>
+      </p:grpSpPr>
+      <p:sp>
+        <p:nvSpPr>
+          <p:cNvPr id="2" name="Title 1"/>
+          <p:cNvSpPr>
+            <a:spLocks noGrp="1"/>
+          </p:cNvSpPr>
+          <p:nvPr>
+            <p:ph type="title"/>
+          </p:nvPr>
+        </p:nvSpPr>
+        <p:spPr/>
+        <p:txBody>
+          <a:bodyPr/>
+          <a:lstStyle/>
+          <a:p>
+            <a:r>
+              <a:rPr lang="en-US" dirty="0" smtClean="0"/>
+              <a:t>Specialty Tools</a:t>
+            </a:r>
+            <a:endParaRPr lang="en-US" dirty="0"/>
+          </a:p>
+        </p:txBody>
+      </p:sp>
+      <p:sp>
+        <p:nvSpPr>
+          <p:cNvPr id="3" name="Content Placeholder 2"/>
+          <p:cNvSpPr>
+            <a:spLocks noGrp="1"/>
+          </p:cNvSpPr>
+          <p:nvPr>
+            <p:ph idx="1"/>
+          </p:nvPr>
+        </p:nvSpPr>
+        <p:spPr/>
+        <p:txBody>
+          <a:bodyPr/>
+          <a:lstStyle/>
+          <a:p>
+            <a:pPr marL="0" indent="0">
+              <a:buNone/>
+            </a:pPr>
+            <a:r>
+              <a:rPr lang="en-US" dirty="0" smtClean="0"/>
+              <a:t>Uncertain Data (</a:t>
+            </a:r>
+            <a:r>
+              <a:rPr lang="en-US" i="1" dirty="0" smtClean="0"/>
+              <a:t>e.g., </a:t>
+            </a:r>
+            <a:r>
+              <a:rPr lang="en-US" dirty="0" smtClean="0"/>
+              <a:t>TRIO)</a:t>
+            </a:r>
+          </a:p>
+          <a:p>
+            <a:pPr lvl="1"/>
+            <a:r>
+              <a:rPr lang="en-US" dirty="0" smtClean="0"/>
+              <a:t>Confidence</a:t>
+            </a:r>
+          </a:p>
+          <a:p>
+            <a:pPr lvl="1"/>
+            <a:r>
+              <a:rPr lang="en-US" dirty="0" smtClean="0"/>
+              <a:t>Lineage</a:t>
+            </a:r>
+          </a:p>
+          <a:p>
+            <a:pPr marL="0" indent="0">
+              <a:buNone/>
+            </a:pPr>
+            <a:r>
+              <a:rPr lang="en-US" dirty="0" smtClean="0"/>
+              <a:t>Spatial Data </a:t>
+            </a:r>
+          </a:p>
+          <a:p>
+            <a:pPr lvl="1"/>
+            <a:r>
+              <a:rPr lang="en-US" dirty="0" smtClean="0"/>
+              <a:t>Polyline support (describe a region)</a:t>
+            </a:r>
+          </a:p>
+          <a:p>
+            <a:pPr lvl="1"/>
+            <a:r>
+              <a:rPr lang="en-US" dirty="0" smtClean="0"/>
+              <a:t>Hierarchy of space (building with floors, rooms, </a:t>
+            </a:r>
+            <a:r>
+              <a:rPr lang="en-US" i="1" dirty="0" smtClean="0"/>
+              <a:t>etc.</a:t>
+            </a:r>
+            <a:r>
+              <a:rPr lang="en-US" dirty="0" smtClean="0"/>
+              <a:t>)</a:t>
+            </a:r>
+          </a:p>
+          <a:p>
+            <a:pPr lvl="1"/>
+            <a:r>
+              <a:rPr lang="en-US" dirty="0" smtClean="0"/>
+              <a:t>Search based on 2d relationship</a:t>
+            </a:r>
+          </a:p>
+          <a:p>
+            <a:pPr lvl="1"/>
+            <a:r>
+              <a:rPr lang="en-US" dirty="0" smtClean="0"/>
+              <a:t>Calculate area</a:t>
+            </a:r>
+          </a:p>
+          <a:p>
+            <a:pPr lvl="1"/>
+            <a:r>
+              <a:rPr lang="en-US" dirty="0" smtClean="0"/>
+              <a:t>Model data in space (</a:t>
+            </a:r>
+            <a:r>
+              <a:rPr lang="en-US" i="1" dirty="0" smtClean="0"/>
+              <a:t>e.g. </a:t>
+            </a:r>
+            <a:r>
+              <a:rPr lang="en-US" dirty="0" smtClean="0"/>
+              <a:t>things may move)</a:t>
+            </a:r>
+          </a:p>
+          <a:p>
+            <a:pPr marL="0" indent="0">
+              <a:buNone/>
+            </a:pPr>
+            <a:endParaRPr lang="en-US" dirty="0"/>
+          </a:p>
+          <a:p>
+            <a:pPr marL="0" indent="0">
+              <a:buNone/>
+            </a:pPr>
+            <a:endParaRPr lang="en-US" dirty="0" smtClean="0"/>
+          </a:p>
+        </p:txBody>
+      </p:sp>
+      <p:sp>
+        <p:nvSpPr>
+          <p:cNvPr id="4" name="Date Placeholder 3"/>
+          <p:cNvSpPr>
+            <a:spLocks noGrp="1"/>
+          </p:cNvSpPr>
+          <p:nvPr>
+            <p:ph type="dt" sz="half" idx="10"/>
+          </p:nvPr>
+        </p:nvSpPr>
+        <p:spPr/>
+        <p:txBody>
+          <a:bodyPr/>
+          <a:lstStyle/>
+          <a:p>
+            <a:fld id="{7053BEFA-1175-F644-B249-7D41D72BD3FF}" type="datetime1">
+              <a:rPr lang="en-US" smtClean="0"/>
+              <a:t>1/16/14</a:t>
+            </a:fld>
+            <a:endParaRPr lang="en-US"/>
+          </a:p>
+        </p:txBody>
+      </p:sp>
+      <p:sp>
+        <p:nvSpPr>
+          <p:cNvPr id="5" name="Footer Placeholder 4"/>
+          <p:cNvSpPr>
+            <a:spLocks noGrp="1"/>
+          </p:cNvSpPr>
+          <p:nvPr>
+            <p:ph type="ftr" sz="quarter" idx="11"/>
+          </p:nvPr>
+        </p:nvSpPr>
+        <p:spPr/>
+        <p:txBody>
+          <a:bodyPr/>
+          <a:lstStyle/>
+          <a:p>
+            <a:endParaRPr lang="en-US" dirty="0"/>
+          </a:p>
+        </p:txBody>
+      </p:sp>
+      <p:sp>
+        <p:nvSpPr>
+          <p:cNvPr id="6" name="Slide Number Placeholder 5"/>
+          <p:cNvSpPr>
+            <a:spLocks noGrp="1"/>
+          </p:cNvSpPr>
+          <p:nvPr>
+            <p:ph type="sldNum" sz="quarter" idx="12"/>
+          </p:nvPr>
+        </p:nvSpPr>
+        <p:spPr/>
+        <p:txBody>
+          <a:bodyPr/>
+          <a:lstStyle/>
+          <a:p>
+            <a:fld id="{17E276FA-8F89-B34D-A726-BE3FA1F8DD97}" type="slidenum">
+              <a:rPr lang="en-US" smtClean="0"/>
+              <a:t>31</a:t>
+            </a:fld>
+            <a:endParaRPr lang="en-US" dirty="0"/>
+          </a:p>
+        </p:txBody>
+      </p:sp>
+    </p:spTree>
+    <p:extLst>
+      <p:ext uri="{BB962C8B-B14F-4D97-AF65-F5344CB8AC3E}">
+        <p14:creationId xmlns:p14="http://schemas.microsoft.com/office/powerpoint/2010/main" val="2382904843"/>
+      </p:ext>
+    </p:extLst>
+  </p:cSld>
+  <p:clrMapOvr>
+    <a:masterClrMapping/>
+  </p:clrMapOvr>
+</p:sld>
+</file>
+
+<file path=ppt/slides/slide32.xml><?xml version="1.0" encoding="utf-8"?>
+<p:sld xmlns:a="http://schemas.openxmlformats.org/drawingml/2006/main" xmlns:r="http://schemas.openxmlformats.org/officeDocument/2006/relationships" xmlns:p="http://schemas.openxmlformats.org/presentationml/2006/main">
+  <p:cSld>
+    <p:spTree>
+      <p:nvGrpSpPr>
+        <p:cNvPr id="1" name=""/>
+        <p:cNvGrpSpPr/>
+        <p:nvPr/>
+      </p:nvGrpSpPr>
+      <p:grpSpPr>
+        <a:xfrm>
+          <a:off x="0" y="0"/>
+          <a:ext cx="0" cy="0"/>
+          <a:chOff x="0" y="0"/>
+          <a:chExt cx="0" cy="0"/>
+        </a:xfrm>
+      </p:grpSpPr>
+      <p:sp>
+        <p:nvSpPr>
+          <p:cNvPr id="2" name="Title 1"/>
+          <p:cNvSpPr>
+            <a:spLocks noGrp="1"/>
+          </p:cNvSpPr>
+          <p:nvPr>
+            <p:ph type="title"/>
+          </p:nvPr>
+        </p:nvSpPr>
+        <p:spPr>
+          <a:xfrm>
+            <a:off x="1128943" y="310162"/>
+            <a:ext cx="6105630" cy="990107"/>
+          </a:xfrm>
+        </p:spPr>
+        <p:txBody>
+          <a:bodyPr/>
+          <a:lstStyle/>
+          <a:p>
+            <a:r>
+              <a:rPr lang="en-US" dirty="0" smtClean="0"/>
+              <a:t>When you didn’t create the model</a:t>
+            </a:r>
+            <a:endParaRPr lang="en-US" dirty="0"/>
+          </a:p>
+        </p:txBody>
+      </p:sp>
+      <p:sp>
+        <p:nvSpPr>
+          <p:cNvPr id="3" name="Content Placeholder 2"/>
+          <p:cNvSpPr>
+            <a:spLocks noGrp="1"/>
+          </p:cNvSpPr>
+          <p:nvPr>
+            <p:ph idx="1"/>
+          </p:nvPr>
+        </p:nvSpPr>
+        <p:spPr>
+          <a:xfrm>
+            <a:off x="1128943" y="1729568"/>
+            <a:ext cx="7048804" cy="4379976"/>
+          </a:xfrm>
+        </p:spPr>
+        <p:txBody>
+          <a:bodyPr/>
+          <a:lstStyle/>
+          <a:p>
+            <a:r>
+              <a:rPr lang="en-US" dirty="0" smtClean="0"/>
+              <a:t>How is it structured; if at all?</a:t>
+            </a:r>
+          </a:p>
+          <a:p>
+            <a:r>
+              <a:rPr lang="en-US" dirty="0" smtClean="0"/>
+              <a:t>What are the </a:t>
+            </a:r>
+            <a:r>
+              <a:rPr lang="en-US" i="1" dirty="0" smtClean="0"/>
+              <a:t>fields</a:t>
+            </a:r>
+            <a:r>
+              <a:rPr lang="en-US" dirty="0" smtClean="0"/>
+              <a:t> and </a:t>
+            </a:r>
+            <a:r>
+              <a:rPr lang="en-US" i="1" dirty="0" smtClean="0"/>
+              <a:t>values</a:t>
+            </a:r>
+            <a:r>
+              <a:rPr lang="en-US" dirty="0" smtClean="0"/>
+              <a:t>?</a:t>
+            </a:r>
+          </a:p>
+          <a:p>
+            <a:r>
+              <a:rPr lang="en-US" dirty="0" smtClean="0"/>
+              <a:t>Does it have multiple tables or just one?</a:t>
+            </a:r>
+          </a:p>
+          <a:p>
+            <a:r>
+              <a:rPr lang="en-US" dirty="0" smtClean="0"/>
+              <a:t>Is it designed for machine consumption or human consumption?</a:t>
+            </a:r>
+          </a:p>
+          <a:p>
+            <a:r>
+              <a:rPr lang="en-US" dirty="0" smtClean="0"/>
+              <a:t>Is it in a database? multiple files or one file?</a:t>
+            </a:r>
+          </a:p>
+          <a:p>
+            <a:pPr marL="0" indent="0">
+              <a:buNone/>
+            </a:pPr>
+            <a:r>
+              <a:rPr lang="en-US" dirty="0" smtClean="0"/>
+              <a:t>Recommended Reading: The Bad Data Handbook (McCallum): O’Reilly</a:t>
+            </a:r>
+            <a:r>
+              <a:rPr lang="en-US" dirty="0"/>
+              <a:t> </a:t>
+            </a:r>
+            <a:r>
+              <a:rPr lang="en-US" dirty="0" smtClean="0"/>
+              <a:t>Press</a:t>
+            </a:r>
+          </a:p>
+          <a:p>
+            <a:endParaRPr lang="en-US" dirty="0"/>
+          </a:p>
+        </p:txBody>
+      </p:sp>
+      <p:sp>
+        <p:nvSpPr>
+          <p:cNvPr id="4" name="Date Placeholder 3"/>
+          <p:cNvSpPr>
+            <a:spLocks noGrp="1"/>
+          </p:cNvSpPr>
+          <p:nvPr>
+            <p:ph type="dt" sz="half" idx="10"/>
+          </p:nvPr>
+        </p:nvSpPr>
+        <p:spPr/>
+        <p:txBody>
+          <a:bodyPr/>
+          <a:lstStyle/>
+          <a:p>
+            <a:fld id="{7053BEFA-1175-F644-B249-7D41D72BD3FF}" type="datetime1">
+              <a:rPr lang="en-US" smtClean="0"/>
+              <a:t>1/16/14</a:t>
+            </a:fld>
+            <a:endParaRPr lang="en-US"/>
+          </a:p>
+        </p:txBody>
+      </p:sp>
+      <p:sp>
+        <p:nvSpPr>
+          <p:cNvPr id="5" name="Footer Placeholder 4"/>
+          <p:cNvSpPr>
+            <a:spLocks noGrp="1"/>
+          </p:cNvSpPr>
+          <p:nvPr>
+            <p:ph type="ftr" sz="quarter" idx="11"/>
+          </p:nvPr>
+        </p:nvSpPr>
+        <p:spPr/>
+        <p:txBody>
+          <a:bodyPr/>
+          <a:lstStyle/>
+          <a:p>
+            <a:endParaRPr lang="en-US" dirty="0"/>
+          </a:p>
+        </p:txBody>
+      </p:sp>
+      <p:sp>
+        <p:nvSpPr>
+          <p:cNvPr id="6" name="Slide Number Placeholder 5"/>
+          <p:cNvSpPr>
+            <a:spLocks noGrp="1"/>
+          </p:cNvSpPr>
+          <p:nvPr>
+            <p:ph type="sldNum" sz="quarter" idx="12"/>
+          </p:nvPr>
+        </p:nvSpPr>
+        <p:spPr/>
+        <p:txBody>
+          <a:bodyPr/>
+          <a:lstStyle/>
+          <a:p>
+            <a:fld id="{17E276FA-8F89-B34D-A726-BE3FA1F8DD97}" type="slidenum">
+              <a:rPr lang="en-US" smtClean="0"/>
+              <a:t>32</a:t>
+            </a:fld>
+            <a:endParaRPr lang="en-US" dirty="0"/>
+          </a:p>
+        </p:txBody>
+      </p:sp>
+    </p:spTree>
+    <p:extLst>
+      <p:ext uri="{BB962C8B-B14F-4D97-AF65-F5344CB8AC3E}">
+        <p14:creationId xmlns:p14="http://schemas.microsoft.com/office/powerpoint/2010/main" val="2775680534"/>
+      </p:ext>
+    </p:extLst>
+  </p:cSld>
+  <p:clrMapOvr>
+    <a:masterClrMapping/>
+  </p:clrMapOvr>
+</p:sld>
+</file>
+
+<file path=ppt/slides/slide33.xml><?xml version="1.0" encoding="utf-8"?>
+<p:sld xmlns:a="http://schemas.openxmlformats.org/drawingml/2006/main" xmlns:r="http://schemas.openxmlformats.org/officeDocument/2006/relationships" xmlns:p="http://schemas.openxmlformats.org/presentationml/2006/main">
+  <p:cSld>
+    <p:spTree>
+      <p:nvGrpSpPr>
+        <p:cNvPr id="1" name=""/>
+        <p:cNvGrpSpPr/>
+        <p:nvPr/>
+      </p:nvGrpSpPr>
+      <p:grpSpPr>
+        <a:xfrm>
+          <a:off x="0" y="0"/>
+          <a:ext cx="0" cy="0"/>
+          <a:chOff x="0" y="0"/>
+          <a:chExt cx="0" cy="0"/>
+        </a:xfrm>
+      </p:grpSpPr>
+      <p:sp>
+        <p:nvSpPr>
+          <p:cNvPr id="2" name="Title 1"/>
+          <p:cNvSpPr>
+            <a:spLocks noGrp="1"/>
+          </p:cNvSpPr>
+          <p:nvPr>
+            <p:ph type="title"/>
+          </p:nvPr>
+        </p:nvSpPr>
+        <p:spPr/>
+        <p:txBody>
+          <a:bodyPr/>
+          <a:lstStyle/>
+          <a:p>
+            <a:r>
+              <a:rPr lang="en-US" dirty="0" smtClean="0"/>
+              <a:t>Data </a:t>
+            </a:r>
+            <a:r>
+              <a:rPr lang="en-US" dirty="0" smtClean="0"/>
+              <a:t>Management</a:t>
+            </a:r>
+            <a:endParaRPr lang="en-US" dirty="0"/>
+          </a:p>
+        </p:txBody>
+      </p:sp>
+      <p:sp>
+        <p:nvSpPr>
+          <p:cNvPr id="3" name="Content Placeholder 2"/>
+          <p:cNvSpPr>
+            <a:spLocks noGrp="1"/>
+          </p:cNvSpPr>
+          <p:nvPr>
+            <p:ph idx="1"/>
+          </p:nvPr>
+        </p:nvSpPr>
+        <p:spPr/>
+        <p:txBody>
+          <a:bodyPr/>
+          <a:lstStyle/>
+          <a:p>
+            <a:pPr marL="0" indent="0">
+              <a:buNone/>
+            </a:pPr>
+            <a:r>
+              <a:rPr lang="en-US" dirty="0"/>
+              <a:t>Information is an organizational resource</a:t>
+            </a:r>
+          </a:p>
+          <a:p>
+            <a:pPr lvl="1"/>
+            <a:r>
+              <a:rPr lang="en-US" dirty="0"/>
+              <a:t>Just like people, capital, and equipment</a:t>
+            </a:r>
+          </a:p>
+          <a:p>
+            <a:pPr lvl="1"/>
+            <a:r>
+              <a:rPr lang="en-US" dirty="0"/>
+              <a:t>It must be managed </a:t>
+            </a:r>
+            <a:r>
+              <a:rPr lang="en-US" dirty="0" smtClean="0"/>
+              <a:t>effectively</a:t>
+            </a:r>
+          </a:p>
+          <a:p>
+            <a:pPr marL="0" indent="0">
+              <a:buNone/>
+            </a:pPr>
+            <a:r>
+              <a:rPr lang="en-US" dirty="0" smtClean="0"/>
+              <a:t>Who should oversee it?</a:t>
+            </a:r>
+          </a:p>
+          <a:p>
+            <a:pPr lvl="1"/>
+            <a:r>
+              <a:rPr lang="en-US" dirty="0" smtClean="0"/>
+              <a:t>Who owns it</a:t>
+            </a:r>
+          </a:p>
+          <a:p>
+            <a:pPr lvl="1"/>
+            <a:r>
+              <a:rPr lang="en-US" dirty="0" smtClean="0"/>
+              <a:t>Who is responsible for the four Cs? (Completeness, Coherence, Correctness, </a:t>
+            </a:r>
+            <a:r>
+              <a:rPr lang="en-US" dirty="0" err="1" smtClean="0"/>
+              <a:t>AcCountability</a:t>
+            </a:r>
+            <a:r>
+              <a:rPr lang="en-US" dirty="0" smtClean="0"/>
+              <a:t>)</a:t>
+            </a:r>
+          </a:p>
+          <a:p>
+            <a:pPr marL="0" indent="0">
+              <a:buNone/>
+            </a:pPr>
+            <a:r>
+              <a:rPr lang="en-US" dirty="0" smtClean="0"/>
+              <a:t>Requires lots of attention, over time, regular checks, </a:t>
+            </a:r>
+            <a:r>
+              <a:rPr lang="en-US" i="1" dirty="0" smtClean="0"/>
+              <a:t>etc.</a:t>
+            </a:r>
+            <a:endParaRPr lang="en-US" dirty="0"/>
+          </a:p>
+          <a:p>
+            <a:endParaRPr lang="en-US" dirty="0"/>
+          </a:p>
+        </p:txBody>
+      </p:sp>
+      <p:sp>
+        <p:nvSpPr>
+          <p:cNvPr id="4" name="Date Placeholder 3"/>
+          <p:cNvSpPr>
+            <a:spLocks noGrp="1"/>
+          </p:cNvSpPr>
+          <p:nvPr>
+            <p:ph type="dt" sz="half" idx="10"/>
+          </p:nvPr>
+        </p:nvSpPr>
+        <p:spPr/>
+        <p:txBody>
+          <a:bodyPr/>
+          <a:lstStyle/>
+          <a:p>
+            <a:fld id="{7053BEFA-1175-F644-B249-7D41D72BD3FF}" type="datetime1">
+              <a:rPr lang="en-US" smtClean="0"/>
+              <a:t>1/16/14</a:t>
+            </a:fld>
+            <a:endParaRPr lang="en-US"/>
+          </a:p>
+        </p:txBody>
+      </p:sp>
+      <p:sp>
+        <p:nvSpPr>
+          <p:cNvPr id="5" name="Footer Placeholder 4"/>
+          <p:cNvSpPr>
+            <a:spLocks noGrp="1"/>
+          </p:cNvSpPr>
+          <p:nvPr>
+            <p:ph type="ftr" sz="quarter" idx="11"/>
+          </p:nvPr>
+        </p:nvSpPr>
+        <p:spPr/>
+        <p:txBody>
+          <a:bodyPr/>
+          <a:lstStyle/>
+          <a:p>
+            <a:endParaRPr lang="en-US" dirty="0"/>
+          </a:p>
+        </p:txBody>
+      </p:sp>
+      <p:sp>
+        <p:nvSpPr>
+          <p:cNvPr id="6" name="Slide Number Placeholder 5"/>
+          <p:cNvSpPr>
+            <a:spLocks noGrp="1"/>
+          </p:cNvSpPr>
+          <p:nvPr>
+            <p:ph type="sldNum" sz="quarter" idx="12"/>
+          </p:nvPr>
+        </p:nvSpPr>
+        <p:spPr/>
+        <p:txBody>
+          <a:bodyPr/>
+          <a:lstStyle/>
+          <a:p>
+            <a:fld id="{17E276FA-8F89-B34D-A726-BE3FA1F8DD97}" type="slidenum">
+              <a:rPr lang="en-US" smtClean="0"/>
+              <a:t>33</a:t>
+            </a:fld>
+            <a:endParaRPr lang="en-US" dirty="0"/>
+          </a:p>
+        </p:txBody>
+      </p:sp>
+    </p:spTree>
+    <p:extLst>
+      <p:ext uri="{BB962C8B-B14F-4D97-AF65-F5344CB8AC3E}">
+        <p14:creationId xmlns:p14="http://schemas.microsoft.com/office/powerpoint/2010/main" val="3472991845"/>
       </p:ext>
     </p:extLst>
   </p:cSld>
@@ -12970,7 +15140,7 @@
           <a:p>
             <a:fld id="{7053BEFA-1175-F644-B249-7D41D72BD3FF}" type="datetime1">
               <a:rPr lang="en-US" smtClean="0"/>
-              <a:t>1/10/14</a:t>
+              <a:t>1/16/14</a:t>
             </a:fld>
             <a:endParaRPr lang="en-US"/>
           </a:p>
@@ -13146,7 +15316,7 @@
           <a:p>
             <a:fld id="{7053BEFA-1175-F644-B249-7D41D72BD3FF}" type="datetime1">
               <a:rPr lang="en-US" smtClean="0"/>
-              <a:t>1/10/14</a:t>
+              <a:t>1/16/14</a:t>
             </a:fld>
             <a:endParaRPr lang="en-US"/>
           </a:p>
@@ -13357,7 +15527,7 @@
           <a:p>
             <a:fld id="{7053BEFA-1175-F644-B249-7D41D72BD3FF}" type="datetime1">
               <a:rPr lang="en-US" smtClean="0"/>
-              <a:t>1/10/14</a:t>
+              <a:t>1/16/14</a:t>
             </a:fld>
             <a:endParaRPr lang="en-US"/>
           </a:p>
@@ -13813,7 +15983,7 @@
           <a:p>
             <a:fld id="{7053BEFA-1175-F644-B249-7D41D72BD3FF}" type="datetime1">
               <a:rPr lang="en-US" smtClean="0"/>
-              <a:t>1/10/14</a:t>
+              <a:t>1/16/14</a:t>
             </a:fld>
             <a:endParaRPr lang="en-US"/>
           </a:p>
@@ -14006,7 +16176,7 @@
           <a:p>
             <a:fld id="{7053BEFA-1175-F644-B249-7D41D72BD3FF}" type="datetime1">
               <a:rPr lang="en-US" smtClean="0"/>
-              <a:t>1/10/14</a:t>
+              <a:t>1/16/14</a:t>
             </a:fld>
             <a:endParaRPr lang="en-US"/>
           </a:p>
@@ -14210,7 +16380,7 @@
           <a:p>
             <a:fld id="{7053BEFA-1175-F644-B249-7D41D72BD3FF}" type="datetime1">
               <a:rPr lang="en-US" smtClean="0"/>
-              <a:t>1/10/14</a:t>
+              <a:t>1/16/14</a:t>
             </a:fld>
             <a:endParaRPr lang="en-US"/>
           </a:p>

</xml_diff>

<commit_message>
Updates to Data Storage lecture and Byte 2
</commit_message>
<xml_diff>
--- a/Lectures/3 Data Storage.pptx
+++ b/Lectures/3 Data Storage.pptx
@@ -5,10 +5,10 @@
     <p:sldMasterId id="2147483648" r:id="rId1"/>
   </p:sldMasterIdLst>
   <p:notesMasterIdLst>
-    <p:notesMasterId r:id="rId35"/>
+    <p:notesMasterId r:id="rId34"/>
   </p:notesMasterIdLst>
   <p:handoutMasterIdLst>
-    <p:handoutMasterId r:id="rId36"/>
+    <p:handoutMasterId r:id="rId35"/>
   </p:handoutMasterIdLst>
   <p:sldIdLst>
     <p:sldId id="256" r:id="rId2"/>
@@ -42,8 +42,7 @@
     <p:sldId id="407" r:id="rId30"/>
     <p:sldId id="408" r:id="rId31"/>
     <p:sldId id="410" r:id="rId32"/>
-    <p:sldId id="423" r:id="rId33"/>
-    <p:sldId id="411" r:id="rId34"/>
+    <p:sldId id="411" r:id="rId33"/>
   </p:sldIdLst>
   <p:sldSz cx="9144000" cy="6858000" type="screen4x3"/>
   <p:notesSz cx="6858000" cy="9144000"/>
@@ -227,7 +226,7 @@
           <a:p>
             <a:fld id="{D3AAB66F-B1B7-D045-B4E8-4F60236F228D}" type="datetimeFigureOut">
               <a:rPr lang="en-US" smtClean="0"/>
-              <a:t>1/16/14</a:t>
+              <a:t>1/21/14</a:t>
             </a:fld>
             <a:endParaRPr lang="en-US"/>
           </a:p>
@@ -393,7 +392,7 @@
           <a:p>
             <a:fld id="{BCCF8E76-06A6-164E-A6FA-EC32C13EB232}" type="datetimeFigureOut">
               <a:rPr lang="en-US" smtClean="0"/>
-              <a:t>1/16/14</a:t>
+              <a:t>1/21/14</a:t>
             </a:fld>
             <a:endParaRPr lang="en-US"/>
           </a:p>
@@ -1040,7 +1039,20 @@
           <a:p>
             <a:r>
               <a:rPr lang="en-US" dirty="0" smtClean="0"/>
-              <a:t>Have special structure that makes this type of data easier to handle .. .but we deal with it all the time outside of these tools</a:t>
+              <a:t>Make sure to DEFINE uncertain and spatial before we ask the class to discuss them! </a:t>
+            </a:r>
+          </a:p>
+          <a:p>
+            <a:endParaRPr lang="en-US" smtClean="0"/>
+          </a:p>
+          <a:p>
+            <a:r>
+              <a:rPr lang="en-US" smtClean="0"/>
+              <a:t>Have </a:t>
+            </a:r>
+            <a:r>
+              <a:rPr lang="en-US" dirty="0" smtClean="0"/>
+              <a:t>special structure that makes this type of data easier to handle .. .but we deal with it all the time outside of these tools</a:t>
             </a:r>
             <a:endParaRPr lang="en-US" dirty="0"/>
           </a:p>
@@ -2598,7 +2610,7 @@
             <a:fld id="{FA3C144B-2939-9A49-B014-915EC3E81866}" type="datetime1">
               <a:rPr lang="en-US" smtClean="0"/>
               <a:pPr/>
-              <a:t>1/16/14</a:t>
+              <a:t>1/21/14</a:t>
             </a:fld>
             <a:endParaRPr lang="en-US" dirty="0"/>
           </a:p>
@@ -3027,7 +3039,7 @@
           <a:p>
             <a:fld id="{76838339-A875-5E45-AB3F-AAABD270346A}" type="datetime1">
               <a:rPr lang="en-US" smtClean="0"/>
-              <a:t>1/16/14</a:t>
+              <a:t>1/21/14</a:t>
             </a:fld>
             <a:endParaRPr lang="en-US"/>
           </a:p>
@@ -3313,7 +3325,7 @@
             <a:fld id="{FA3C144B-2939-9A49-B014-915EC3E81866}" type="datetime1">
               <a:rPr lang="en-US" smtClean="0"/>
               <a:pPr/>
-              <a:t>1/16/14</a:t>
+              <a:t>1/21/14</a:t>
             </a:fld>
             <a:endParaRPr lang="en-US" dirty="0"/>
           </a:p>
@@ -3795,7 +3807,7 @@
           <a:p>
             <a:fld id="{A73F672F-A5FB-5745-934A-1BF51CA5539C}" type="datetime1">
               <a:rPr lang="en-US" smtClean="0"/>
-              <a:t>1/16/14</a:t>
+              <a:t>1/21/14</a:t>
             </a:fld>
             <a:endParaRPr lang="en-US"/>
           </a:p>
@@ -4137,7 +4149,7 @@
             <a:fld id="{FA3C144B-2939-9A49-B014-915EC3E81866}" type="datetime1">
               <a:rPr lang="en-US" smtClean="0"/>
               <a:pPr/>
-              <a:t>1/16/14</a:t>
+              <a:t>1/21/14</a:t>
             </a:fld>
             <a:endParaRPr lang="en-US" dirty="0"/>
           </a:p>
@@ -4601,7 +4613,7 @@
           <a:p>
             <a:fld id="{6AFE6A63-5EBE-3E48-B0AE-DF655A1ECE76}" type="datetime1">
               <a:rPr lang="en-US" smtClean="0"/>
-              <a:t>1/16/14</a:t>
+              <a:t>1/21/14</a:t>
             </a:fld>
             <a:endParaRPr lang="en-US"/>
           </a:p>
@@ -4920,7 +4932,7 @@
           <a:p>
             <a:fld id="{4A019F0C-9D18-B54A-9AC9-18AA74EDB034}" type="datetime1">
               <a:rPr lang="en-US" smtClean="0"/>
-              <a:t>1/16/14</a:t>
+              <a:t>1/21/14</a:t>
             </a:fld>
             <a:endParaRPr lang="en-US"/>
           </a:p>
@@ -5230,7 +5242,7 @@
             <a:fld id="{FA3C144B-2939-9A49-B014-915EC3E81866}" type="datetime1">
               <a:rPr lang="en-US" smtClean="0"/>
               <a:pPr/>
-              <a:t>1/16/14</a:t>
+              <a:t>1/21/14</a:t>
             </a:fld>
             <a:endParaRPr lang="en-US" dirty="0"/>
           </a:p>
@@ -5493,7 +5505,7 @@
           <a:p>
             <a:fld id="{FA3C144B-2939-9A49-B014-915EC3E81866}" type="datetime1">
               <a:rPr lang="en-US" smtClean="0"/>
-              <a:t>1/16/14</a:t>
+              <a:t>1/21/14</a:t>
             </a:fld>
             <a:endParaRPr lang="en-US" dirty="0"/>
           </a:p>
@@ -5861,7 +5873,7 @@
           <a:p>
             <a:fld id="{7053BEFA-1175-F644-B249-7D41D72BD3FF}" type="datetime1">
               <a:rPr lang="en-US" smtClean="0"/>
-              <a:t>1/16/14</a:t>
+              <a:t>1/21/14</a:t>
             </a:fld>
             <a:endParaRPr lang="en-US"/>
           </a:p>
@@ -5980,7 +5992,7 @@
             <a:fld id="{FA3C144B-2939-9A49-B014-915EC3E81866}" type="datetime1">
               <a:rPr lang="en-US" smtClean="0"/>
               <a:pPr/>
-              <a:t>1/16/14</a:t>
+              <a:t>1/21/14</a:t>
             </a:fld>
             <a:endParaRPr lang="en-US" dirty="0"/>
           </a:p>
@@ -6197,7 +6209,7 @@
             <a:fld id="{FA3C144B-2939-9A49-B014-915EC3E81866}" type="datetime1">
               <a:rPr lang="en-US" smtClean="0"/>
               <a:pPr/>
-              <a:t>1/16/14</a:t>
+              <a:t>1/21/14</a:t>
             </a:fld>
             <a:endParaRPr lang="en-US" dirty="0"/>
           </a:p>
@@ -6442,7 +6454,7 @@
             <a:fld id="{FA3C144B-2939-9A49-B014-915EC3E81866}" type="datetime1">
               <a:rPr lang="en-US" smtClean="0"/>
               <a:pPr/>
-              <a:t>1/16/14</a:t>
+              <a:t>1/21/14</a:t>
             </a:fld>
             <a:endParaRPr lang="en-US" dirty="0"/>
           </a:p>
@@ -6820,7 +6832,7 @@
           <a:p>
             <a:fld id="{111EEF3B-ABF2-AA4E-9E24-0C6256942674}" type="datetime1">
               <a:rPr lang="en-US" smtClean="0"/>
-              <a:t>1/16/14</a:t>
+              <a:t>1/21/14</a:t>
             </a:fld>
             <a:endParaRPr lang="en-US"/>
           </a:p>
@@ -6984,7 +6996,7 @@
             <a:fld id="{FA3C144B-2939-9A49-B014-915EC3E81866}" type="datetime1">
               <a:rPr lang="en-US" smtClean="0"/>
               <a:pPr/>
-              <a:t>1/16/14</a:t>
+              <a:t>1/21/14</a:t>
             </a:fld>
             <a:endParaRPr lang="en-US" dirty="0"/>
           </a:p>
@@ -7401,7 +7413,7 @@
             <a:fld id="{FA3C144B-2939-9A49-B014-915EC3E81866}" type="datetime1">
               <a:rPr lang="en-US" smtClean="0"/>
               <a:pPr/>
-              <a:t>1/16/14</a:t>
+              <a:t>1/21/14</a:t>
             </a:fld>
             <a:endParaRPr lang="en-US" dirty="0"/>
           </a:p>
@@ -7717,7 +7729,7 @@
             <a:fld id="{FA3C144B-2939-9A49-B014-915EC3E81866}" type="datetime1">
               <a:rPr lang="en-US" smtClean="0"/>
               <a:pPr/>
-              <a:t>1/16/14</a:t>
+              <a:t>1/21/14</a:t>
             </a:fld>
             <a:endParaRPr lang="en-US" dirty="0"/>
           </a:p>
@@ -8383,7 +8395,7 @@
             <a:fld id="{FA3C144B-2939-9A49-B014-915EC3E81866}" type="datetime1">
               <a:rPr lang="en-US" smtClean="0"/>
               <a:pPr/>
-              <a:t>1/16/14</a:t>
+              <a:t>1/21/14</a:t>
             </a:fld>
             <a:endParaRPr lang="en-US" dirty="0"/>
           </a:p>
@@ -9423,6 +9435,13 @@
   <p:clrMapOvr>
     <a:masterClrMapping/>
   </p:clrMapOvr>
+  <p:timing>
+    <p:tnLst>
+      <p:par>
+        <p:cTn xmlns:p14="http://schemas.microsoft.com/office/powerpoint/2010/main" id="1" dur="indefinite" restart="never" nodeType="tmRoot"/>
+      </p:par>
+    </p:tnLst>
+  </p:timing>
 </p:sld>
 </file>
 
@@ -9502,7 +9521,7 @@
           <a:p>
             <a:fld id="{7053BEFA-1175-F644-B249-7D41D72BD3FF}" type="datetime1">
               <a:rPr lang="en-US" smtClean="0"/>
-              <a:t>1/16/14</a:t>
+              <a:t>1/21/14</a:t>
             </a:fld>
             <a:endParaRPr lang="en-US"/>
           </a:p>
@@ -9560,6 +9579,13 @@
   <p:clrMapOvr>
     <a:masterClrMapping/>
   </p:clrMapOvr>
+  <p:timing>
+    <p:tnLst>
+      <p:par>
+        <p:cTn xmlns:p14="http://schemas.microsoft.com/office/powerpoint/2010/main" id="1" dur="indefinite" restart="never" nodeType="tmRoot"/>
+      </p:par>
+    </p:tnLst>
+  </p:timing>
 </p:sld>
 </file>
 
@@ -9706,7 +9732,7 @@
           <a:p>
             <a:fld id="{7053BEFA-1175-F644-B249-7D41D72BD3FF}" type="datetime1">
               <a:rPr lang="en-US" smtClean="0"/>
-              <a:t>1/16/14</a:t>
+              <a:t>1/21/14</a:t>
             </a:fld>
             <a:endParaRPr lang="en-US"/>
           </a:p>
@@ -9790,6 +9816,13 @@
   <p:clrMapOvr>
     <a:masterClrMapping/>
   </p:clrMapOvr>
+  <p:timing>
+    <p:tnLst>
+      <p:par>
+        <p:cTn xmlns:p14="http://schemas.microsoft.com/office/powerpoint/2010/main" id="1" dur="indefinite" restart="never" nodeType="tmRoot"/>
+      </p:par>
+    </p:tnLst>
+  </p:timing>
 </p:sld>
 </file>
 
@@ -9917,7 +9950,7 @@
           <a:p>
             <a:fld id="{7053BEFA-1175-F644-B249-7D41D72BD3FF}" type="datetime1">
               <a:rPr lang="en-US" smtClean="0"/>
-              <a:t>1/16/14</a:t>
+              <a:t>1/21/14</a:t>
             </a:fld>
             <a:endParaRPr lang="en-US"/>
           </a:p>
@@ -9975,6 +10008,13 @@
   <p:clrMapOvr>
     <a:masterClrMapping/>
   </p:clrMapOvr>
+  <p:timing>
+    <p:tnLst>
+      <p:par>
+        <p:cTn xmlns:p14="http://schemas.microsoft.com/office/powerpoint/2010/main" id="1" dur="indefinite" restart="never" nodeType="tmRoot"/>
+      </p:par>
+    </p:tnLst>
+  </p:timing>
 </p:sld>
 </file>
 
@@ -10101,7 +10141,7 @@
           <a:p>
             <a:fld id="{7053BEFA-1175-F644-B249-7D41D72BD3FF}" type="datetime1">
               <a:rPr lang="en-US" smtClean="0"/>
-              <a:t>1/16/14</a:t>
+              <a:t>1/21/14</a:t>
             </a:fld>
             <a:endParaRPr lang="en-US"/>
           </a:p>
@@ -10159,6 +10199,13 @@
   <p:clrMapOvr>
     <a:masterClrMapping/>
   </p:clrMapOvr>
+  <p:timing>
+    <p:tnLst>
+      <p:par>
+        <p:cTn xmlns:p14="http://schemas.microsoft.com/office/powerpoint/2010/main" id="1" dur="indefinite" restart="never" nodeType="tmRoot"/>
+      </p:par>
+    </p:tnLst>
+  </p:timing>
 </p:sld>
 </file>
 
@@ -10250,7 +10297,7 @@
           <a:p>
             <a:fld id="{7053BEFA-1175-F644-B249-7D41D72BD3FF}" type="datetime1">
               <a:rPr lang="en-US" smtClean="0"/>
-              <a:t>1/16/14</a:t>
+              <a:t>1/21/14</a:t>
             </a:fld>
             <a:endParaRPr lang="en-US"/>
           </a:p>
@@ -10464,6 +10511,13 @@
   <p:clrMapOvr>
     <a:masterClrMapping/>
   </p:clrMapOvr>
+  <p:timing>
+    <p:tnLst>
+      <p:par>
+        <p:cTn xmlns:p14="http://schemas.microsoft.com/office/powerpoint/2010/main" id="1" dur="indefinite" restart="never" nodeType="tmRoot"/>
+      </p:par>
+    </p:tnLst>
+  </p:timing>
 </p:sld>
 </file>
 
@@ -10631,7 +10685,7 @@
           <a:p>
             <a:fld id="{7053BEFA-1175-F644-B249-7D41D72BD3FF}" type="datetime1">
               <a:rPr lang="en-US" smtClean="0"/>
-              <a:t>1/16/14</a:t>
+              <a:t>1/21/14</a:t>
             </a:fld>
             <a:endParaRPr lang="en-US"/>
           </a:p>
@@ -11155,6 +11209,13 @@
   <p:clrMapOvr>
     <a:masterClrMapping/>
   </p:clrMapOvr>
+  <p:timing>
+    <p:tnLst>
+      <p:par>
+        <p:cTn xmlns:p14="http://schemas.microsoft.com/office/powerpoint/2010/main" id="1" dur="indefinite" restart="never" nodeType="tmRoot"/>
+      </p:par>
+    </p:tnLst>
+  </p:timing>
 </p:sld>
 </file>
 
@@ -11248,7 +11309,7 @@
           <a:p>
             <a:fld id="{7053BEFA-1175-F644-B249-7D41D72BD3FF}" type="datetime1">
               <a:rPr lang="en-US" smtClean="0"/>
-              <a:t>1/16/14</a:t>
+              <a:t>1/21/14</a:t>
             </a:fld>
             <a:endParaRPr lang="en-US"/>
           </a:p>
@@ -11306,6 +11367,13 @@
   <p:clrMapOvr>
     <a:masterClrMapping/>
   </p:clrMapOvr>
+  <p:timing>
+    <p:tnLst>
+      <p:par>
+        <p:cTn xmlns:p14="http://schemas.microsoft.com/office/powerpoint/2010/main" id="1" dur="indefinite" restart="never" nodeType="tmRoot"/>
+      </p:par>
+    </p:tnLst>
+  </p:timing>
 </p:sld>
 </file>
 
@@ -11423,7 +11491,7 @@
           <a:p>
             <a:fld id="{7053BEFA-1175-F644-B249-7D41D72BD3FF}" type="datetime1">
               <a:rPr lang="en-US" smtClean="0"/>
-              <a:t>1/16/14</a:t>
+              <a:t>1/21/14</a:t>
             </a:fld>
             <a:endParaRPr lang="en-US"/>
           </a:p>
@@ -11481,6 +11549,13 @@
   <p:clrMapOvr>
     <a:masterClrMapping/>
   </p:clrMapOvr>
+  <p:timing>
+    <p:tnLst>
+      <p:par>
+        <p:cTn xmlns:p14="http://schemas.microsoft.com/office/powerpoint/2010/main" id="1" dur="indefinite" restart="never" nodeType="tmRoot"/>
+      </p:par>
+    </p:tnLst>
+  </p:timing>
 </p:sld>
 </file>
 
@@ -11600,7 +11675,7 @@
           <a:p>
             <a:fld id="{7053BEFA-1175-F644-B249-7D41D72BD3FF}" type="datetime1">
               <a:rPr lang="en-US" smtClean="0"/>
-              <a:t>1/16/14</a:t>
+              <a:t>1/21/14</a:t>
             </a:fld>
             <a:endParaRPr lang="en-US"/>
           </a:p>
@@ -11658,6 +11733,13 @@
   <p:clrMapOvr>
     <a:masterClrMapping/>
   </p:clrMapOvr>
+  <p:timing>
+    <p:tnLst>
+      <p:par>
+        <p:cTn xmlns:p14="http://schemas.microsoft.com/office/powerpoint/2010/main" id="1" dur="indefinite" restart="never" nodeType="tmRoot"/>
+      </p:par>
+    </p:tnLst>
+  </p:timing>
 </p:sld>
 </file>
 
@@ -11777,7 +11859,7 @@
           <a:p>
             <a:fld id="{7053BEFA-1175-F644-B249-7D41D72BD3FF}" type="datetime1">
               <a:rPr lang="en-US" smtClean="0"/>
-              <a:t>1/16/14</a:t>
+              <a:t>1/21/14</a:t>
             </a:fld>
             <a:endParaRPr lang="en-US"/>
           </a:p>
@@ -11835,6 +11917,13 @@
   <p:clrMapOvr>
     <a:masterClrMapping/>
   </p:clrMapOvr>
+  <p:timing>
+    <p:tnLst>
+      <p:par>
+        <p:cTn xmlns:p14="http://schemas.microsoft.com/office/powerpoint/2010/main" id="1" dur="indefinite" restart="never" nodeType="tmRoot"/>
+      </p:par>
+    </p:tnLst>
+  </p:timing>
 </p:sld>
 </file>
 
@@ -11914,7 +12003,7 @@
           <a:p>
             <a:fld id="{7053BEFA-1175-F644-B249-7D41D72BD3FF}" type="datetime1">
               <a:rPr lang="en-US" smtClean="0"/>
-              <a:t>1/16/14</a:t>
+              <a:t>1/21/14</a:t>
             </a:fld>
             <a:endParaRPr lang="en-US"/>
           </a:p>
@@ -11972,6 +12061,13 @@
   <p:clrMapOvr>
     <a:masterClrMapping/>
   </p:clrMapOvr>
+  <p:timing>
+    <p:tnLst>
+      <p:par>
+        <p:cTn xmlns:p14="http://schemas.microsoft.com/office/powerpoint/2010/main" id="1" dur="indefinite" restart="never" nodeType="tmRoot"/>
+      </p:par>
+    </p:tnLst>
+  </p:timing>
 </p:sld>
 </file>
 
@@ -12112,7 +12208,7 @@
           <a:p>
             <a:fld id="{7053BEFA-1175-F644-B249-7D41D72BD3FF}" type="datetime1">
               <a:rPr lang="en-US" smtClean="0"/>
-              <a:t>1/16/14</a:t>
+              <a:t>1/21/14</a:t>
             </a:fld>
             <a:endParaRPr lang="en-US"/>
           </a:p>
@@ -12170,6 +12266,13 @@
   <p:clrMapOvr>
     <a:masterClrMapping/>
   </p:clrMapOvr>
+  <p:timing>
+    <p:tnLst>
+      <p:par>
+        <p:cTn xmlns:p14="http://schemas.microsoft.com/office/powerpoint/2010/main" id="1" dur="indefinite" restart="never" nodeType="tmRoot"/>
+      </p:par>
+    </p:tnLst>
+  </p:timing>
 </p:sld>
 </file>
 
@@ -12307,7 +12410,7 @@
           <a:p>
             <a:fld id="{7053BEFA-1175-F644-B249-7D41D72BD3FF}" type="datetime1">
               <a:rPr lang="en-US" smtClean="0"/>
-              <a:t>1/16/14</a:t>
+              <a:t>1/21/14</a:t>
             </a:fld>
             <a:endParaRPr lang="en-US"/>
           </a:p>
@@ -12365,6 +12468,13 @@
   <p:clrMapOvr>
     <a:masterClrMapping/>
   </p:clrMapOvr>
+  <p:timing>
+    <p:tnLst>
+      <p:par>
+        <p:cTn xmlns:p14="http://schemas.microsoft.com/office/powerpoint/2010/main" id="1" dur="indefinite" restart="never" nodeType="tmRoot"/>
+      </p:par>
+    </p:tnLst>
+  </p:timing>
 </p:sld>
 </file>
 
@@ -12505,7 +12615,7 @@
           <a:p>
             <a:fld id="{7053BEFA-1175-F644-B249-7D41D72BD3FF}" type="datetime1">
               <a:rPr lang="en-US" smtClean="0"/>
-              <a:t>1/16/14</a:t>
+              <a:t>1/21/14</a:t>
             </a:fld>
             <a:endParaRPr lang="en-US"/>
           </a:p>
@@ -12563,6 +12673,13 @@
   <p:clrMapOvr>
     <a:masterClrMapping/>
   </p:clrMapOvr>
+  <p:timing>
+    <p:tnLst>
+      <p:par>
+        <p:cTn xmlns:p14="http://schemas.microsoft.com/office/powerpoint/2010/main" id="1" dur="indefinite" restart="never" nodeType="tmRoot"/>
+      </p:par>
+    </p:tnLst>
+  </p:timing>
 </p:sld>
 </file>
 
@@ -12712,7 +12829,7 @@
           <a:p>
             <a:fld id="{7053BEFA-1175-F644-B249-7D41D72BD3FF}" type="datetime1">
               <a:rPr lang="en-US" smtClean="0"/>
-              <a:t>1/16/14</a:t>
+              <a:t>1/21/14</a:t>
             </a:fld>
             <a:endParaRPr lang="en-US"/>
           </a:p>
@@ -12770,6 +12887,13 @@
   <p:clrMapOvr>
     <a:masterClrMapping/>
   </p:clrMapOvr>
+  <p:timing>
+    <p:tnLst>
+      <p:par>
+        <p:cTn xmlns:p14="http://schemas.microsoft.com/office/powerpoint/2010/main" id="1" dur="indefinite" restart="never" nodeType="tmRoot"/>
+      </p:par>
+    </p:tnLst>
+  </p:timing>
 </p:sld>
 </file>
 
@@ -12871,11 +12995,7 @@
             </a:pPr>
             <a:r>
               <a:rPr lang="en-US" dirty="0" smtClean="0"/>
-              <a:t>Other jobs</a:t>
-            </a:r>
-            <a:r>
-              <a:rPr lang="en-US" dirty="0" smtClean="0"/>
-              <a:t>?</a:t>
+              <a:t>Other jobs?</a:t>
             </a:r>
           </a:p>
         </p:txBody>
@@ -12897,7 +13017,7 @@
           <a:p>
             <a:fld id="{7053BEFA-1175-F644-B249-7D41D72BD3FF}" type="datetime1">
               <a:rPr lang="en-US" smtClean="0"/>
-              <a:t>1/16/14</a:t>
+              <a:t>1/21/14</a:t>
             </a:fld>
             <a:endParaRPr lang="en-US"/>
           </a:p>
@@ -12955,6 +13075,13 @@
   <p:clrMapOvr>
     <a:masterClrMapping/>
   </p:clrMapOvr>
+  <p:timing>
+    <p:tnLst>
+      <p:par>
+        <p:cTn xmlns:p14="http://schemas.microsoft.com/office/powerpoint/2010/main" id="1" dur="indefinite" restart="never" nodeType="tmRoot"/>
+      </p:par>
+    </p:tnLst>
+  </p:timing>
 </p:sld>
 </file>
 
@@ -13041,7 +13168,7 @@
           <a:p>
             <a:fld id="{7053BEFA-1175-F644-B249-7D41D72BD3FF}" type="datetime1">
               <a:rPr lang="en-US" smtClean="0"/>
-              <a:t>1/16/14</a:t>
+              <a:t>1/21/14</a:t>
             </a:fld>
             <a:endParaRPr lang="en-US"/>
           </a:p>
@@ -13099,6 +13226,13 @@
   <p:clrMapOvr>
     <a:masterClrMapping/>
   </p:clrMapOvr>
+  <p:timing>
+    <p:tnLst>
+      <p:par>
+        <p:cTn xmlns:p14="http://schemas.microsoft.com/office/powerpoint/2010/main" id="1" dur="indefinite" restart="never" nodeType="tmRoot"/>
+      </p:par>
+    </p:tnLst>
+  </p:timing>
 </p:sld>
 </file>
 
@@ -13175,11 +13309,7 @@
             </a:pPr>
             <a:r>
               <a:rPr lang="en-US" dirty="0" smtClean="0"/>
-              <a:t>So may the underlying </a:t>
-            </a:r>
-            <a:r>
-              <a:rPr lang="en-US" dirty="0" smtClean="0"/>
-              <a:t>engine</a:t>
+              <a:t>So may the underlying engine</a:t>
             </a:r>
           </a:p>
           <a:p>
@@ -13244,7 +13374,7 @@
           <a:p>
             <a:fld id="{7053BEFA-1175-F644-B249-7D41D72BD3FF}" type="datetime1">
               <a:rPr lang="en-US" smtClean="0"/>
-              <a:t>1/16/14</a:t>
+              <a:t>1/21/14</a:t>
             </a:fld>
             <a:endParaRPr lang="en-US"/>
           </a:p>
@@ -13302,6 +13432,13 @@
   <p:clrMapOvr>
     <a:masterClrMapping/>
   </p:clrMapOvr>
+  <p:timing>
+    <p:tnLst>
+      <p:par>
+        <p:cTn xmlns:p14="http://schemas.microsoft.com/office/powerpoint/2010/main" id="1" dur="indefinite" restart="never" nodeType="tmRoot"/>
+      </p:par>
+    </p:tnLst>
+  </p:timing>
 </p:sld>
 </file>
 
@@ -13417,7 +13554,7 @@
           <a:p>
             <a:fld id="{7053BEFA-1175-F644-B249-7D41D72BD3FF}" type="datetime1">
               <a:rPr lang="en-US" smtClean="0"/>
-              <a:t>1/16/14</a:t>
+              <a:t>1/21/14</a:t>
             </a:fld>
             <a:endParaRPr lang="en-US"/>
           </a:p>
@@ -13475,6 +13612,13 @@
   <p:clrMapOvr>
     <a:masterClrMapping/>
   </p:clrMapOvr>
+  <p:timing>
+    <p:tnLst>
+      <p:par>
+        <p:cTn xmlns:p14="http://schemas.microsoft.com/office/powerpoint/2010/main" id="1" dur="indefinite" restart="never" nodeType="tmRoot"/>
+      </p:par>
+    </p:tnLst>
+  </p:timing>
 </p:sld>
 </file>
 
@@ -13630,7 +13774,7 @@
           <a:p>
             <a:fld id="{7053BEFA-1175-F644-B249-7D41D72BD3FF}" type="datetime1">
               <a:rPr lang="en-US" smtClean="0"/>
-              <a:t>1/16/14</a:t>
+              <a:t>1/21/14</a:t>
             </a:fld>
             <a:endParaRPr lang="en-US"/>
           </a:p>
@@ -13688,6 +13832,13 @@
   <p:clrMapOvr>
     <a:masterClrMapping/>
   </p:clrMapOvr>
+  <p:timing>
+    <p:tnLst>
+      <p:par>
+        <p:cTn xmlns:p14="http://schemas.microsoft.com/office/powerpoint/2010/main" id="1" dur="indefinite" restart="never" nodeType="tmRoot"/>
+      </p:par>
+    </p:tnLst>
+  </p:timing>
 </p:sld>
 </file>
 
@@ -13843,7 +13994,7 @@
           <a:p>
             <a:fld id="{7053BEFA-1175-F644-B249-7D41D72BD3FF}" type="datetime1">
               <a:rPr lang="en-US" smtClean="0"/>
-              <a:t>1/16/14</a:t>
+              <a:t>1/21/14</a:t>
             </a:fld>
             <a:endParaRPr lang="en-US"/>
           </a:p>
@@ -13901,6 +14052,13 @@
   <p:clrMapOvr>
     <a:masterClrMapping/>
   </p:clrMapOvr>
+  <p:timing>
+    <p:tnLst>
+      <p:par>
+        <p:cTn xmlns:p14="http://schemas.microsoft.com/office/powerpoint/2010/main" id="1" dur="indefinite" restart="never" nodeType="tmRoot"/>
+      </p:par>
+    </p:tnLst>
+  </p:timing>
 </p:sld>
 </file>
 
@@ -14020,7 +14178,7 @@
           <a:p>
             <a:fld id="{7053BEFA-1175-F644-B249-7D41D72BD3FF}" type="datetime1">
               <a:rPr lang="en-US" smtClean="0"/>
-              <a:t>1/16/14</a:t>
+              <a:t>1/21/14</a:t>
             </a:fld>
             <a:endParaRPr lang="en-US"/>
           </a:p>
@@ -14078,6 +14236,13 @@
   <p:clrMapOvr>
     <a:masterClrMapping/>
   </p:clrMapOvr>
+  <p:timing>
+    <p:tnLst>
+      <p:par>
+        <p:cTn xmlns:p14="http://schemas.microsoft.com/office/powerpoint/2010/main" id="1" dur="indefinite" restart="never" nodeType="tmRoot"/>
+      </p:par>
+    </p:tnLst>
+  </p:timing>
 </p:sld>
 </file>
 
@@ -14230,7 +14395,7 @@
           <a:p>
             <a:fld id="{7053BEFA-1175-F644-B249-7D41D72BD3FF}" type="datetime1">
               <a:rPr lang="en-US" smtClean="0"/>
-              <a:t>1/16/14</a:t>
+              <a:t>1/21/14</a:t>
             </a:fld>
             <a:endParaRPr lang="en-US"/>
           </a:p>
@@ -14562,7 +14727,7 @@
           <a:p>
             <a:fld id="{7053BEFA-1175-F644-B249-7D41D72BD3FF}" type="datetime1">
               <a:rPr lang="en-US" smtClean="0"/>
-              <a:t>1/16/14</a:t>
+              <a:t>1/21/14</a:t>
             </a:fld>
             <a:endParaRPr lang="en-US"/>
           </a:p>
@@ -14650,19 +14815,14 @@
             <p:ph type="title"/>
           </p:nvPr>
         </p:nvSpPr>
-        <p:spPr>
-          <a:xfrm>
-            <a:off x="1128943" y="310162"/>
-            <a:ext cx="6105630" cy="990107"/>
-          </a:xfrm>
-        </p:spPr>
-        <p:txBody>
-          <a:bodyPr/>
-          <a:lstStyle/>
-          <a:p>
-            <a:r>
-              <a:rPr lang="en-US" dirty="0" smtClean="0"/>
-              <a:t>When you didn’t create the model</a:t>
+        <p:spPr/>
+        <p:txBody>
+          <a:bodyPr/>
+          <a:lstStyle/>
+          <a:p>
+            <a:r>
+              <a:rPr lang="en-US" dirty="0" smtClean="0"/>
+              <a:t>Data Management</a:t>
             </a:r>
             <a:endParaRPr lang="en-US" dirty="0"/>
           </a:p>
@@ -14678,77 +14838,81 @@
             <p:ph idx="1"/>
           </p:nvPr>
         </p:nvSpPr>
-        <p:spPr>
-          <a:xfrm>
-            <a:off x="1128943" y="1729568"/>
-            <a:ext cx="7048804" cy="4379976"/>
-          </a:xfrm>
-        </p:spPr>
-        <p:txBody>
-          <a:bodyPr/>
-          <a:lstStyle/>
-          <a:p>
-            <a:r>
-              <a:rPr lang="en-US" dirty="0" smtClean="0"/>
-              <a:t>How is it structured; if at all?</a:t>
-            </a:r>
-          </a:p>
-          <a:p>
-            <a:r>
-              <a:rPr lang="en-US" dirty="0" smtClean="0"/>
-              <a:t>What are the </a:t>
+        <p:spPr/>
+        <p:txBody>
+          <a:bodyPr/>
+          <a:lstStyle/>
+          <a:p>
+            <a:pPr marL="0" indent="0">
+              <a:buNone/>
+            </a:pPr>
+            <a:r>
+              <a:rPr lang="en-US" dirty="0"/>
+              <a:t>Information is an organizational resource</a:t>
+            </a:r>
+          </a:p>
+          <a:p>
+            <a:pPr lvl="1"/>
+            <a:r>
+              <a:rPr lang="en-US" dirty="0"/>
+              <a:t>Just like people, capital, and equipment</a:t>
+            </a:r>
+          </a:p>
+          <a:p>
+            <a:pPr lvl="1"/>
+            <a:r>
+              <a:rPr lang="en-US" dirty="0"/>
+              <a:t>It must be managed </a:t>
+            </a:r>
+            <a:r>
+              <a:rPr lang="en-US" dirty="0" smtClean="0"/>
+              <a:t>effectively</a:t>
+            </a:r>
+          </a:p>
+          <a:p>
+            <a:pPr marL="0" indent="0">
+              <a:buNone/>
+            </a:pPr>
+            <a:r>
+              <a:rPr lang="en-US" dirty="0" smtClean="0"/>
+              <a:t>Who should oversee it?</a:t>
+            </a:r>
+          </a:p>
+          <a:p>
+            <a:pPr lvl="1"/>
+            <a:r>
+              <a:rPr lang="en-US" dirty="0" smtClean="0"/>
+              <a:t>Who owns it</a:t>
+            </a:r>
+          </a:p>
+          <a:p>
+            <a:pPr lvl="1"/>
+            <a:r>
+              <a:rPr lang="en-US" dirty="0" smtClean="0"/>
+              <a:t>Who is responsible for the four Cs? (Completeness, Coherence, Correctness, </a:t>
+            </a:r>
+            <a:r>
+              <a:rPr lang="en-US" dirty="0" err="1" smtClean="0"/>
+              <a:t>AcCountability</a:t>
+            </a:r>
+            <a:r>
+              <a:rPr lang="en-US" dirty="0" smtClean="0"/>
+              <a:t>)</a:t>
+            </a:r>
+          </a:p>
+          <a:p>
+            <a:pPr marL="0" indent="0">
+              <a:buNone/>
+            </a:pPr>
+            <a:r>
+              <a:rPr lang="en-US" dirty="0" smtClean="0"/>
+              <a:t>Requires lots of attention, over time, regular checks, </a:t>
             </a:r>
             <a:r>
               <a:rPr lang="en-US" i="1" dirty="0" smtClean="0"/>
-              <a:t>fields</a:t>
-            </a:r>
-            <a:r>
-              <a:rPr lang="en-US" dirty="0" smtClean="0"/>
-              <a:t> and </a:t>
-            </a:r>
-            <a:r>
-              <a:rPr lang="en-US" i="1" dirty="0" smtClean="0"/>
-              <a:t>values</a:t>
-            </a:r>
-            <a:r>
-              <a:rPr lang="en-US" dirty="0" smtClean="0"/>
-              <a:t>?</a:t>
-            </a:r>
-          </a:p>
-          <a:p>
-            <a:r>
-              <a:rPr lang="en-US" dirty="0" smtClean="0"/>
-              <a:t>Does it have multiple tables or just one?</a:t>
-            </a:r>
-          </a:p>
-          <a:p>
-            <a:r>
-              <a:rPr lang="en-US" dirty="0" smtClean="0"/>
-              <a:t>Is it designed for machine consumption or human consumption?</a:t>
-            </a:r>
-          </a:p>
-          <a:p>
-            <a:r>
-              <a:rPr lang="en-US" dirty="0" smtClean="0"/>
-              <a:t>Is it in a database? multiple files or one file?</a:t>
-            </a:r>
-          </a:p>
-          <a:p>
-            <a:pPr marL="0" indent="0">
-              <a:buNone/>
-            </a:pPr>
-            <a:r>
-              <a:rPr lang="en-US" dirty="0" smtClean="0"/>
-              <a:t>Recommended Reading: The Bad Data Handbook (McCallum): O’Reilly</a:t>
-            </a:r>
-            <a:r>
-              <a:rPr lang="en-US" dirty="0"/>
-              <a:t> </a:t>
-            </a:r>
-            <a:r>
-              <a:rPr lang="en-US" dirty="0" smtClean="0"/>
-              <a:t>Press</a:t>
-            </a:r>
+              <a:t>etc.</a:t>
+            </a:r>
+            <a:endParaRPr lang="en-US" dirty="0"/>
           </a:p>
           <a:p>
             <a:endParaRPr lang="en-US" dirty="0"/>
@@ -14772,7 +14936,7 @@
           <a:p>
             <a:fld id="{7053BEFA-1175-F644-B249-7D41D72BD3FF}" type="datetime1">
               <a:rPr lang="en-US" smtClean="0"/>
-              <a:t>1/16/14</a:t>
+              <a:t>1/21/14</a:t>
             </a:fld>
             <a:endParaRPr lang="en-US"/>
           </a:p>
@@ -14815,219 +14979,6 @@
             <a:fld id="{17E276FA-8F89-B34D-A726-BE3FA1F8DD97}" type="slidenum">
               <a:rPr lang="en-US" smtClean="0"/>
               <a:t>32</a:t>
-            </a:fld>
-            <a:endParaRPr lang="en-US" dirty="0"/>
-          </a:p>
-        </p:txBody>
-      </p:sp>
-    </p:spTree>
-    <p:extLst>
-      <p:ext uri="{BB962C8B-B14F-4D97-AF65-F5344CB8AC3E}">
-        <p14:creationId xmlns:p14="http://schemas.microsoft.com/office/powerpoint/2010/main" val="2775680534"/>
-      </p:ext>
-    </p:extLst>
-  </p:cSld>
-  <p:clrMapOvr>
-    <a:masterClrMapping/>
-  </p:clrMapOvr>
-</p:sld>
-</file>
-
-<file path=ppt/slides/slide33.xml><?xml version="1.0" encoding="utf-8"?>
-<p:sld xmlns:a="http://schemas.openxmlformats.org/drawingml/2006/main" xmlns:r="http://schemas.openxmlformats.org/officeDocument/2006/relationships" xmlns:p="http://schemas.openxmlformats.org/presentationml/2006/main">
-  <p:cSld>
-    <p:spTree>
-      <p:nvGrpSpPr>
-        <p:cNvPr id="1" name=""/>
-        <p:cNvGrpSpPr/>
-        <p:nvPr/>
-      </p:nvGrpSpPr>
-      <p:grpSpPr>
-        <a:xfrm>
-          <a:off x="0" y="0"/>
-          <a:ext cx="0" cy="0"/>
-          <a:chOff x="0" y="0"/>
-          <a:chExt cx="0" cy="0"/>
-        </a:xfrm>
-      </p:grpSpPr>
-      <p:sp>
-        <p:nvSpPr>
-          <p:cNvPr id="2" name="Title 1"/>
-          <p:cNvSpPr>
-            <a:spLocks noGrp="1"/>
-          </p:cNvSpPr>
-          <p:nvPr>
-            <p:ph type="title"/>
-          </p:nvPr>
-        </p:nvSpPr>
-        <p:spPr/>
-        <p:txBody>
-          <a:bodyPr/>
-          <a:lstStyle/>
-          <a:p>
-            <a:r>
-              <a:rPr lang="en-US" dirty="0" smtClean="0"/>
-              <a:t>Data </a:t>
-            </a:r>
-            <a:r>
-              <a:rPr lang="en-US" dirty="0" smtClean="0"/>
-              <a:t>Management</a:t>
-            </a:r>
-            <a:endParaRPr lang="en-US" dirty="0"/>
-          </a:p>
-        </p:txBody>
-      </p:sp>
-      <p:sp>
-        <p:nvSpPr>
-          <p:cNvPr id="3" name="Content Placeholder 2"/>
-          <p:cNvSpPr>
-            <a:spLocks noGrp="1"/>
-          </p:cNvSpPr>
-          <p:nvPr>
-            <p:ph idx="1"/>
-          </p:nvPr>
-        </p:nvSpPr>
-        <p:spPr/>
-        <p:txBody>
-          <a:bodyPr/>
-          <a:lstStyle/>
-          <a:p>
-            <a:pPr marL="0" indent="0">
-              <a:buNone/>
-            </a:pPr>
-            <a:r>
-              <a:rPr lang="en-US" dirty="0"/>
-              <a:t>Information is an organizational resource</a:t>
-            </a:r>
-          </a:p>
-          <a:p>
-            <a:pPr lvl="1"/>
-            <a:r>
-              <a:rPr lang="en-US" dirty="0"/>
-              <a:t>Just like people, capital, and equipment</a:t>
-            </a:r>
-          </a:p>
-          <a:p>
-            <a:pPr lvl="1"/>
-            <a:r>
-              <a:rPr lang="en-US" dirty="0"/>
-              <a:t>It must be managed </a:t>
-            </a:r>
-            <a:r>
-              <a:rPr lang="en-US" dirty="0" smtClean="0"/>
-              <a:t>effectively</a:t>
-            </a:r>
-          </a:p>
-          <a:p>
-            <a:pPr marL="0" indent="0">
-              <a:buNone/>
-            </a:pPr>
-            <a:r>
-              <a:rPr lang="en-US" dirty="0" smtClean="0"/>
-              <a:t>Who should oversee it?</a:t>
-            </a:r>
-          </a:p>
-          <a:p>
-            <a:pPr lvl="1"/>
-            <a:r>
-              <a:rPr lang="en-US" dirty="0" smtClean="0"/>
-              <a:t>Who owns it</a:t>
-            </a:r>
-          </a:p>
-          <a:p>
-            <a:pPr lvl="1"/>
-            <a:r>
-              <a:rPr lang="en-US" dirty="0" smtClean="0"/>
-              <a:t>Who is responsible for the four Cs? (Completeness, Coherence, Correctness, </a:t>
-            </a:r>
-            <a:r>
-              <a:rPr lang="en-US" dirty="0" err="1" smtClean="0"/>
-              <a:t>AcCountability</a:t>
-            </a:r>
-            <a:r>
-              <a:rPr lang="en-US" dirty="0" smtClean="0"/>
-              <a:t>)</a:t>
-            </a:r>
-          </a:p>
-          <a:p>
-            <a:pPr marL="0" indent="0">
-              <a:buNone/>
-            </a:pPr>
-            <a:r>
-              <a:rPr lang="en-US" dirty="0" smtClean="0"/>
-              <a:t>Requires lots of attention, over time, regular checks, </a:t>
-            </a:r>
-            <a:r>
-              <a:rPr lang="en-US" i="1" dirty="0" smtClean="0"/>
-              <a:t>etc.</a:t>
-            </a:r>
-            <a:endParaRPr lang="en-US" dirty="0"/>
-          </a:p>
-          <a:p>
-            <a:endParaRPr lang="en-US" dirty="0"/>
-          </a:p>
-        </p:txBody>
-      </p:sp>
-      <p:sp>
-        <p:nvSpPr>
-          <p:cNvPr id="4" name="Date Placeholder 3"/>
-          <p:cNvSpPr>
-            <a:spLocks noGrp="1"/>
-          </p:cNvSpPr>
-          <p:nvPr>
-            <p:ph type="dt" sz="half" idx="10"/>
-          </p:nvPr>
-        </p:nvSpPr>
-        <p:spPr/>
-        <p:txBody>
-          <a:bodyPr/>
-          <a:lstStyle/>
-          <a:p>
-            <a:fld id="{7053BEFA-1175-F644-B249-7D41D72BD3FF}" type="datetime1">
-              <a:rPr lang="en-US" smtClean="0"/>
-              <a:t>1/16/14</a:t>
-            </a:fld>
-            <a:endParaRPr lang="en-US"/>
-          </a:p>
-        </p:txBody>
-      </p:sp>
-      <p:sp>
-        <p:nvSpPr>
-          <p:cNvPr id="5" name="Footer Placeholder 4"/>
-          <p:cNvSpPr>
-            <a:spLocks noGrp="1"/>
-          </p:cNvSpPr>
-          <p:nvPr>
-            <p:ph type="ftr" sz="quarter" idx="11"/>
-          </p:nvPr>
-        </p:nvSpPr>
-        <p:spPr/>
-        <p:txBody>
-          <a:bodyPr/>
-          <a:lstStyle/>
-          <a:p>
-            <a:endParaRPr lang="en-US" dirty="0"/>
-          </a:p>
-        </p:txBody>
-      </p:sp>
-      <p:sp>
-        <p:nvSpPr>
-          <p:cNvPr id="6" name="Slide Number Placeholder 5"/>
-          <p:cNvSpPr>
-            <a:spLocks noGrp="1"/>
-          </p:cNvSpPr>
-          <p:nvPr>
-            <p:ph type="sldNum" sz="quarter" idx="12"/>
-          </p:nvPr>
-        </p:nvSpPr>
-        <p:spPr/>
-        <p:txBody>
-          <a:bodyPr/>
-          <a:lstStyle/>
-          <a:p>
-            <a:fld id="{17E276FA-8F89-B34D-A726-BE3FA1F8DD97}" type="slidenum">
-              <a:rPr lang="en-US" smtClean="0"/>
-              <a:t>33</a:t>
             </a:fld>
             <a:endParaRPr lang="en-US" dirty="0"/>
           </a:p>
@@ -15140,7 +15091,7 @@
           <a:p>
             <a:fld id="{7053BEFA-1175-F644-B249-7D41D72BD3FF}" type="datetime1">
               <a:rPr lang="en-US" smtClean="0"/>
-              <a:t>1/16/14</a:t>
+              <a:t>1/21/14</a:t>
             </a:fld>
             <a:endParaRPr lang="en-US"/>
           </a:p>
@@ -15198,6 +15149,13 @@
   <p:clrMapOvr>
     <a:masterClrMapping/>
   </p:clrMapOvr>
+  <p:timing>
+    <p:tnLst>
+      <p:par>
+        <p:cTn xmlns:p14="http://schemas.microsoft.com/office/powerpoint/2010/main" id="1" dur="indefinite" restart="never" nodeType="tmRoot"/>
+      </p:par>
+    </p:tnLst>
+  </p:timing>
 </p:sld>
 </file>
 
@@ -15316,7 +15274,7 @@
           <a:p>
             <a:fld id="{7053BEFA-1175-F644-B249-7D41D72BD3FF}" type="datetime1">
               <a:rPr lang="en-US" smtClean="0"/>
-              <a:t>1/16/14</a:t>
+              <a:t>1/21/14</a:t>
             </a:fld>
             <a:endParaRPr lang="en-US"/>
           </a:p>
@@ -15400,6 +15358,13 @@
   <p:clrMapOvr>
     <a:masterClrMapping/>
   </p:clrMapOvr>
+  <p:timing>
+    <p:tnLst>
+      <p:par>
+        <p:cTn xmlns:p14="http://schemas.microsoft.com/office/powerpoint/2010/main" id="1" dur="indefinite" restart="never" nodeType="tmRoot"/>
+      </p:par>
+    </p:tnLst>
+  </p:timing>
 </p:sld>
 </file>
 
@@ -15527,7 +15492,7 @@
           <a:p>
             <a:fld id="{7053BEFA-1175-F644-B249-7D41D72BD3FF}" type="datetime1">
               <a:rPr lang="en-US" smtClean="0"/>
-              <a:t>1/16/14</a:t>
+              <a:t>1/21/14</a:t>
             </a:fld>
             <a:endParaRPr lang="en-US"/>
           </a:p>
@@ -15787,6 +15752,13 @@
   <p:clrMapOvr>
     <a:masterClrMapping/>
   </p:clrMapOvr>
+  <p:timing>
+    <p:tnLst>
+      <p:par>
+        <p:cTn xmlns:p14="http://schemas.microsoft.com/office/powerpoint/2010/main" id="1" dur="indefinite" restart="never" nodeType="tmRoot"/>
+      </p:par>
+    </p:tnLst>
+  </p:timing>
 </p:sld>
 </file>
 
@@ -15983,7 +15955,7 @@
           <a:p>
             <a:fld id="{7053BEFA-1175-F644-B249-7D41D72BD3FF}" type="datetime1">
               <a:rPr lang="en-US" smtClean="0"/>
-              <a:t>1/16/14</a:t>
+              <a:t>1/21/14</a:t>
             </a:fld>
             <a:endParaRPr lang="en-US"/>
           </a:p>
@@ -16067,6 +16039,13 @@
   <p:clrMapOvr>
     <a:masterClrMapping/>
   </p:clrMapOvr>
+  <p:timing>
+    <p:tnLst>
+      <p:par>
+        <p:cTn xmlns:p14="http://schemas.microsoft.com/office/powerpoint/2010/main" id="1" dur="indefinite" restart="never" nodeType="tmRoot"/>
+      </p:par>
+    </p:tnLst>
+  </p:timing>
 </p:sld>
 </file>
 
@@ -16176,7 +16155,7 @@
           <a:p>
             <a:fld id="{7053BEFA-1175-F644-B249-7D41D72BD3FF}" type="datetime1">
               <a:rPr lang="en-US" smtClean="0"/>
-              <a:t>1/16/14</a:t>
+              <a:t>1/21/14</a:t>
             </a:fld>
             <a:endParaRPr lang="en-US"/>
           </a:p>
@@ -16234,6 +16213,13 @@
   <p:clrMapOvr>
     <a:masterClrMapping/>
   </p:clrMapOvr>
+  <p:timing>
+    <p:tnLst>
+      <p:par>
+        <p:cTn xmlns:p14="http://schemas.microsoft.com/office/powerpoint/2010/main" id="1" dur="indefinite" restart="never" nodeType="tmRoot"/>
+      </p:par>
+    </p:tnLst>
+  </p:timing>
 </p:sld>
 </file>
 
@@ -16380,7 +16366,7 @@
           <a:p>
             <a:fld id="{7053BEFA-1175-F644-B249-7D41D72BD3FF}" type="datetime1">
               <a:rPr lang="en-US" smtClean="0"/>
-              <a:t>1/16/14</a:t>
+              <a:t>1/21/14</a:t>
             </a:fld>
             <a:endParaRPr lang="en-US"/>
           </a:p>
@@ -16438,6 +16424,13 @@
   <p:clrMapOvr>
     <a:masterClrMapping/>
   </p:clrMapOvr>
+  <p:timing>
+    <p:tnLst>
+      <p:par>
+        <p:cTn xmlns:p14="http://schemas.microsoft.com/office/powerpoint/2010/main" id="1" dur="indefinite" restart="never" nodeType="tmRoot"/>
+      </p:par>
+    </p:tnLst>
+  </p:timing>
 </p:sld>
 </file>
 

</xml_diff>

<commit_message>
Updated Lectures and added new lectures.
</commit_message>
<xml_diff>
--- a/Lectures/3 Data Storage.pptx
+++ b/Lectures/3 Data Storage.pptx
@@ -5,44 +5,45 @@
     <p:sldMasterId id="2147483648" r:id="rId1"/>
   </p:sldMasterIdLst>
   <p:notesMasterIdLst>
-    <p:notesMasterId r:id="rId34"/>
+    <p:notesMasterId r:id="rId35"/>
   </p:notesMasterIdLst>
   <p:handoutMasterIdLst>
-    <p:handoutMasterId r:id="rId35"/>
+    <p:handoutMasterId r:id="rId36"/>
   </p:handoutMasterIdLst>
   <p:sldIdLst>
     <p:sldId id="256" r:id="rId2"/>
-    <p:sldId id="257" r:id="rId3"/>
-    <p:sldId id="425" r:id="rId4"/>
-    <p:sldId id="259" r:id="rId5"/>
-    <p:sldId id="386" r:id="rId6"/>
-    <p:sldId id="315" r:id="rId7"/>
-    <p:sldId id="387" r:id="rId8"/>
-    <p:sldId id="388" r:id="rId9"/>
-    <p:sldId id="389" r:id="rId10"/>
-    <p:sldId id="390" r:id="rId11"/>
-    <p:sldId id="392" r:id="rId12"/>
-    <p:sldId id="412" r:id="rId13"/>
-    <p:sldId id="394" r:id="rId14"/>
-    <p:sldId id="395" r:id="rId15"/>
-    <p:sldId id="396" r:id="rId16"/>
-    <p:sldId id="397" r:id="rId17"/>
-    <p:sldId id="413" r:id="rId18"/>
-    <p:sldId id="416" r:id="rId19"/>
-    <p:sldId id="417" r:id="rId20"/>
-    <p:sldId id="418" r:id="rId21"/>
-    <p:sldId id="419" r:id="rId22"/>
-    <p:sldId id="420" r:id="rId23"/>
-    <p:sldId id="421" r:id="rId24"/>
-    <p:sldId id="422" r:id="rId25"/>
-    <p:sldId id="414" r:id="rId26"/>
-    <p:sldId id="399" r:id="rId27"/>
-    <p:sldId id="424" r:id="rId28"/>
-    <p:sldId id="409" r:id="rId29"/>
-    <p:sldId id="402" r:id="rId30"/>
-    <p:sldId id="407" r:id="rId31"/>
-    <p:sldId id="408" r:id="rId32"/>
-    <p:sldId id="410" r:id="rId33"/>
+    <p:sldId id="426" r:id="rId3"/>
+    <p:sldId id="257" r:id="rId4"/>
+    <p:sldId id="425" r:id="rId5"/>
+    <p:sldId id="259" r:id="rId6"/>
+    <p:sldId id="386" r:id="rId7"/>
+    <p:sldId id="315" r:id="rId8"/>
+    <p:sldId id="387" r:id="rId9"/>
+    <p:sldId id="388" r:id="rId10"/>
+    <p:sldId id="389" r:id="rId11"/>
+    <p:sldId id="390" r:id="rId12"/>
+    <p:sldId id="392" r:id="rId13"/>
+    <p:sldId id="412" r:id="rId14"/>
+    <p:sldId id="394" r:id="rId15"/>
+    <p:sldId id="395" r:id="rId16"/>
+    <p:sldId id="396" r:id="rId17"/>
+    <p:sldId id="397" r:id="rId18"/>
+    <p:sldId id="413" r:id="rId19"/>
+    <p:sldId id="416" r:id="rId20"/>
+    <p:sldId id="417" r:id="rId21"/>
+    <p:sldId id="418" r:id="rId22"/>
+    <p:sldId id="419" r:id="rId23"/>
+    <p:sldId id="420" r:id="rId24"/>
+    <p:sldId id="421" r:id="rId25"/>
+    <p:sldId id="422" r:id="rId26"/>
+    <p:sldId id="414" r:id="rId27"/>
+    <p:sldId id="399" r:id="rId28"/>
+    <p:sldId id="424" r:id="rId29"/>
+    <p:sldId id="409" r:id="rId30"/>
+    <p:sldId id="402" r:id="rId31"/>
+    <p:sldId id="407" r:id="rId32"/>
+    <p:sldId id="408" r:id="rId33"/>
+    <p:sldId id="410" r:id="rId34"/>
   </p:sldIdLst>
   <p:sldSz cx="9144000" cy="6858000" type="screen4x3"/>
   <p:notesSz cx="6858000" cy="9144000"/>
@@ -226,7 +227,7 @@
           <a:p>
             <a:fld id="{D3AAB66F-B1B7-D045-B4E8-4F60236F228D}" type="datetimeFigureOut">
               <a:rPr lang="en-US" smtClean="0"/>
-              <a:t>1/19/15</a:t>
+              <a:t>1/25/15</a:t>
             </a:fld>
             <a:endParaRPr lang="en-US"/>
           </a:p>
@@ -392,7 +393,7 @@
           <a:p>
             <a:fld id="{BCCF8E76-06A6-164E-A6FA-EC32C13EB232}" type="datetimeFigureOut">
               <a:rPr lang="en-US" smtClean="0"/>
-              <a:t>1/19/15</a:t>
+              <a:t>1/25/15</a:t>
             </a:fld>
             <a:endParaRPr lang="en-US"/>
           </a:p>
@@ -782,7 +783,7 @@
           <a:p>
             <a:fld id="{FD66F34B-9C4D-8640-BB34-4C24A79C9FFB}" type="slidenum">
               <a:rPr lang="en-US" smtClean="0"/>
-              <a:t>6</a:t>
+              <a:t>7</a:t>
             </a:fld>
             <a:endParaRPr lang="en-US"/>
           </a:p>
@@ -866,7 +867,7 @@
           <a:p>
             <a:fld id="{FD66F34B-9C4D-8640-BB34-4C24A79C9FFB}" type="slidenum">
               <a:rPr lang="en-US" smtClean="0"/>
-              <a:t>24</a:t>
+              <a:t>25</a:t>
             </a:fld>
             <a:endParaRPr lang="en-US"/>
           </a:p>
@@ -974,7 +975,7 @@
           <a:p>
             <a:fld id="{FD66F34B-9C4D-8640-BB34-4C24A79C9FFB}" type="slidenum">
               <a:rPr lang="en-US" smtClean="0"/>
-              <a:t>25</a:t>
+              <a:t>26</a:t>
             </a:fld>
             <a:endParaRPr lang="en-US"/>
           </a:p>
@@ -1075,7 +1076,7 @@
           <a:p>
             <a:fld id="{FD66F34B-9C4D-8640-BB34-4C24A79C9FFB}" type="slidenum">
               <a:rPr lang="en-US" smtClean="0"/>
-              <a:t>28</a:t>
+              <a:t>29</a:t>
             </a:fld>
             <a:endParaRPr lang="en-US"/>
           </a:p>
@@ -1163,7 +1164,7 @@
           <a:p>
             <a:fld id="{FD66F34B-9C4D-8640-BB34-4C24A79C9FFB}" type="slidenum">
               <a:rPr lang="en-US" smtClean="0"/>
-              <a:t>30</a:t>
+              <a:t>31</a:t>
             </a:fld>
             <a:endParaRPr lang="en-US"/>
           </a:p>
@@ -1256,7 +1257,7 @@
           <a:p>
             <a:fld id="{FD66F34B-9C4D-8640-BB34-4C24A79C9FFB}" type="slidenum">
               <a:rPr lang="en-US" smtClean="0"/>
-              <a:t>31</a:t>
+              <a:t>32</a:t>
             </a:fld>
             <a:endParaRPr lang="en-US"/>
           </a:p>
@@ -1331,6 +1332,9 @@
             </a:r>
           </a:p>
           <a:p>
+            <a:endParaRPr lang="en-US" smtClean="0"/>
+          </a:p>
+          <a:p>
             <a:endParaRPr lang="en-US" dirty="0"/>
           </a:p>
         </p:txBody>
@@ -1352,7 +1356,7 @@
           <a:p>
             <a:fld id="{FD66F34B-9C4D-8640-BB34-4C24A79C9FFB}" type="slidenum">
               <a:rPr lang="en-US" smtClean="0"/>
-              <a:t>32</a:t>
+              <a:t>33</a:t>
             </a:fld>
             <a:endParaRPr lang="en-US"/>
           </a:p>
@@ -1444,7 +1448,7 @@
           <a:p>
             <a:fld id="{FD66F34B-9C4D-8640-BB34-4C24A79C9FFB}" type="slidenum">
               <a:rPr lang="en-US" smtClean="0"/>
-              <a:t>8</a:t>
+              <a:t>9</a:t>
             </a:fld>
             <a:endParaRPr lang="en-US"/>
           </a:p>
@@ -1536,7 +1540,7 @@
           <a:p>
             <a:fld id="{FD66F34B-9C4D-8640-BB34-4C24A79C9FFB}" type="slidenum">
               <a:rPr lang="en-US" smtClean="0"/>
-              <a:t>9</a:t>
+              <a:t>10</a:t>
             </a:fld>
             <a:endParaRPr lang="en-US"/>
           </a:p>
@@ -1628,7 +1632,7 @@
           <a:p>
             <a:fld id="{FD66F34B-9C4D-8640-BB34-4C24A79C9FFB}" type="slidenum">
               <a:rPr lang="en-US" smtClean="0"/>
-              <a:t>10</a:t>
+              <a:t>11</a:t>
             </a:fld>
             <a:endParaRPr lang="en-US"/>
           </a:p>
@@ -1724,7 +1728,7 @@
           <a:p>
             <a:fld id="{FD66F34B-9C4D-8640-BB34-4C24A79C9FFB}" type="slidenum">
               <a:rPr lang="en-US" smtClean="0"/>
-              <a:t>11</a:t>
+              <a:t>12</a:t>
             </a:fld>
             <a:endParaRPr lang="en-US"/>
           </a:p>
@@ -1814,7 +1818,7 @@
           <a:p>
             <a:fld id="{FD66F34B-9C4D-8640-BB34-4C24A79C9FFB}" type="slidenum">
               <a:rPr lang="en-US" smtClean="0"/>
-              <a:t>12</a:t>
+              <a:t>13</a:t>
             </a:fld>
             <a:endParaRPr lang="en-US"/>
           </a:p>
@@ -1906,7 +1910,7 @@
           <a:p>
             <a:fld id="{FD66F34B-9C4D-8640-BB34-4C24A79C9FFB}" type="slidenum">
               <a:rPr lang="en-US" smtClean="0"/>
-              <a:t>21</a:t>
+              <a:t>22</a:t>
             </a:fld>
             <a:endParaRPr lang="en-US"/>
           </a:p>
@@ -1990,7 +1994,7 @@
           <a:p>
             <a:fld id="{FD66F34B-9C4D-8640-BB34-4C24A79C9FFB}" type="slidenum">
               <a:rPr lang="en-US" smtClean="0"/>
-              <a:t>22</a:t>
+              <a:t>23</a:t>
             </a:fld>
             <a:endParaRPr lang="en-US"/>
           </a:p>
@@ -2074,7 +2078,7 @@
           <a:p>
             <a:fld id="{FD66F34B-9C4D-8640-BB34-4C24A79C9FFB}" type="slidenum">
               <a:rPr lang="en-US" smtClean="0"/>
-              <a:t>23</a:t>
+              <a:t>24</a:t>
             </a:fld>
             <a:endParaRPr lang="en-US"/>
           </a:p>
@@ -2610,7 +2614,7 @@
             <a:fld id="{FA3C144B-2939-9A49-B014-915EC3E81866}" type="datetime1">
               <a:rPr lang="en-US" smtClean="0"/>
               <a:pPr/>
-              <a:t>1/19/15</a:t>
+              <a:t>1/25/15</a:t>
             </a:fld>
             <a:endParaRPr lang="en-US" dirty="0"/>
           </a:p>
@@ -3039,7 +3043,7 @@
           <a:p>
             <a:fld id="{76838339-A875-5E45-AB3F-AAABD270346A}" type="datetime1">
               <a:rPr lang="en-US" smtClean="0"/>
-              <a:t>1/19/15</a:t>
+              <a:t>1/25/15</a:t>
             </a:fld>
             <a:endParaRPr lang="en-US"/>
           </a:p>
@@ -3325,7 +3329,7 @@
             <a:fld id="{FA3C144B-2939-9A49-B014-915EC3E81866}" type="datetime1">
               <a:rPr lang="en-US" smtClean="0"/>
               <a:pPr/>
-              <a:t>1/19/15</a:t>
+              <a:t>1/25/15</a:t>
             </a:fld>
             <a:endParaRPr lang="en-US" dirty="0"/>
           </a:p>
@@ -3807,7 +3811,7 @@
           <a:p>
             <a:fld id="{A73F672F-A5FB-5745-934A-1BF51CA5539C}" type="datetime1">
               <a:rPr lang="en-US" smtClean="0"/>
-              <a:t>1/19/15</a:t>
+              <a:t>1/25/15</a:t>
             </a:fld>
             <a:endParaRPr lang="en-US"/>
           </a:p>
@@ -4149,7 +4153,7 @@
             <a:fld id="{FA3C144B-2939-9A49-B014-915EC3E81866}" type="datetime1">
               <a:rPr lang="en-US" smtClean="0"/>
               <a:pPr/>
-              <a:t>1/19/15</a:t>
+              <a:t>1/25/15</a:t>
             </a:fld>
             <a:endParaRPr lang="en-US" dirty="0"/>
           </a:p>
@@ -4613,7 +4617,7 @@
           <a:p>
             <a:fld id="{6AFE6A63-5EBE-3E48-B0AE-DF655A1ECE76}" type="datetime1">
               <a:rPr lang="en-US" smtClean="0"/>
-              <a:t>1/19/15</a:t>
+              <a:t>1/25/15</a:t>
             </a:fld>
             <a:endParaRPr lang="en-US"/>
           </a:p>
@@ -4932,7 +4936,7 @@
           <a:p>
             <a:fld id="{4A019F0C-9D18-B54A-9AC9-18AA74EDB034}" type="datetime1">
               <a:rPr lang="en-US" smtClean="0"/>
-              <a:t>1/19/15</a:t>
+              <a:t>1/25/15</a:t>
             </a:fld>
             <a:endParaRPr lang="en-US"/>
           </a:p>
@@ -5242,7 +5246,7 @@
             <a:fld id="{FA3C144B-2939-9A49-B014-915EC3E81866}" type="datetime1">
               <a:rPr lang="en-US" smtClean="0"/>
               <a:pPr/>
-              <a:t>1/19/15</a:t>
+              <a:t>1/25/15</a:t>
             </a:fld>
             <a:endParaRPr lang="en-US" dirty="0"/>
           </a:p>
@@ -5505,7 +5509,7 @@
           <a:p>
             <a:fld id="{FA3C144B-2939-9A49-B014-915EC3E81866}" type="datetime1">
               <a:rPr lang="en-US" smtClean="0"/>
-              <a:t>1/19/15</a:t>
+              <a:t>1/25/15</a:t>
             </a:fld>
             <a:endParaRPr lang="en-US" dirty="0"/>
           </a:p>
@@ -5873,7 +5877,7 @@
           <a:p>
             <a:fld id="{7053BEFA-1175-F644-B249-7D41D72BD3FF}" type="datetime1">
               <a:rPr lang="en-US" smtClean="0"/>
-              <a:t>1/19/15</a:t>
+              <a:t>1/25/15</a:t>
             </a:fld>
             <a:endParaRPr lang="en-US"/>
           </a:p>
@@ -5992,7 +5996,7 @@
             <a:fld id="{FA3C144B-2939-9A49-B014-915EC3E81866}" type="datetime1">
               <a:rPr lang="en-US" smtClean="0"/>
               <a:pPr/>
-              <a:t>1/19/15</a:t>
+              <a:t>1/25/15</a:t>
             </a:fld>
             <a:endParaRPr lang="en-US" dirty="0"/>
           </a:p>
@@ -6209,7 +6213,7 @@
             <a:fld id="{FA3C144B-2939-9A49-B014-915EC3E81866}" type="datetime1">
               <a:rPr lang="en-US" smtClean="0"/>
               <a:pPr/>
-              <a:t>1/19/15</a:t>
+              <a:t>1/25/15</a:t>
             </a:fld>
             <a:endParaRPr lang="en-US" dirty="0"/>
           </a:p>
@@ -6454,7 +6458,7 @@
             <a:fld id="{FA3C144B-2939-9A49-B014-915EC3E81866}" type="datetime1">
               <a:rPr lang="en-US" smtClean="0"/>
               <a:pPr/>
-              <a:t>1/19/15</a:t>
+              <a:t>1/25/15</a:t>
             </a:fld>
             <a:endParaRPr lang="en-US" dirty="0"/>
           </a:p>
@@ -6832,7 +6836,7 @@
           <a:p>
             <a:fld id="{111EEF3B-ABF2-AA4E-9E24-0C6256942674}" type="datetime1">
               <a:rPr lang="en-US" smtClean="0"/>
-              <a:t>1/19/15</a:t>
+              <a:t>1/25/15</a:t>
             </a:fld>
             <a:endParaRPr lang="en-US"/>
           </a:p>
@@ -6996,7 +7000,7 @@
             <a:fld id="{FA3C144B-2939-9A49-B014-915EC3E81866}" type="datetime1">
               <a:rPr lang="en-US" smtClean="0"/>
               <a:pPr/>
-              <a:t>1/19/15</a:t>
+              <a:t>1/25/15</a:t>
             </a:fld>
             <a:endParaRPr lang="en-US" dirty="0"/>
           </a:p>
@@ -7413,7 +7417,7 @@
             <a:fld id="{FA3C144B-2939-9A49-B014-915EC3E81866}" type="datetime1">
               <a:rPr lang="en-US" smtClean="0"/>
               <a:pPr/>
-              <a:t>1/19/15</a:t>
+              <a:t>1/25/15</a:t>
             </a:fld>
             <a:endParaRPr lang="en-US" dirty="0"/>
           </a:p>
@@ -7729,7 +7733,7 @@
             <a:fld id="{FA3C144B-2939-9A49-B014-915EC3E81866}" type="datetime1">
               <a:rPr lang="en-US" smtClean="0"/>
               <a:pPr/>
-              <a:t>1/19/15</a:t>
+              <a:t>1/25/15</a:t>
             </a:fld>
             <a:endParaRPr lang="en-US" dirty="0"/>
           </a:p>
@@ -8395,7 +8399,7 @@
             <a:fld id="{FA3C144B-2939-9A49-B014-915EC3E81866}" type="datetime1">
               <a:rPr lang="en-US" smtClean="0"/>
               <a:pPr/>
-              <a:t>1/19/15</a:t>
+              <a:t>1/25/15</a:t>
             </a:fld>
             <a:endParaRPr lang="en-US" dirty="0"/>
           </a:p>
@@ -9479,7 +9483,7 @@
           <a:p>
             <a:r>
               <a:rPr lang="en-US" dirty="0" smtClean="0"/>
-              <a:t>How Structured is it Really?</a:t>
+              <a:t>How Structured is this Data?</a:t>
             </a:r>
             <a:endParaRPr lang="en-US" dirty="0"/>
           </a:p>
@@ -9505,68 +9509,31 @@
             </a:pPr>
             <a:r>
               <a:rPr lang="en-US" dirty="0" smtClean="0"/>
-              <a:t>XML/JSON often used for communication (</a:t>
-            </a:r>
-            <a:r>
-              <a:rPr lang="en-US" i="1" dirty="0" smtClean="0"/>
-              <a:t>e.g. </a:t>
-            </a:r>
-            <a:r>
-              <a:rPr lang="en-US" dirty="0" smtClean="0"/>
-              <a:t>Web API return values)</a:t>
+              <a:t>Possible to specify a schema and check against it</a:t>
+            </a:r>
+          </a:p>
+          <a:p>
+            <a:r>
+              <a:rPr lang="en-US" dirty="0" smtClean="0"/>
+              <a:t>XML DTD (weak specification)</a:t>
+            </a:r>
+          </a:p>
+          <a:p>
+            <a:r>
+              <a:rPr lang="en-US" dirty="0" smtClean="0"/>
+              <a:t>XML Schema (more powerful, includes types)</a:t>
+            </a:r>
+          </a:p>
+          <a:p>
+            <a:r>
+              <a:rPr lang="en-US" dirty="0" smtClean="0"/>
+              <a:t>JSON Schema</a:t>
             </a:r>
           </a:p>
           <a:p>
             <a:pPr marL="0" indent="0">
               <a:buNone/>
             </a:pPr>
-            <a:r>
-              <a:rPr lang="en-US" dirty="0" smtClean="0"/>
-              <a:t>Underlying data may be </a:t>
-            </a:r>
-            <a:r>
-              <a:rPr lang="en-US" i="1" dirty="0" smtClean="0"/>
-              <a:t>highly </a:t>
-            </a:r>
-            <a:r>
-              <a:rPr lang="en-US" dirty="0" smtClean="0"/>
-              <a:t>structured</a:t>
-            </a:r>
-          </a:p>
-          <a:p>
-            <a:pPr marL="0" indent="0">
-              <a:buNone/>
-            </a:pPr>
-            <a:r>
-              <a:rPr lang="en-US" dirty="0" smtClean="0"/>
-              <a:t>Usually no DTD or Schema included (documentation is considered sufficient)</a:t>
-            </a:r>
-          </a:p>
-          <a:p>
-            <a:pPr marL="0" indent="0">
-              <a:buNone/>
-            </a:pPr>
-            <a:r>
-              <a:rPr lang="en-US" dirty="0" smtClean="0"/>
-              <a:t>Must linearize any cyclical data to do this</a:t>
-            </a:r>
-          </a:p>
-          <a:p>
-            <a:pPr marL="228600" lvl="1" indent="0">
-              <a:buNone/>
-            </a:pPr>
-            <a:r>
-              <a:rPr lang="en-US" dirty="0" smtClean="0"/>
-              <a:t>Often leads to multiple queries corresponding </a:t>
-            </a:r>
-            <a:r>
-              <a:rPr lang="en-US" dirty="0" err="1" smtClean="0"/>
-              <a:t>approx</a:t>
-            </a:r>
-            <a:r>
-              <a:rPr lang="en-US" dirty="0" smtClean="0"/>
-              <a:t> to different database tables</a:t>
-            </a:r>
             <a:endParaRPr lang="en-US" dirty="0"/>
           </a:p>
         </p:txBody>
@@ -9588,7 +9555,7 @@
           <a:p>
             <a:fld id="{7053BEFA-1175-F644-B249-7D41D72BD3FF}" type="datetime1">
               <a:rPr lang="en-US" smtClean="0"/>
-              <a:t>1/19/15</a:t>
+              <a:t>1/25/15</a:t>
             </a:fld>
             <a:endParaRPr lang="en-US"/>
           </a:p>
@@ -9639,7 +9606,7 @@
     </p:spTree>
     <p:extLst>
       <p:ext uri="{BB962C8B-B14F-4D97-AF65-F5344CB8AC3E}">
-        <p14:creationId xmlns:p14="http://schemas.microsoft.com/office/powerpoint/2010/main" val="78491078"/>
+        <p14:creationId xmlns:p14="http://schemas.microsoft.com/office/powerpoint/2010/main" val="1768430142"/>
       </p:ext>
     </p:extLst>
   </p:cSld>
@@ -9690,7 +9657,7 @@
           <a:p>
             <a:r>
               <a:rPr lang="en-US" dirty="0" smtClean="0"/>
-              <a:t>So what is structured data?</a:t>
+              <a:t>How Structured is it Really?</a:t>
             </a:r>
             <a:endParaRPr lang="en-US" dirty="0"/>
           </a:p>
@@ -9711,7 +9678,74 @@
           <a:bodyPr/>
           <a:lstStyle/>
           <a:p>
-            <a:endParaRPr lang="en-US"/>
+            <a:pPr marL="0" indent="0">
+              <a:buNone/>
+            </a:pPr>
+            <a:r>
+              <a:rPr lang="en-US" dirty="0" smtClean="0"/>
+              <a:t>XML/JSON often used for communication (</a:t>
+            </a:r>
+            <a:r>
+              <a:rPr lang="en-US" i="1" dirty="0" smtClean="0"/>
+              <a:t>e.g. </a:t>
+            </a:r>
+            <a:r>
+              <a:rPr lang="en-US" dirty="0" smtClean="0"/>
+              <a:t>Web API return values)</a:t>
+            </a:r>
+          </a:p>
+          <a:p>
+            <a:pPr marL="0" indent="0">
+              <a:buNone/>
+            </a:pPr>
+            <a:r>
+              <a:rPr lang="en-US" dirty="0" smtClean="0"/>
+              <a:t>Underlying data may be </a:t>
+            </a:r>
+            <a:r>
+              <a:rPr lang="en-US" i="1" dirty="0" smtClean="0"/>
+              <a:t>highly </a:t>
+            </a:r>
+            <a:r>
+              <a:rPr lang="en-US" dirty="0" smtClean="0"/>
+              <a:t>structured</a:t>
+            </a:r>
+          </a:p>
+          <a:p>
+            <a:pPr marL="0" indent="0">
+              <a:buNone/>
+            </a:pPr>
+            <a:r>
+              <a:rPr lang="en-US" dirty="0" smtClean="0"/>
+              <a:t>Usually no DTD or Schema included (documentation is considered sufficient)</a:t>
+            </a:r>
+          </a:p>
+          <a:p>
+            <a:pPr marL="0" indent="0">
+              <a:buNone/>
+            </a:pPr>
+            <a:r>
+              <a:rPr lang="en-US" dirty="0" smtClean="0"/>
+              <a:t>Must linearize any cyclical data to do this</a:t>
+            </a:r>
+          </a:p>
+          <a:p>
+            <a:pPr marL="228600" lvl="1" indent="0">
+              <a:buNone/>
+            </a:pPr>
+            <a:r>
+              <a:rPr lang="en-US" dirty="0" smtClean="0"/>
+              <a:t>Often leads to multiple queries corresponding </a:t>
+            </a:r>
+            <a:r>
+              <a:rPr lang="en-US" dirty="0" err="1" smtClean="0"/>
+              <a:t>approx</a:t>
+            </a:r>
+            <a:r>
+              <a:rPr lang="en-US" dirty="0" smtClean="0"/>
+              <a:t> to different database tables</a:t>
+            </a:r>
+            <a:endParaRPr lang="en-US" dirty="0"/>
           </a:p>
         </p:txBody>
       </p:sp>
@@ -9732,7 +9766,7 @@
           <a:p>
             <a:fld id="{7053BEFA-1175-F644-B249-7D41D72BD3FF}" type="datetime1">
               <a:rPr lang="en-US" smtClean="0"/>
-              <a:t>1/19/15</a:t>
+              <a:t>1/25/15</a:t>
             </a:fld>
             <a:endParaRPr lang="en-US"/>
           </a:p>
@@ -9783,7 +9817,7 @@
     </p:spTree>
     <p:extLst>
       <p:ext uri="{BB962C8B-B14F-4D97-AF65-F5344CB8AC3E}">
-        <p14:creationId xmlns:p14="http://schemas.microsoft.com/office/powerpoint/2010/main" val="2469477308"/>
+        <p14:creationId xmlns:p14="http://schemas.microsoft.com/office/powerpoint/2010/main" val="78491078"/>
       </p:ext>
     </p:extLst>
   </p:cSld>
@@ -9834,7 +9868,7 @@
           <a:p>
             <a:r>
               <a:rPr lang="en-US" dirty="0" smtClean="0"/>
-              <a:t>What is a Data Model?</a:t>
+              <a:t>So what is structured data?</a:t>
             </a:r>
             <a:endParaRPr lang="en-US" dirty="0"/>
           </a:p>
@@ -9855,74 +9889,7 @@
           <a:bodyPr/>
           <a:lstStyle/>
           <a:p>
-            <a:pPr marL="0" indent="0">
-              <a:buNone/>
-            </a:pPr>
-            <a:r>
-              <a:rPr lang="en-US" dirty="0"/>
-              <a:t>What data is </a:t>
-            </a:r>
-            <a:r>
-              <a:rPr lang="en-US" dirty="0" smtClean="0"/>
-              <a:t>stored and </a:t>
-            </a:r>
-            <a:r>
-              <a:rPr lang="en-US" dirty="0"/>
-              <a:t>how it is </a:t>
-            </a:r>
-            <a:r>
-              <a:rPr lang="en-US" dirty="0" smtClean="0"/>
-              <a:t>organized</a:t>
-            </a:r>
-          </a:p>
-          <a:p>
-            <a:pPr marL="0" indent="0">
-              <a:buNone/>
-            </a:pPr>
-            <a:endParaRPr lang="en-US" dirty="0" smtClean="0"/>
-          </a:p>
-          <a:p>
-            <a:pPr marL="0" indent="0">
-              <a:buNone/>
-            </a:pPr>
-            <a:r>
-              <a:rPr lang="en-US" dirty="0" smtClean="0"/>
-              <a:t>Key benefits:</a:t>
-            </a:r>
-          </a:p>
-          <a:p>
-            <a:r>
-              <a:rPr lang="en-US" dirty="0" smtClean="0"/>
-              <a:t>Leverage  </a:t>
-            </a:r>
-            <a:r>
-              <a:rPr lang="en-US" dirty="0"/>
-              <a:t>(big impact on programming; cost; </a:t>
-            </a:r>
-            <a:r>
-              <a:rPr lang="en-US" i="1" dirty="0" smtClean="0"/>
-              <a:t>etc.</a:t>
-            </a:r>
-            <a:r>
-              <a:rPr lang="en-US" dirty="0" smtClean="0"/>
-              <a:t>)</a:t>
-            </a:r>
-            <a:endParaRPr lang="en-US" dirty="0"/>
-          </a:p>
-          <a:p>
-            <a:r>
-              <a:rPr lang="en-US" dirty="0"/>
-              <a:t>Conciseness (implies an interaction model)</a:t>
-            </a:r>
-          </a:p>
-          <a:p>
-            <a:r>
-              <a:rPr lang="en-US" dirty="0"/>
-              <a:t>Can encode integrity constraints </a:t>
-            </a:r>
-          </a:p>
-          <a:p>
-            <a:endParaRPr lang="en-US" dirty="0"/>
+            <a:endParaRPr lang="en-US"/>
           </a:p>
         </p:txBody>
       </p:sp>
@@ -9943,7 +9910,7 @@
           <a:p>
             <a:fld id="{7053BEFA-1175-F644-B249-7D41D72BD3FF}" type="datetime1">
               <a:rPr lang="en-US" smtClean="0"/>
-              <a:t>1/19/15</a:t>
+              <a:t>1/25/15</a:t>
             </a:fld>
             <a:endParaRPr lang="en-US"/>
           </a:p>
@@ -9991,36 +9958,10 @@
           </a:p>
         </p:txBody>
       </p:sp>
-      <p:sp>
-        <p:nvSpPr>
-          <p:cNvPr id="7" name="TextBox 6"/>
-          <p:cNvSpPr txBox="1"/>
-          <p:nvPr/>
-        </p:nvSpPr>
-        <p:spPr>
-          <a:xfrm>
-            <a:off x="3362451" y="3473351"/>
-            <a:ext cx="184666" cy="369332"/>
-          </a:xfrm>
-          <a:prstGeom prst="rect">
-            <a:avLst/>
-          </a:prstGeom>
-          <a:noFill/>
-        </p:spPr>
-        <p:txBody>
-          <a:bodyPr wrap="none" rtlCol="0">
-            <a:spAutoFit/>
-          </a:bodyPr>
-          <a:lstStyle/>
-          <a:p>
-            <a:endParaRPr lang="en-US" dirty="0"/>
-          </a:p>
-        </p:txBody>
-      </p:sp>
     </p:spTree>
     <p:extLst>
       <p:ext uri="{BB962C8B-B14F-4D97-AF65-F5344CB8AC3E}">
-        <p14:creationId xmlns:p14="http://schemas.microsoft.com/office/powerpoint/2010/main" val="321535194"/>
+        <p14:creationId xmlns:p14="http://schemas.microsoft.com/office/powerpoint/2010/main" val="2469477308"/>
       </p:ext>
     </p:extLst>
   </p:cSld>
@@ -10071,7 +10012,7 @@
           <a:p>
             <a:r>
               <a:rPr lang="en-US" dirty="0" smtClean="0"/>
-              <a:t>Common structure</a:t>
+              <a:t>What is a Data Model?</a:t>
             </a:r>
             <a:endParaRPr lang="en-US" dirty="0"/>
           </a:p>
@@ -10096,32 +10037,27 @@
               <a:buNone/>
             </a:pPr>
             <a:r>
-              <a:rPr lang="en-US" dirty="0" smtClean="0"/>
-              <a:t>Tables (rows &amp; columns)</a:t>
+              <a:rPr lang="en-US" dirty="0"/>
+              <a:t>What data is </a:t>
+            </a:r>
+            <a:r>
+              <a:rPr lang="en-US" dirty="0" smtClean="0"/>
+              <a:t>stored and </a:t>
+            </a:r>
+            <a:r>
+              <a:rPr lang="en-US" dirty="0"/>
+              <a:t>how it is </a:t>
+            </a:r>
+            <a:r>
+              <a:rPr lang="en-US" dirty="0" smtClean="0"/>
+              <a:t>organized</a:t>
             </a:r>
           </a:p>
           <a:p>
             <a:pPr marL="0" indent="0">
               <a:buNone/>
             </a:pPr>
-            <a:r>
-              <a:rPr lang="en-US" dirty="0" smtClean="0"/>
-              <a:t>Example from Byte2: </a:t>
-            </a:r>
-          </a:p>
-          <a:p>
-            <a:pPr lvl="1"/>
-            <a:r>
-              <a:rPr lang="en-US" dirty="0" smtClean="0"/>
-              <a:t>Each row is a pet </a:t>
-            </a:r>
-          </a:p>
-          <a:p>
-            <a:pPr lvl="1"/>
-            <a:r>
-              <a:rPr lang="en-US" dirty="0" smtClean="0"/>
-              <a:t>Columns describe where it was found, breed, color, outcome and so on.</a:t>
-            </a:r>
+            <a:endParaRPr lang="en-US" dirty="0" smtClean="0"/>
           </a:p>
           <a:p>
             <a:pPr marL="0" indent="0">
@@ -10129,17 +10065,41 @@
             </a:pPr>
             <a:r>
               <a:rPr lang="en-US" dirty="0" smtClean="0"/>
-              <a:t>Many of the data sets we will look at have this form</a:t>
-            </a:r>
-          </a:p>
-          <a:p>
-            <a:pPr marL="0" indent="0">
-              <a:buNone/>
-            </a:pPr>
-            <a:r>
-              <a:rPr lang="en-US" dirty="0" smtClean="0"/>
-              <a:t>But a database is typically far more complex</a:t>
-            </a:r>
+              <a:t>Key benefits:</a:t>
+            </a:r>
+          </a:p>
+          <a:p>
+            <a:r>
+              <a:rPr lang="en-US" dirty="0" smtClean="0"/>
+              <a:t>Leverage  </a:t>
+            </a:r>
+            <a:r>
+              <a:rPr lang="en-US" dirty="0"/>
+              <a:t>(big impact on programming; cost; </a:t>
+            </a:r>
+            <a:r>
+              <a:rPr lang="en-US" i="1" dirty="0" smtClean="0"/>
+              <a:t>etc.</a:t>
+            </a:r>
+            <a:r>
+              <a:rPr lang="en-US" dirty="0" smtClean="0"/>
+              <a:t>)</a:t>
+            </a:r>
+            <a:endParaRPr lang="en-US" dirty="0"/>
+          </a:p>
+          <a:p>
+            <a:r>
+              <a:rPr lang="en-US" dirty="0"/>
+              <a:t>Conciseness (implies an interaction model)</a:t>
+            </a:r>
+          </a:p>
+          <a:p>
+            <a:r>
+              <a:rPr lang="en-US" dirty="0"/>
+              <a:t>Can encode integrity constraints </a:t>
+            </a:r>
+          </a:p>
+          <a:p>
             <a:endParaRPr lang="en-US" dirty="0"/>
           </a:p>
         </p:txBody>
@@ -10161,7 +10121,7 @@
           <a:p>
             <a:fld id="{7053BEFA-1175-F644-B249-7D41D72BD3FF}" type="datetime1">
               <a:rPr lang="en-US" smtClean="0"/>
-              <a:t>1/19/15</a:t>
+              <a:t>1/25/15</a:t>
             </a:fld>
             <a:endParaRPr lang="en-US"/>
           </a:p>
@@ -10209,10 +10169,36 @@
           </a:p>
         </p:txBody>
       </p:sp>
+      <p:sp>
+        <p:nvSpPr>
+          <p:cNvPr id="7" name="TextBox 6"/>
+          <p:cNvSpPr txBox="1"/>
+          <p:nvPr/>
+        </p:nvSpPr>
+        <p:spPr>
+          <a:xfrm>
+            <a:off x="3362451" y="3473351"/>
+            <a:ext cx="184666" cy="369332"/>
+          </a:xfrm>
+          <a:prstGeom prst="rect">
+            <a:avLst/>
+          </a:prstGeom>
+          <a:noFill/>
+        </p:spPr>
+        <p:txBody>
+          <a:bodyPr wrap="none" rtlCol="0">
+            <a:spAutoFit/>
+          </a:bodyPr>
+          <a:lstStyle/>
+          <a:p>
+            <a:endParaRPr lang="en-US" dirty="0"/>
+          </a:p>
+        </p:txBody>
+      </p:sp>
     </p:spTree>
     <p:extLst>
       <p:ext uri="{BB962C8B-B14F-4D97-AF65-F5344CB8AC3E}">
-        <p14:creationId xmlns:p14="http://schemas.microsoft.com/office/powerpoint/2010/main" val="1224266322"/>
+        <p14:creationId xmlns:p14="http://schemas.microsoft.com/office/powerpoint/2010/main" val="321535194"/>
       </p:ext>
     </p:extLst>
   </p:cSld>
@@ -10263,7 +10249,7 @@
           <a:p>
             <a:r>
               <a:rPr lang="en-US" dirty="0" smtClean="0"/>
-              <a:t>Complex Schema</a:t>
+              <a:t>Common structure</a:t>
             </a:r>
             <a:endParaRPr lang="en-US" dirty="0"/>
           </a:p>
@@ -10289,7 +10275,7 @@
             </a:pPr>
             <a:r>
               <a:rPr lang="en-US" dirty="0" smtClean="0"/>
-              <a:t>Many tables</a:t>
+              <a:t>Tables (rows &amp; columns)</a:t>
             </a:r>
           </a:p>
           <a:p>
@@ -10297,18 +10283,23 @@
               <a:buNone/>
             </a:pPr>
             <a:r>
-              <a:rPr lang="en-US" i="1" dirty="0" smtClean="0"/>
-              <a:t>Logically </a:t>
-            </a:r>
-            <a:r>
-              <a:rPr lang="en-US" dirty="0" smtClean="0"/>
-              <a:t>connected </a:t>
-            </a:r>
-            <a:r>
-              <a:rPr lang="en-US" dirty="0" smtClean="0"/>
-              <a:t>[who’s logic?]</a:t>
-            </a:r>
-            <a:endParaRPr lang="en-US" dirty="0" smtClean="0"/>
+              <a:rPr lang="en-US" dirty="0" smtClean="0"/>
+              <a:t>Example from Byte2: </a:t>
+            </a:r>
+          </a:p>
+          <a:p>
+            <a:pPr lvl="1"/>
+            <a:r>
+              <a:rPr lang="en-US" dirty="0" smtClean="0"/>
+              <a:t>Each row is a pet </a:t>
+            </a:r>
+          </a:p>
+          <a:p>
+            <a:pPr lvl="1"/>
+            <a:r>
+              <a:rPr lang="en-US" dirty="0" smtClean="0"/>
+              <a:t>Columns describe where it was found, breed, color, outcome and so on.</a:t>
+            </a:r>
           </a:p>
           <a:p>
             <a:pPr marL="0" indent="0">
@@ -10316,7 +10307,7 @@
             </a:pPr>
             <a:r>
               <a:rPr lang="en-US" dirty="0" smtClean="0"/>
-              <a:t>Connections expressed using special kinds of columns that reflect Ids of other tables (“foreign keys”)</a:t>
+              <a:t>Many of the data sets we will look at have this form</a:t>
             </a:r>
           </a:p>
           <a:p>
@@ -10324,19 +10315,10 @@
               <a:buNone/>
             </a:pPr>
             <a:r>
-              <a:rPr lang="en-US" i="1" dirty="0" smtClean="0"/>
-              <a:t>Rules </a:t>
-            </a:r>
-            <a:r>
-              <a:rPr lang="en-US" dirty="0" smtClean="0"/>
-              <a:t>(implicit or explicit) may further govern the integrity of data</a:t>
-            </a:r>
-          </a:p>
-          <a:p>
-            <a:pPr marL="0" indent="0">
-              <a:buNone/>
-            </a:pPr>
-            <a:endParaRPr lang="en-US" dirty="0" smtClean="0"/>
+              <a:rPr lang="en-US" dirty="0" smtClean="0"/>
+              <a:t>But a database is typically far more complex</a:t>
+            </a:r>
+            <a:endParaRPr lang="en-US" dirty="0"/>
           </a:p>
         </p:txBody>
       </p:sp>
@@ -10357,7 +10339,7 @@
           <a:p>
             <a:fld id="{7053BEFA-1175-F644-B249-7D41D72BD3FF}" type="datetime1">
               <a:rPr lang="en-US" smtClean="0"/>
-              <a:t>1/19/15</a:t>
+              <a:t>1/25/15</a:t>
             </a:fld>
             <a:endParaRPr lang="en-US"/>
           </a:p>
@@ -10408,7 +10390,7 @@
     </p:spTree>
     <p:extLst>
       <p:ext uri="{BB962C8B-B14F-4D97-AF65-F5344CB8AC3E}">
-        <p14:creationId xmlns:p14="http://schemas.microsoft.com/office/powerpoint/2010/main" val="3564684317"/>
+        <p14:creationId xmlns:p14="http://schemas.microsoft.com/office/powerpoint/2010/main" val="1224266322"/>
       </p:ext>
     </p:extLst>
   </p:cSld>
@@ -10459,7 +10441,7 @@
           <a:p>
             <a:r>
               <a:rPr lang="en-US" dirty="0" smtClean="0"/>
-              <a:t>Example</a:t>
+              <a:t>Complex Schema</a:t>
             </a:r>
             <a:endParaRPr lang="en-US" dirty="0"/>
           </a:p>
@@ -10485,14 +10467,49 @@
             </a:pPr>
             <a:r>
               <a:rPr lang="en-US" dirty="0" smtClean="0"/>
-              <a:t>What if we had a table of dog breeds</a:t>
+              <a:t>Many tables</a:t>
             </a:r>
           </a:p>
           <a:p>
             <a:pPr marL="0" indent="0">
               <a:buNone/>
             </a:pPr>
-            <a:endParaRPr lang="en-US" dirty="0"/>
+            <a:r>
+              <a:rPr lang="en-US" i="1" dirty="0" smtClean="0"/>
+              <a:t>Logically </a:t>
+            </a:r>
+            <a:r>
+              <a:rPr lang="en-US" dirty="0" smtClean="0"/>
+              <a:t>connected [who’s logic?]</a:t>
+            </a:r>
+          </a:p>
+          <a:p>
+            <a:pPr marL="0" indent="0">
+              <a:buNone/>
+            </a:pPr>
+            <a:r>
+              <a:rPr lang="en-US" dirty="0" smtClean="0"/>
+              <a:t>Connections expressed using special kinds of columns that reflect Ids of other tables (“foreign keys”)</a:t>
+            </a:r>
+          </a:p>
+          <a:p>
+            <a:pPr marL="0" indent="0">
+              <a:buNone/>
+            </a:pPr>
+            <a:r>
+              <a:rPr lang="en-US" i="1" dirty="0" smtClean="0"/>
+              <a:t>Rules </a:t>
+            </a:r>
+            <a:r>
+              <a:rPr lang="en-US" dirty="0" smtClean="0"/>
+              <a:t>(implicit or explicit) may further govern the integrity of data</a:t>
+            </a:r>
+          </a:p>
+          <a:p>
+            <a:pPr marL="0" indent="0">
+              <a:buNone/>
+            </a:pPr>
+            <a:endParaRPr lang="en-US" dirty="0" smtClean="0"/>
           </a:p>
         </p:txBody>
       </p:sp>
@@ -10513,7 +10530,7 @@
           <a:p>
             <a:fld id="{7053BEFA-1175-F644-B249-7D41D72BD3FF}" type="datetime1">
               <a:rPr lang="en-US" smtClean="0"/>
-              <a:t>1/19/15</a:t>
+              <a:t>1/25/15</a:t>
             </a:fld>
             <a:endParaRPr lang="en-US"/>
           </a:p>
@@ -10556,6 +10573,162 @@
             <a:fld id="{17E276FA-8F89-B34D-A726-BE3FA1F8DD97}" type="slidenum">
               <a:rPr lang="en-US" smtClean="0"/>
               <a:t>15</a:t>
+            </a:fld>
+            <a:endParaRPr lang="en-US" dirty="0"/>
+          </a:p>
+        </p:txBody>
+      </p:sp>
+    </p:spTree>
+    <p:extLst>
+      <p:ext uri="{BB962C8B-B14F-4D97-AF65-F5344CB8AC3E}">
+        <p14:creationId xmlns:p14="http://schemas.microsoft.com/office/powerpoint/2010/main" val="3564684317"/>
+      </p:ext>
+    </p:extLst>
+  </p:cSld>
+  <p:clrMapOvr>
+    <a:masterClrMapping/>
+  </p:clrMapOvr>
+  <p:timing>
+    <p:tnLst>
+      <p:par>
+        <p:cTn xmlns:p14="http://schemas.microsoft.com/office/powerpoint/2010/main" id="1" dur="indefinite" restart="never" nodeType="tmRoot"/>
+      </p:par>
+    </p:tnLst>
+  </p:timing>
+</p:sld>
+</file>
+
+<file path=ppt/slides/slide16.xml><?xml version="1.0" encoding="utf-8"?>
+<p:sld xmlns:a="http://schemas.openxmlformats.org/drawingml/2006/main" xmlns:r="http://schemas.openxmlformats.org/officeDocument/2006/relationships" xmlns:p="http://schemas.openxmlformats.org/presentationml/2006/main">
+  <p:cSld>
+    <p:spTree>
+      <p:nvGrpSpPr>
+        <p:cNvPr id="1" name=""/>
+        <p:cNvGrpSpPr/>
+        <p:nvPr/>
+      </p:nvGrpSpPr>
+      <p:grpSpPr>
+        <a:xfrm>
+          <a:off x="0" y="0"/>
+          <a:ext cx="0" cy="0"/>
+          <a:chOff x="0" y="0"/>
+          <a:chExt cx="0" cy="0"/>
+        </a:xfrm>
+      </p:grpSpPr>
+      <p:sp>
+        <p:nvSpPr>
+          <p:cNvPr id="2" name="Title 1"/>
+          <p:cNvSpPr>
+            <a:spLocks noGrp="1"/>
+          </p:cNvSpPr>
+          <p:nvPr>
+            <p:ph type="title"/>
+          </p:nvPr>
+        </p:nvSpPr>
+        <p:spPr/>
+        <p:txBody>
+          <a:bodyPr/>
+          <a:lstStyle/>
+          <a:p>
+            <a:r>
+              <a:rPr lang="en-US" dirty="0" smtClean="0"/>
+              <a:t>Example</a:t>
+            </a:r>
+            <a:endParaRPr lang="en-US" dirty="0"/>
+          </a:p>
+        </p:txBody>
+      </p:sp>
+      <p:sp>
+        <p:nvSpPr>
+          <p:cNvPr id="3" name="Content Placeholder 2"/>
+          <p:cNvSpPr>
+            <a:spLocks noGrp="1"/>
+          </p:cNvSpPr>
+          <p:nvPr>
+            <p:ph idx="1"/>
+          </p:nvPr>
+        </p:nvSpPr>
+        <p:spPr/>
+        <p:txBody>
+          <a:bodyPr/>
+          <a:lstStyle/>
+          <a:p>
+            <a:pPr marL="0" indent="0">
+              <a:buNone/>
+            </a:pPr>
+            <a:r>
+              <a:rPr lang="en-US" dirty="0" smtClean="0"/>
+              <a:t>What if we had a table of dog breeds</a:t>
+            </a:r>
+          </a:p>
+          <a:p>
+            <a:pPr marL="0" indent="0">
+              <a:buNone/>
+            </a:pPr>
+            <a:endParaRPr lang="en-US" dirty="0"/>
+          </a:p>
+        </p:txBody>
+      </p:sp>
+      <p:sp>
+        <p:nvSpPr>
+          <p:cNvPr id="4" name="Date Placeholder 3"/>
+          <p:cNvSpPr>
+            <a:spLocks noGrp="1"/>
+          </p:cNvSpPr>
+          <p:nvPr>
+            <p:ph type="dt" sz="half" idx="10"/>
+          </p:nvPr>
+        </p:nvSpPr>
+        <p:spPr/>
+        <p:txBody>
+          <a:bodyPr/>
+          <a:lstStyle/>
+          <a:p>
+            <a:fld id="{7053BEFA-1175-F644-B249-7D41D72BD3FF}" type="datetime1">
+              <a:rPr lang="en-US" smtClean="0"/>
+              <a:t>1/25/15</a:t>
+            </a:fld>
+            <a:endParaRPr lang="en-US"/>
+          </a:p>
+        </p:txBody>
+      </p:sp>
+      <p:sp>
+        <p:nvSpPr>
+          <p:cNvPr id="5" name="Footer Placeholder 4"/>
+          <p:cNvSpPr>
+            <a:spLocks noGrp="1"/>
+          </p:cNvSpPr>
+          <p:nvPr>
+            <p:ph type="ftr" sz="quarter" idx="11"/>
+          </p:nvPr>
+        </p:nvSpPr>
+        <p:spPr/>
+        <p:txBody>
+          <a:bodyPr/>
+          <a:lstStyle/>
+          <a:p>
+            <a:endParaRPr lang="en-US" dirty="0"/>
+          </a:p>
+        </p:txBody>
+      </p:sp>
+      <p:sp>
+        <p:nvSpPr>
+          <p:cNvPr id="6" name="Slide Number Placeholder 5"/>
+          <p:cNvSpPr>
+            <a:spLocks noGrp="1"/>
+          </p:cNvSpPr>
+          <p:nvPr>
+            <p:ph type="sldNum" sz="quarter" idx="12"/>
+          </p:nvPr>
+        </p:nvSpPr>
+        <p:spPr/>
+        <p:txBody>
+          <a:bodyPr/>
+          <a:lstStyle/>
+          <a:p>
+            <a:fld id="{17E276FA-8F89-B34D-A726-BE3FA1F8DD97}" type="slidenum">
+              <a:rPr lang="en-US" smtClean="0"/>
+              <a:t>16</a:t>
             </a:fld>
             <a:endParaRPr lang="en-US" dirty="0"/>
           </a:p>
@@ -10737,7 +10910,7 @@
 </p:sld>
 </file>
 
-<file path=ppt/slides/slide16.xml><?xml version="1.0" encoding="utf-8"?>
+<file path=ppt/slides/slide17.xml><?xml version="1.0" encoding="utf-8"?>
 <p:sld xmlns:a="http://schemas.openxmlformats.org/drawingml/2006/main" xmlns:r="http://schemas.openxmlformats.org/officeDocument/2006/relationships" xmlns:p="http://schemas.openxmlformats.org/presentationml/2006/main">
   <p:cSld>
     <p:spTree>
@@ -10901,7 +11074,7 @@
           <a:p>
             <a:fld id="{7053BEFA-1175-F644-B249-7D41D72BD3FF}" type="datetime1">
               <a:rPr lang="en-US" smtClean="0"/>
-              <a:t>1/19/15</a:t>
+              <a:t>1/25/15</a:t>
             </a:fld>
             <a:endParaRPr lang="en-US"/>
           </a:p>
@@ -10943,7 +11116,7 @@
           <a:p>
             <a:fld id="{17E276FA-8F89-B34D-A726-BE3FA1F8DD97}" type="slidenum">
               <a:rPr lang="en-US" smtClean="0"/>
-              <a:t>16</a:t>
+              <a:t>17</a:t>
             </a:fld>
             <a:endParaRPr lang="en-US" dirty="0"/>
           </a:p>
@@ -11431,156 +11604,6 @@
 </p:sld>
 </file>
 
-<file path=ppt/slides/slide17.xml><?xml version="1.0" encoding="utf-8"?>
-<p:sld xmlns:a="http://schemas.openxmlformats.org/drawingml/2006/main" xmlns:r="http://schemas.openxmlformats.org/officeDocument/2006/relationships" xmlns:p="http://schemas.openxmlformats.org/presentationml/2006/main">
-  <p:cSld>
-    <p:spTree>
-      <p:nvGrpSpPr>
-        <p:cNvPr id="1" name=""/>
-        <p:cNvGrpSpPr/>
-        <p:nvPr/>
-      </p:nvGrpSpPr>
-      <p:grpSpPr>
-        <a:xfrm>
-          <a:off x="0" y="0"/>
-          <a:ext cx="0" cy="0"/>
-          <a:chOff x="0" y="0"/>
-          <a:chExt cx="0" cy="0"/>
-        </a:xfrm>
-      </p:grpSpPr>
-      <p:sp>
-        <p:nvSpPr>
-          <p:cNvPr id="2" name="Title 1"/>
-          <p:cNvSpPr>
-            <a:spLocks noGrp="1"/>
-          </p:cNvSpPr>
-          <p:nvPr>
-            <p:ph type="title"/>
-          </p:nvPr>
-        </p:nvSpPr>
-        <p:spPr/>
-        <p:txBody>
-          <a:bodyPr/>
-          <a:lstStyle/>
-          <a:p>
-            <a:r>
-              <a:rPr lang="en-US" dirty="0" smtClean="0"/>
-              <a:t>What makes a good data model?</a:t>
-            </a:r>
-            <a:endParaRPr lang="en-US" dirty="0"/>
-          </a:p>
-        </p:txBody>
-      </p:sp>
-      <p:sp>
-        <p:nvSpPr>
-          <p:cNvPr id="3" name="Content Placeholder 2"/>
-          <p:cNvSpPr>
-            <a:spLocks noGrp="1"/>
-          </p:cNvSpPr>
-          <p:nvPr>
-            <p:ph idx="1"/>
-          </p:nvPr>
-        </p:nvSpPr>
-        <p:spPr/>
-        <p:txBody>
-          <a:bodyPr/>
-          <a:lstStyle/>
-          <a:p>
-            <a:pPr marL="0" indent="0">
-              <a:buNone/>
-            </a:pPr>
-            <a:r>
-              <a:rPr lang="en-US" dirty="0" smtClean="0"/>
-              <a:t>Completeness – does it support all of the data?</a:t>
-            </a:r>
-          </a:p>
-        </p:txBody>
-      </p:sp>
-      <p:sp>
-        <p:nvSpPr>
-          <p:cNvPr id="4" name="Date Placeholder 3"/>
-          <p:cNvSpPr>
-            <a:spLocks noGrp="1"/>
-          </p:cNvSpPr>
-          <p:nvPr>
-            <p:ph type="dt" sz="half" idx="10"/>
-          </p:nvPr>
-        </p:nvSpPr>
-        <p:spPr/>
-        <p:txBody>
-          <a:bodyPr/>
-          <a:lstStyle/>
-          <a:p>
-            <a:fld id="{7053BEFA-1175-F644-B249-7D41D72BD3FF}" type="datetime1">
-              <a:rPr lang="en-US" smtClean="0"/>
-              <a:t>1/19/15</a:t>
-            </a:fld>
-            <a:endParaRPr lang="en-US"/>
-          </a:p>
-        </p:txBody>
-      </p:sp>
-      <p:sp>
-        <p:nvSpPr>
-          <p:cNvPr id="5" name="Footer Placeholder 4"/>
-          <p:cNvSpPr>
-            <a:spLocks noGrp="1"/>
-          </p:cNvSpPr>
-          <p:nvPr>
-            <p:ph type="ftr" sz="quarter" idx="11"/>
-          </p:nvPr>
-        </p:nvSpPr>
-        <p:spPr/>
-        <p:txBody>
-          <a:bodyPr/>
-          <a:lstStyle/>
-          <a:p>
-            <a:endParaRPr lang="en-US" dirty="0"/>
-          </a:p>
-        </p:txBody>
-      </p:sp>
-      <p:sp>
-        <p:nvSpPr>
-          <p:cNvPr id="6" name="Slide Number Placeholder 5"/>
-          <p:cNvSpPr>
-            <a:spLocks noGrp="1"/>
-          </p:cNvSpPr>
-          <p:nvPr>
-            <p:ph type="sldNum" sz="quarter" idx="12"/>
-          </p:nvPr>
-        </p:nvSpPr>
-        <p:spPr/>
-        <p:txBody>
-          <a:bodyPr/>
-          <a:lstStyle/>
-          <a:p>
-            <a:fld id="{17E276FA-8F89-B34D-A726-BE3FA1F8DD97}" type="slidenum">
-              <a:rPr lang="en-US" smtClean="0"/>
-              <a:t>17</a:t>
-            </a:fld>
-            <a:endParaRPr lang="en-US" dirty="0"/>
-          </a:p>
-        </p:txBody>
-      </p:sp>
-    </p:spTree>
-    <p:extLst>
-      <p:ext uri="{BB962C8B-B14F-4D97-AF65-F5344CB8AC3E}">
-        <p14:creationId xmlns:p14="http://schemas.microsoft.com/office/powerpoint/2010/main" val="2240654708"/>
-      </p:ext>
-    </p:extLst>
-  </p:cSld>
-  <p:clrMapOvr>
-    <a:masterClrMapping/>
-  </p:clrMapOvr>
-  <p:timing>
-    <p:tnLst>
-      <p:par>
-        <p:cTn xmlns:p14="http://schemas.microsoft.com/office/powerpoint/2010/main" id="1" dur="indefinite" restart="never" nodeType="tmRoot"/>
-      </p:par>
-    </p:tnLst>
-  </p:timing>
-</p:sld>
-</file>
-
 <file path=ppt/slides/slide18.xml><?xml version="1.0" encoding="utf-8"?>
 <p:sld xmlns:a="http://schemas.openxmlformats.org/drawingml/2006/main" xmlns:r="http://schemas.openxmlformats.org/officeDocument/2006/relationships" xmlns:p="http://schemas.openxmlformats.org/presentationml/2006/main">
   <p:cSld>
@@ -11641,40 +11664,8 @@
             </a:pPr>
             <a:r>
               <a:rPr lang="en-US" dirty="0" smtClean="0"/>
-              <a:t>Completeness</a:t>
-            </a:r>
-          </a:p>
-          <a:p>
-            <a:pPr marL="0" indent="0">
-              <a:buNone/>
-            </a:pPr>
-            <a:r>
-              <a:rPr lang="en-US" dirty="0" err="1" smtClean="0"/>
-              <a:t>Nonredundancy</a:t>
-            </a:r>
-            <a:r>
-              <a:rPr lang="en-US" dirty="0" smtClean="0"/>
-              <a:t> – Age &amp; Birth Date? </a:t>
-            </a:r>
-          </a:p>
-          <a:p>
-            <a:r>
-              <a:rPr lang="en-US" dirty="0" smtClean="0"/>
-              <a:t>Affects space</a:t>
-            </a:r>
-          </a:p>
-          <a:p>
-            <a:r>
-              <a:rPr lang="en-US" dirty="0" smtClean="0"/>
-              <a:t>Affects processing</a:t>
-            </a:r>
-          </a:p>
-          <a:p>
-            <a:r>
-              <a:rPr lang="en-US" dirty="0" smtClean="0"/>
-              <a:t>Affects consistency!! </a:t>
-            </a:r>
-            <a:endParaRPr lang="en-US" dirty="0"/>
+              <a:t>Completeness – does it support all of the data?</a:t>
+            </a:r>
           </a:p>
         </p:txBody>
       </p:sp>
@@ -11695,7 +11686,7 @@
           <a:p>
             <a:fld id="{7053BEFA-1175-F644-B249-7D41D72BD3FF}" type="datetime1">
               <a:rPr lang="en-US" smtClean="0"/>
-              <a:t>1/19/15</a:t>
+              <a:t>1/25/15</a:t>
             </a:fld>
             <a:endParaRPr lang="en-US"/>
           </a:p>
@@ -11746,7 +11737,7 @@
     </p:spTree>
     <p:extLst>
       <p:ext uri="{BB962C8B-B14F-4D97-AF65-F5344CB8AC3E}">
-        <p14:creationId xmlns:p14="http://schemas.microsoft.com/office/powerpoint/2010/main" val="3038058737"/>
+        <p14:creationId xmlns:p14="http://schemas.microsoft.com/office/powerpoint/2010/main" val="2240654708"/>
       </p:ext>
     </p:extLst>
   </p:cSld>
@@ -11834,37 +11825,27 @@
               <a:rPr lang="en-US" dirty="0" err="1" smtClean="0"/>
               <a:t>Nonredundancy</a:t>
             </a:r>
-            <a:endParaRPr lang="en-US" dirty="0" smtClean="0"/>
-          </a:p>
-          <a:p>
-            <a:pPr marL="0" indent="0">
-              <a:buNone/>
-            </a:pPr>
-            <a:r>
-              <a:rPr lang="en-US" dirty="0" smtClean="0"/>
-              <a:t>Enforcement of Rules </a:t>
-            </a:r>
-          </a:p>
-          <a:p>
-            <a:r>
-              <a:rPr lang="en-US" dirty="0" smtClean="0"/>
-              <a:t>Happens across tables by ensuring </a:t>
-            </a:r>
-            <a:r>
-              <a:rPr lang="en-US" i="1" dirty="0" smtClean="0"/>
-              <a:t>e.g. </a:t>
-            </a:r>
-            <a:r>
-              <a:rPr lang="en-US" dirty="0" smtClean="0"/>
-              <a:t>that each dog only has </a:t>
-            </a:r>
-            <a:r>
-              <a:rPr lang="en-US" dirty="0"/>
-              <a:t>2</a:t>
-            </a:r>
-            <a:r>
-              <a:rPr lang="en-US" dirty="0" smtClean="0"/>
-              <a:t> breeds</a:t>
+            <a:r>
+              <a:rPr lang="en-US" dirty="0" smtClean="0"/>
+              <a:t> – Age &amp; Birth Date? </a:t>
+            </a:r>
+          </a:p>
+          <a:p>
+            <a:r>
+              <a:rPr lang="en-US" dirty="0" smtClean="0"/>
+              <a:t>Affects space</a:t>
+            </a:r>
+          </a:p>
+          <a:p>
+            <a:r>
+              <a:rPr lang="en-US" dirty="0" smtClean="0"/>
+              <a:t>Affects processing</a:t>
+            </a:r>
+          </a:p>
+          <a:p>
+            <a:r>
+              <a:rPr lang="en-US" dirty="0" smtClean="0"/>
+              <a:t>Affects consistency!! </a:t>
             </a:r>
             <a:endParaRPr lang="en-US" dirty="0"/>
           </a:p>
@@ -11887,7 +11868,7 @@
           <a:p>
             <a:fld id="{7053BEFA-1175-F644-B249-7D41D72BD3FF}" type="datetime1">
               <a:rPr lang="en-US" smtClean="0"/>
-              <a:t>1/19/15</a:t>
+              <a:t>1/25/15</a:t>
             </a:fld>
             <a:endParaRPr lang="en-US"/>
           </a:p>
@@ -11938,7 +11919,7 @@
     </p:spTree>
     <p:extLst>
       <p:ext uri="{BB962C8B-B14F-4D97-AF65-F5344CB8AC3E}">
-        <p14:creationId xmlns:p14="http://schemas.microsoft.com/office/powerpoint/2010/main" val="3461001942"/>
+        <p14:creationId xmlns:p14="http://schemas.microsoft.com/office/powerpoint/2010/main" val="3038058737"/>
       </p:ext>
     </p:extLst>
   </p:cSld>
@@ -11989,7 +11970,7 @@
           <a:p>
             <a:r>
               <a:rPr lang="en-US" dirty="0" smtClean="0"/>
-              <a:t>What is Data?</a:t>
+              <a:t>Readings Starting up</a:t>
             </a:r>
             <a:endParaRPr lang="en-US" dirty="0"/>
           </a:p>
@@ -12010,7 +11991,64 @@
           <a:bodyPr/>
           <a:lstStyle/>
           <a:p>
-            <a:endParaRPr lang="en-US"/>
+            <a:pPr marL="0" indent="0">
+              <a:buNone/>
+            </a:pPr>
+            <a:r>
+              <a:rPr lang="en-US" dirty="0" smtClean="0"/>
+              <a:t>Optional</a:t>
+            </a:r>
+            <a:r>
+              <a:rPr lang="en-US" dirty="0"/>
+              <a:t>: </a:t>
+            </a:r>
+            <a:r>
+              <a:rPr lang="en-US" dirty="0" err="1"/>
+              <a:t>Stonebraker</a:t>
+            </a:r>
+            <a:r>
+              <a:rPr lang="en-US" dirty="0"/>
+              <a:t> &amp; </a:t>
+            </a:r>
+            <a:r>
+              <a:rPr lang="en-US" dirty="0" err="1"/>
+              <a:t>Hellerstein</a:t>
+            </a:r>
+            <a:r>
+              <a:rPr lang="en-US" dirty="0"/>
+              <a:t>: What Goes Around Comes Around </a:t>
+            </a:r>
+            <a:endParaRPr lang="en-US" dirty="0" smtClean="0"/>
+          </a:p>
+          <a:p>
+            <a:pPr marL="0" indent="0">
+              <a:buNone/>
+            </a:pPr>
+            <a:r>
+              <a:rPr lang="en-US" dirty="0" smtClean="0"/>
+              <a:t>(can be found </a:t>
+            </a:r>
+            <a:r>
+              <a:rPr lang="en-US" dirty="0"/>
+              <a:t>on http://</a:t>
+            </a:r>
+            <a:r>
+              <a:rPr lang="en-US" dirty="0" err="1"/>
+              <a:t>data.cmubi.org</a:t>
+            </a:r>
+            <a:r>
+              <a:rPr lang="en-US" dirty="0"/>
+              <a:t>/</a:t>
+            </a:r>
+            <a:r>
+              <a:rPr lang="en-US" dirty="0" smtClean="0"/>
+              <a:t>calendar; first required reading due next Tuesday. Should discuss </a:t>
+            </a:r>
+            <a:r>
+              <a:rPr lang="en-US" smtClean="0"/>
+              <a:t>on Piazza). </a:t>
+            </a:r>
+            <a:endParaRPr lang="en-US" dirty="0"/>
           </a:p>
         </p:txBody>
       </p:sp>
@@ -12031,7 +12069,7 @@
           <a:p>
             <a:fld id="{7053BEFA-1175-F644-B249-7D41D72BD3FF}" type="datetime1">
               <a:rPr lang="en-US" smtClean="0"/>
-              <a:t>1/19/15</a:t>
+              <a:t>1/25/15</a:t>
             </a:fld>
             <a:endParaRPr lang="en-US"/>
           </a:p>
@@ -12082,20 +12120,13 @@
     </p:spTree>
     <p:extLst>
       <p:ext uri="{BB962C8B-B14F-4D97-AF65-F5344CB8AC3E}">
-        <p14:creationId xmlns:p14="http://schemas.microsoft.com/office/powerpoint/2010/main" val="1405784729"/>
+        <p14:creationId xmlns:p14="http://schemas.microsoft.com/office/powerpoint/2010/main" val="2825193249"/>
       </p:ext>
     </p:extLst>
   </p:cSld>
   <p:clrMapOvr>
     <a:masterClrMapping/>
   </p:clrMapOvr>
-  <p:timing>
-    <p:tnLst>
-      <p:par>
-        <p:cTn xmlns:p14="http://schemas.microsoft.com/office/powerpoint/2010/main" id="1" dur="indefinite" restart="never" nodeType="tmRoot"/>
-      </p:par>
-    </p:tnLst>
-  </p:timing>
 </p:sld>
 </file>
 
@@ -12178,23 +12209,31 @@
             </a:pPr>
             <a:r>
               <a:rPr lang="en-US" dirty="0" smtClean="0"/>
-              <a:t>Enforcement of Rules</a:t>
-            </a:r>
-          </a:p>
-          <a:p>
-            <a:pPr marL="0" indent="0">
-              <a:buNone/>
-            </a:pPr>
-            <a:r>
-              <a:rPr lang="en-US" dirty="0" smtClean="0"/>
-              <a:t>Data Re-usability </a:t>
-            </a:r>
-          </a:p>
-          <a:p>
-            <a:pPr marL="0" indent="0">
-              <a:buNone/>
-            </a:pPr>
-            <a:endParaRPr lang="en-US" dirty="0" smtClean="0"/>
+              <a:t>Enforcement of Rules </a:t>
+            </a:r>
+          </a:p>
+          <a:p>
+            <a:r>
+              <a:rPr lang="en-US" dirty="0" smtClean="0"/>
+              <a:t>Happens across tables by ensuring </a:t>
+            </a:r>
+            <a:r>
+              <a:rPr lang="en-US" i="1" dirty="0" smtClean="0"/>
+              <a:t>e.g. </a:t>
+            </a:r>
+            <a:r>
+              <a:rPr lang="en-US" dirty="0" smtClean="0"/>
+              <a:t>that each dog only has </a:t>
+            </a:r>
+            <a:r>
+              <a:rPr lang="en-US" dirty="0"/>
+              <a:t>2</a:t>
+            </a:r>
+            <a:r>
+              <a:rPr lang="en-US" dirty="0" smtClean="0"/>
+              <a:t> breeds</a:t>
+            </a:r>
+            <a:endParaRPr lang="en-US" dirty="0"/>
           </a:p>
         </p:txBody>
       </p:sp>
@@ -12215,7 +12254,7 @@
           <a:p>
             <a:fld id="{7053BEFA-1175-F644-B249-7D41D72BD3FF}" type="datetime1">
               <a:rPr lang="en-US" smtClean="0"/>
-              <a:t>1/19/15</a:t>
+              <a:t>1/25/15</a:t>
             </a:fld>
             <a:endParaRPr lang="en-US"/>
           </a:p>
@@ -12266,7 +12305,7 @@
     </p:spTree>
     <p:extLst>
       <p:ext uri="{BB962C8B-B14F-4D97-AF65-F5344CB8AC3E}">
-        <p14:creationId xmlns:p14="http://schemas.microsoft.com/office/powerpoint/2010/main" val="2092762484"/>
+        <p14:creationId xmlns:p14="http://schemas.microsoft.com/office/powerpoint/2010/main" val="3461001942"/>
       </p:ext>
     </p:extLst>
   </p:cSld>
@@ -12378,27 +12417,6 @@
             <a:pPr marL="0" indent="0">
               <a:buNone/>
             </a:pPr>
-            <a:r>
-              <a:rPr lang="en-US" dirty="0" smtClean="0"/>
-              <a:t>Stability &amp; Flexibility</a:t>
-            </a:r>
-          </a:p>
-          <a:p>
-            <a:r>
-              <a:rPr lang="en-US" dirty="0" smtClean="0"/>
-              <a:t>Dog breeds in a separate table allows for adding the concept of “mixed” breeds</a:t>
-            </a:r>
-          </a:p>
-          <a:p>
-            <a:r>
-              <a:rPr lang="en-US" dirty="0" smtClean="0"/>
-              <a:t>But adding many breeds is awkward (how many columns?) -&gt; a new table </a:t>
-            </a:r>
-          </a:p>
-          <a:p>
-            <a:pPr marL="0" indent="0">
-              <a:buNone/>
-            </a:pPr>
             <a:endParaRPr lang="en-US" dirty="0" smtClean="0"/>
           </a:p>
         </p:txBody>
@@ -12420,7 +12438,7 @@
           <a:p>
             <a:fld id="{7053BEFA-1175-F644-B249-7D41D72BD3FF}" type="datetime1">
               <a:rPr lang="en-US" smtClean="0"/>
-              <a:t>1/19/15</a:t>
+              <a:t>1/25/15</a:t>
             </a:fld>
             <a:endParaRPr lang="en-US"/>
           </a:p>
@@ -12471,7 +12489,7 @@
     </p:spTree>
     <p:extLst>
       <p:ext uri="{BB962C8B-B14F-4D97-AF65-F5344CB8AC3E}">
-        <p14:creationId xmlns:p14="http://schemas.microsoft.com/office/powerpoint/2010/main" val="319541556"/>
+        <p14:creationId xmlns:p14="http://schemas.microsoft.com/office/powerpoint/2010/main" val="2092762484"/>
       </p:ext>
     </p:extLst>
   </p:cSld>
@@ -12589,12 +12607,15 @@
             </a:r>
           </a:p>
           <a:p>
-            <a:pPr marL="0" indent="0">
-              <a:buNone/>
-            </a:pPr>
-            <a:r>
-              <a:rPr lang="en-US" dirty="0" smtClean="0"/>
-              <a:t>Elegance -&gt; neat &amp; simple &amp; appropriate</a:t>
+            <a:r>
+              <a:rPr lang="en-US" dirty="0" smtClean="0"/>
+              <a:t>Dog breeds in a separate table allows for adding the concept of “mixed” breeds</a:t>
+            </a:r>
+          </a:p>
+          <a:p>
+            <a:r>
+              <a:rPr lang="en-US" dirty="0" smtClean="0"/>
+              <a:t>But adding many breeds is awkward (how many columns?) -&gt; a new table </a:t>
             </a:r>
           </a:p>
           <a:p>
@@ -12622,7 +12643,7 @@
           <a:p>
             <a:fld id="{7053BEFA-1175-F644-B249-7D41D72BD3FF}" type="datetime1">
               <a:rPr lang="en-US" smtClean="0"/>
-              <a:t>1/19/15</a:t>
+              <a:t>1/25/15</a:t>
             </a:fld>
             <a:endParaRPr lang="en-US"/>
           </a:p>
@@ -12673,7 +12694,7 @@
     </p:spTree>
     <p:extLst>
       <p:ext uri="{BB962C8B-B14F-4D97-AF65-F5344CB8AC3E}">
-        <p14:creationId xmlns:p14="http://schemas.microsoft.com/office/powerpoint/2010/main" val="2641636026"/>
+        <p14:creationId xmlns:p14="http://schemas.microsoft.com/office/powerpoint/2010/main" val="319541556"/>
       </p:ext>
     </p:extLst>
   </p:cSld>
@@ -12796,17 +12817,14 @@
             </a:pPr>
             <a:r>
               <a:rPr lang="en-US" dirty="0" smtClean="0"/>
-              <a:t>Elegance </a:t>
+              <a:t>Elegance -&gt; neat &amp; simple &amp; appropriate</a:t>
             </a:r>
           </a:p>
           <a:p>
             <a:pPr marL="0" indent="0">
               <a:buNone/>
             </a:pPr>
-            <a:r>
-              <a:rPr lang="en-US" dirty="0" smtClean="0"/>
-              <a:t>Communication (people again!)</a:t>
-            </a:r>
+            <a:endParaRPr lang="en-US" dirty="0" smtClean="0"/>
           </a:p>
         </p:txBody>
       </p:sp>
@@ -12827,7 +12845,7 @@
           <a:p>
             <a:fld id="{7053BEFA-1175-F644-B249-7D41D72BD3FF}" type="datetime1">
               <a:rPr lang="en-US" smtClean="0"/>
-              <a:t>1/19/15</a:t>
+              <a:t>1/25/15</a:t>
             </a:fld>
             <a:endParaRPr lang="en-US"/>
           </a:p>
@@ -12878,7 +12896,7 @@
     </p:spTree>
     <p:extLst>
       <p:ext uri="{BB962C8B-B14F-4D97-AF65-F5344CB8AC3E}">
-        <p14:creationId xmlns:p14="http://schemas.microsoft.com/office/powerpoint/2010/main" val="1117071535"/>
+        <p14:creationId xmlns:p14="http://schemas.microsoft.com/office/powerpoint/2010/main" val="2641636026"/>
       </p:ext>
     </p:extLst>
   </p:cSld>
@@ -13010,16 +13028,7 @@
             </a:pPr>
             <a:r>
               <a:rPr lang="en-US" dirty="0" smtClean="0"/>
-              <a:t>Communication</a:t>
-            </a:r>
-          </a:p>
-          <a:p>
-            <a:pPr marL="0" indent="0">
-              <a:buNone/>
-            </a:pPr>
-            <a:r>
-              <a:rPr lang="en-US" dirty="0" smtClean="0"/>
-              <a:t>Performance? -&gt; more of a software and hardware issue (ideally)</a:t>
+              <a:t>Communication (people again!)</a:t>
             </a:r>
           </a:p>
         </p:txBody>
@@ -13041,7 +13050,7 @@
           <a:p>
             <a:fld id="{7053BEFA-1175-F644-B249-7D41D72BD3FF}" type="datetime1">
               <a:rPr lang="en-US" smtClean="0"/>
-              <a:t>1/19/15</a:t>
+              <a:t>1/25/15</a:t>
             </a:fld>
             <a:endParaRPr lang="en-US"/>
           </a:p>
@@ -13092,7 +13101,7 @@
     </p:spTree>
     <p:extLst>
       <p:ext uri="{BB962C8B-B14F-4D97-AF65-F5344CB8AC3E}">
-        <p14:creationId xmlns:p14="http://schemas.microsoft.com/office/powerpoint/2010/main" val="3910965864"/>
+        <p14:creationId xmlns:p14="http://schemas.microsoft.com/office/powerpoint/2010/main" val="1117071535"/>
       </p:ext>
     </p:extLst>
   </p:cSld>
@@ -13143,7 +13152,7 @@
           <a:p>
             <a:r>
               <a:rPr lang="en-US" dirty="0" smtClean="0"/>
-              <a:t>What is a Database?</a:t>
+              <a:t>What makes a good data model?</a:t>
             </a:r>
             <a:endParaRPr lang="en-US" dirty="0"/>
           </a:p>
@@ -13169,13 +13178,17 @@
             </a:pPr>
             <a:r>
               <a:rPr lang="en-US" dirty="0" smtClean="0"/>
-              <a:t>Stores Information</a:t>
+              <a:t>Completeness</a:t>
             </a:r>
           </a:p>
           <a:p>
             <a:pPr marL="0" indent="0">
               <a:buNone/>
             </a:pPr>
+            <a:r>
+              <a:rPr lang="en-US" dirty="0" err="1" smtClean="0"/>
+              <a:t>Nonredundancy</a:t>
+            </a:r>
             <a:endParaRPr lang="en-US" dirty="0" smtClean="0"/>
           </a:p>
           <a:p>
@@ -13184,22 +13197,17 @@
             </a:pPr>
             <a:r>
               <a:rPr lang="en-US" dirty="0" smtClean="0"/>
-              <a:t>Separates logical (schema) physical (storage) and control (queries </a:t>
-            </a:r>
-            <a:r>
-              <a:rPr lang="en-US" i="1" dirty="0" smtClean="0"/>
-              <a:t>etc.</a:t>
-            </a:r>
-            <a:r>
-              <a:rPr lang="en-US" dirty="0" smtClean="0"/>
-              <a:t>)</a:t>
+              <a:t>Enforcement of Rules</a:t>
             </a:r>
           </a:p>
           <a:p>
             <a:pPr marL="0" indent="0">
               <a:buNone/>
             </a:pPr>
-            <a:endParaRPr lang="en-US" dirty="0" smtClean="0"/>
+            <a:r>
+              <a:rPr lang="en-US" dirty="0" smtClean="0"/>
+              <a:t>Data Re-usability </a:t>
+            </a:r>
           </a:p>
           <a:p>
             <a:pPr marL="0" indent="0">
@@ -13207,7 +13215,34 @@
             </a:pPr>
             <a:r>
               <a:rPr lang="en-US" dirty="0" smtClean="0"/>
-              <a:t>Other jobs?</a:t>
+              <a:t>Stability &amp; Flexibility</a:t>
+            </a:r>
+          </a:p>
+          <a:p>
+            <a:pPr marL="0" indent="0">
+              <a:buNone/>
+            </a:pPr>
+            <a:r>
+              <a:rPr lang="en-US" dirty="0" smtClean="0"/>
+              <a:t>Elegance </a:t>
+            </a:r>
+          </a:p>
+          <a:p>
+            <a:pPr marL="0" indent="0">
+              <a:buNone/>
+            </a:pPr>
+            <a:r>
+              <a:rPr lang="en-US" dirty="0" smtClean="0"/>
+              <a:t>Communication</a:t>
+            </a:r>
+          </a:p>
+          <a:p>
+            <a:pPr marL="0" indent="0">
+              <a:buNone/>
+            </a:pPr>
+            <a:r>
+              <a:rPr lang="en-US" dirty="0" smtClean="0"/>
+              <a:t>Performance? -&gt; more of a software and hardware issue (ideally)</a:t>
             </a:r>
           </a:p>
         </p:txBody>
@@ -13229,7 +13264,7 @@
           <a:p>
             <a:fld id="{7053BEFA-1175-F644-B249-7D41D72BD3FF}" type="datetime1">
               <a:rPr lang="en-US" smtClean="0"/>
-              <a:t>1/19/15</a:t>
+              <a:t>1/25/15</a:t>
             </a:fld>
             <a:endParaRPr lang="en-US"/>
           </a:p>
@@ -13280,7 +13315,7 @@
     </p:spTree>
     <p:extLst>
       <p:ext uri="{BB962C8B-B14F-4D97-AF65-F5344CB8AC3E}">
-        <p14:creationId xmlns:p14="http://schemas.microsoft.com/office/powerpoint/2010/main" val="99290824"/>
+        <p14:creationId xmlns:p14="http://schemas.microsoft.com/office/powerpoint/2010/main" val="3910965864"/>
       </p:ext>
     </p:extLst>
   </p:cSld>
@@ -13331,7 +13366,7 @@
           <a:p>
             <a:r>
               <a:rPr lang="en-US" dirty="0" smtClean="0"/>
-              <a:t>Query Language (Typically SQL)</a:t>
+              <a:t>What is a Database?</a:t>
             </a:r>
             <a:endParaRPr lang="en-US" dirty="0"/>
           </a:p>
@@ -13357,9 +13392,46 @@
             </a:pPr>
             <a:r>
               <a:rPr lang="en-US" dirty="0" smtClean="0"/>
-              <a:t>Structured language, very widely adopted</a:t>
-            </a:r>
-            <a:endParaRPr lang="en-US" dirty="0"/>
+              <a:t>Stores Information</a:t>
+            </a:r>
+          </a:p>
+          <a:p>
+            <a:pPr marL="0" indent="0">
+              <a:buNone/>
+            </a:pPr>
+            <a:endParaRPr lang="en-US" dirty="0" smtClean="0"/>
+          </a:p>
+          <a:p>
+            <a:pPr marL="0" indent="0">
+              <a:buNone/>
+            </a:pPr>
+            <a:r>
+              <a:rPr lang="en-US" dirty="0" smtClean="0"/>
+              <a:t>Separates logical (schema) physical (storage) and control (queries </a:t>
+            </a:r>
+            <a:r>
+              <a:rPr lang="en-US" i="1" dirty="0" smtClean="0"/>
+              <a:t>etc.</a:t>
+            </a:r>
+            <a:r>
+              <a:rPr lang="en-US" dirty="0" smtClean="0"/>
+              <a:t>)</a:t>
+            </a:r>
+          </a:p>
+          <a:p>
+            <a:pPr marL="0" indent="0">
+              <a:buNone/>
+            </a:pPr>
+            <a:endParaRPr lang="en-US" dirty="0" smtClean="0"/>
+          </a:p>
+          <a:p>
+            <a:pPr marL="0" indent="0">
+              <a:buNone/>
+            </a:pPr>
+            <a:r>
+              <a:rPr lang="en-US" dirty="0" smtClean="0"/>
+              <a:t>Other jobs?</a:t>
+            </a:r>
           </a:p>
         </p:txBody>
       </p:sp>
@@ -13380,7 +13452,7 @@
           <a:p>
             <a:fld id="{7053BEFA-1175-F644-B249-7D41D72BD3FF}" type="datetime1">
               <a:rPr lang="en-US" smtClean="0"/>
-              <a:t>1/19/15</a:t>
+              <a:t>1/25/15</a:t>
             </a:fld>
             <a:endParaRPr lang="en-US"/>
           </a:p>
@@ -13431,7 +13503,7 @@
     </p:spTree>
     <p:extLst>
       <p:ext uri="{BB962C8B-B14F-4D97-AF65-F5344CB8AC3E}">
-        <p14:creationId xmlns:p14="http://schemas.microsoft.com/office/powerpoint/2010/main" val="4275976873"/>
+        <p14:creationId xmlns:p14="http://schemas.microsoft.com/office/powerpoint/2010/main" val="99290824"/>
       </p:ext>
     </p:extLst>
   </p:cSld>
@@ -13482,7 +13554,7 @@
           <a:p>
             <a:r>
               <a:rPr lang="en-US" dirty="0" smtClean="0"/>
-              <a:t>Implementation Issues</a:t>
+              <a:t>Query Language (Typically SQL)</a:t>
             </a:r>
             <a:endParaRPr lang="en-US" dirty="0"/>
           </a:p>
@@ -13507,64 +13579,9 @@
               <a:buNone/>
             </a:pPr>
             <a:r>
-              <a:rPr lang="en-US" dirty="0"/>
-              <a:t>Schema design affects the kinds of queries we can ask </a:t>
-            </a:r>
-            <a:r>
-              <a:rPr lang="en-US" dirty="0" smtClean="0"/>
-              <a:t>efficiently</a:t>
-            </a:r>
-          </a:p>
-          <a:p>
-            <a:pPr marL="0" indent="0">
-              <a:buNone/>
-            </a:pPr>
-            <a:r>
-              <a:rPr lang="en-US" dirty="0" smtClean="0"/>
-              <a:t>So may the underlying engine</a:t>
-            </a:r>
-          </a:p>
-          <a:p>
-            <a:pPr lvl="1"/>
-            <a:r>
-              <a:rPr lang="en-US" dirty="0"/>
-              <a:t>Ability to handle big data (</a:t>
-            </a:r>
-            <a:r>
-              <a:rPr lang="en-US" i="1" dirty="0"/>
-              <a:t>e.g. </a:t>
-            </a:r>
-            <a:r>
-              <a:rPr lang="en-US" i="1" dirty="0" err="1"/>
-              <a:t>mongodb</a:t>
-            </a:r>
-            <a:r>
-              <a:rPr lang="en-US" dirty="0"/>
-              <a:t>) </a:t>
-            </a:r>
-          </a:p>
-          <a:p>
-            <a:pPr lvl="1"/>
-            <a:r>
-              <a:rPr lang="en-US" dirty="0" err="1"/>
-              <a:t>Debuggability</a:t>
-            </a:r>
-            <a:endParaRPr lang="en-US" dirty="0"/>
-          </a:p>
-          <a:p>
-            <a:pPr lvl="1"/>
-            <a:r>
-              <a:rPr lang="en-US" dirty="0"/>
-              <a:t>Accessibility of raw data </a:t>
-            </a:r>
-          </a:p>
-          <a:p>
-            <a:pPr marL="0" indent="0">
-              <a:buNone/>
-            </a:pPr>
-            <a:endParaRPr lang="en-US" dirty="0" smtClean="0"/>
-          </a:p>
-          <a:p>
+              <a:rPr lang="en-US" dirty="0" smtClean="0"/>
+              <a:t>Structured language, very widely adopted</a:t>
+            </a:r>
             <a:endParaRPr lang="en-US" dirty="0"/>
           </a:p>
         </p:txBody>
@@ -13586,7 +13603,7 @@
           <a:p>
             <a:fld id="{7053BEFA-1175-F644-B249-7D41D72BD3FF}" type="datetime1">
               <a:rPr lang="en-US" smtClean="0"/>
-              <a:t>1/19/15</a:t>
+              <a:t>1/25/15</a:t>
             </a:fld>
             <a:endParaRPr lang="en-US"/>
           </a:p>
@@ -13637,7 +13654,7 @@
     </p:spTree>
     <p:extLst>
       <p:ext uri="{BB962C8B-B14F-4D97-AF65-F5344CB8AC3E}">
-        <p14:creationId xmlns:p14="http://schemas.microsoft.com/office/powerpoint/2010/main" val="401190124"/>
+        <p14:creationId xmlns:p14="http://schemas.microsoft.com/office/powerpoint/2010/main" val="4275976873"/>
       </p:ext>
     </p:extLst>
   </p:cSld>
@@ -13688,7 +13705,7 @@
           <a:p>
             <a:r>
               <a:rPr lang="en-US" dirty="0" smtClean="0"/>
-              <a:t>Special Kinds of Data</a:t>
+              <a:t>Implementation Issues</a:t>
             </a:r>
             <a:endParaRPr lang="en-US" dirty="0"/>
           </a:p>
@@ -13713,8 +13730,12 @@
               <a:buNone/>
             </a:pPr>
             <a:r>
-              <a:rPr lang="en-US" dirty="0" smtClean="0"/>
-              <a:t>Uncertain Data </a:t>
+              <a:rPr lang="en-US" dirty="0"/>
+              <a:t>Schema design affects the kinds of queries we can ask </a:t>
+            </a:r>
+            <a:r>
+              <a:rPr lang="en-US" dirty="0" smtClean="0"/>
+              <a:t>efficiently</a:t>
             </a:r>
           </a:p>
           <a:p>
@@ -13723,14 +13744,42 @@
             </a:pPr>
             <a:r>
               <a:rPr lang="en-US" dirty="0" smtClean="0"/>
-              <a:t>Spatial Data </a:t>
-            </a:r>
-          </a:p>
-          <a:p>
-            <a:pPr marL="0" indent="0">
-              <a:buNone/>
-            </a:pPr>
-            <a:endParaRPr lang="en-US" dirty="0"/>
+              <a:t>So may the underlying engine</a:t>
+            </a:r>
+          </a:p>
+          <a:p>
+            <a:pPr lvl="1"/>
+            <a:r>
+              <a:rPr lang="en-US" dirty="0"/>
+              <a:t>Ability to handle big data (</a:t>
+            </a:r>
+            <a:r>
+              <a:rPr lang="en-US" i="1" dirty="0"/>
+              <a:t>e.g. </a:t>
+            </a:r>
+            <a:r>
+              <a:rPr lang="en-US" i="1" dirty="0" err="1"/>
+              <a:t>mongodb</a:t>
+            </a:r>
+            <a:r>
+              <a:rPr lang="en-US" dirty="0"/>
+              <a:t>) </a:t>
+            </a:r>
+          </a:p>
+          <a:p>
+            <a:pPr lvl="1"/>
+            <a:r>
+              <a:rPr lang="en-US" dirty="0" err="1"/>
+              <a:t>Debuggability</a:t>
+            </a:r>
+            <a:endParaRPr lang="en-US" dirty="0"/>
+          </a:p>
+          <a:p>
+            <a:pPr lvl="1"/>
+            <a:r>
+              <a:rPr lang="en-US" dirty="0"/>
+              <a:t>Accessibility of raw data </a:t>
+            </a:r>
           </a:p>
           <a:p>
             <a:pPr marL="0" indent="0">
@@ -13739,13 +13788,7 @@
             <a:endParaRPr lang="en-US" dirty="0" smtClean="0"/>
           </a:p>
           <a:p>
-            <a:pPr marL="0" indent="0">
-              <a:buNone/>
-            </a:pPr>
-            <a:r>
-              <a:rPr lang="en-US" dirty="0" smtClean="0"/>
-              <a:t>Pair off: Have you ever used either kind of data? Come up with an example</a:t>
-            </a:r>
+            <a:endParaRPr lang="en-US" dirty="0"/>
           </a:p>
         </p:txBody>
       </p:sp>
@@ -13766,7 +13809,7 @@
           <a:p>
             <a:fld id="{7053BEFA-1175-F644-B249-7D41D72BD3FF}" type="datetime1">
               <a:rPr lang="en-US" smtClean="0"/>
-              <a:t>1/19/15</a:t>
+              <a:t>1/25/15</a:t>
             </a:fld>
             <a:endParaRPr lang="en-US"/>
           </a:p>
@@ -13817,7 +13860,7 @@
     </p:spTree>
     <p:extLst>
       <p:ext uri="{BB962C8B-B14F-4D97-AF65-F5344CB8AC3E}">
-        <p14:creationId xmlns:p14="http://schemas.microsoft.com/office/powerpoint/2010/main" val="1017482662"/>
+        <p14:creationId xmlns:p14="http://schemas.microsoft.com/office/powerpoint/2010/main" val="401190124"/>
       </p:ext>
     </p:extLst>
   </p:cSld>
@@ -13868,7 +13911,7 @@
           <a:p>
             <a:r>
               <a:rPr lang="en-US" dirty="0" smtClean="0"/>
-              <a:t>Spatial Data</a:t>
+              <a:t>Special Kinds of Data</a:t>
             </a:r>
             <a:endParaRPr lang="en-US" dirty="0"/>
           </a:p>
@@ -13889,82 +13932,42 @@
           <a:bodyPr/>
           <a:lstStyle/>
           <a:p>
-            <a:pPr marL="228600" lvl="1" indent="0">
-              <a:lnSpc>
-                <a:spcPct val="150000"/>
-              </a:lnSpc>
+            <a:pPr marL="0" indent="0">
               <a:buNone/>
             </a:pPr>
             <a:r>
-              <a:rPr lang="en-US" sz="2400" dirty="0" smtClean="0"/>
-              <a:t>Census </a:t>
-            </a:r>
-            <a:r>
-              <a:rPr lang="en-US" sz="2400" dirty="0"/>
-              <a:t>Data</a:t>
-            </a:r>
-          </a:p>
-          <a:p>
-            <a:pPr marL="228600" lvl="1" indent="0">
-              <a:lnSpc>
-                <a:spcPct val="150000"/>
-              </a:lnSpc>
+              <a:rPr lang="en-US" dirty="0" smtClean="0"/>
+              <a:t>Uncertain Data </a:t>
+            </a:r>
+          </a:p>
+          <a:p>
+            <a:pPr marL="0" indent="0">
               <a:buNone/>
             </a:pPr>
             <a:r>
-              <a:rPr lang="en-US" sz="2400" dirty="0"/>
-              <a:t>Climate Data </a:t>
-            </a:r>
-          </a:p>
-          <a:p>
-            <a:pPr marL="228600" lvl="1" indent="0">
-              <a:lnSpc>
-                <a:spcPct val="150000"/>
-              </a:lnSpc>
+              <a:rPr lang="en-US" dirty="0" smtClean="0"/>
+              <a:t>Spatial Data </a:t>
+            </a:r>
+          </a:p>
+          <a:p>
+            <a:pPr marL="0" indent="0">
               <a:buNone/>
             </a:pPr>
-            <a:r>
-              <a:rPr lang="en-US" sz="2400" dirty="0"/>
-              <a:t>Satellite Images</a:t>
-            </a:r>
-          </a:p>
-          <a:p>
-            <a:pPr marL="228600" lvl="1" indent="0">
-              <a:lnSpc>
-                <a:spcPct val="150000"/>
-              </a:lnSpc>
+            <a:endParaRPr lang="en-US" dirty="0"/>
+          </a:p>
+          <a:p>
+            <a:pPr marL="0" indent="0">
               <a:buNone/>
             </a:pPr>
-            <a:r>
-              <a:rPr lang="en-US" sz="2400" dirty="0"/>
-              <a:t>Byte 2 Data </a:t>
-            </a:r>
-          </a:p>
-          <a:p>
-            <a:pPr marL="228600" lvl="1" indent="0">
-              <a:lnSpc>
-                <a:spcPct val="150000"/>
-              </a:lnSpc>
+            <a:endParaRPr lang="en-US" dirty="0" smtClean="0"/>
+          </a:p>
+          <a:p>
+            <a:pPr marL="0" indent="0">
               <a:buNone/>
             </a:pPr>
             <a:r>
-              <a:rPr lang="en-US" sz="2400" dirty="0" smtClean="0"/>
-              <a:t>Medical Imaging</a:t>
-            </a:r>
-          </a:p>
-          <a:p>
-            <a:pPr marL="228600" lvl="1" indent="0">
-              <a:buNone/>
-            </a:pPr>
-            <a:endParaRPr lang="en-US" sz="2400" dirty="0"/>
-          </a:p>
-          <a:p>
-            <a:pPr marL="0" indent="0">
-              <a:buNone/>
-            </a:pPr>
-            <a:r>
-              <a:rPr lang="en-US" dirty="0" smtClean="0"/>
-              <a:t> </a:t>
+              <a:rPr lang="en-US" dirty="0" smtClean="0"/>
+              <a:t>Pair off: Have you ever used either kind of data? Come up with an example</a:t>
             </a:r>
           </a:p>
         </p:txBody>
@@ -13986,7 +13989,7 @@
           <a:p>
             <a:fld id="{7053BEFA-1175-F644-B249-7D41D72BD3FF}" type="datetime1">
               <a:rPr lang="en-US" smtClean="0"/>
-              <a:t>1/19/15</a:t>
+              <a:t>1/25/15</a:t>
             </a:fld>
             <a:endParaRPr lang="en-US"/>
           </a:p>
@@ -14037,7 +14040,7 @@
     </p:spTree>
     <p:extLst>
       <p:ext uri="{BB962C8B-B14F-4D97-AF65-F5344CB8AC3E}">
-        <p14:creationId xmlns:p14="http://schemas.microsoft.com/office/powerpoint/2010/main" val="1384093771"/>
+        <p14:creationId xmlns:p14="http://schemas.microsoft.com/office/powerpoint/2010/main" val="1017482662"/>
       </p:ext>
     </p:extLst>
   </p:cSld>
@@ -14088,7 +14091,7 @@
           <a:p>
             <a:r>
               <a:rPr lang="en-US" dirty="0" smtClean="0"/>
-              <a:t>Data Management</a:t>
+              <a:t>What is Data?</a:t>
             </a:r>
             <a:endParaRPr lang="en-US" dirty="0"/>
           </a:p>
@@ -14109,79 +14112,7 @@
           <a:bodyPr/>
           <a:lstStyle/>
           <a:p>
-            <a:pPr marL="0" indent="0">
-              <a:buNone/>
-            </a:pPr>
-            <a:r>
-              <a:rPr lang="en-US" dirty="0"/>
-              <a:t>Information is an organizational resource</a:t>
-            </a:r>
-          </a:p>
-          <a:p>
-            <a:pPr lvl="1"/>
-            <a:r>
-              <a:rPr lang="en-US" dirty="0"/>
-              <a:t>Just like people, capital, and equipment</a:t>
-            </a:r>
-          </a:p>
-          <a:p>
-            <a:pPr lvl="1"/>
-            <a:r>
-              <a:rPr lang="en-US" dirty="0"/>
-              <a:t>It must be managed </a:t>
-            </a:r>
-            <a:r>
-              <a:rPr lang="en-US" dirty="0" smtClean="0"/>
-              <a:t>effectively</a:t>
-            </a:r>
-          </a:p>
-          <a:p>
-            <a:pPr marL="0" indent="0">
-              <a:buNone/>
-            </a:pPr>
-            <a:r>
-              <a:rPr lang="en-US" dirty="0" smtClean="0"/>
-              <a:t>Who should oversee it?</a:t>
-            </a:r>
-          </a:p>
-          <a:p>
-            <a:pPr lvl="1"/>
-            <a:r>
-              <a:rPr lang="en-US" dirty="0" smtClean="0"/>
-              <a:t>Who owns it</a:t>
-            </a:r>
-          </a:p>
-          <a:p>
-            <a:pPr lvl="1"/>
-            <a:r>
-              <a:rPr lang="en-US" dirty="0" smtClean="0"/>
-              <a:t>Who is responsible for the four Cs? (Completeness, Coherence, Correctness, </a:t>
-            </a:r>
-            <a:r>
-              <a:rPr lang="en-US" dirty="0" err="1" smtClean="0"/>
-              <a:t>AcCountability</a:t>
-            </a:r>
-            <a:r>
-              <a:rPr lang="en-US" dirty="0" smtClean="0"/>
-              <a:t>)</a:t>
-            </a:r>
-          </a:p>
-          <a:p>
-            <a:pPr marL="0" indent="0">
-              <a:buNone/>
-            </a:pPr>
-            <a:r>
-              <a:rPr lang="en-US" dirty="0" smtClean="0"/>
-              <a:t>Requires lots of attention, over time, regular checks, </a:t>
-            </a:r>
-            <a:r>
-              <a:rPr lang="en-US" i="1" dirty="0" smtClean="0"/>
-              <a:t>etc.</a:t>
-            </a:r>
-            <a:endParaRPr lang="en-US" dirty="0"/>
-          </a:p>
-          <a:p>
-            <a:endParaRPr lang="en-US" dirty="0"/>
+            <a:endParaRPr lang="en-US"/>
           </a:p>
         </p:txBody>
       </p:sp>
@@ -14202,7 +14133,7 @@
           <a:p>
             <a:fld id="{7053BEFA-1175-F644-B249-7D41D72BD3FF}" type="datetime1">
               <a:rPr lang="en-US" smtClean="0"/>
-              <a:t>1/19/15</a:t>
+              <a:t>1/25/15</a:t>
             </a:fld>
             <a:endParaRPr lang="en-US"/>
           </a:p>
@@ -14253,13 +14184,20 @@
     </p:spTree>
     <p:extLst>
       <p:ext uri="{BB962C8B-B14F-4D97-AF65-F5344CB8AC3E}">
-        <p14:creationId xmlns:p14="http://schemas.microsoft.com/office/powerpoint/2010/main" val="4254068576"/>
+        <p14:creationId xmlns:p14="http://schemas.microsoft.com/office/powerpoint/2010/main" val="1405784729"/>
       </p:ext>
     </p:extLst>
   </p:cSld>
   <p:clrMapOvr>
     <a:masterClrMapping/>
   </p:clrMapOvr>
+  <p:timing>
+    <p:tnLst>
+      <p:par>
+        <p:cTn xmlns:p14="http://schemas.microsoft.com/office/powerpoint/2010/main" id="1" dur="indefinite" restart="never" nodeType="tmRoot"/>
+      </p:par>
+    </p:tnLst>
+  </p:timing>
 </p:sld>
 </file>
 
@@ -14297,7 +14235,7 @@
           <a:p>
             <a:r>
               <a:rPr lang="en-US" dirty="0" smtClean="0"/>
-              <a:t>Questions you could ask?</a:t>
+              <a:t>Spatial Data</a:t>
             </a:r>
             <a:endParaRPr lang="en-US" dirty="0"/>
           </a:p>
@@ -14377,7 +14315,7 @@
               <a:buNone/>
             </a:pPr>
             <a:r>
-              <a:rPr lang="en-US" sz="2400" dirty="0"/>
+              <a:rPr lang="en-US" sz="2400" dirty="0" smtClean="0"/>
               <a:t>Medical Imaging</a:t>
             </a:r>
           </a:p>
@@ -14415,7 +14353,7 @@
           <a:p>
             <a:fld id="{7053BEFA-1175-F644-B249-7D41D72BD3FF}" type="datetime1">
               <a:rPr lang="en-US" smtClean="0"/>
-              <a:t>1/19/15</a:t>
+              <a:t>1/25/15</a:t>
             </a:fld>
             <a:endParaRPr lang="en-US"/>
           </a:p>
@@ -14466,7 +14404,7 @@
     </p:spTree>
     <p:extLst>
       <p:ext uri="{BB962C8B-B14F-4D97-AF65-F5344CB8AC3E}">
-        <p14:creationId xmlns:p14="http://schemas.microsoft.com/office/powerpoint/2010/main" val="2408615049"/>
+        <p14:creationId xmlns:p14="http://schemas.microsoft.com/office/powerpoint/2010/main" val="1384093771"/>
       </p:ext>
     </p:extLst>
   </p:cSld>
@@ -14546,9 +14484,12 @@
             </a:pPr>
             <a:r>
               <a:rPr lang="en-US" sz="2400" dirty="0" smtClean="0"/>
-              <a:t>Census Data</a:t>
-            </a:r>
-            <a:endParaRPr lang="en-US" sz="2400" dirty="0"/>
+              <a:t>Census </a:t>
+            </a:r>
+            <a:r>
+              <a:rPr lang="en-US" sz="2400" dirty="0"/>
+              <a:t>Data</a:t>
+            </a:r>
           </a:p>
           <a:p>
             <a:pPr marL="228600" lvl="1" indent="0">
@@ -14632,7 +14573,7 @@
           <a:p>
             <a:fld id="{7053BEFA-1175-F644-B249-7D41D72BD3FF}" type="datetime1">
               <a:rPr lang="en-US" smtClean="0"/>
-              <a:t>1/19/15</a:t>
+              <a:t>1/25/15</a:t>
             </a:fld>
             <a:endParaRPr lang="en-US"/>
           </a:p>
@@ -14680,111 +14621,23 @@
           </a:p>
         </p:txBody>
       </p:sp>
-      <p:sp>
-        <p:nvSpPr>
-          <p:cNvPr id="7" name="TextBox 6"/>
-          <p:cNvSpPr txBox="1"/>
-          <p:nvPr/>
-        </p:nvSpPr>
-        <p:spPr>
-          <a:xfrm>
-            <a:off x="4220977" y="4578976"/>
-            <a:ext cx="4057140" cy="1477328"/>
-          </a:xfrm>
-          <a:prstGeom prst="rect">
-            <a:avLst/>
-          </a:prstGeom>
-          <a:noFill/>
-        </p:spPr>
-        <p:txBody>
-          <a:bodyPr wrap="square" rtlCol="0">
-            <a:spAutoFit/>
-          </a:bodyPr>
-          <a:lstStyle/>
-          <a:p>
-            <a:r>
-              <a:rPr lang="en-US" dirty="0"/>
-              <a:t>Based on this patient's  MRI,  have we treated somebody with a similar condition ?</a:t>
-            </a:r>
-          </a:p>
-          <a:p>
-            <a:endParaRPr lang="en-US" dirty="0"/>
-          </a:p>
-          <a:p>
-            <a:endParaRPr lang="en-US" dirty="0"/>
-          </a:p>
-        </p:txBody>
-      </p:sp>
-      <p:sp>
-        <p:nvSpPr>
-          <p:cNvPr id="8" name="TextBox 7"/>
-          <p:cNvSpPr txBox="1"/>
-          <p:nvPr/>
-        </p:nvSpPr>
-        <p:spPr>
-          <a:xfrm>
-            <a:off x="4219698" y="3948781"/>
-            <a:ext cx="4057140" cy="646331"/>
-          </a:xfrm>
-          <a:prstGeom prst="rect">
-            <a:avLst/>
-          </a:prstGeom>
-          <a:noFill/>
-        </p:spPr>
-        <p:txBody>
-          <a:bodyPr wrap="square" rtlCol="0">
-            <a:spAutoFit/>
-          </a:bodyPr>
-          <a:lstStyle/>
-          <a:p>
-            <a:r>
-              <a:rPr lang="en-US" dirty="0" smtClean="0"/>
-              <a:t>Are certain breeds found more commonly in urban areas?</a:t>
-            </a:r>
-            <a:endParaRPr lang="en-US" dirty="0"/>
-          </a:p>
-        </p:txBody>
-      </p:sp>
-      <p:sp>
-        <p:nvSpPr>
-          <p:cNvPr id="9" name="TextBox 8"/>
-          <p:cNvSpPr txBox="1"/>
-          <p:nvPr/>
-        </p:nvSpPr>
-        <p:spPr>
-          <a:xfrm>
-            <a:off x="4238617" y="3253808"/>
-            <a:ext cx="4057140" cy="646331"/>
-          </a:xfrm>
-          <a:prstGeom prst="rect">
-            <a:avLst/>
-          </a:prstGeom>
-          <a:noFill/>
-        </p:spPr>
-        <p:txBody>
-          <a:bodyPr wrap="square" rtlCol="0">
-            <a:spAutoFit/>
-          </a:bodyPr>
-          <a:lstStyle/>
-          <a:p>
-            <a:r>
-              <a:rPr lang="en-US" dirty="0" smtClean="0"/>
-              <a:t>How do trees affect the prevalence of Lyme disease?</a:t>
-            </a:r>
-            <a:endParaRPr lang="en-US" dirty="0"/>
-          </a:p>
-        </p:txBody>
-      </p:sp>
     </p:spTree>
     <p:extLst>
       <p:ext uri="{BB962C8B-B14F-4D97-AF65-F5344CB8AC3E}">
-        <p14:creationId xmlns:p14="http://schemas.microsoft.com/office/powerpoint/2010/main" val="3702149012"/>
+        <p14:creationId xmlns:p14="http://schemas.microsoft.com/office/powerpoint/2010/main" val="2408615049"/>
       </p:ext>
     </p:extLst>
   </p:cSld>
   <p:clrMapOvr>
     <a:masterClrMapping/>
   </p:clrMapOvr>
+  <p:timing>
+    <p:tnLst>
+      <p:par>
+        <p:cTn xmlns:p14="http://schemas.microsoft.com/office/powerpoint/2010/main" id="1" dur="indefinite" restart="never" nodeType="tmRoot"/>
+      </p:par>
+    </p:tnLst>
+  </p:timing>
 </p:sld>
 </file>
 
@@ -14822,7 +14675,7 @@
           <a:p>
             <a:r>
               <a:rPr lang="en-US" dirty="0" smtClean="0"/>
-              <a:t>Specialty Tools</a:t>
+              <a:t>Questions you could ask?</a:t>
             </a:r>
             <a:endParaRPr lang="en-US" dirty="0"/>
           </a:p>
@@ -14843,107 +14696,80 @@
           <a:bodyPr/>
           <a:lstStyle/>
           <a:p>
+            <a:pPr marL="228600" lvl="1" indent="0">
+              <a:lnSpc>
+                <a:spcPct val="150000"/>
+              </a:lnSpc>
+              <a:buNone/>
+            </a:pPr>
+            <a:r>
+              <a:rPr lang="en-US" sz="2400" dirty="0" smtClean="0"/>
+              <a:t>Census Data</a:t>
+            </a:r>
+            <a:endParaRPr lang="en-US" sz="2400" dirty="0"/>
+          </a:p>
+          <a:p>
+            <a:pPr marL="228600" lvl="1" indent="0">
+              <a:lnSpc>
+                <a:spcPct val="150000"/>
+              </a:lnSpc>
+              <a:buNone/>
+            </a:pPr>
+            <a:r>
+              <a:rPr lang="en-US" sz="2400" dirty="0"/>
+              <a:t>Climate Data </a:t>
+            </a:r>
+          </a:p>
+          <a:p>
+            <a:pPr marL="228600" lvl="1" indent="0">
+              <a:lnSpc>
+                <a:spcPct val="150000"/>
+              </a:lnSpc>
+              <a:buNone/>
+            </a:pPr>
+            <a:r>
+              <a:rPr lang="en-US" sz="2400" dirty="0"/>
+              <a:t>Satellite Images</a:t>
+            </a:r>
+          </a:p>
+          <a:p>
+            <a:pPr marL="228600" lvl="1" indent="0">
+              <a:lnSpc>
+                <a:spcPct val="150000"/>
+              </a:lnSpc>
+              <a:buNone/>
+            </a:pPr>
+            <a:r>
+              <a:rPr lang="en-US" sz="2400" dirty="0"/>
+              <a:t>Byte 2 Data </a:t>
+            </a:r>
+          </a:p>
+          <a:p>
+            <a:pPr marL="228600" lvl="1" indent="0">
+              <a:lnSpc>
+                <a:spcPct val="150000"/>
+              </a:lnSpc>
+              <a:buNone/>
+            </a:pPr>
+            <a:r>
+              <a:rPr lang="en-US" sz="2400" dirty="0"/>
+              <a:t>Medical Imaging</a:t>
+            </a:r>
+          </a:p>
+          <a:p>
+            <a:pPr marL="228600" lvl="1" indent="0">
+              <a:buNone/>
+            </a:pPr>
+            <a:endParaRPr lang="en-US" sz="2400" dirty="0"/>
+          </a:p>
+          <a:p>
             <a:pPr marL="0" indent="0">
               <a:buNone/>
             </a:pPr>
             <a:r>
               <a:rPr lang="en-US" dirty="0" smtClean="0"/>
-              <a:t>Uncertain Data (</a:t>
-            </a:r>
-            <a:r>
-              <a:rPr lang="en-US" i="1" dirty="0" smtClean="0"/>
-              <a:t>e.g., </a:t>
-            </a:r>
-            <a:r>
-              <a:rPr lang="en-US" dirty="0" smtClean="0"/>
-              <a:t>TRIO)</a:t>
-            </a:r>
-          </a:p>
-          <a:p>
-            <a:pPr lvl="1"/>
-            <a:r>
-              <a:rPr lang="en-US" dirty="0" smtClean="0"/>
-              <a:t>Confidence</a:t>
-            </a:r>
-          </a:p>
-          <a:p>
-            <a:pPr lvl="1"/>
-            <a:r>
-              <a:rPr lang="en-US" dirty="0" smtClean="0"/>
-              <a:t>Lineage</a:t>
-            </a:r>
-          </a:p>
-          <a:p>
-            <a:pPr marL="0" indent="0">
-              <a:buNone/>
-            </a:pPr>
-            <a:r>
-              <a:rPr lang="en-US" dirty="0" smtClean="0"/>
-              <a:t>Spatial Data </a:t>
-            </a:r>
-          </a:p>
-          <a:p>
-            <a:pPr lvl="1"/>
-            <a:r>
-              <a:rPr lang="en-US" dirty="0" smtClean="0"/>
-              <a:t>Polyline support (describe a region)</a:t>
-            </a:r>
-          </a:p>
-          <a:p>
-            <a:pPr lvl="1"/>
-            <a:r>
-              <a:rPr lang="en-US" dirty="0" smtClean="0"/>
-              <a:t>Hierarchy of space (building with floors, rooms, </a:t>
-            </a:r>
-            <a:r>
-              <a:rPr lang="en-US" i="1" dirty="0" smtClean="0"/>
-              <a:t>etc.</a:t>
-            </a:r>
-            <a:r>
-              <a:rPr lang="en-US" dirty="0" smtClean="0"/>
-              <a:t>)</a:t>
-            </a:r>
-          </a:p>
-          <a:p>
-            <a:pPr lvl="1"/>
-            <a:r>
-              <a:rPr lang="en-US" dirty="0" smtClean="0"/>
-              <a:t>Search based on 2d relationship</a:t>
-            </a:r>
-          </a:p>
-          <a:p>
-            <a:pPr lvl="1"/>
-            <a:r>
-              <a:rPr lang="en-US" dirty="0" smtClean="0"/>
-              <a:t>Calculate area</a:t>
-            </a:r>
-          </a:p>
-          <a:p>
-            <a:pPr lvl="1"/>
-            <a:r>
-              <a:rPr lang="en-US" dirty="0" smtClean="0"/>
-              <a:t>Model data in space (</a:t>
-            </a:r>
-            <a:r>
-              <a:rPr lang="en-US" i="1" dirty="0" smtClean="0"/>
-              <a:t>e.g. </a:t>
-            </a:r>
-            <a:r>
-              <a:rPr lang="en-US" dirty="0" smtClean="0"/>
-              <a:t>things may move)</a:t>
-            </a:r>
-          </a:p>
-          <a:p>
-            <a:pPr marL="0" indent="0">
-              <a:buNone/>
-            </a:pPr>
-            <a:endParaRPr lang="en-US" dirty="0"/>
-          </a:p>
-          <a:p>
-            <a:pPr marL="0" indent="0">
-              <a:buNone/>
-            </a:pPr>
-            <a:endParaRPr lang="en-US" dirty="0" smtClean="0"/>
+              <a:t> </a:t>
+            </a:r>
           </a:p>
         </p:txBody>
       </p:sp>
@@ -14964,7 +14790,7 @@
           <a:p>
             <a:fld id="{7053BEFA-1175-F644-B249-7D41D72BD3FF}" type="datetime1">
               <a:rPr lang="en-US" smtClean="0"/>
-              <a:t>1/19/15</a:t>
+              <a:t>1/25/15</a:t>
             </a:fld>
             <a:endParaRPr lang="en-US"/>
           </a:p>
@@ -15007,6 +14833,338 @@
             <a:fld id="{17E276FA-8F89-B34D-A726-BE3FA1F8DD97}" type="slidenum">
               <a:rPr lang="en-US" smtClean="0"/>
               <a:t>32</a:t>
+            </a:fld>
+            <a:endParaRPr lang="en-US" dirty="0"/>
+          </a:p>
+        </p:txBody>
+      </p:sp>
+      <p:sp>
+        <p:nvSpPr>
+          <p:cNvPr id="7" name="TextBox 6"/>
+          <p:cNvSpPr txBox="1"/>
+          <p:nvPr/>
+        </p:nvSpPr>
+        <p:spPr>
+          <a:xfrm>
+            <a:off x="4220977" y="4578976"/>
+            <a:ext cx="4057140" cy="1477328"/>
+          </a:xfrm>
+          <a:prstGeom prst="rect">
+            <a:avLst/>
+          </a:prstGeom>
+          <a:noFill/>
+        </p:spPr>
+        <p:txBody>
+          <a:bodyPr wrap="square" rtlCol="0">
+            <a:spAutoFit/>
+          </a:bodyPr>
+          <a:lstStyle/>
+          <a:p>
+            <a:r>
+              <a:rPr lang="en-US" dirty="0"/>
+              <a:t>Based on this patient's  MRI,  have we treated somebody with a similar condition ?</a:t>
+            </a:r>
+          </a:p>
+          <a:p>
+            <a:endParaRPr lang="en-US" dirty="0"/>
+          </a:p>
+          <a:p>
+            <a:endParaRPr lang="en-US" dirty="0"/>
+          </a:p>
+        </p:txBody>
+      </p:sp>
+      <p:sp>
+        <p:nvSpPr>
+          <p:cNvPr id="8" name="TextBox 7"/>
+          <p:cNvSpPr txBox="1"/>
+          <p:nvPr/>
+        </p:nvSpPr>
+        <p:spPr>
+          <a:xfrm>
+            <a:off x="4219698" y="3948781"/>
+            <a:ext cx="4057140" cy="646331"/>
+          </a:xfrm>
+          <a:prstGeom prst="rect">
+            <a:avLst/>
+          </a:prstGeom>
+          <a:noFill/>
+        </p:spPr>
+        <p:txBody>
+          <a:bodyPr wrap="square" rtlCol="0">
+            <a:spAutoFit/>
+          </a:bodyPr>
+          <a:lstStyle/>
+          <a:p>
+            <a:r>
+              <a:rPr lang="en-US" dirty="0" smtClean="0"/>
+              <a:t>Are certain breeds found more commonly in urban areas?</a:t>
+            </a:r>
+            <a:endParaRPr lang="en-US" dirty="0"/>
+          </a:p>
+        </p:txBody>
+      </p:sp>
+      <p:sp>
+        <p:nvSpPr>
+          <p:cNvPr id="9" name="TextBox 8"/>
+          <p:cNvSpPr txBox="1"/>
+          <p:nvPr/>
+        </p:nvSpPr>
+        <p:spPr>
+          <a:xfrm>
+            <a:off x="4238617" y="3253808"/>
+            <a:ext cx="4057140" cy="646331"/>
+          </a:xfrm>
+          <a:prstGeom prst="rect">
+            <a:avLst/>
+          </a:prstGeom>
+          <a:noFill/>
+        </p:spPr>
+        <p:txBody>
+          <a:bodyPr wrap="square" rtlCol="0">
+            <a:spAutoFit/>
+          </a:bodyPr>
+          <a:lstStyle/>
+          <a:p>
+            <a:r>
+              <a:rPr lang="en-US" dirty="0" smtClean="0"/>
+              <a:t>How do trees affect the prevalence of Lyme disease?</a:t>
+            </a:r>
+            <a:endParaRPr lang="en-US" dirty="0"/>
+          </a:p>
+        </p:txBody>
+      </p:sp>
+    </p:spTree>
+    <p:extLst>
+      <p:ext uri="{BB962C8B-B14F-4D97-AF65-F5344CB8AC3E}">
+        <p14:creationId xmlns:p14="http://schemas.microsoft.com/office/powerpoint/2010/main" val="3702149012"/>
+      </p:ext>
+    </p:extLst>
+  </p:cSld>
+  <p:clrMapOvr>
+    <a:masterClrMapping/>
+  </p:clrMapOvr>
+</p:sld>
+</file>
+
+<file path=ppt/slides/slide33.xml><?xml version="1.0" encoding="utf-8"?>
+<p:sld xmlns:a="http://schemas.openxmlformats.org/drawingml/2006/main" xmlns:r="http://schemas.openxmlformats.org/officeDocument/2006/relationships" xmlns:p="http://schemas.openxmlformats.org/presentationml/2006/main">
+  <p:cSld>
+    <p:spTree>
+      <p:nvGrpSpPr>
+        <p:cNvPr id="1" name=""/>
+        <p:cNvGrpSpPr/>
+        <p:nvPr/>
+      </p:nvGrpSpPr>
+      <p:grpSpPr>
+        <a:xfrm>
+          <a:off x="0" y="0"/>
+          <a:ext cx="0" cy="0"/>
+          <a:chOff x="0" y="0"/>
+          <a:chExt cx="0" cy="0"/>
+        </a:xfrm>
+      </p:grpSpPr>
+      <p:sp>
+        <p:nvSpPr>
+          <p:cNvPr id="2" name="Title 1"/>
+          <p:cNvSpPr>
+            <a:spLocks noGrp="1"/>
+          </p:cNvSpPr>
+          <p:nvPr>
+            <p:ph type="title"/>
+          </p:nvPr>
+        </p:nvSpPr>
+        <p:spPr/>
+        <p:txBody>
+          <a:bodyPr/>
+          <a:lstStyle/>
+          <a:p>
+            <a:r>
+              <a:rPr lang="en-US" dirty="0" smtClean="0"/>
+              <a:t>Specialty Tools</a:t>
+            </a:r>
+            <a:endParaRPr lang="en-US" dirty="0"/>
+          </a:p>
+        </p:txBody>
+      </p:sp>
+      <p:sp>
+        <p:nvSpPr>
+          <p:cNvPr id="3" name="Content Placeholder 2"/>
+          <p:cNvSpPr>
+            <a:spLocks noGrp="1"/>
+          </p:cNvSpPr>
+          <p:nvPr>
+            <p:ph idx="1"/>
+          </p:nvPr>
+        </p:nvSpPr>
+        <p:spPr/>
+        <p:txBody>
+          <a:bodyPr/>
+          <a:lstStyle/>
+          <a:p>
+            <a:pPr marL="0" indent="0">
+              <a:buNone/>
+            </a:pPr>
+            <a:r>
+              <a:rPr lang="en-US" dirty="0" smtClean="0"/>
+              <a:t>Uncertain Data (</a:t>
+            </a:r>
+            <a:r>
+              <a:rPr lang="en-US" i="1" dirty="0" smtClean="0"/>
+              <a:t>e.g., </a:t>
+            </a:r>
+            <a:r>
+              <a:rPr lang="en-US" dirty="0" smtClean="0"/>
+              <a:t>TRIO)</a:t>
+            </a:r>
+          </a:p>
+          <a:p>
+            <a:pPr lvl="1"/>
+            <a:r>
+              <a:rPr lang="en-US" dirty="0" smtClean="0"/>
+              <a:t>Confidence</a:t>
+            </a:r>
+          </a:p>
+          <a:p>
+            <a:pPr lvl="1"/>
+            <a:r>
+              <a:rPr lang="en-US" dirty="0" smtClean="0"/>
+              <a:t>Lineage</a:t>
+            </a:r>
+          </a:p>
+          <a:p>
+            <a:pPr marL="0" indent="0">
+              <a:buNone/>
+            </a:pPr>
+            <a:r>
+              <a:rPr lang="en-US" dirty="0" smtClean="0"/>
+              <a:t>Spatial Data </a:t>
+            </a:r>
+          </a:p>
+          <a:p>
+            <a:pPr lvl="1"/>
+            <a:r>
+              <a:rPr lang="en-US" dirty="0" smtClean="0"/>
+              <a:t>Polyline support (describe a region)</a:t>
+            </a:r>
+          </a:p>
+          <a:p>
+            <a:pPr lvl="1"/>
+            <a:r>
+              <a:rPr lang="en-US" dirty="0" smtClean="0"/>
+              <a:t>Hierarchy of space (building with floors, rooms, </a:t>
+            </a:r>
+            <a:r>
+              <a:rPr lang="en-US" i="1" dirty="0" smtClean="0"/>
+              <a:t>etc.</a:t>
+            </a:r>
+            <a:r>
+              <a:rPr lang="en-US" dirty="0" smtClean="0"/>
+              <a:t>)</a:t>
+            </a:r>
+          </a:p>
+          <a:p>
+            <a:pPr lvl="1"/>
+            <a:r>
+              <a:rPr lang="en-US" dirty="0" smtClean="0"/>
+              <a:t>Search based on 2d relationship</a:t>
+            </a:r>
+          </a:p>
+          <a:p>
+            <a:pPr lvl="1"/>
+            <a:r>
+              <a:rPr lang="en-US" dirty="0" smtClean="0"/>
+              <a:t>Calculate area</a:t>
+            </a:r>
+          </a:p>
+          <a:p>
+            <a:pPr lvl="1"/>
+            <a:r>
+              <a:rPr lang="en-US" dirty="0" smtClean="0"/>
+              <a:t>Model data in space (</a:t>
+            </a:r>
+            <a:r>
+              <a:rPr lang="en-US" i="1" dirty="0" smtClean="0"/>
+              <a:t>e.g. </a:t>
+            </a:r>
+            <a:r>
+              <a:rPr lang="en-US" dirty="0" smtClean="0"/>
+              <a:t>things may move)</a:t>
+            </a:r>
+          </a:p>
+          <a:p>
+            <a:pPr marL="0" indent="0">
+              <a:buNone/>
+            </a:pPr>
+            <a:endParaRPr lang="en-US" dirty="0"/>
+          </a:p>
+          <a:p>
+            <a:pPr marL="0" indent="0">
+              <a:buNone/>
+            </a:pPr>
+            <a:endParaRPr lang="en-US" dirty="0" smtClean="0"/>
+          </a:p>
+        </p:txBody>
+      </p:sp>
+      <p:sp>
+        <p:nvSpPr>
+          <p:cNvPr id="4" name="Date Placeholder 3"/>
+          <p:cNvSpPr>
+            <a:spLocks noGrp="1"/>
+          </p:cNvSpPr>
+          <p:nvPr>
+            <p:ph type="dt" sz="half" idx="10"/>
+          </p:nvPr>
+        </p:nvSpPr>
+        <p:spPr/>
+        <p:txBody>
+          <a:bodyPr/>
+          <a:lstStyle/>
+          <a:p>
+            <a:fld id="{7053BEFA-1175-F644-B249-7D41D72BD3FF}" type="datetime1">
+              <a:rPr lang="en-US" smtClean="0"/>
+              <a:t>1/25/15</a:t>
+            </a:fld>
+            <a:endParaRPr lang="en-US"/>
+          </a:p>
+        </p:txBody>
+      </p:sp>
+      <p:sp>
+        <p:nvSpPr>
+          <p:cNvPr id="5" name="Footer Placeholder 4"/>
+          <p:cNvSpPr>
+            <a:spLocks noGrp="1"/>
+          </p:cNvSpPr>
+          <p:nvPr>
+            <p:ph type="ftr" sz="quarter" idx="11"/>
+          </p:nvPr>
+        </p:nvSpPr>
+        <p:spPr/>
+        <p:txBody>
+          <a:bodyPr/>
+          <a:lstStyle/>
+          <a:p>
+            <a:endParaRPr lang="en-US" dirty="0"/>
+          </a:p>
+        </p:txBody>
+      </p:sp>
+      <p:sp>
+        <p:nvSpPr>
+          <p:cNvPr id="6" name="Slide Number Placeholder 5"/>
+          <p:cNvSpPr>
+            <a:spLocks noGrp="1"/>
+          </p:cNvSpPr>
+          <p:nvPr>
+            <p:ph type="sldNum" sz="quarter" idx="12"/>
+          </p:nvPr>
+        </p:nvSpPr>
+        <p:spPr/>
+        <p:txBody>
+          <a:bodyPr/>
+          <a:lstStyle/>
+          <a:p>
+            <a:fld id="{17E276FA-8F89-B34D-A726-BE3FA1F8DD97}" type="slidenum">
+              <a:rPr lang="en-US" smtClean="0"/>
+              <a:t>33</a:t>
             </a:fld>
             <a:endParaRPr lang="en-US" dirty="0"/>
           </a:p>
@@ -15059,7 +15217,7 @@
           <a:p>
             <a:r>
               <a:rPr lang="en-US" dirty="0" smtClean="0"/>
-              <a:t>Types of Data</a:t>
+              <a:t>Data Management</a:t>
             </a:r>
             <a:endParaRPr lang="en-US" dirty="0"/>
           </a:p>
@@ -15080,46 +15238,78 @@
           <a:bodyPr/>
           <a:lstStyle/>
           <a:p>
-            <a:r>
-              <a:rPr lang="en-US" dirty="0" smtClean="0"/>
-              <a:t>Unstructured – </a:t>
+            <a:pPr marL="0" indent="0">
+              <a:buNone/>
+            </a:pPr>
+            <a:r>
+              <a:rPr lang="en-US" dirty="0"/>
+              <a:t>Information is an organizational resource</a:t>
+            </a:r>
+          </a:p>
+          <a:p>
+            <a:pPr lvl="1"/>
+            <a:r>
+              <a:rPr lang="en-US" dirty="0"/>
+              <a:t>Just like people, capital, and equipment</a:t>
+            </a:r>
+          </a:p>
+          <a:p>
+            <a:pPr lvl="1"/>
+            <a:r>
+              <a:rPr lang="en-US" dirty="0"/>
+              <a:t>It must be managed </a:t>
+            </a:r>
+            <a:r>
+              <a:rPr lang="en-US" dirty="0" smtClean="0"/>
+              <a:t>effectively</a:t>
+            </a:r>
+          </a:p>
+          <a:p>
+            <a:pPr marL="0" indent="0">
+              <a:buNone/>
+            </a:pPr>
+            <a:r>
+              <a:rPr lang="en-US" dirty="0" smtClean="0"/>
+              <a:t>Who should oversee it?</a:t>
+            </a:r>
+          </a:p>
+          <a:p>
+            <a:pPr lvl="1"/>
+            <a:r>
+              <a:rPr lang="en-US" dirty="0" smtClean="0"/>
+              <a:t>Who owns it</a:t>
+            </a:r>
+          </a:p>
+          <a:p>
+            <a:pPr lvl="1"/>
+            <a:r>
+              <a:rPr lang="en-US" dirty="0" smtClean="0"/>
+              <a:t>Who is responsible for the four Cs? (Completeness, Coherence, Correctness, </a:t>
+            </a:r>
+            <a:r>
+              <a:rPr lang="en-US" dirty="0" err="1" smtClean="0"/>
+              <a:t>AcCountability</a:t>
+            </a:r>
+            <a:r>
+              <a:rPr lang="en-US" dirty="0" smtClean="0"/>
+              <a:t>)</a:t>
+            </a:r>
+          </a:p>
+          <a:p>
+            <a:pPr marL="0" indent="0">
+              <a:buNone/>
+            </a:pPr>
+            <a:r>
+              <a:rPr lang="en-US" dirty="0" smtClean="0"/>
+              <a:t>Requires lots of attention, over time, regular checks, </a:t>
             </a:r>
             <a:r>
               <a:rPr lang="en-US" i="1" dirty="0" smtClean="0"/>
-              <a:t>e.g. </a:t>
-            </a:r>
-            <a:r>
-              <a:rPr lang="en-US" dirty="0" smtClean="0"/>
-              <a:t>text</a:t>
-            </a:r>
-          </a:p>
-          <a:p>
-            <a:r>
-              <a:rPr lang="en-US" dirty="0" smtClean="0"/>
-              <a:t>Semi-Structured – </a:t>
-            </a:r>
-            <a:r>
-              <a:rPr lang="en-US" i="1" dirty="0" smtClean="0"/>
-              <a:t>e.g. </a:t>
-            </a:r>
-            <a:r>
-              <a:rPr lang="en-US" dirty="0" smtClean="0"/>
-              <a:t>XML (RSS feeds are a specific example of this)</a:t>
-            </a:r>
-          </a:p>
-          <a:p>
-            <a:r>
-              <a:rPr lang="en-US" dirty="0" smtClean="0"/>
-              <a:t>Structured – </a:t>
-            </a:r>
-            <a:r>
-              <a:rPr lang="en-US" i="1" dirty="0" smtClean="0"/>
-              <a:t>e.g. </a:t>
-            </a:r>
-            <a:r>
-              <a:rPr lang="en-US" dirty="0" smtClean="0"/>
-              <a:t>a MySQL database</a:t>
-            </a:r>
+              <a:t>etc.</a:t>
+            </a:r>
+            <a:endParaRPr lang="en-US" dirty="0"/>
+          </a:p>
+          <a:p>
             <a:endParaRPr lang="en-US" dirty="0"/>
           </a:p>
         </p:txBody>
@@ -15141,7 +15331,7 @@
           <a:p>
             <a:fld id="{7053BEFA-1175-F644-B249-7D41D72BD3FF}" type="datetime1">
               <a:rPr lang="en-US" smtClean="0"/>
-              <a:t>1/19/15</a:t>
+              <a:t>1/25/15</a:t>
             </a:fld>
             <a:endParaRPr lang="en-US"/>
           </a:p>
@@ -15192,20 +15382,13 @@
     </p:spTree>
     <p:extLst>
       <p:ext uri="{BB962C8B-B14F-4D97-AF65-F5344CB8AC3E}">
-        <p14:creationId xmlns:p14="http://schemas.microsoft.com/office/powerpoint/2010/main" val="1082504122"/>
+        <p14:creationId xmlns:p14="http://schemas.microsoft.com/office/powerpoint/2010/main" val="4254068576"/>
       </p:ext>
     </p:extLst>
   </p:cSld>
   <p:clrMapOvr>
     <a:masterClrMapping/>
   </p:clrMapOvr>
-  <p:timing>
-    <p:tnLst>
-      <p:par>
-        <p:cTn xmlns:p14="http://schemas.microsoft.com/office/powerpoint/2010/main" id="1" dur="indefinite" restart="never" nodeType="tmRoot"/>
-      </p:par>
-    </p:tnLst>
-  </p:timing>
 </p:sld>
 </file>
 
@@ -15243,7 +15426,7 @@
           <a:p>
             <a:r>
               <a:rPr lang="en-US" dirty="0" smtClean="0"/>
-              <a:t>Unstructured Data</a:t>
+              <a:t>Types of Data</a:t>
             </a:r>
             <a:endParaRPr lang="en-US" dirty="0"/>
           </a:p>
@@ -15265,24 +15448,46 @@
           <a:lstStyle/>
           <a:p>
             <a:r>
-              <a:rPr lang="en-US" dirty="0"/>
-              <a:t>Text with a table in it (or just text)</a:t>
-            </a:r>
-          </a:p>
-          <a:p>
-            <a:r>
-              <a:rPr lang="en-US" dirty="0" smtClean="0"/>
-              <a:t>Twitter posts (actually: semi-structured. Why?)</a:t>
-            </a:r>
-          </a:p>
-          <a:p>
-            <a:r>
-              <a:rPr lang="en-US" dirty="0" smtClean="0"/>
-              <a:t>HTML (potentially)</a:t>
-            </a:r>
-          </a:p>
-          <a:p>
-            <a:endParaRPr lang="en-US" dirty="0" smtClean="0"/>
+              <a:rPr lang="en-US" dirty="0" smtClean="0"/>
+              <a:t>Unstructured – </a:t>
+            </a:r>
+            <a:r>
+              <a:rPr lang="en-US" i="1" dirty="0" smtClean="0"/>
+              <a:t>e.g. </a:t>
+            </a:r>
+            <a:r>
+              <a:rPr lang="en-US" dirty="0" smtClean="0"/>
+              <a:t>text</a:t>
+            </a:r>
+          </a:p>
+          <a:p>
+            <a:r>
+              <a:rPr lang="en-US" dirty="0" smtClean="0"/>
+              <a:t>Semi-Structured – </a:t>
+            </a:r>
+            <a:r>
+              <a:rPr lang="en-US" i="1" dirty="0" smtClean="0"/>
+              <a:t>e.g. </a:t>
+            </a:r>
+            <a:r>
+              <a:rPr lang="en-US" dirty="0" smtClean="0"/>
+              <a:t>XML (RSS feeds are a specific example of this)</a:t>
+            </a:r>
+          </a:p>
+          <a:p>
+            <a:r>
+              <a:rPr lang="en-US" dirty="0" smtClean="0"/>
+              <a:t>Structured – </a:t>
+            </a:r>
+            <a:r>
+              <a:rPr lang="en-US" i="1" dirty="0" smtClean="0"/>
+              <a:t>e.g. </a:t>
+            </a:r>
+            <a:r>
+              <a:rPr lang="en-US" dirty="0" smtClean="0"/>
+              <a:t>a MySQL database</a:t>
+            </a:r>
+            <a:endParaRPr lang="en-US" dirty="0"/>
           </a:p>
         </p:txBody>
       </p:sp>
@@ -15303,7 +15508,7 @@
           <a:p>
             <a:fld id="{7053BEFA-1175-F644-B249-7D41D72BD3FF}" type="datetime1">
               <a:rPr lang="en-US" smtClean="0"/>
-              <a:t>1/19/15</a:t>
+              <a:t>1/25/15</a:t>
             </a:fld>
             <a:endParaRPr lang="en-US"/>
           </a:p>
@@ -15354,7 +15559,7 @@
     </p:spTree>
     <p:extLst>
       <p:ext uri="{BB962C8B-B14F-4D97-AF65-F5344CB8AC3E}">
-        <p14:creationId xmlns:p14="http://schemas.microsoft.com/office/powerpoint/2010/main" val="589055938"/>
+        <p14:creationId xmlns:p14="http://schemas.microsoft.com/office/powerpoint/2010/main" val="1082504122"/>
       </p:ext>
     </p:extLst>
   </p:cSld>
@@ -15405,7 +15610,7 @@
           <a:p>
             <a:r>
               <a:rPr lang="en-US" dirty="0" smtClean="0"/>
-              <a:t>Semi-structured Data</a:t>
+              <a:t>Unstructured Data</a:t>
             </a:r>
             <a:endParaRPr lang="en-US" dirty="0"/>
           </a:p>
@@ -15426,46 +15631,25 @@
           <a:bodyPr/>
           <a:lstStyle/>
           <a:p>
-            <a:pPr marL="0" indent="0">
-              <a:buNone/>
-            </a:pPr>
-            <a:r>
-              <a:rPr lang="en-US" dirty="0" smtClean="0"/>
-              <a:t>Ad-hoc</a:t>
-            </a:r>
-          </a:p>
-          <a:p>
-            <a:pPr marL="0" indent="0">
-              <a:buNone/>
-            </a:pPr>
-            <a:r>
-              <a:rPr lang="en-US" dirty="0" smtClean="0"/>
-              <a:t>May not all be identically structured</a:t>
-            </a:r>
-          </a:p>
-          <a:p>
-            <a:pPr marL="0" indent="0">
-              <a:buNone/>
-            </a:pPr>
-            <a:r>
-              <a:rPr lang="en-US" dirty="0" smtClean="0"/>
-              <a:t>Schema not known in advance</a:t>
-            </a:r>
-          </a:p>
-          <a:p>
-            <a:pPr marL="0" indent="0">
-              <a:buNone/>
-            </a:pPr>
-            <a:r>
-              <a:rPr lang="en-US" dirty="0" smtClean="0"/>
-              <a:t>“self-describing” </a:t>
-            </a:r>
-          </a:p>
-          <a:p>
-            <a:pPr marL="0" indent="0">
-              <a:buNone/>
-            </a:pPr>
-            <a:endParaRPr lang="en-US" dirty="0"/>
+            <a:r>
+              <a:rPr lang="en-US" dirty="0"/>
+              <a:t>Text with a table in it (or just text)</a:t>
+            </a:r>
+          </a:p>
+          <a:p>
+            <a:r>
+              <a:rPr lang="en-US" dirty="0" smtClean="0"/>
+              <a:t>Twitter posts (actually: semi-structured. Why?)</a:t>
+            </a:r>
+          </a:p>
+          <a:p>
+            <a:r>
+              <a:rPr lang="en-US" dirty="0" smtClean="0"/>
+              <a:t>HTML (potentially)</a:t>
+            </a:r>
+          </a:p>
+          <a:p>
+            <a:endParaRPr lang="en-US" dirty="0" smtClean="0"/>
           </a:p>
         </p:txBody>
       </p:sp>
@@ -15486,7 +15670,7 @@
           <a:p>
             <a:fld id="{7053BEFA-1175-F644-B249-7D41D72BD3FF}" type="datetime1">
               <a:rPr lang="en-US" smtClean="0"/>
-              <a:t>1/19/15</a:t>
+              <a:t>1/25/15</a:t>
             </a:fld>
             <a:endParaRPr lang="en-US"/>
           </a:p>
@@ -15534,36 +15718,10 @@
           </a:p>
         </p:txBody>
       </p:sp>
-      <p:sp>
-        <p:nvSpPr>
-          <p:cNvPr id="8" name="TextBox 7"/>
-          <p:cNvSpPr txBox="1"/>
-          <p:nvPr/>
-        </p:nvSpPr>
-        <p:spPr>
-          <a:xfrm>
-            <a:off x="1481738" y="4110390"/>
-            <a:ext cx="184666" cy="369332"/>
-          </a:xfrm>
-          <a:prstGeom prst="rect">
-            <a:avLst/>
-          </a:prstGeom>
-          <a:noFill/>
-        </p:spPr>
-        <p:txBody>
-          <a:bodyPr wrap="none" rtlCol="0">
-            <a:spAutoFit/>
-          </a:bodyPr>
-          <a:lstStyle/>
-          <a:p>
-            <a:endParaRPr lang="en-US" dirty="0"/>
-          </a:p>
-        </p:txBody>
-      </p:sp>
     </p:spTree>
     <p:extLst>
       <p:ext uri="{BB962C8B-B14F-4D97-AF65-F5344CB8AC3E}">
-        <p14:creationId xmlns:p14="http://schemas.microsoft.com/office/powerpoint/2010/main" val="4191292735"/>
+        <p14:creationId xmlns:p14="http://schemas.microsoft.com/office/powerpoint/2010/main" val="589055938"/>
       </p:ext>
     </p:extLst>
   </p:cSld>
@@ -15614,7 +15772,7 @@
           <a:p>
             <a:r>
               <a:rPr lang="en-US" dirty="0" smtClean="0"/>
-              <a:t>XML (prototypical example)</a:t>
+              <a:t>Semi-structured Data</a:t>
             </a:r>
             <a:endParaRPr lang="en-US" dirty="0"/>
           </a:p>
@@ -15630,60 +15788,51 @@
             <p:ph idx="1"/>
           </p:nvPr>
         </p:nvSpPr>
-        <p:spPr>
-          <a:xfrm>
-            <a:off x="1128943" y="1847153"/>
-            <a:ext cx="5080245" cy="4379976"/>
-          </a:xfrm>
-        </p:spPr>
-        <p:txBody>
-          <a:bodyPr/>
-          <a:lstStyle/>
-          <a:p>
-            <a:pPr marL="0" lvl="1" indent="0">
-              <a:buClr>
-                <a:schemeClr val="accent3"/>
-              </a:buClr>
-              <a:buSzTx/>
+        <p:spPr/>
+        <p:txBody>
+          <a:bodyPr/>
+          <a:lstStyle/>
+          <a:p>
+            <a:pPr marL="0" indent="0">
               <a:buNone/>
             </a:pPr>
             <a:r>
-              <a:rPr lang="en-US" sz="2400" dirty="0" smtClean="0"/>
-              <a:t>XML </a:t>
-            </a:r>
-            <a:r>
-              <a:rPr lang="en-US" sz="2400" dirty="0"/>
-              <a:t>can be used to provide more information about the structure and meaning of the data in the Web pages rather than just specifying how the Web pages are formatted for display on the screen. </a:t>
-            </a:r>
-            <a:endParaRPr lang="en-US" sz="2400" dirty="0" smtClean="0"/>
-          </a:p>
-          <a:p>
-            <a:pPr marL="0" lvl="1" indent="0">
-              <a:buClr>
-                <a:schemeClr val="accent3"/>
-              </a:buClr>
-              <a:buSzTx/>
+              <a:rPr lang="en-US" dirty="0" smtClean="0"/>
+              <a:t>Ad-hoc</a:t>
+            </a:r>
+          </a:p>
+          <a:p>
+            <a:pPr marL="0" indent="0">
               <a:buNone/>
             </a:pPr>
-            <a:endParaRPr lang="en-US" sz="2400" dirty="0"/>
-          </a:p>
-          <a:p>
-            <a:pPr marL="0" lvl="1" indent="0">
-              <a:buClr>
-                <a:schemeClr val="accent3"/>
-              </a:buClr>
-              <a:buSzTx/>
+            <a:r>
+              <a:rPr lang="en-US" dirty="0" smtClean="0"/>
+              <a:t>May not all be identically structured</a:t>
+            </a:r>
+          </a:p>
+          <a:p>
+            <a:pPr marL="0" indent="0">
               <a:buNone/>
             </a:pPr>
             <a:r>
-              <a:rPr lang="en-US" sz="2400" dirty="0"/>
-              <a:t>Example: http://www.w3schools.com/xml/</a:t>
-            </a:r>
-            <a:r>
-              <a:rPr lang="en-US" sz="2400" dirty="0" err="1"/>
-              <a:t>cd_catalog.xml</a:t>
-            </a:r>
-            <a:endParaRPr lang="en-US" sz="2400" dirty="0"/>
+              <a:rPr lang="en-US" dirty="0" smtClean="0"/>
+              <a:t>Schema not known in advance</a:t>
+            </a:r>
+          </a:p>
+          <a:p>
+            <a:pPr marL="0" indent="0">
+              <a:buNone/>
+            </a:pPr>
+            <a:r>
+              <a:rPr lang="en-US" dirty="0" smtClean="0"/>
+              <a:t>“self-describing” </a:t>
+            </a:r>
+          </a:p>
+          <a:p>
+            <a:pPr marL="0" indent="0">
+              <a:buNone/>
+            </a:pPr>
+            <a:endParaRPr lang="en-US" dirty="0"/>
           </a:p>
         </p:txBody>
       </p:sp>
@@ -15704,7 +15853,7 @@
           <a:p>
             <a:fld id="{7053BEFA-1175-F644-B249-7D41D72BD3FF}" type="datetime1">
               <a:rPr lang="en-US" smtClean="0"/>
-              <a:t>1/19/15</a:t>
+              <a:t>1/25/15</a:t>
             </a:fld>
             <a:endParaRPr lang="en-US"/>
           </a:p>
@@ -15749,182 +15898,6 @@
               <a:t>7</a:t>
             </a:fld>
             <a:endParaRPr lang="en-US" dirty="0"/>
-          </a:p>
-        </p:txBody>
-      </p:sp>
-      <p:sp>
-        <p:nvSpPr>
-          <p:cNvPr id="7" name="Rectangle 6"/>
-          <p:cNvSpPr/>
-          <p:nvPr/>
-        </p:nvSpPr>
-        <p:spPr>
-          <a:xfrm>
-            <a:off x="6491424" y="831998"/>
-            <a:ext cx="4572000" cy="5478422"/>
-          </a:xfrm>
-          <a:prstGeom prst="rect">
-            <a:avLst/>
-          </a:prstGeom>
-        </p:spPr>
-        <p:txBody>
-          <a:bodyPr>
-            <a:spAutoFit/>
-          </a:bodyPr>
-          <a:lstStyle/>
-          <a:p>
-            <a:r>
-              <a:rPr lang="en-US" sz="1400" dirty="0" smtClean="0"/>
-              <a:t>&lt;</a:t>
-            </a:r>
-            <a:r>
-              <a:rPr lang="en-US" sz="1400" dirty="0"/>
-              <a:t>CATALOG&gt;</a:t>
-            </a:r>
-          </a:p>
-          <a:p>
-            <a:r>
-              <a:rPr lang="en-US" sz="1400" dirty="0"/>
-              <a:t>&lt;CD&gt;</a:t>
-            </a:r>
-          </a:p>
-          <a:p>
-            <a:r>
-              <a:rPr lang="en-US" sz="1400" dirty="0"/>
-              <a:t>&lt;TITLE&gt;Empire Burlesque&lt;/TITLE&gt;</a:t>
-            </a:r>
-          </a:p>
-          <a:p>
-            <a:r>
-              <a:rPr lang="en-US" sz="1400" dirty="0"/>
-              <a:t>&lt;ARTIST&gt;Bob Dylan&lt;/ARTIST&gt;</a:t>
-            </a:r>
-          </a:p>
-          <a:p>
-            <a:r>
-              <a:rPr lang="en-US" sz="1400" dirty="0"/>
-              <a:t>&lt;COUNTRY&gt;USA&lt;/COUNTRY&gt;</a:t>
-            </a:r>
-          </a:p>
-          <a:p>
-            <a:r>
-              <a:rPr lang="en-US" sz="1400" dirty="0"/>
-              <a:t>&lt;COMPANY&gt;Columbia&lt;/COMPANY&gt;</a:t>
-            </a:r>
-          </a:p>
-          <a:p>
-            <a:r>
-              <a:rPr lang="en-US" sz="1400" dirty="0"/>
-              <a:t>&lt;PRICE&gt;10.90&lt;/PRICE&gt;</a:t>
-            </a:r>
-          </a:p>
-          <a:p>
-            <a:r>
-              <a:rPr lang="en-US" sz="1400" dirty="0"/>
-              <a:t>&lt;YEAR&gt;1985&lt;/YEAR&gt;</a:t>
-            </a:r>
-          </a:p>
-          <a:p>
-            <a:r>
-              <a:rPr lang="en-US" sz="1400" dirty="0"/>
-              <a:t>&lt;/CD&gt;</a:t>
-            </a:r>
-          </a:p>
-          <a:p>
-            <a:r>
-              <a:rPr lang="en-US" sz="1400" dirty="0"/>
-              <a:t>&lt;CD&gt;</a:t>
-            </a:r>
-          </a:p>
-          <a:p>
-            <a:r>
-              <a:rPr lang="en-US" sz="1400" dirty="0"/>
-              <a:t>&lt;TITLE&gt;Hide your heart&lt;/TITLE&gt;</a:t>
-            </a:r>
-          </a:p>
-          <a:p>
-            <a:r>
-              <a:rPr lang="en-US" sz="1400" dirty="0"/>
-              <a:t>&lt;ARTIST&gt;Bonnie Tyler&lt;/ARTIST&gt;</a:t>
-            </a:r>
-          </a:p>
-          <a:p>
-            <a:r>
-              <a:rPr lang="en-US" sz="1400" dirty="0"/>
-              <a:t>&lt;COUNTRY&gt;UK&lt;/COUNTRY&gt;</a:t>
-            </a:r>
-          </a:p>
-          <a:p>
-            <a:r>
-              <a:rPr lang="en-US" sz="1400" dirty="0"/>
-              <a:t>&lt;COMPANY&gt;CBS Records&lt;/COMPANY&gt;</a:t>
-            </a:r>
-          </a:p>
-          <a:p>
-            <a:r>
-              <a:rPr lang="en-US" sz="1400" dirty="0"/>
-              <a:t>&lt;PRICE&gt;9.90&lt;/PRICE&gt;</a:t>
-            </a:r>
-          </a:p>
-          <a:p>
-            <a:r>
-              <a:rPr lang="en-US" sz="1400" dirty="0"/>
-              <a:t>&lt;YEAR&gt;1988&lt;/YEAR&gt;</a:t>
-            </a:r>
-          </a:p>
-          <a:p>
-            <a:r>
-              <a:rPr lang="en-US" sz="1400" dirty="0"/>
-              <a:t>&lt;/CD&gt;</a:t>
-            </a:r>
-          </a:p>
-          <a:p>
-            <a:r>
-              <a:rPr lang="en-US" sz="1400" dirty="0"/>
-              <a:t>&lt;CD&gt;</a:t>
-            </a:r>
-          </a:p>
-          <a:p>
-            <a:r>
-              <a:rPr lang="en-US" sz="1400" dirty="0"/>
-              <a:t>&lt;TITLE&gt;Greatest Hits&lt;/TITLE&gt;</a:t>
-            </a:r>
-          </a:p>
-          <a:p>
-            <a:r>
-              <a:rPr lang="en-US" sz="1400" dirty="0"/>
-              <a:t>&lt;ARTIST&gt;Dolly Parton&lt;/ARTIST&gt;</a:t>
-            </a:r>
-          </a:p>
-          <a:p>
-            <a:r>
-              <a:rPr lang="en-US" sz="1400" dirty="0"/>
-              <a:t>&lt;COUNTRY&gt;USA&lt;/COUNTRY&gt;</a:t>
-            </a:r>
-          </a:p>
-          <a:p>
-            <a:r>
-              <a:rPr lang="en-US" sz="1400" dirty="0"/>
-              <a:t>&lt;COMPANY&gt;RCA&lt;/COMPANY&gt;</a:t>
-            </a:r>
-          </a:p>
-          <a:p>
-            <a:r>
-              <a:rPr lang="en-US" sz="1400" dirty="0"/>
-              <a:t>&lt;PRICE&gt;9.90&lt;/PRICE&gt;</a:t>
-            </a:r>
-          </a:p>
-          <a:p>
-            <a:r>
-              <a:rPr lang="en-US" sz="1400" dirty="0"/>
-              <a:t>&lt;YEAR&gt;1982&lt;/YEAR&gt;</a:t>
-            </a:r>
-          </a:p>
-          <a:p>
-            <a:r>
-              <a:rPr lang="en-US" sz="1400" dirty="0"/>
-              <a:t>&lt;/CD&gt;</a:t>
-            </a:r>
           </a:p>
         </p:txBody>
       </p:sp>
@@ -15957,7 +15930,7 @@
     </p:spTree>
     <p:extLst>
       <p:ext uri="{BB962C8B-B14F-4D97-AF65-F5344CB8AC3E}">
-        <p14:creationId xmlns:p14="http://schemas.microsoft.com/office/powerpoint/2010/main" val="3327868801"/>
+        <p14:creationId xmlns:p14="http://schemas.microsoft.com/office/powerpoint/2010/main" val="4191292735"/>
       </p:ext>
     </p:extLst>
   </p:cSld>
@@ -16006,11 +15979,11 @@
           <a:bodyPr/>
           <a:lstStyle/>
           <a:p>
-            <a:pPr marL="0" indent="0"/>
-            <a:r>
-              <a:rPr lang="en-US" dirty="0"/>
-              <a:t>JSON is another example</a:t>
-            </a:r>
+            <a:r>
+              <a:rPr lang="en-US" dirty="0" smtClean="0"/>
+              <a:t>XML (prototypical example)</a:t>
+            </a:r>
+            <a:endParaRPr lang="en-US" dirty="0"/>
           </a:p>
         </p:txBody>
       </p:sp>
@@ -16026,8 +15999,8 @@
         </p:nvSpPr>
         <p:spPr>
           <a:xfrm>
-            <a:off x="1128942" y="1811871"/>
-            <a:ext cx="7655647" cy="4379976"/>
+            <a:off x="1128943" y="1847153"/>
+            <a:ext cx="5080245" cy="4379976"/>
           </a:xfrm>
         </p:spPr>
         <p:txBody>
@@ -16042,9 +16015,14 @@
               <a:buNone/>
             </a:pPr>
             <a:r>
-              <a:rPr lang="en-US" sz="2800" dirty="0" smtClean="0"/>
-              <a:t>Originally a text format for storing JavaScript objects but widely adopted</a:t>
-            </a:r>
+              <a:rPr lang="en-US" sz="2400" dirty="0" smtClean="0"/>
+              <a:t>XML </a:t>
+            </a:r>
+            <a:r>
+              <a:rPr lang="en-US" sz="2400" dirty="0"/>
+              <a:t>can be used to provide more information about the structure and meaning of the data in the Web pages rather than just specifying how the Web pages are formatted for display on the screen. </a:t>
+            </a:r>
+            <a:endParaRPr lang="en-US" sz="2400" dirty="0" smtClean="0"/>
           </a:p>
           <a:p>
             <a:pPr marL="0" lvl="1" indent="0">
@@ -16054,34 +16032,7 @@
               <a:buSzTx/>
               <a:buNone/>
             </a:pPr>
-            <a:r>
-              <a:rPr lang="en-US" sz="2800" dirty="0" smtClean="0"/>
-              <a:t>Includes </a:t>
-            </a:r>
-            <a:r>
-              <a:rPr lang="en-US" sz="2800" i="1" dirty="0" smtClean="0"/>
-              <a:t>type </a:t>
-            </a:r>
-            <a:r>
-              <a:rPr lang="en-US" sz="2800" dirty="0" smtClean="0"/>
-              <a:t>information (number, </a:t>
-            </a:r>
-            <a:r>
-              <a:rPr lang="en-US" sz="2800" dirty="0" err="1" smtClean="0"/>
-              <a:t>bool</a:t>
-            </a:r>
-            <a:r>
-              <a:rPr lang="en-US" sz="2800" dirty="0" smtClean="0"/>
-              <a:t>, string, array, object, empty or </a:t>
-            </a:r>
-            <a:r>
-              <a:rPr lang="en-US" sz="2800" i="1" dirty="0" smtClean="0"/>
-              <a:t>null</a:t>
-            </a:r>
-            <a:r>
-              <a:rPr lang="en-US" sz="2800" dirty="0" smtClean="0"/>
-              <a:t>)</a:t>
-            </a:r>
+            <a:endParaRPr lang="en-US" sz="2400" dirty="0"/>
           </a:p>
           <a:p>
             <a:pPr marL="0" lvl="1" indent="0">
@@ -16092,61 +16043,14 @@
               <a:buNone/>
             </a:pPr>
             <a:r>
-              <a:rPr lang="en-US" sz="2800" dirty="0" smtClean="0"/>
-              <a:t>Everything has a ‘label’: Translates into nested dictionaries from a python perspective</a:t>
-            </a:r>
-          </a:p>
-          <a:p>
-            <a:pPr marL="0" lvl="1" indent="0">
-              <a:buClr>
-                <a:schemeClr val="accent3"/>
-              </a:buClr>
-              <a:buSzTx/>
-              <a:buNone/>
-            </a:pPr>
-            <a:r>
-              <a:rPr lang="en-US" sz="2800" dirty="0" smtClean="0"/>
-              <a:t>Type is up to the creator (</a:t>
-            </a:r>
-            <a:r>
-              <a:rPr lang="en-US" sz="2800" i="1" dirty="0" smtClean="0"/>
-              <a:t>e.g. </a:t>
-            </a:r>
-            <a:r>
-              <a:rPr lang="en-US" sz="2800" dirty="0" smtClean="0"/>
-              <a:t>is a zip a string?)</a:t>
-            </a:r>
-          </a:p>
-          <a:p>
-            <a:pPr marL="0" lvl="1" indent="0">
-              <a:buClr>
-                <a:schemeClr val="accent3"/>
-              </a:buClr>
-              <a:buSzTx/>
-              <a:buNone/>
-            </a:pPr>
-            <a:r>
-              <a:rPr lang="en-US" sz="2800" dirty="0"/>
-              <a:t>Example: Twitter Tweets: https://</a:t>
-            </a:r>
-            <a:r>
-              <a:rPr lang="en-US" sz="2800" dirty="0" err="1"/>
-              <a:t>dev.twitter.com</a:t>
-            </a:r>
-            <a:r>
-              <a:rPr lang="en-US" sz="2800" dirty="0"/>
-              <a:t>/docs/platform-objects/tweets</a:t>
-            </a:r>
-          </a:p>
-          <a:p>
-            <a:pPr marL="0" lvl="1" indent="0">
-              <a:buClr>
-                <a:schemeClr val="accent3"/>
-              </a:buClr>
-              <a:buSzTx/>
-              <a:buNone/>
-            </a:pPr>
-            <a:endParaRPr lang="en-US" sz="2800" dirty="0" smtClean="0"/>
+              <a:rPr lang="en-US" sz="2400" dirty="0"/>
+              <a:t>Example: http://www.w3schools.com/xml/</a:t>
+            </a:r>
+            <a:r>
+              <a:rPr lang="en-US" sz="2400" dirty="0" err="1"/>
+              <a:t>cd_catalog.xml</a:t>
+            </a:r>
+            <a:endParaRPr lang="en-US" sz="2400" dirty="0"/>
           </a:p>
         </p:txBody>
       </p:sp>
@@ -16167,7 +16071,7 @@
           <a:p>
             <a:fld id="{7053BEFA-1175-F644-B249-7D41D72BD3FF}" type="datetime1">
               <a:rPr lang="en-US" smtClean="0"/>
-              <a:t>1/19/15</a:t>
+              <a:t>1/25/15</a:t>
             </a:fld>
             <a:endParaRPr lang="en-US"/>
           </a:p>
@@ -16212,6 +16116,182 @@
               <a:t>8</a:t>
             </a:fld>
             <a:endParaRPr lang="en-US" dirty="0"/>
+          </a:p>
+        </p:txBody>
+      </p:sp>
+      <p:sp>
+        <p:nvSpPr>
+          <p:cNvPr id="7" name="Rectangle 6"/>
+          <p:cNvSpPr/>
+          <p:nvPr/>
+        </p:nvSpPr>
+        <p:spPr>
+          <a:xfrm>
+            <a:off x="6491424" y="831998"/>
+            <a:ext cx="4572000" cy="5478422"/>
+          </a:xfrm>
+          <a:prstGeom prst="rect">
+            <a:avLst/>
+          </a:prstGeom>
+        </p:spPr>
+        <p:txBody>
+          <a:bodyPr>
+            <a:spAutoFit/>
+          </a:bodyPr>
+          <a:lstStyle/>
+          <a:p>
+            <a:r>
+              <a:rPr lang="en-US" sz="1400" dirty="0" smtClean="0"/>
+              <a:t>&lt;</a:t>
+            </a:r>
+            <a:r>
+              <a:rPr lang="en-US" sz="1400" dirty="0"/>
+              <a:t>CATALOG&gt;</a:t>
+            </a:r>
+          </a:p>
+          <a:p>
+            <a:r>
+              <a:rPr lang="en-US" sz="1400" dirty="0"/>
+              <a:t>&lt;CD&gt;</a:t>
+            </a:r>
+          </a:p>
+          <a:p>
+            <a:r>
+              <a:rPr lang="en-US" sz="1400" dirty="0"/>
+              <a:t>&lt;TITLE&gt;Empire Burlesque&lt;/TITLE&gt;</a:t>
+            </a:r>
+          </a:p>
+          <a:p>
+            <a:r>
+              <a:rPr lang="en-US" sz="1400" dirty="0"/>
+              <a:t>&lt;ARTIST&gt;Bob Dylan&lt;/ARTIST&gt;</a:t>
+            </a:r>
+          </a:p>
+          <a:p>
+            <a:r>
+              <a:rPr lang="en-US" sz="1400" dirty="0"/>
+              <a:t>&lt;COUNTRY&gt;USA&lt;/COUNTRY&gt;</a:t>
+            </a:r>
+          </a:p>
+          <a:p>
+            <a:r>
+              <a:rPr lang="en-US" sz="1400" dirty="0"/>
+              <a:t>&lt;COMPANY&gt;Columbia&lt;/COMPANY&gt;</a:t>
+            </a:r>
+          </a:p>
+          <a:p>
+            <a:r>
+              <a:rPr lang="en-US" sz="1400" dirty="0"/>
+              <a:t>&lt;PRICE&gt;10.90&lt;/PRICE&gt;</a:t>
+            </a:r>
+          </a:p>
+          <a:p>
+            <a:r>
+              <a:rPr lang="en-US" sz="1400" dirty="0"/>
+              <a:t>&lt;YEAR&gt;1985&lt;/YEAR&gt;</a:t>
+            </a:r>
+          </a:p>
+          <a:p>
+            <a:r>
+              <a:rPr lang="en-US" sz="1400" dirty="0"/>
+              <a:t>&lt;/CD&gt;</a:t>
+            </a:r>
+          </a:p>
+          <a:p>
+            <a:r>
+              <a:rPr lang="en-US" sz="1400" dirty="0"/>
+              <a:t>&lt;CD&gt;</a:t>
+            </a:r>
+          </a:p>
+          <a:p>
+            <a:r>
+              <a:rPr lang="en-US" sz="1400" dirty="0"/>
+              <a:t>&lt;TITLE&gt;Hide your heart&lt;/TITLE&gt;</a:t>
+            </a:r>
+          </a:p>
+          <a:p>
+            <a:r>
+              <a:rPr lang="en-US" sz="1400" dirty="0"/>
+              <a:t>&lt;ARTIST&gt;Bonnie Tyler&lt;/ARTIST&gt;</a:t>
+            </a:r>
+          </a:p>
+          <a:p>
+            <a:r>
+              <a:rPr lang="en-US" sz="1400" dirty="0"/>
+              <a:t>&lt;COUNTRY&gt;UK&lt;/COUNTRY&gt;</a:t>
+            </a:r>
+          </a:p>
+          <a:p>
+            <a:r>
+              <a:rPr lang="en-US" sz="1400" dirty="0"/>
+              <a:t>&lt;COMPANY&gt;CBS Records&lt;/COMPANY&gt;</a:t>
+            </a:r>
+          </a:p>
+          <a:p>
+            <a:r>
+              <a:rPr lang="en-US" sz="1400" dirty="0"/>
+              <a:t>&lt;PRICE&gt;9.90&lt;/PRICE&gt;</a:t>
+            </a:r>
+          </a:p>
+          <a:p>
+            <a:r>
+              <a:rPr lang="en-US" sz="1400" dirty="0"/>
+              <a:t>&lt;YEAR&gt;1988&lt;/YEAR&gt;</a:t>
+            </a:r>
+          </a:p>
+          <a:p>
+            <a:r>
+              <a:rPr lang="en-US" sz="1400" dirty="0"/>
+              <a:t>&lt;/CD&gt;</a:t>
+            </a:r>
+          </a:p>
+          <a:p>
+            <a:r>
+              <a:rPr lang="en-US" sz="1400" dirty="0"/>
+              <a:t>&lt;CD&gt;</a:t>
+            </a:r>
+          </a:p>
+          <a:p>
+            <a:r>
+              <a:rPr lang="en-US" sz="1400" dirty="0"/>
+              <a:t>&lt;TITLE&gt;Greatest Hits&lt;/TITLE&gt;</a:t>
+            </a:r>
+          </a:p>
+          <a:p>
+            <a:r>
+              <a:rPr lang="en-US" sz="1400" dirty="0"/>
+              <a:t>&lt;ARTIST&gt;Dolly Parton&lt;/ARTIST&gt;</a:t>
+            </a:r>
+          </a:p>
+          <a:p>
+            <a:r>
+              <a:rPr lang="en-US" sz="1400" dirty="0"/>
+              <a:t>&lt;COUNTRY&gt;USA&lt;/COUNTRY&gt;</a:t>
+            </a:r>
+          </a:p>
+          <a:p>
+            <a:r>
+              <a:rPr lang="en-US" sz="1400" dirty="0"/>
+              <a:t>&lt;COMPANY&gt;RCA&lt;/COMPANY&gt;</a:t>
+            </a:r>
+          </a:p>
+          <a:p>
+            <a:r>
+              <a:rPr lang="en-US" sz="1400" dirty="0"/>
+              <a:t>&lt;PRICE&gt;9.90&lt;/PRICE&gt;</a:t>
+            </a:r>
+          </a:p>
+          <a:p>
+            <a:r>
+              <a:rPr lang="en-US" sz="1400" dirty="0"/>
+              <a:t>&lt;YEAR&gt;1982&lt;/YEAR&gt;</a:t>
+            </a:r>
+          </a:p>
+          <a:p>
+            <a:r>
+              <a:rPr lang="en-US" sz="1400" dirty="0"/>
+              <a:t>&lt;/CD&gt;</a:t>
+            </a:r>
           </a:p>
         </p:txBody>
       </p:sp>
@@ -16244,7 +16324,7 @@
     </p:spTree>
     <p:extLst>
       <p:ext uri="{BB962C8B-B14F-4D97-AF65-F5344CB8AC3E}">
-        <p14:creationId xmlns:p14="http://schemas.microsoft.com/office/powerpoint/2010/main" val="2294058340"/>
+        <p14:creationId xmlns:p14="http://schemas.microsoft.com/office/powerpoint/2010/main" val="3327868801"/>
       </p:ext>
     </p:extLst>
   </p:cSld>
@@ -16293,11 +16373,11 @@
           <a:bodyPr/>
           <a:lstStyle/>
           <a:p>
-            <a:r>
-              <a:rPr lang="en-US" dirty="0" smtClean="0"/>
-              <a:t>How Structured is this Data?</a:t>
-            </a:r>
-            <a:endParaRPr lang="en-US" dirty="0"/>
+            <a:pPr marL="0" indent="0"/>
+            <a:r>
+              <a:rPr lang="en-US" dirty="0"/>
+              <a:t>JSON is another example</a:t>
+            </a:r>
           </a:p>
         </p:txBody>
       </p:sp>
@@ -16311,42 +16391,129 @@
             <p:ph idx="1"/>
           </p:nvPr>
         </p:nvSpPr>
-        <p:spPr/>
-        <p:txBody>
-          <a:bodyPr/>
-          <a:lstStyle/>
-          <a:p>
-            <a:pPr marL="0" indent="0">
+        <p:spPr>
+          <a:xfrm>
+            <a:off x="1128942" y="1811871"/>
+            <a:ext cx="7655647" cy="4379976"/>
+          </a:xfrm>
+        </p:spPr>
+        <p:txBody>
+          <a:bodyPr/>
+          <a:lstStyle/>
+          <a:p>
+            <a:pPr marL="0" lvl="1" indent="0">
+              <a:buClr>
+                <a:schemeClr val="accent3"/>
+              </a:buClr>
+              <a:buSzTx/>
               <a:buNone/>
             </a:pPr>
             <a:r>
-              <a:rPr lang="en-US" dirty="0" smtClean="0"/>
-              <a:t>Possible to specify a schema and check against it</a:t>
-            </a:r>
-          </a:p>
-          <a:p>
-            <a:r>
-              <a:rPr lang="en-US" dirty="0" smtClean="0"/>
-              <a:t>XML DTD (weak specification)</a:t>
-            </a:r>
-          </a:p>
-          <a:p>
-            <a:r>
-              <a:rPr lang="en-US" dirty="0" smtClean="0"/>
-              <a:t>XML Schema (more powerful, includes types)</a:t>
-            </a:r>
-          </a:p>
-          <a:p>
-            <a:r>
-              <a:rPr lang="en-US" dirty="0" smtClean="0"/>
-              <a:t>JSON Schema</a:t>
-            </a:r>
-          </a:p>
-          <a:p>
-            <a:pPr marL="0" indent="0">
+              <a:rPr lang="en-US" sz="2800" dirty="0" smtClean="0"/>
+              <a:t>Originally a text format for storing JavaScript objects but widely adopted</a:t>
+            </a:r>
+          </a:p>
+          <a:p>
+            <a:pPr marL="0" lvl="1" indent="0">
+              <a:buClr>
+                <a:schemeClr val="accent3"/>
+              </a:buClr>
+              <a:buSzTx/>
               <a:buNone/>
             </a:pPr>
-            <a:endParaRPr lang="en-US" dirty="0"/>
+            <a:r>
+              <a:rPr lang="en-US" sz="2800" dirty="0" smtClean="0"/>
+              <a:t>Includes </a:t>
+            </a:r>
+            <a:r>
+              <a:rPr lang="en-US" sz="2800" i="1" dirty="0" smtClean="0"/>
+              <a:t>type </a:t>
+            </a:r>
+            <a:r>
+              <a:rPr lang="en-US" sz="2800" dirty="0" smtClean="0"/>
+              <a:t>information (number, </a:t>
+            </a:r>
+            <a:r>
+              <a:rPr lang="en-US" sz="2800" dirty="0" err="1" smtClean="0"/>
+              <a:t>bool</a:t>
+            </a:r>
+            <a:r>
+              <a:rPr lang="en-US" sz="2800" dirty="0" smtClean="0"/>
+              <a:t>, string, array, object, empty or </a:t>
+            </a:r>
+            <a:r>
+              <a:rPr lang="en-US" sz="2800" i="1" dirty="0" smtClean="0"/>
+              <a:t>null</a:t>
+            </a:r>
+            <a:r>
+              <a:rPr lang="en-US" sz="2800" dirty="0" smtClean="0"/>
+              <a:t>)</a:t>
+            </a:r>
+          </a:p>
+          <a:p>
+            <a:pPr marL="0" lvl="1" indent="0">
+              <a:buClr>
+                <a:schemeClr val="accent3"/>
+              </a:buClr>
+              <a:buSzTx/>
+              <a:buNone/>
+            </a:pPr>
+            <a:r>
+              <a:rPr lang="en-US" sz="2800" dirty="0" smtClean="0"/>
+              <a:t>Everything has a ‘label’: Translates into nested dictionaries from a python perspective</a:t>
+            </a:r>
+          </a:p>
+          <a:p>
+            <a:pPr marL="0" lvl="1" indent="0">
+              <a:buClr>
+                <a:schemeClr val="accent3"/>
+              </a:buClr>
+              <a:buSzTx/>
+              <a:buNone/>
+            </a:pPr>
+            <a:r>
+              <a:rPr lang="en-US" sz="2800" dirty="0" smtClean="0"/>
+              <a:t>Type is up to the creator (</a:t>
+            </a:r>
+            <a:r>
+              <a:rPr lang="en-US" sz="2800" i="1" dirty="0" smtClean="0"/>
+              <a:t>e.g. </a:t>
+            </a:r>
+            <a:r>
+              <a:rPr lang="en-US" sz="2800" dirty="0" smtClean="0"/>
+              <a:t>is a zip a string?)</a:t>
+            </a:r>
+          </a:p>
+          <a:p>
+            <a:pPr marL="0" lvl="1" indent="0">
+              <a:buClr>
+                <a:schemeClr val="accent3"/>
+              </a:buClr>
+              <a:buSzTx/>
+              <a:buNone/>
+            </a:pPr>
+            <a:r>
+              <a:rPr lang="en-US" sz="2800" dirty="0"/>
+              <a:t>Example: Twitter Tweets: https://</a:t>
+            </a:r>
+            <a:r>
+              <a:rPr lang="en-US" sz="2800" dirty="0" err="1"/>
+              <a:t>dev.twitter.com</a:t>
+            </a:r>
+            <a:r>
+              <a:rPr lang="en-US" sz="2800" dirty="0"/>
+              <a:t>/docs/platform-objects/tweets</a:t>
+            </a:r>
+          </a:p>
+          <a:p>
+            <a:pPr marL="0" lvl="1" indent="0">
+              <a:buClr>
+                <a:schemeClr val="accent3"/>
+              </a:buClr>
+              <a:buSzTx/>
+              <a:buNone/>
+            </a:pPr>
+            <a:endParaRPr lang="en-US" sz="2800" dirty="0" smtClean="0"/>
           </a:p>
         </p:txBody>
       </p:sp>
@@ -16367,7 +16534,7 @@
           <a:p>
             <a:fld id="{7053BEFA-1175-F644-B249-7D41D72BD3FF}" type="datetime1">
               <a:rPr lang="en-US" smtClean="0"/>
-              <a:t>1/19/15</a:t>
+              <a:t>1/25/15</a:t>
             </a:fld>
             <a:endParaRPr lang="en-US"/>
           </a:p>
@@ -16415,10 +16582,36 @@
           </a:p>
         </p:txBody>
       </p:sp>
+      <p:sp>
+        <p:nvSpPr>
+          <p:cNvPr id="8" name="TextBox 7"/>
+          <p:cNvSpPr txBox="1"/>
+          <p:nvPr/>
+        </p:nvSpPr>
+        <p:spPr>
+          <a:xfrm>
+            <a:off x="1481738" y="4110390"/>
+            <a:ext cx="184666" cy="369332"/>
+          </a:xfrm>
+          <a:prstGeom prst="rect">
+            <a:avLst/>
+          </a:prstGeom>
+          <a:noFill/>
+        </p:spPr>
+        <p:txBody>
+          <a:bodyPr wrap="none" rtlCol="0">
+            <a:spAutoFit/>
+          </a:bodyPr>
+          <a:lstStyle/>
+          <a:p>
+            <a:endParaRPr lang="en-US" dirty="0"/>
+          </a:p>
+        </p:txBody>
+      </p:sp>
     </p:spTree>
     <p:extLst>
       <p:ext uri="{BB962C8B-B14F-4D97-AF65-F5344CB8AC3E}">
-        <p14:creationId xmlns:p14="http://schemas.microsoft.com/office/powerpoint/2010/main" val="1768430142"/>
+        <p14:creationId xmlns:p14="http://schemas.microsoft.com/office/powerpoint/2010/main" val="2294058340"/>
       </p:ext>
     </p:extLst>
   </p:cSld>

</xml_diff>

<commit_message>
added goals slides to each slide deck
Also created new lecture 10 and 11.
</commit_message>
<xml_diff>
--- a/Lectures/3 Data Storage.pptx
+++ b/Lectures/3 Data Storage.pptx
@@ -5,45 +5,46 @@
     <p:sldMasterId id="2147483648" r:id="rId1"/>
   </p:sldMasterIdLst>
   <p:notesMasterIdLst>
-    <p:notesMasterId r:id="rId35"/>
+    <p:notesMasterId r:id="rId36"/>
   </p:notesMasterIdLst>
   <p:handoutMasterIdLst>
-    <p:handoutMasterId r:id="rId36"/>
+    <p:handoutMasterId r:id="rId37"/>
   </p:handoutMasterIdLst>
   <p:sldIdLst>
     <p:sldId id="256" r:id="rId2"/>
-    <p:sldId id="426" r:id="rId3"/>
-    <p:sldId id="257" r:id="rId4"/>
-    <p:sldId id="425" r:id="rId5"/>
-    <p:sldId id="259" r:id="rId6"/>
-    <p:sldId id="386" r:id="rId7"/>
-    <p:sldId id="315" r:id="rId8"/>
-    <p:sldId id="387" r:id="rId9"/>
-    <p:sldId id="388" r:id="rId10"/>
-    <p:sldId id="389" r:id="rId11"/>
-    <p:sldId id="390" r:id="rId12"/>
-    <p:sldId id="392" r:id="rId13"/>
-    <p:sldId id="412" r:id="rId14"/>
-    <p:sldId id="394" r:id="rId15"/>
-    <p:sldId id="395" r:id="rId16"/>
-    <p:sldId id="396" r:id="rId17"/>
-    <p:sldId id="397" r:id="rId18"/>
-    <p:sldId id="413" r:id="rId19"/>
-    <p:sldId id="416" r:id="rId20"/>
-    <p:sldId id="417" r:id="rId21"/>
-    <p:sldId id="418" r:id="rId22"/>
-    <p:sldId id="419" r:id="rId23"/>
-    <p:sldId id="420" r:id="rId24"/>
-    <p:sldId id="421" r:id="rId25"/>
-    <p:sldId id="422" r:id="rId26"/>
-    <p:sldId id="414" r:id="rId27"/>
-    <p:sldId id="399" r:id="rId28"/>
-    <p:sldId id="424" r:id="rId29"/>
-    <p:sldId id="409" r:id="rId30"/>
-    <p:sldId id="402" r:id="rId31"/>
-    <p:sldId id="407" r:id="rId32"/>
-    <p:sldId id="408" r:id="rId33"/>
-    <p:sldId id="410" r:id="rId34"/>
+    <p:sldId id="427" r:id="rId3"/>
+    <p:sldId id="426" r:id="rId4"/>
+    <p:sldId id="257" r:id="rId5"/>
+    <p:sldId id="425" r:id="rId6"/>
+    <p:sldId id="259" r:id="rId7"/>
+    <p:sldId id="386" r:id="rId8"/>
+    <p:sldId id="315" r:id="rId9"/>
+    <p:sldId id="387" r:id="rId10"/>
+    <p:sldId id="388" r:id="rId11"/>
+    <p:sldId id="389" r:id="rId12"/>
+    <p:sldId id="390" r:id="rId13"/>
+    <p:sldId id="392" r:id="rId14"/>
+    <p:sldId id="412" r:id="rId15"/>
+    <p:sldId id="394" r:id="rId16"/>
+    <p:sldId id="395" r:id="rId17"/>
+    <p:sldId id="396" r:id="rId18"/>
+    <p:sldId id="397" r:id="rId19"/>
+    <p:sldId id="413" r:id="rId20"/>
+    <p:sldId id="416" r:id="rId21"/>
+    <p:sldId id="417" r:id="rId22"/>
+    <p:sldId id="418" r:id="rId23"/>
+    <p:sldId id="419" r:id="rId24"/>
+    <p:sldId id="420" r:id="rId25"/>
+    <p:sldId id="421" r:id="rId26"/>
+    <p:sldId id="422" r:id="rId27"/>
+    <p:sldId id="414" r:id="rId28"/>
+    <p:sldId id="399" r:id="rId29"/>
+    <p:sldId id="424" r:id="rId30"/>
+    <p:sldId id="409" r:id="rId31"/>
+    <p:sldId id="402" r:id="rId32"/>
+    <p:sldId id="407" r:id="rId33"/>
+    <p:sldId id="408" r:id="rId34"/>
+    <p:sldId id="410" r:id="rId35"/>
   </p:sldIdLst>
   <p:sldSz cx="9144000" cy="6858000" type="screen4x3"/>
   <p:notesSz cx="6858000" cy="9144000"/>
@@ -227,7 +228,7 @@
           <a:p>
             <a:fld id="{D3AAB66F-B1B7-D045-B4E8-4F60236F228D}" type="datetimeFigureOut">
               <a:rPr lang="en-US" smtClean="0"/>
-              <a:t>1/25/15</a:t>
+              <a:t>2/14/15</a:t>
             </a:fld>
             <a:endParaRPr lang="en-US"/>
           </a:p>
@@ -393,7 +394,7 @@
           <a:p>
             <a:fld id="{BCCF8E76-06A6-164E-A6FA-EC32C13EB232}" type="datetimeFigureOut">
               <a:rPr lang="en-US" smtClean="0"/>
-              <a:t>1/25/15</a:t>
+              <a:t>2/14/15</a:t>
             </a:fld>
             <a:endParaRPr lang="en-US"/>
           </a:p>
@@ -783,7 +784,7 @@
           <a:p>
             <a:fld id="{FD66F34B-9C4D-8640-BB34-4C24A79C9FFB}" type="slidenum">
               <a:rPr lang="en-US" smtClean="0"/>
-              <a:t>7</a:t>
+              <a:t>8</a:t>
             </a:fld>
             <a:endParaRPr lang="en-US"/>
           </a:p>
@@ -867,7 +868,7 @@
           <a:p>
             <a:fld id="{FD66F34B-9C4D-8640-BB34-4C24A79C9FFB}" type="slidenum">
               <a:rPr lang="en-US" smtClean="0"/>
-              <a:t>25</a:t>
+              <a:t>26</a:t>
             </a:fld>
             <a:endParaRPr lang="en-US"/>
           </a:p>
@@ -975,7 +976,7 @@
           <a:p>
             <a:fld id="{FD66F34B-9C4D-8640-BB34-4C24A79C9FFB}" type="slidenum">
               <a:rPr lang="en-US" smtClean="0"/>
-              <a:t>26</a:t>
+              <a:t>27</a:t>
             </a:fld>
             <a:endParaRPr lang="en-US"/>
           </a:p>
@@ -1076,7 +1077,7 @@
           <a:p>
             <a:fld id="{FD66F34B-9C4D-8640-BB34-4C24A79C9FFB}" type="slidenum">
               <a:rPr lang="en-US" smtClean="0"/>
-              <a:t>29</a:t>
+              <a:t>30</a:t>
             </a:fld>
             <a:endParaRPr lang="en-US"/>
           </a:p>
@@ -1164,7 +1165,7 @@
           <a:p>
             <a:fld id="{FD66F34B-9C4D-8640-BB34-4C24A79C9FFB}" type="slidenum">
               <a:rPr lang="en-US" smtClean="0"/>
-              <a:t>31</a:t>
+              <a:t>32</a:t>
             </a:fld>
             <a:endParaRPr lang="en-US"/>
           </a:p>
@@ -1257,7 +1258,7 @@
           <a:p>
             <a:fld id="{FD66F34B-9C4D-8640-BB34-4C24A79C9FFB}" type="slidenum">
               <a:rPr lang="en-US" smtClean="0"/>
-              <a:t>32</a:t>
+              <a:t>33</a:t>
             </a:fld>
             <a:endParaRPr lang="en-US"/>
           </a:p>
@@ -1356,7 +1357,7 @@
           <a:p>
             <a:fld id="{FD66F34B-9C4D-8640-BB34-4C24A79C9FFB}" type="slidenum">
               <a:rPr lang="en-US" smtClean="0"/>
-              <a:t>33</a:t>
+              <a:t>34</a:t>
             </a:fld>
             <a:endParaRPr lang="en-US"/>
           </a:p>
@@ -1448,7 +1449,7 @@
           <a:p>
             <a:fld id="{FD66F34B-9C4D-8640-BB34-4C24A79C9FFB}" type="slidenum">
               <a:rPr lang="en-US" smtClean="0"/>
-              <a:t>9</a:t>
+              <a:t>10</a:t>
             </a:fld>
             <a:endParaRPr lang="en-US"/>
           </a:p>
@@ -1540,7 +1541,7 @@
           <a:p>
             <a:fld id="{FD66F34B-9C4D-8640-BB34-4C24A79C9FFB}" type="slidenum">
               <a:rPr lang="en-US" smtClean="0"/>
-              <a:t>10</a:t>
+              <a:t>11</a:t>
             </a:fld>
             <a:endParaRPr lang="en-US"/>
           </a:p>
@@ -1632,7 +1633,7 @@
           <a:p>
             <a:fld id="{FD66F34B-9C4D-8640-BB34-4C24A79C9FFB}" type="slidenum">
               <a:rPr lang="en-US" smtClean="0"/>
-              <a:t>11</a:t>
+              <a:t>12</a:t>
             </a:fld>
             <a:endParaRPr lang="en-US"/>
           </a:p>
@@ -1728,7 +1729,7 @@
           <a:p>
             <a:fld id="{FD66F34B-9C4D-8640-BB34-4C24A79C9FFB}" type="slidenum">
               <a:rPr lang="en-US" smtClean="0"/>
-              <a:t>12</a:t>
+              <a:t>13</a:t>
             </a:fld>
             <a:endParaRPr lang="en-US"/>
           </a:p>
@@ -1818,7 +1819,7 @@
           <a:p>
             <a:fld id="{FD66F34B-9C4D-8640-BB34-4C24A79C9FFB}" type="slidenum">
               <a:rPr lang="en-US" smtClean="0"/>
-              <a:t>13</a:t>
+              <a:t>14</a:t>
             </a:fld>
             <a:endParaRPr lang="en-US"/>
           </a:p>
@@ -1910,7 +1911,7 @@
           <a:p>
             <a:fld id="{FD66F34B-9C4D-8640-BB34-4C24A79C9FFB}" type="slidenum">
               <a:rPr lang="en-US" smtClean="0"/>
-              <a:t>22</a:t>
+              <a:t>23</a:t>
             </a:fld>
             <a:endParaRPr lang="en-US"/>
           </a:p>
@@ -1994,7 +1995,7 @@
           <a:p>
             <a:fld id="{FD66F34B-9C4D-8640-BB34-4C24A79C9FFB}" type="slidenum">
               <a:rPr lang="en-US" smtClean="0"/>
-              <a:t>23</a:t>
+              <a:t>24</a:t>
             </a:fld>
             <a:endParaRPr lang="en-US"/>
           </a:p>
@@ -2078,7 +2079,7 @@
           <a:p>
             <a:fld id="{FD66F34B-9C4D-8640-BB34-4C24A79C9FFB}" type="slidenum">
               <a:rPr lang="en-US" smtClean="0"/>
-              <a:t>24</a:t>
+              <a:t>25</a:t>
             </a:fld>
             <a:endParaRPr lang="en-US"/>
           </a:p>
@@ -2614,7 +2615,7 @@
             <a:fld id="{FA3C144B-2939-9A49-B014-915EC3E81866}" type="datetime1">
               <a:rPr lang="en-US" smtClean="0"/>
               <a:pPr/>
-              <a:t>1/25/15</a:t>
+              <a:t>2/14/15</a:t>
             </a:fld>
             <a:endParaRPr lang="en-US" dirty="0"/>
           </a:p>
@@ -3043,7 +3044,7 @@
           <a:p>
             <a:fld id="{76838339-A875-5E45-AB3F-AAABD270346A}" type="datetime1">
               <a:rPr lang="en-US" smtClean="0"/>
-              <a:t>1/25/15</a:t>
+              <a:t>2/14/15</a:t>
             </a:fld>
             <a:endParaRPr lang="en-US"/>
           </a:p>
@@ -3329,7 +3330,7 @@
             <a:fld id="{FA3C144B-2939-9A49-B014-915EC3E81866}" type="datetime1">
               <a:rPr lang="en-US" smtClean="0"/>
               <a:pPr/>
-              <a:t>1/25/15</a:t>
+              <a:t>2/14/15</a:t>
             </a:fld>
             <a:endParaRPr lang="en-US" dirty="0"/>
           </a:p>
@@ -3811,7 +3812,7 @@
           <a:p>
             <a:fld id="{A73F672F-A5FB-5745-934A-1BF51CA5539C}" type="datetime1">
               <a:rPr lang="en-US" smtClean="0"/>
-              <a:t>1/25/15</a:t>
+              <a:t>2/14/15</a:t>
             </a:fld>
             <a:endParaRPr lang="en-US"/>
           </a:p>
@@ -4153,7 +4154,7 @@
             <a:fld id="{FA3C144B-2939-9A49-B014-915EC3E81866}" type="datetime1">
               <a:rPr lang="en-US" smtClean="0"/>
               <a:pPr/>
-              <a:t>1/25/15</a:t>
+              <a:t>2/14/15</a:t>
             </a:fld>
             <a:endParaRPr lang="en-US" dirty="0"/>
           </a:p>
@@ -4617,7 +4618,7 @@
           <a:p>
             <a:fld id="{6AFE6A63-5EBE-3E48-B0AE-DF655A1ECE76}" type="datetime1">
               <a:rPr lang="en-US" smtClean="0"/>
-              <a:t>1/25/15</a:t>
+              <a:t>2/14/15</a:t>
             </a:fld>
             <a:endParaRPr lang="en-US"/>
           </a:p>
@@ -4936,7 +4937,7 @@
           <a:p>
             <a:fld id="{4A019F0C-9D18-B54A-9AC9-18AA74EDB034}" type="datetime1">
               <a:rPr lang="en-US" smtClean="0"/>
-              <a:t>1/25/15</a:t>
+              <a:t>2/14/15</a:t>
             </a:fld>
             <a:endParaRPr lang="en-US"/>
           </a:p>
@@ -5246,7 +5247,7 @@
             <a:fld id="{FA3C144B-2939-9A49-B014-915EC3E81866}" type="datetime1">
               <a:rPr lang="en-US" smtClean="0"/>
               <a:pPr/>
-              <a:t>1/25/15</a:t>
+              <a:t>2/14/15</a:t>
             </a:fld>
             <a:endParaRPr lang="en-US" dirty="0"/>
           </a:p>
@@ -5509,7 +5510,7 @@
           <a:p>
             <a:fld id="{FA3C144B-2939-9A49-B014-915EC3E81866}" type="datetime1">
               <a:rPr lang="en-US" smtClean="0"/>
-              <a:t>1/25/15</a:t>
+              <a:t>2/14/15</a:t>
             </a:fld>
             <a:endParaRPr lang="en-US" dirty="0"/>
           </a:p>
@@ -5877,7 +5878,7 @@
           <a:p>
             <a:fld id="{7053BEFA-1175-F644-B249-7D41D72BD3FF}" type="datetime1">
               <a:rPr lang="en-US" smtClean="0"/>
-              <a:t>1/25/15</a:t>
+              <a:t>2/14/15</a:t>
             </a:fld>
             <a:endParaRPr lang="en-US"/>
           </a:p>
@@ -5996,7 +5997,7 @@
             <a:fld id="{FA3C144B-2939-9A49-B014-915EC3E81866}" type="datetime1">
               <a:rPr lang="en-US" smtClean="0"/>
               <a:pPr/>
-              <a:t>1/25/15</a:t>
+              <a:t>2/14/15</a:t>
             </a:fld>
             <a:endParaRPr lang="en-US" dirty="0"/>
           </a:p>
@@ -6213,7 +6214,7 @@
             <a:fld id="{FA3C144B-2939-9A49-B014-915EC3E81866}" type="datetime1">
               <a:rPr lang="en-US" smtClean="0"/>
               <a:pPr/>
-              <a:t>1/25/15</a:t>
+              <a:t>2/14/15</a:t>
             </a:fld>
             <a:endParaRPr lang="en-US" dirty="0"/>
           </a:p>
@@ -6458,7 +6459,7 @@
             <a:fld id="{FA3C144B-2939-9A49-B014-915EC3E81866}" type="datetime1">
               <a:rPr lang="en-US" smtClean="0"/>
               <a:pPr/>
-              <a:t>1/25/15</a:t>
+              <a:t>2/14/15</a:t>
             </a:fld>
             <a:endParaRPr lang="en-US" dirty="0"/>
           </a:p>
@@ -6836,7 +6837,7 @@
           <a:p>
             <a:fld id="{111EEF3B-ABF2-AA4E-9E24-0C6256942674}" type="datetime1">
               <a:rPr lang="en-US" smtClean="0"/>
-              <a:t>1/25/15</a:t>
+              <a:t>2/14/15</a:t>
             </a:fld>
             <a:endParaRPr lang="en-US"/>
           </a:p>
@@ -7000,7 +7001,7 @@
             <a:fld id="{FA3C144B-2939-9A49-B014-915EC3E81866}" type="datetime1">
               <a:rPr lang="en-US" smtClean="0"/>
               <a:pPr/>
-              <a:t>1/25/15</a:t>
+              <a:t>2/14/15</a:t>
             </a:fld>
             <a:endParaRPr lang="en-US" dirty="0"/>
           </a:p>
@@ -7417,7 +7418,7 @@
             <a:fld id="{FA3C144B-2939-9A49-B014-915EC3E81866}" type="datetime1">
               <a:rPr lang="en-US" smtClean="0"/>
               <a:pPr/>
-              <a:t>1/25/15</a:t>
+              <a:t>2/14/15</a:t>
             </a:fld>
             <a:endParaRPr lang="en-US" dirty="0"/>
           </a:p>
@@ -7733,7 +7734,7 @@
             <a:fld id="{FA3C144B-2939-9A49-B014-915EC3E81866}" type="datetime1">
               <a:rPr lang="en-US" smtClean="0"/>
               <a:pPr/>
-              <a:t>1/25/15</a:t>
+              <a:t>2/14/15</a:t>
             </a:fld>
             <a:endParaRPr lang="en-US" dirty="0"/>
           </a:p>
@@ -8399,7 +8400,7 @@
             <a:fld id="{FA3C144B-2939-9A49-B014-915EC3E81866}" type="datetime1">
               <a:rPr lang="en-US" smtClean="0"/>
               <a:pPr/>
-              <a:t>1/25/15</a:t>
+              <a:t>2/14/15</a:t>
             </a:fld>
             <a:endParaRPr lang="en-US" dirty="0"/>
           </a:p>
@@ -9481,11 +9482,11 @@
           <a:bodyPr/>
           <a:lstStyle/>
           <a:p>
-            <a:r>
-              <a:rPr lang="en-US" dirty="0" smtClean="0"/>
-              <a:t>How Structured is this Data?</a:t>
-            </a:r>
-            <a:endParaRPr lang="en-US" dirty="0"/>
+            <a:pPr marL="0" indent="0"/>
+            <a:r>
+              <a:rPr lang="en-US" dirty="0"/>
+              <a:t>JSON is another example</a:t>
+            </a:r>
           </a:p>
         </p:txBody>
       </p:sp>
@@ -9499,42 +9500,129 @@
             <p:ph idx="1"/>
           </p:nvPr>
         </p:nvSpPr>
-        <p:spPr/>
-        <p:txBody>
-          <a:bodyPr/>
-          <a:lstStyle/>
-          <a:p>
-            <a:pPr marL="0" indent="0">
+        <p:spPr>
+          <a:xfrm>
+            <a:off x="1128942" y="1811871"/>
+            <a:ext cx="7655647" cy="4379976"/>
+          </a:xfrm>
+        </p:spPr>
+        <p:txBody>
+          <a:bodyPr/>
+          <a:lstStyle/>
+          <a:p>
+            <a:pPr marL="0" lvl="1" indent="0">
+              <a:buClr>
+                <a:schemeClr val="accent3"/>
+              </a:buClr>
+              <a:buSzTx/>
               <a:buNone/>
             </a:pPr>
             <a:r>
-              <a:rPr lang="en-US" dirty="0" smtClean="0"/>
-              <a:t>Possible to specify a schema and check against it</a:t>
-            </a:r>
-          </a:p>
-          <a:p>
-            <a:r>
-              <a:rPr lang="en-US" dirty="0" smtClean="0"/>
-              <a:t>XML DTD (weak specification)</a:t>
-            </a:r>
-          </a:p>
-          <a:p>
-            <a:r>
-              <a:rPr lang="en-US" dirty="0" smtClean="0"/>
-              <a:t>XML Schema (more powerful, includes types)</a:t>
-            </a:r>
-          </a:p>
-          <a:p>
-            <a:r>
-              <a:rPr lang="en-US" dirty="0" smtClean="0"/>
-              <a:t>JSON Schema</a:t>
-            </a:r>
-          </a:p>
-          <a:p>
-            <a:pPr marL="0" indent="0">
+              <a:rPr lang="en-US" sz="2800" dirty="0" smtClean="0"/>
+              <a:t>Originally a text format for storing JavaScript objects but widely adopted</a:t>
+            </a:r>
+          </a:p>
+          <a:p>
+            <a:pPr marL="0" lvl="1" indent="0">
+              <a:buClr>
+                <a:schemeClr val="accent3"/>
+              </a:buClr>
+              <a:buSzTx/>
               <a:buNone/>
             </a:pPr>
-            <a:endParaRPr lang="en-US" dirty="0"/>
+            <a:r>
+              <a:rPr lang="en-US" sz="2800" dirty="0" smtClean="0"/>
+              <a:t>Includes </a:t>
+            </a:r>
+            <a:r>
+              <a:rPr lang="en-US" sz="2800" i="1" dirty="0" smtClean="0"/>
+              <a:t>type </a:t>
+            </a:r>
+            <a:r>
+              <a:rPr lang="en-US" sz="2800" dirty="0" smtClean="0"/>
+              <a:t>information (number, </a:t>
+            </a:r>
+            <a:r>
+              <a:rPr lang="en-US" sz="2800" dirty="0" err="1" smtClean="0"/>
+              <a:t>bool</a:t>
+            </a:r>
+            <a:r>
+              <a:rPr lang="en-US" sz="2800" dirty="0" smtClean="0"/>
+              <a:t>, string, array, object, empty or </a:t>
+            </a:r>
+            <a:r>
+              <a:rPr lang="en-US" sz="2800" i="1" dirty="0" smtClean="0"/>
+              <a:t>null</a:t>
+            </a:r>
+            <a:r>
+              <a:rPr lang="en-US" sz="2800" dirty="0" smtClean="0"/>
+              <a:t>)</a:t>
+            </a:r>
+          </a:p>
+          <a:p>
+            <a:pPr marL="0" lvl="1" indent="0">
+              <a:buClr>
+                <a:schemeClr val="accent3"/>
+              </a:buClr>
+              <a:buSzTx/>
+              <a:buNone/>
+            </a:pPr>
+            <a:r>
+              <a:rPr lang="en-US" sz="2800" dirty="0" smtClean="0"/>
+              <a:t>Everything has a ‘label’: Translates into nested dictionaries from a python perspective</a:t>
+            </a:r>
+          </a:p>
+          <a:p>
+            <a:pPr marL="0" lvl="1" indent="0">
+              <a:buClr>
+                <a:schemeClr val="accent3"/>
+              </a:buClr>
+              <a:buSzTx/>
+              <a:buNone/>
+            </a:pPr>
+            <a:r>
+              <a:rPr lang="en-US" sz="2800" dirty="0" smtClean="0"/>
+              <a:t>Type is up to the creator (</a:t>
+            </a:r>
+            <a:r>
+              <a:rPr lang="en-US" sz="2800" i="1" dirty="0" smtClean="0"/>
+              <a:t>e.g. </a:t>
+            </a:r>
+            <a:r>
+              <a:rPr lang="en-US" sz="2800" dirty="0" smtClean="0"/>
+              <a:t>is a zip a string?)</a:t>
+            </a:r>
+          </a:p>
+          <a:p>
+            <a:pPr marL="0" lvl="1" indent="0">
+              <a:buClr>
+                <a:schemeClr val="accent3"/>
+              </a:buClr>
+              <a:buSzTx/>
+              <a:buNone/>
+            </a:pPr>
+            <a:r>
+              <a:rPr lang="en-US" sz="2800" dirty="0"/>
+              <a:t>Example: Twitter Tweets: https://</a:t>
+            </a:r>
+            <a:r>
+              <a:rPr lang="en-US" sz="2800" dirty="0" err="1"/>
+              <a:t>dev.twitter.com</a:t>
+            </a:r>
+            <a:r>
+              <a:rPr lang="en-US" sz="2800" dirty="0"/>
+              <a:t>/docs/platform-objects/tweets</a:t>
+            </a:r>
+          </a:p>
+          <a:p>
+            <a:pPr marL="0" lvl="1" indent="0">
+              <a:buClr>
+                <a:schemeClr val="accent3"/>
+              </a:buClr>
+              <a:buSzTx/>
+              <a:buNone/>
+            </a:pPr>
+            <a:endParaRPr lang="en-US" sz="2800" dirty="0" smtClean="0"/>
           </a:p>
         </p:txBody>
       </p:sp>
@@ -9555,7 +9643,7 @@
           <a:p>
             <a:fld id="{7053BEFA-1175-F644-B249-7D41D72BD3FF}" type="datetime1">
               <a:rPr lang="en-US" smtClean="0"/>
-              <a:t>1/25/15</a:t>
+              <a:t>2/14/15</a:t>
             </a:fld>
             <a:endParaRPr lang="en-US"/>
           </a:p>
@@ -9603,10 +9691,36 @@
           </a:p>
         </p:txBody>
       </p:sp>
+      <p:sp>
+        <p:nvSpPr>
+          <p:cNvPr id="8" name="TextBox 7"/>
+          <p:cNvSpPr txBox="1"/>
+          <p:nvPr/>
+        </p:nvSpPr>
+        <p:spPr>
+          <a:xfrm>
+            <a:off x="1481738" y="4110390"/>
+            <a:ext cx="184666" cy="369332"/>
+          </a:xfrm>
+          <a:prstGeom prst="rect">
+            <a:avLst/>
+          </a:prstGeom>
+          <a:noFill/>
+        </p:spPr>
+        <p:txBody>
+          <a:bodyPr wrap="none" rtlCol="0">
+            <a:spAutoFit/>
+          </a:bodyPr>
+          <a:lstStyle/>
+          <a:p>
+            <a:endParaRPr lang="en-US" dirty="0"/>
+          </a:p>
+        </p:txBody>
+      </p:sp>
     </p:spTree>
     <p:extLst>
       <p:ext uri="{BB962C8B-B14F-4D97-AF65-F5344CB8AC3E}">
-        <p14:creationId xmlns:p14="http://schemas.microsoft.com/office/powerpoint/2010/main" val="1768430142"/>
+        <p14:creationId xmlns:p14="http://schemas.microsoft.com/office/powerpoint/2010/main" val="2294058340"/>
       </p:ext>
     </p:extLst>
   </p:cSld>
@@ -9657,7 +9771,7 @@
           <a:p>
             <a:r>
               <a:rPr lang="en-US" dirty="0" smtClean="0"/>
-              <a:t>How Structured is it Really?</a:t>
+              <a:t>How Structured is this Data?</a:t>
             </a:r>
             <a:endParaRPr lang="en-US" dirty="0"/>
           </a:p>
@@ -9683,68 +9797,31 @@
             </a:pPr>
             <a:r>
               <a:rPr lang="en-US" dirty="0" smtClean="0"/>
-              <a:t>XML/JSON often used for communication (</a:t>
-            </a:r>
-            <a:r>
-              <a:rPr lang="en-US" i="1" dirty="0" smtClean="0"/>
-              <a:t>e.g. </a:t>
-            </a:r>
-            <a:r>
-              <a:rPr lang="en-US" dirty="0" smtClean="0"/>
-              <a:t>Web API return values)</a:t>
+              <a:t>Possible to specify a schema and check against it</a:t>
+            </a:r>
+          </a:p>
+          <a:p>
+            <a:r>
+              <a:rPr lang="en-US" dirty="0" smtClean="0"/>
+              <a:t>XML DTD (weak specification)</a:t>
+            </a:r>
+          </a:p>
+          <a:p>
+            <a:r>
+              <a:rPr lang="en-US" dirty="0" smtClean="0"/>
+              <a:t>XML Schema (more powerful, includes types)</a:t>
+            </a:r>
+          </a:p>
+          <a:p>
+            <a:r>
+              <a:rPr lang="en-US" dirty="0" smtClean="0"/>
+              <a:t>JSON Schema</a:t>
             </a:r>
           </a:p>
           <a:p>
             <a:pPr marL="0" indent="0">
               <a:buNone/>
             </a:pPr>
-            <a:r>
-              <a:rPr lang="en-US" dirty="0" smtClean="0"/>
-              <a:t>Underlying data may be </a:t>
-            </a:r>
-            <a:r>
-              <a:rPr lang="en-US" i="1" dirty="0" smtClean="0"/>
-              <a:t>highly </a:t>
-            </a:r>
-            <a:r>
-              <a:rPr lang="en-US" dirty="0" smtClean="0"/>
-              <a:t>structured</a:t>
-            </a:r>
-          </a:p>
-          <a:p>
-            <a:pPr marL="0" indent="0">
-              <a:buNone/>
-            </a:pPr>
-            <a:r>
-              <a:rPr lang="en-US" dirty="0" smtClean="0"/>
-              <a:t>Usually no DTD or Schema included (documentation is considered sufficient)</a:t>
-            </a:r>
-          </a:p>
-          <a:p>
-            <a:pPr marL="0" indent="0">
-              <a:buNone/>
-            </a:pPr>
-            <a:r>
-              <a:rPr lang="en-US" dirty="0" smtClean="0"/>
-              <a:t>Must linearize any cyclical data to do this</a:t>
-            </a:r>
-          </a:p>
-          <a:p>
-            <a:pPr marL="228600" lvl="1" indent="0">
-              <a:buNone/>
-            </a:pPr>
-            <a:r>
-              <a:rPr lang="en-US" dirty="0" smtClean="0"/>
-              <a:t>Often leads to multiple queries corresponding </a:t>
-            </a:r>
-            <a:r>
-              <a:rPr lang="en-US" dirty="0" err="1" smtClean="0"/>
-              <a:t>approx</a:t>
-            </a:r>
-            <a:r>
-              <a:rPr lang="en-US" dirty="0" smtClean="0"/>
-              <a:t> to different database tables</a:t>
-            </a:r>
             <a:endParaRPr lang="en-US" dirty="0"/>
           </a:p>
         </p:txBody>
@@ -9766,7 +9843,7 @@
           <a:p>
             <a:fld id="{7053BEFA-1175-F644-B249-7D41D72BD3FF}" type="datetime1">
               <a:rPr lang="en-US" smtClean="0"/>
-              <a:t>1/25/15</a:t>
+              <a:t>2/14/15</a:t>
             </a:fld>
             <a:endParaRPr lang="en-US"/>
           </a:p>
@@ -9817,7 +9894,7 @@
     </p:spTree>
     <p:extLst>
       <p:ext uri="{BB962C8B-B14F-4D97-AF65-F5344CB8AC3E}">
-        <p14:creationId xmlns:p14="http://schemas.microsoft.com/office/powerpoint/2010/main" val="78491078"/>
+        <p14:creationId xmlns:p14="http://schemas.microsoft.com/office/powerpoint/2010/main" val="1768430142"/>
       </p:ext>
     </p:extLst>
   </p:cSld>
@@ -9868,7 +9945,7 @@
           <a:p>
             <a:r>
               <a:rPr lang="en-US" dirty="0" smtClean="0"/>
-              <a:t>So what is structured data?</a:t>
+              <a:t>How Structured is it Really?</a:t>
             </a:r>
             <a:endParaRPr lang="en-US" dirty="0"/>
           </a:p>
@@ -9889,7 +9966,74 @@
           <a:bodyPr/>
           <a:lstStyle/>
           <a:p>
-            <a:endParaRPr lang="en-US"/>
+            <a:pPr marL="0" indent="0">
+              <a:buNone/>
+            </a:pPr>
+            <a:r>
+              <a:rPr lang="en-US" dirty="0" smtClean="0"/>
+              <a:t>XML/JSON often used for communication (</a:t>
+            </a:r>
+            <a:r>
+              <a:rPr lang="en-US" i="1" dirty="0" smtClean="0"/>
+              <a:t>e.g. </a:t>
+            </a:r>
+            <a:r>
+              <a:rPr lang="en-US" dirty="0" smtClean="0"/>
+              <a:t>Web API return values)</a:t>
+            </a:r>
+          </a:p>
+          <a:p>
+            <a:pPr marL="0" indent="0">
+              <a:buNone/>
+            </a:pPr>
+            <a:r>
+              <a:rPr lang="en-US" dirty="0" smtClean="0"/>
+              <a:t>Underlying data may be </a:t>
+            </a:r>
+            <a:r>
+              <a:rPr lang="en-US" i="1" dirty="0" smtClean="0"/>
+              <a:t>highly </a:t>
+            </a:r>
+            <a:r>
+              <a:rPr lang="en-US" dirty="0" smtClean="0"/>
+              <a:t>structured</a:t>
+            </a:r>
+          </a:p>
+          <a:p>
+            <a:pPr marL="0" indent="0">
+              <a:buNone/>
+            </a:pPr>
+            <a:r>
+              <a:rPr lang="en-US" dirty="0" smtClean="0"/>
+              <a:t>Usually no DTD or Schema included (documentation is considered sufficient)</a:t>
+            </a:r>
+          </a:p>
+          <a:p>
+            <a:pPr marL="0" indent="0">
+              <a:buNone/>
+            </a:pPr>
+            <a:r>
+              <a:rPr lang="en-US" dirty="0" smtClean="0"/>
+              <a:t>Must linearize any cyclical data to do this</a:t>
+            </a:r>
+          </a:p>
+          <a:p>
+            <a:pPr marL="228600" lvl="1" indent="0">
+              <a:buNone/>
+            </a:pPr>
+            <a:r>
+              <a:rPr lang="en-US" dirty="0" smtClean="0"/>
+              <a:t>Often leads to multiple queries corresponding </a:t>
+            </a:r>
+            <a:r>
+              <a:rPr lang="en-US" dirty="0" err="1" smtClean="0"/>
+              <a:t>approx</a:t>
+            </a:r>
+            <a:r>
+              <a:rPr lang="en-US" dirty="0" smtClean="0"/>
+              <a:t> to different database tables</a:t>
+            </a:r>
+            <a:endParaRPr lang="en-US" dirty="0"/>
           </a:p>
         </p:txBody>
       </p:sp>
@@ -9910,7 +10054,7 @@
           <a:p>
             <a:fld id="{7053BEFA-1175-F644-B249-7D41D72BD3FF}" type="datetime1">
               <a:rPr lang="en-US" smtClean="0"/>
-              <a:t>1/25/15</a:t>
+              <a:t>2/14/15</a:t>
             </a:fld>
             <a:endParaRPr lang="en-US"/>
           </a:p>
@@ -9961,7 +10105,7 @@
     </p:spTree>
     <p:extLst>
       <p:ext uri="{BB962C8B-B14F-4D97-AF65-F5344CB8AC3E}">
-        <p14:creationId xmlns:p14="http://schemas.microsoft.com/office/powerpoint/2010/main" val="2469477308"/>
+        <p14:creationId xmlns:p14="http://schemas.microsoft.com/office/powerpoint/2010/main" val="78491078"/>
       </p:ext>
     </p:extLst>
   </p:cSld>
@@ -10012,7 +10156,7 @@
           <a:p>
             <a:r>
               <a:rPr lang="en-US" dirty="0" smtClean="0"/>
-              <a:t>What is a Data Model?</a:t>
+              <a:t>So what is structured data?</a:t>
             </a:r>
             <a:endParaRPr lang="en-US" dirty="0"/>
           </a:p>
@@ -10033,74 +10177,7 @@
           <a:bodyPr/>
           <a:lstStyle/>
           <a:p>
-            <a:pPr marL="0" indent="0">
-              <a:buNone/>
-            </a:pPr>
-            <a:r>
-              <a:rPr lang="en-US" dirty="0"/>
-              <a:t>What data is </a:t>
-            </a:r>
-            <a:r>
-              <a:rPr lang="en-US" dirty="0" smtClean="0"/>
-              <a:t>stored and </a:t>
-            </a:r>
-            <a:r>
-              <a:rPr lang="en-US" dirty="0"/>
-              <a:t>how it is </a:t>
-            </a:r>
-            <a:r>
-              <a:rPr lang="en-US" dirty="0" smtClean="0"/>
-              <a:t>organized</a:t>
-            </a:r>
-          </a:p>
-          <a:p>
-            <a:pPr marL="0" indent="0">
-              <a:buNone/>
-            </a:pPr>
-            <a:endParaRPr lang="en-US" dirty="0" smtClean="0"/>
-          </a:p>
-          <a:p>
-            <a:pPr marL="0" indent="0">
-              <a:buNone/>
-            </a:pPr>
-            <a:r>
-              <a:rPr lang="en-US" dirty="0" smtClean="0"/>
-              <a:t>Key benefits:</a:t>
-            </a:r>
-          </a:p>
-          <a:p>
-            <a:r>
-              <a:rPr lang="en-US" dirty="0" smtClean="0"/>
-              <a:t>Leverage  </a:t>
-            </a:r>
-            <a:r>
-              <a:rPr lang="en-US" dirty="0"/>
-              <a:t>(big impact on programming; cost; </a:t>
-            </a:r>
-            <a:r>
-              <a:rPr lang="en-US" i="1" dirty="0" smtClean="0"/>
-              <a:t>etc.</a:t>
-            </a:r>
-            <a:r>
-              <a:rPr lang="en-US" dirty="0" smtClean="0"/>
-              <a:t>)</a:t>
-            </a:r>
-            <a:endParaRPr lang="en-US" dirty="0"/>
-          </a:p>
-          <a:p>
-            <a:r>
-              <a:rPr lang="en-US" dirty="0"/>
-              <a:t>Conciseness (implies an interaction model)</a:t>
-            </a:r>
-          </a:p>
-          <a:p>
-            <a:r>
-              <a:rPr lang="en-US" dirty="0"/>
-              <a:t>Can encode integrity constraints </a:t>
-            </a:r>
-          </a:p>
-          <a:p>
-            <a:endParaRPr lang="en-US" dirty="0"/>
+            <a:endParaRPr lang="en-US"/>
           </a:p>
         </p:txBody>
       </p:sp>
@@ -10121,7 +10198,7 @@
           <a:p>
             <a:fld id="{7053BEFA-1175-F644-B249-7D41D72BD3FF}" type="datetime1">
               <a:rPr lang="en-US" smtClean="0"/>
-              <a:t>1/25/15</a:t>
+              <a:t>2/14/15</a:t>
             </a:fld>
             <a:endParaRPr lang="en-US"/>
           </a:p>
@@ -10169,36 +10246,10 @@
           </a:p>
         </p:txBody>
       </p:sp>
-      <p:sp>
-        <p:nvSpPr>
-          <p:cNvPr id="7" name="TextBox 6"/>
-          <p:cNvSpPr txBox="1"/>
-          <p:nvPr/>
-        </p:nvSpPr>
-        <p:spPr>
-          <a:xfrm>
-            <a:off x="3362451" y="3473351"/>
-            <a:ext cx="184666" cy="369332"/>
-          </a:xfrm>
-          <a:prstGeom prst="rect">
-            <a:avLst/>
-          </a:prstGeom>
-          <a:noFill/>
-        </p:spPr>
-        <p:txBody>
-          <a:bodyPr wrap="none" rtlCol="0">
-            <a:spAutoFit/>
-          </a:bodyPr>
-          <a:lstStyle/>
-          <a:p>
-            <a:endParaRPr lang="en-US" dirty="0"/>
-          </a:p>
-        </p:txBody>
-      </p:sp>
     </p:spTree>
     <p:extLst>
       <p:ext uri="{BB962C8B-B14F-4D97-AF65-F5344CB8AC3E}">
-        <p14:creationId xmlns:p14="http://schemas.microsoft.com/office/powerpoint/2010/main" val="321535194"/>
+        <p14:creationId xmlns:p14="http://schemas.microsoft.com/office/powerpoint/2010/main" val="2469477308"/>
       </p:ext>
     </p:extLst>
   </p:cSld>
@@ -10249,7 +10300,7 @@
           <a:p>
             <a:r>
               <a:rPr lang="en-US" dirty="0" smtClean="0"/>
-              <a:t>Common structure</a:t>
+              <a:t>What is a Data Model?</a:t>
             </a:r>
             <a:endParaRPr lang="en-US" dirty="0"/>
           </a:p>
@@ -10274,32 +10325,27 @@
               <a:buNone/>
             </a:pPr>
             <a:r>
-              <a:rPr lang="en-US" dirty="0" smtClean="0"/>
-              <a:t>Tables (rows &amp; columns)</a:t>
+              <a:rPr lang="en-US" dirty="0"/>
+              <a:t>What data is </a:t>
+            </a:r>
+            <a:r>
+              <a:rPr lang="en-US" dirty="0" smtClean="0"/>
+              <a:t>stored and </a:t>
+            </a:r>
+            <a:r>
+              <a:rPr lang="en-US" dirty="0"/>
+              <a:t>how it is </a:t>
+            </a:r>
+            <a:r>
+              <a:rPr lang="en-US" dirty="0" smtClean="0"/>
+              <a:t>organized</a:t>
             </a:r>
           </a:p>
           <a:p>
             <a:pPr marL="0" indent="0">
               <a:buNone/>
             </a:pPr>
-            <a:r>
-              <a:rPr lang="en-US" dirty="0" smtClean="0"/>
-              <a:t>Example from Byte2: </a:t>
-            </a:r>
-          </a:p>
-          <a:p>
-            <a:pPr lvl="1"/>
-            <a:r>
-              <a:rPr lang="en-US" dirty="0" smtClean="0"/>
-              <a:t>Each row is a pet </a:t>
-            </a:r>
-          </a:p>
-          <a:p>
-            <a:pPr lvl="1"/>
-            <a:r>
-              <a:rPr lang="en-US" dirty="0" smtClean="0"/>
-              <a:t>Columns describe where it was found, breed, color, outcome and so on.</a:t>
-            </a:r>
+            <a:endParaRPr lang="en-US" dirty="0" smtClean="0"/>
           </a:p>
           <a:p>
             <a:pPr marL="0" indent="0">
@@ -10307,17 +10353,41 @@
             </a:pPr>
             <a:r>
               <a:rPr lang="en-US" dirty="0" smtClean="0"/>
-              <a:t>Many of the data sets we will look at have this form</a:t>
-            </a:r>
-          </a:p>
-          <a:p>
-            <a:pPr marL="0" indent="0">
-              <a:buNone/>
-            </a:pPr>
-            <a:r>
-              <a:rPr lang="en-US" dirty="0" smtClean="0"/>
-              <a:t>But a database is typically far more complex</a:t>
-            </a:r>
+              <a:t>Key benefits:</a:t>
+            </a:r>
+          </a:p>
+          <a:p>
+            <a:r>
+              <a:rPr lang="en-US" dirty="0" smtClean="0"/>
+              <a:t>Leverage  </a:t>
+            </a:r>
+            <a:r>
+              <a:rPr lang="en-US" dirty="0"/>
+              <a:t>(big impact on programming; cost; </a:t>
+            </a:r>
+            <a:r>
+              <a:rPr lang="en-US" i="1" dirty="0" smtClean="0"/>
+              <a:t>etc.</a:t>
+            </a:r>
+            <a:r>
+              <a:rPr lang="en-US" dirty="0" smtClean="0"/>
+              <a:t>)</a:t>
+            </a:r>
+            <a:endParaRPr lang="en-US" dirty="0"/>
+          </a:p>
+          <a:p>
+            <a:r>
+              <a:rPr lang="en-US" dirty="0"/>
+              <a:t>Conciseness (implies an interaction model)</a:t>
+            </a:r>
+          </a:p>
+          <a:p>
+            <a:r>
+              <a:rPr lang="en-US" dirty="0"/>
+              <a:t>Can encode integrity constraints </a:t>
+            </a:r>
+          </a:p>
+          <a:p>
             <a:endParaRPr lang="en-US" dirty="0"/>
           </a:p>
         </p:txBody>
@@ -10339,7 +10409,7 @@
           <a:p>
             <a:fld id="{7053BEFA-1175-F644-B249-7D41D72BD3FF}" type="datetime1">
               <a:rPr lang="en-US" smtClean="0"/>
-              <a:t>1/25/15</a:t>
+              <a:t>2/14/15</a:t>
             </a:fld>
             <a:endParaRPr lang="en-US"/>
           </a:p>
@@ -10387,10 +10457,36 @@
           </a:p>
         </p:txBody>
       </p:sp>
+      <p:sp>
+        <p:nvSpPr>
+          <p:cNvPr id="7" name="TextBox 6"/>
+          <p:cNvSpPr txBox="1"/>
+          <p:nvPr/>
+        </p:nvSpPr>
+        <p:spPr>
+          <a:xfrm>
+            <a:off x="3362451" y="3473351"/>
+            <a:ext cx="184666" cy="369332"/>
+          </a:xfrm>
+          <a:prstGeom prst="rect">
+            <a:avLst/>
+          </a:prstGeom>
+          <a:noFill/>
+        </p:spPr>
+        <p:txBody>
+          <a:bodyPr wrap="none" rtlCol="0">
+            <a:spAutoFit/>
+          </a:bodyPr>
+          <a:lstStyle/>
+          <a:p>
+            <a:endParaRPr lang="en-US" dirty="0"/>
+          </a:p>
+        </p:txBody>
+      </p:sp>
     </p:spTree>
     <p:extLst>
       <p:ext uri="{BB962C8B-B14F-4D97-AF65-F5344CB8AC3E}">
-        <p14:creationId xmlns:p14="http://schemas.microsoft.com/office/powerpoint/2010/main" val="1224266322"/>
+        <p14:creationId xmlns:p14="http://schemas.microsoft.com/office/powerpoint/2010/main" val="321535194"/>
       </p:ext>
     </p:extLst>
   </p:cSld>
@@ -10441,7 +10537,7 @@
           <a:p>
             <a:r>
               <a:rPr lang="en-US" dirty="0" smtClean="0"/>
-              <a:t>Complex Schema</a:t>
+              <a:t>Common structure</a:t>
             </a:r>
             <a:endParaRPr lang="en-US" dirty="0"/>
           </a:p>
@@ -10467,7 +10563,7 @@
             </a:pPr>
             <a:r>
               <a:rPr lang="en-US" dirty="0" smtClean="0"/>
-              <a:t>Many tables</a:t>
+              <a:t>Tables (rows &amp; columns)</a:t>
             </a:r>
           </a:p>
           <a:p>
@@ -10475,12 +10571,22 @@
               <a:buNone/>
             </a:pPr>
             <a:r>
-              <a:rPr lang="en-US" i="1" dirty="0" smtClean="0"/>
-              <a:t>Logically </a:t>
-            </a:r>
-            <a:r>
-              <a:rPr lang="en-US" dirty="0" smtClean="0"/>
-              <a:t>connected [who’s logic?]</a:t>
+              <a:rPr lang="en-US" dirty="0" smtClean="0"/>
+              <a:t>Example from Byte2: </a:t>
+            </a:r>
+          </a:p>
+          <a:p>
+            <a:pPr lvl="1"/>
+            <a:r>
+              <a:rPr lang="en-US" dirty="0" smtClean="0"/>
+              <a:t>Each row is a pet </a:t>
+            </a:r>
+          </a:p>
+          <a:p>
+            <a:pPr lvl="1"/>
+            <a:r>
+              <a:rPr lang="en-US" dirty="0" smtClean="0"/>
+              <a:t>Columns describe where it was found, breed, color, outcome and so on.</a:t>
             </a:r>
           </a:p>
           <a:p>
@@ -10489,7 +10595,7 @@
             </a:pPr>
             <a:r>
               <a:rPr lang="en-US" dirty="0" smtClean="0"/>
-              <a:t>Connections expressed using special kinds of columns that reflect Ids of other tables (“foreign keys”)</a:t>
+              <a:t>Many of the data sets we will look at have this form</a:t>
             </a:r>
           </a:p>
           <a:p>
@@ -10497,19 +10603,10 @@
               <a:buNone/>
             </a:pPr>
             <a:r>
-              <a:rPr lang="en-US" i="1" dirty="0" smtClean="0"/>
-              <a:t>Rules </a:t>
-            </a:r>
-            <a:r>
-              <a:rPr lang="en-US" dirty="0" smtClean="0"/>
-              <a:t>(implicit or explicit) may further govern the integrity of data</a:t>
-            </a:r>
-          </a:p>
-          <a:p>
-            <a:pPr marL="0" indent="0">
-              <a:buNone/>
-            </a:pPr>
-            <a:endParaRPr lang="en-US" dirty="0" smtClean="0"/>
+              <a:rPr lang="en-US" dirty="0" smtClean="0"/>
+              <a:t>But a database is typically far more complex</a:t>
+            </a:r>
+            <a:endParaRPr lang="en-US" dirty="0"/>
           </a:p>
         </p:txBody>
       </p:sp>
@@ -10530,7 +10627,7 @@
           <a:p>
             <a:fld id="{7053BEFA-1175-F644-B249-7D41D72BD3FF}" type="datetime1">
               <a:rPr lang="en-US" smtClean="0"/>
-              <a:t>1/25/15</a:t>
+              <a:t>2/14/15</a:t>
             </a:fld>
             <a:endParaRPr lang="en-US"/>
           </a:p>
@@ -10581,7 +10678,7 @@
     </p:spTree>
     <p:extLst>
       <p:ext uri="{BB962C8B-B14F-4D97-AF65-F5344CB8AC3E}">
-        <p14:creationId xmlns:p14="http://schemas.microsoft.com/office/powerpoint/2010/main" val="3564684317"/>
+        <p14:creationId xmlns:p14="http://schemas.microsoft.com/office/powerpoint/2010/main" val="1224266322"/>
       </p:ext>
     </p:extLst>
   </p:cSld>
@@ -10632,7 +10729,7 @@
           <a:p>
             <a:r>
               <a:rPr lang="en-US" dirty="0" smtClean="0"/>
-              <a:t>Example</a:t>
+              <a:t>Complex Schema</a:t>
             </a:r>
             <a:endParaRPr lang="en-US" dirty="0"/>
           </a:p>
@@ -10658,14 +10755,49 @@
             </a:pPr>
             <a:r>
               <a:rPr lang="en-US" dirty="0" smtClean="0"/>
-              <a:t>What if we had a table of dog breeds</a:t>
+              <a:t>Many tables</a:t>
             </a:r>
           </a:p>
           <a:p>
             <a:pPr marL="0" indent="0">
               <a:buNone/>
             </a:pPr>
-            <a:endParaRPr lang="en-US" dirty="0"/>
+            <a:r>
+              <a:rPr lang="en-US" i="1" dirty="0" smtClean="0"/>
+              <a:t>Logically </a:t>
+            </a:r>
+            <a:r>
+              <a:rPr lang="en-US" dirty="0" smtClean="0"/>
+              <a:t>connected [who’s logic?]</a:t>
+            </a:r>
+          </a:p>
+          <a:p>
+            <a:pPr marL="0" indent="0">
+              <a:buNone/>
+            </a:pPr>
+            <a:r>
+              <a:rPr lang="en-US" dirty="0" smtClean="0"/>
+              <a:t>Connections expressed using special kinds of columns that reflect Ids of other tables (“foreign keys”)</a:t>
+            </a:r>
+          </a:p>
+          <a:p>
+            <a:pPr marL="0" indent="0">
+              <a:buNone/>
+            </a:pPr>
+            <a:r>
+              <a:rPr lang="en-US" i="1" dirty="0" smtClean="0"/>
+              <a:t>Rules </a:t>
+            </a:r>
+            <a:r>
+              <a:rPr lang="en-US" dirty="0" smtClean="0"/>
+              <a:t>(implicit or explicit) may further govern the integrity of data</a:t>
+            </a:r>
+          </a:p>
+          <a:p>
+            <a:pPr marL="0" indent="0">
+              <a:buNone/>
+            </a:pPr>
+            <a:endParaRPr lang="en-US" dirty="0" smtClean="0"/>
           </a:p>
         </p:txBody>
       </p:sp>
@@ -10686,7 +10818,7 @@
           <a:p>
             <a:fld id="{7053BEFA-1175-F644-B249-7D41D72BD3FF}" type="datetime1">
               <a:rPr lang="en-US" smtClean="0"/>
-              <a:t>1/25/15</a:t>
+              <a:t>2/14/15</a:t>
             </a:fld>
             <a:endParaRPr lang="en-US"/>
           </a:p>
@@ -10729,6 +10861,162 @@
             <a:fld id="{17E276FA-8F89-B34D-A726-BE3FA1F8DD97}" type="slidenum">
               <a:rPr lang="en-US" smtClean="0"/>
               <a:t>16</a:t>
+            </a:fld>
+            <a:endParaRPr lang="en-US" dirty="0"/>
+          </a:p>
+        </p:txBody>
+      </p:sp>
+    </p:spTree>
+    <p:extLst>
+      <p:ext uri="{BB962C8B-B14F-4D97-AF65-F5344CB8AC3E}">
+        <p14:creationId xmlns:p14="http://schemas.microsoft.com/office/powerpoint/2010/main" val="3564684317"/>
+      </p:ext>
+    </p:extLst>
+  </p:cSld>
+  <p:clrMapOvr>
+    <a:masterClrMapping/>
+  </p:clrMapOvr>
+  <p:timing>
+    <p:tnLst>
+      <p:par>
+        <p:cTn xmlns:p14="http://schemas.microsoft.com/office/powerpoint/2010/main" id="1" dur="indefinite" restart="never" nodeType="tmRoot"/>
+      </p:par>
+    </p:tnLst>
+  </p:timing>
+</p:sld>
+</file>
+
+<file path=ppt/slides/slide17.xml><?xml version="1.0" encoding="utf-8"?>
+<p:sld xmlns:a="http://schemas.openxmlformats.org/drawingml/2006/main" xmlns:r="http://schemas.openxmlformats.org/officeDocument/2006/relationships" xmlns:p="http://schemas.openxmlformats.org/presentationml/2006/main">
+  <p:cSld>
+    <p:spTree>
+      <p:nvGrpSpPr>
+        <p:cNvPr id="1" name=""/>
+        <p:cNvGrpSpPr/>
+        <p:nvPr/>
+      </p:nvGrpSpPr>
+      <p:grpSpPr>
+        <a:xfrm>
+          <a:off x="0" y="0"/>
+          <a:ext cx="0" cy="0"/>
+          <a:chOff x="0" y="0"/>
+          <a:chExt cx="0" cy="0"/>
+        </a:xfrm>
+      </p:grpSpPr>
+      <p:sp>
+        <p:nvSpPr>
+          <p:cNvPr id="2" name="Title 1"/>
+          <p:cNvSpPr>
+            <a:spLocks noGrp="1"/>
+          </p:cNvSpPr>
+          <p:nvPr>
+            <p:ph type="title"/>
+          </p:nvPr>
+        </p:nvSpPr>
+        <p:spPr/>
+        <p:txBody>
+          <a:bodyPr/>
+          <a:lstStyle/>
+          <a:p>
+            <a:r>
+              <a:rPr lang="en-US" dirty="0" smtClean="0"/>
+              <a:t>Example</a:t>
+            </a:r>
+            <a:endParaRPr lang="en-US" dirty="0"/>
+          </a:p>
+        </p:txBody>
+      </p:sp>
+      <p:sp>
+        <p:nvSpPr>
+          <p:cNvPr id="3" name="Content Placeholder 2"/>
+          <p:cNvSpPr>
+            <a:spLocks noGrp="1"/>
+          </p:cNvSpPr>
+          <p:nvPr>
+            <p:ph idx="1"/>
+          </p:nvPr>
+        </p:nvSpPr>
+        <p:spPr/>
+        <p:txBody>
+          <a:bodyPr/>
+          <a:lstStyle/>
+          <a:p>
+            <a:pPr marL="0" indent="0">
+              <a:buNone/>
+            </a:pPr>
+            <a:r>
+              <a:rPr lang="en-US" dirty="0" smtClean="0"/>
+              <a:t>What if we had a table of dog breeds</a:t>
+            </a:r>
+          </a:p>
+          <a:p>
+            <a:pPr marL="0" indent="0">
+              <a:buNone/>
+            </a:pPr>
+            <a:endParaRPr lang="en-US" dirty="0"/>
+          </a:p>
+        </p:txBody>
+      </p:sp>
+      <p:sp>
+        <p:nvSpPr>
+          <p:cNvPr id="4" name="Date Placeholder 3"/>
+          <p:cNvSpPr>
+            <a:spLocks noGrp="1"/>
+          </p:cNvSpPr>
+          <p:nvPr>
+            <p:ph type="dt" sz="half" idx="10"/>
+          </p:nvPr>
+        </p:nvSpPr>
+        <p:spPr/>
+        <p:txBody>
+          <a:bodyPr/>
+          <a:lstStyle/>
+          <a:p>
+            <a:fld id="{7053BEFA-1175-F644-B249-7D41D72BD3FF}" type="datetime1">
+              <a:rPr lang="en-US" smtClean="0"/>
+              <a:t>2/14/15</a:t>
+            </a:fld>
+            <a:endParaRPr lang="en-US"/>
+          </a:p>
+        </p:txBody>
+      </p:sp>
+      <p:sp>
+        <p:nvSpPr>
+          <p:cNvPr id="5" name="Footer Placeholder 4"/>
+          <p:cNvSpPr>
+            <a:spLocks noGrp="1"/>
+          </p:cNvSpPr>
+          <p:nvPr>
+            <p:ph type="ftr" sz="quarter" idx="11"/>
+          </p:nvPr>
+        </p:nvSpPr>
+        <p:spPr/>
+        <p:txBody>
+          <a:bodyPr/>
+          <a:lstStyle/>
+          <a:p>
+            <a:endParaRPr lang="en-US" dirty="0"/>
+          </a:p>
+        </p:txBody>
+      </p:sp>
+      <p:sp>
+        <p:nvSpPr>
+          <p:cNvPr id="6" name="Slide Number Placeholder 5"/>
+          <p:cNvSpPr>
+            <a:spLocks noGrp="1"/>
+          </p:cNvSpPr>
+          <p:nvPr>
+            <p:ph type="sldNum" sz="quarter" idx="12"/>
+          </p:nvPr>
+        </p:nvSpPr>
+        <p:spPr/>
+        <p:txBody>
+          <a:bodyPr/>
+          <a:lstStyle/>
+          <a:p>
+            <a:fld id="{17E276FA-8F89-B34D-A726-BE3FA1F8DD97}" type="slidenum">
+              <a:rPr lang="en-US" smtClean="0"/>
+              <a:t>17</a:t>
             </a:fld>
             <a:endParaRPr lang="en-US" dirty="0"/>
           </a:p>
@@ -10910,7 +11198,7 @@
 </p:sld>
 </file>
 
-<file path=ppt/slides/slide17.xml><?xml version="1.0" encoding="utf-8"?>
+<file path=ppt/slides/slide18.xml><?xml version="1.0" encoding="utf-8"?>
 <p:sld xmlns:a="http://schemas.openxmlformats.org/drawingml/2006/main" xmlns:r="http://schemas.openxmlformats.org/officeDocument/2006/relationships" xmlns:p="http://schemas.openxmlformats.org/presentationml/2006/main">
   <p:cSld>
     <p:spTree>
@@ -11074,7 +11362,7 @@
           <a:p>
             <a:fld id="{7053BEFA-1175-F644-B249-7D41D72BD3FF}" type="datetime1">
               <a:rPr lang="en-US" smtClean="0"/>
-              <a:t>1/25/15</a:t>
+              <a:t>2/14/15</a:t>
             </a:fld>
             <a:endParaRPr lang="en-US"/>
           </a:p>
@@ -11116,7 +11404,7 @@
           <a:p>
             <a:fld id="{17E276FA-8F89-B34D-A726-BE3FA1F8DD97}" type="slidenum">
               <a:rPr lang="en-US" smtClean="0"/>
-              <a:t>17</a:t>
+              <a:t>18</a:t>
             </a:fld>
             <a:endParaRPr lang="en-US" dirty="0"/>
           </a:p>
@@ -11604,156 +11892,6 @@
 </p:sld>
 </file>
 
-<file path=ppt/slides/slide18.xml><?xml version="1.0" encoding="utf-8"?>
-<p:sld xmlns:a="http://schemas.openxmlformats.org/drawingml/2006/main" xmlns:r="http://schemas.openxmlformats.org/officeDocument/2006/relationships" xmlns:p="http://schemas.openxmlformats.org/presentationml/2006/main">
-  <p:cSld>
-    <p:spTree>
-      <p:nvGrpSpPr>
-        <p:cNvPr id="1" name=""/>
-        <p:cNvGrpSpPr/>
-        <p:nvPr/>
-      </p:nvGrpSpPr>
-      <p:grpSpPr>
-        <a:xfrm>
-          <a:off x="0" y="0"/>
-          <a:ext cx="0" cy="0"/>
-          <a:chOff x="0" y="0"/>
-          <a:chExt cx="0" cy="0"/>
-        </a:xfrm>
-      </p:grpSpPr>
-      <p:sp>
-        <p:nvSpPr>
-          <p:cNvPr id="2" name="Title 1"/>
-          <p:cNvSpPr>
-            <a:spLocks noGrp="1"/>
-          </p:cNvSpPr>
-          <p:nvPr>
-            <p:ph type="title"/>
-          </p:nvPr>
-        </p:nvSpPr>
-        <p:spPr/>
-        <p:txBody>
-          <a:bodyPr/>
-          <a:lstStyle/>
-          <a:p>
-            <a:r>
-              <a:rPr lang="en-US" dirty="0" smtClean="0"/>
-              <a:t>What makes a good data model?</a:t>
-            </a:r>
-            <a:endParaRPr lang="en-US" dirty="0"/>
-          </a:p>
-        </p:txBody>
-      </p:sp>
-      <p:sp>
-        <p:nvSpPr>
-          <p:cNvPr id="3" name="Content Placeholder 2"/>
-          <p:cNvSpPr>
-            <a:spLocks noGrp="1"/>
-          </p:cNvSpPr>
-          <p:nvPr>
-            <p:ph idx="1"/>
-          </p:nvPr>
-        </p:nvSpPr>
-        <p:spPr/>
-        <p:txBody>
-          <a:bodyPr/>
-          <a:lstStyle/>
-          <a:p>
-            <a:pPr marL="0" indent="0">
-              <a:buNone/>
-            </a:pPr>
-            <a:r>
-              <a:rPr lang="en-US" dirty="0" smtClean="0"/>
-              <a:t>Completeness – does it support all of the data?</a:t>
-            </a:r>
-          </a:p>
-        </p:txBody>
-      </p:sp>
-      <p:sp>
-        <p:nvSpPr>
-          <p:cNvPr id="4" name="Date Placeholder 3"/>
-          <p:cNvSpPr>
-            <a:spLocks noGrp="1"/>
-          </p:cNvSpPr>
-          <p:nvPr>
-            <p:ph type="dt" sz="half" idx="10"/>
-          </p:nvPr>
-        </p:nvSpPr>
-        <p:spPr/>
-        <p:txBody>
-          <a:bodyPr/>
-          <a:lstStyle/>
-          <a:p>
-            <a:fld id="{7053BEFA-1175-F644-B249-7D41D72BD3FF}" type="datetime1">
-              <a:rPr lang="en-US" smtClean="0"/>
-              <a:t>1/25/15</a:t>
-            </a:fld>
-            <a:endParaRPr lang="en-US"/>
-          </a:p>
-        </p:txBody>
-      </p:sp>
-      <p:sp>
-        <p:nvSpPr>
-          <p:cNvPr id="5" name="Footer Placeholder 4"/>
-          <p:cNvSpPr>
-            <a:spLocks noGrp="1"/>
-          </p:cNvSpPr>
-          <p:nvPr>
-            <p:ph type="ftr" sz="quarter" idx="11"/>
-          </p:nvPr>
-        </p:nvSpPr>
-        <p:spPr/>
-        <p:txBody>
-          <a:bodyPr/>
-          <a:lstStyle/>
-          <a:p>
-            <a:endParaRPr lang="en-US" dirty="0"/>
-          </a:p>
-        </p:txBody>
-      </p:sp>
-      <p:sp>
-        <p:nvSpPr>
-          <p:cNvPr id="6" name="Slide Number Placeholder 5"/>
-          <p:cNvSpPr>
-            <a:spLocks noGrp="1"/>
-          </p:cNvSpPr>
-          <p:nvPr>
-            <p:ph type="sldNum" sz="quarter" idx="12"/>
-          </p:nvPr>
-        </p:nvSpPr>
-        <p:spPr/>
-        <p:txBody>
-          <a:bodyPr/>
-          <a:lstStyle/>
-          <a:p>
-            <a:fld id="{17E276FA-8F89-B34D-A726-BE3FA1F8DD97}" type="slidenum">
-              <a:rPr lang="en-US" smtClean="0"/>
-              <a:t>18</a:t>
-            </a:fld>
-            <a:endParaRPr lang="en-US" dirty="0"/>
-          </a:p>
-        </p:txBody>
-      </p:sp>
-    </p:spTree>
-    <p:extLst>
-      <p:ext uri="{BB962C8B-B14F-4D97-AF65-F5344CB8AC3E}">
-        <p14:creationId xmlns:p14="http://schemas.microsoft.com/office/powerpoint/2010/main" val="2240654708"/>
-      </p:ext>
-    </p:extLst>
-  </p:cSld>
-  <p:clrMapOvr>
-    <a:masterClrMapping/>
-  </p:clrMapOvr>
-  <p:timing>
-    <p:tnLst>
-      <p:par>
-        <p:cTn xmlns:p14="http://schemas.microsoft.com/office/powerpoint/2010/main" id="1" dur="indefinite" restart="never" nodeType="tmRoot"/>
-      </p:par>
-    </p:tnLst>
-  </p:timing>
-</p:sld>
-</file>
-
 <file path=ppt/slides/slide19.xml><?xml version="1.0" encoding="utf-8"?>
 <p:sld xmlns:a="http://schemas.openxmlformats.org/drawingml/2006/main" xmlns:r="http://schemas.openxmlformats.org/officeDocument/2006/relationships" xmlns:p="http://schemas.openxmlformats.org/presentationml/2006/main">
   <p:cSld>
@@ -11814,40 +11952,8 @@
             </a:pPr>
             <a:r>
               <a:rPr lang="en-US" dirty="0" smtClean="0"/>
-              <a:t>Completeness</a:t>
-            </a:r>
-          </a:p>
-          <a:p>
-            <a:pPr marL="0" indent="0">
-              <a:buNone/>
-            </a:pPr>
-            <a:r>
-              <a:rPr lang="en-US" dirty="0" err="1" smtClean="0"/>
-              <a:t>Nonredundancy</a:t>
-            </a:r>
-            <a:r>
-              <a:rPr lang="en-US" dirty="0" smtClean="0"/>
-              <a:t> – Age &amp; Birth Date? </a:t>
-            </a:r>
-          </a:p>
-          <a:p>
-            <a:r>
-              <a:rPr lang="en-US" dirty="0" smtClean="0"/>
-              <a:t>Affects space</a:t>
-            </a:r>
-          </a:p>
-          <a:p>
-            <a:r>
-              <a:rPr lang="en-US" dirty="0" smtClean="0"/>
-              <a:t>Affects processing</a:t>
-            </a:r>
-          </a:p>
-          <a:p>
-            <a:r>
-              <a:rPr lang="en-US" dirty="0" smtClean="0"/>
-              <a:t>Affects consistency!! </a:t>
-            </a:r>
-            <a:endParaRPr lang="en-US" dirty="0"/>
+              <a:t>Completeness – does it support all of the data?</a:t>
+            </a:r>
           </a:p>
         </p:txBody>
       </p:sp>
@@ -11868,7 +11974,7 @@
           <a:p>
             <a:fld id="{7053BEFA-1175-F644-B249-7D41D72BD3FF}" type="datetime1">
               <a:rPr lang="en-US" smtClean="0"/>
-              <a:t>1/25/15</a:t>
+              <a:t>2/14/15</a:t>
             </a:fld>
             <a:endParaRPr lang="en-US"/>
           </a:p>
@@ -11919,7 +12025,7 @@
     </p:spTree>
     <p:extLst>
       <p:ext uri="{BB962C8B-B14F-4D97-AF65-F5344CB8AC3E}">
-        <p14:creationId xmlns:p14="http://schemas.microsoft.com/office/powerpoint/2010/main" val="3038058737"/>
+        <p14:creationId xmlns:p14="http://schemas.microsoft.com/office/powerpoint/2010/main" val="2240654708"/>
       </p:ext>
     </p:extLst>
   </p:cSld>
@@ -11955,9 +12061,9 @@
       </p:grpSpPr>
       <p:sp>
         <p:nvSpPr>
-          <p:cNvPr id="2" name="Title 1"/>
-          <p:cNvSpPr>
-            <a:spLocks noGrp="1"/>
+          <p:cNvPr id="5122" name="Rectangle 2"/>
+          <p:cNvSpPr>
+            <a:spLocks noGrp="1" noChangeArrowheads="1"/>
           </p:cNvSpPr>
           <p:nvPr>
             <p:ph type="title"/>
@@ -11969,150 +12075,152 @@
           <a:lstStyle/>
           <a:p>
             <a:r>
-              <a:rPr lang="en-US" dirty="0" smtClean="0"/>
-              <a:t>Readings Starting up</a:t>
-            </a:r>
-            <a:endParaRPr lang="en-US" dirty="0"/>
-          </a:p>
-        </p:txBody>
-      </p:sp>
-      <p:sp>
-        <p:nvSpPr>
-          <p:cNvPr id="3" name="Content Placeholder 2"/>
-          <p:cNvSpPr>
-            <a:spLocks noGrp="1"/>
+              <a:rPr lang="en-US"/>
+              <a:t>Goals</a:t>
+            </a:r>
+          </a:p>
+        </p:txBody>
+      </p:sp>
+      <p:sp>
+        <p:nvSpPr>
+          <p:cNvPr id="5123" name="Rectangle 3"/>
+          <p:cNvSpPr>
+            <a:spLocks noGrp="1" noChangeArrowheads="1"/>
           </p:cNvSpPr>
           <p:nvPr>
             <p:ph idx="1"/>
           </p:nvPr>
         </p:nvSpPr>
-        <p:spPr/>
-        <p:txBody>
-          <a:bodyPr/>
-          <a:lstStyle/>
-          <a:p>
-            <a:pPr marL="0" indent="0">
+        <p:spPr>
+          <a:xfrm>
+            <a:off x="1128943" y="1847153"/>
+            <a:ext cx="7048804" cy="4302716"/>
+          </a:xfrm>
+          <a:noFill/>
+        </p:spPr>
+        <p:txBody>
+          <a:bodyPr>
+            <a:spAutoFit/>
+          </a:bodyPr>
+          <a:lstStyle/>
+          <a:p>
+            <a:pPr marL="320675" indent="-320675" defTabSz="852488">
+              <a:lnSpc>
+                <a:spcPct val="110000"/>
+              </a:lnSpc>
+              <a:buFontTx/>
               <a:buNone/>
             </a:pPr>
             <a:r>
-              <a:rPr lang="en-US" dirty="0" smtClean="0"/>
-              <a:t>Optional</a:t>
+              <a:rPr lang="en-US" b="1" dirty="0"/>
+              <a:t>After </a:t>
+            </a:r>
+            <a:r>
+              <a:rPr lang="en-US" b="1" dirty="0" smtClean="0"/>
+              <a:t>this, </a:t>
+            </a:r>
+            <a:r>
+              <a:rPr lang="en-US" b="1" dirty="0"/>
+              <a:t>you should be able to:</a:t>
+            </a:r>
+            <a:r>
+              <a:rPr lang="en-US" sz="3600" dirty="0"/>
+              <a:t> </a:t>
+            </a:r>
+            <a:endParaRPr lang="en-US" sz="1200" dirty="0"/>
+          </a:p>
+          <a:p>
+            <a:pPr marL="320675" indent="-320675" defTabSz="852488">
+              <a:spcBef>
+                <a:spcPct val="25000"/>
+              </a:spcBef>
+              <a:buSzPct val="80000"/>
+            </a:pPr>
+            <a:r>
+              <a:rPr lang="en-US" dirty="0" smtClean="0"/>
+              <a:t>Explain the difference between semi-structured, structured, and unstructured data</a:t>
+            </a:r>
+          </a:p>
+          <a:p>
+            <a:pPr marL="320675" indent="-320675" defTabSz="852488">
+              <a:spcBef>
+                <a:spcPct val="25000"/>
+              </a:spcBef>
+              <a:buSzPct val="80000"/>
+            </a:pPr>
+            <a:r>
+              <a:rPr lang="en-US" sz="2800" dirty="0" smtClean="0"/>
+              <a:t>Describe what makes a good data model</a:t>
+            </a:r>
+          </a:p>
+          <a:p>
+            <a:pPr marL="320675" indent="-320675" defTabSz="852488">
+              <a:spcBef>
+                <a:spcPct val="25000"/>
+              </a:spcBef>
+              <a:buSzPct val="80000"/>
+            </a:pPr>
+            <a:r>
+              <a:rPr lang="en-US" sz="2800" dirty="0" smtClean="0"/>
+              <a:t>Understand the relationship between semi-structured and structured data </a:t>
+            </a:r>
+            <a:r>
+              <a:rPr lang="en-US" sz="2800" smtClean="0"/>
+              <a:t>on the web</a:t>
+            </a:r>
+            <a:endParaRPr lang="en-US" sz="2800" dirty="0" smtClean="0"/>
+          </a:p>
+        </p:txBody>
+      </p:sp>
+      <p:sp>
+        <p:nvSpPr>
+          <p:cNvPr id="2" name="Rectangle 1"/>
+          <p:cNvSpPr/>
+          <p:nvPr/>
+        </p:nvSpPr>
+        <p:spPr>
+          <a:xfrm>
+            <a:off x="0" y="6488668"/>
+            <a:ext cx="7101749" cy="369332"/>
+          </a:xfrm>
+          <a:prstGeom prst="rect">
+            <a:avLst/>
+          </a:prstGeom>
+        </p:spPr>
+        <p:txBody>
+          <a:bodyPr wrap="none">
+            <a:spAutoFit/>
+          </a:bodyPr>
+          <a:lstStyle/>
+          <a:p>
+            <a:r>
+              <a:rPr lang="en-US" dirty="0" smtClean="0"/>
+              <a:t>Adapted from http</a:t>
             </a:r>
             <a:r>
               <a:rPr lang="en-US" dirty="0"/>
-              <a:t>: </a:t>
+              <a:t>://</a:t>
             </a:r>
             <a:r>
               <a:rPr lang="en-US" dirty="0" err="1"/>
-              <a:t>Stonebraker</a:t>
+              <a:t>www.fordham.edu</a:t>
             </a:r>
             <a:r>
               <a:rPr lang="en-US" dirty="0"/>
-              <a:t> &amp; </a:t>
+              <a:t>/economics/</a:t>
             </a:r>
             <a:r>
               <a:rPr lang="en-US" dirty="0" err="1"/>
-              <a:t>Hellerstein</a:t>
-            </a:r>
-            <a:r>
-              <a:rPr lang="en-US" dirty="0"/>
-              <a:t>: What Goes Around Comes Around </a:t>
-            </a:r>
-            <a:endParaRPr lang="en-US" dirty="0" smtClean="0"/>
-          </a:p>
-          <a:p>
-            <a:pPr marL="0" indent="0">
-              <a:buNone/>
-            </a:pPr>
-            <a:r>
-              <a:rPr lang="en-US" dirty="0" smtClean="0"/>
-              <a:t>(can be found </a:t>
-            </a:r>
-            <a:r>
-              <a:rPr lang="en-US" dirty="0"/>
-              <a:t>on http://</a:t>
-            </a:r>
-            <a:r>
-              <a:rPr lang="en-US" dirty="0" err="1"/>
-              <a:t>data.cmubi.org</a:t>
-            </a:r>
-            <a:r>
-              <a:rPr lang="en-US" dirty="0"/>
+              <a:t>Vinod</a:t>
+            </a:r>
+            <a:r>
+              <a:rPr lang="en-US" dirty="0" smtClean="0"/>
               <a:t>/</a:t>
             </a:r>
             <a:r>
-              <a:rPr lang="en-US" dirty="0" smtClean="0"/>
-              <a:t>calendar; first required reading due next Tuesday. Should discuss </a:t>
-            </a:r>
-            <a:r>
-              <a:rPr lang="en-US" smtClean="0"/>
-              <a:t>on Piazza). </a:t>
-            </a:r>
-            <a:endParaRPr lang="en-US" dirty="0"/>
-          </a:p>
-        </p:txBody>
-      </p:sp>
-      <p:sp>
-        <p:nvSpPr>
-          <p:cNvPr id="4" name="Date Placeholder 3"/>
-          <p:cNvSpPr>
-            <a:spLocks noGrp="1"/>
-          </p:cNvSpPr>
-          <p:nvPr>
-            <p:ph type="dt" sz="half" idx="10"/>
-          </p:nvPr>
-        </p:nvSpPr>
-        <p:spPr/>
-        <p:txBody>
-          <a:bodyPr/>
-          <a:lstStyle/>
-          <a:p>
-            <a:fld id="{7053BEFA-1175-F644-B249-7D41D72BD3FF}" type="datetime1">
-              <a:rPr lang="en-US" smtClean="0"/>
-              <a:t>1/25/15</a:t>
-            </a:fld>
-            <a:endParaRPr lang="en-US"/>
-          </a:p>
-        </p:txBody>
-      </p:sp>
-      <p:sp>
-        <p:nvSpPr>
-          <p:cNvPr id="5" name="Footer Placeholder 4"/>
-          <p:cNvSpPr>
-            <a:spLocks noGrp="1"/>
-          </p:cNvSpPr>
-          <p:nvPr>
-            <p:ph type="ftr" sz="quarter" idx="11"/>
-          </p:nvPr>
-        </p:nvSpPr>
-        <p:spPr/>
-        <p:txBody>
-          <a:bodyPr/>
-          <a:lstStyle/>
-          <a:p>
-            <a:endParaRPr lang="en-US" dirty="0"/>
-          </a:p>
-        </p:txBody>
-      </p:sp>
-      <p:sp>
-        <p:nvSpPr>
-          <p:cNvPr id="6" name="Slide Number Placeholder 5"/>
-          <p:cNvSpPr>
-            <a:spLocks noGrp="1"/>
-          </p:cNvSpPr>
-          <p:nvPr>
-            <p:ph type="sldNum" sz="quarter" idx="12"/>
-          </p:nvPr>
-        </p:nvSpPr>
-        <p:spPr/>
-        <p:txBody>
-          <a:bodyPr/>
-          <a:lstStyle/>
-          <a:p>
-            <a:fld id="{17E276FA-8F89-B34D-A726-BE3FA1F8DD97}" type="slidenum">
-              <a:rPr lang="en-US" smtClean="0"/>
-              <a:t>2</a:t>
-            </a:fld>
+              <a:rPr lang="en-US" dirty="0" err="1" smtClean="0"/>
+              <a:t>correl-regr.ppt</a:t>
+            </a:r>
             <a:endParaRPr lang="en-US" dirty="0"/>
           </a:p>
         </p:txBody>
@@ -12120,13 +12228,20 @@
     </p:spTree>
     <p:extLst>
       <p:ext uri="{BB962C8B-B14F-4D97-AF65-F5344CB8AC3E}">
-        <p14:creationId xmlns:p14="http://schemas.microsoft.com/office/powerpoint/2010/main" val="2825193249"/>
+        <p14:creationId xmlns:p14="http://schemas.microsoft.com/office/powerpoint/2010/main" val="703361331"/>
       </p:ext>
     </p:extLst>
   </p:cSld>
   <p:clrMapOvr>
     <a:masterClrMapping/>
   </p:clrMapOvr>
+  <p:timing>
+    <p:tnLst>
+      <p:par>
+        <p:cTn xmlns:p14="http://schemas.microsoft.com/office/powerpoint/2010/main" id="1" dur="indefinite" restart="never" nodeType="tmRoot"/>
+      </p:par>
+    </p:tnLst>
+  </p:timing>
 </p:sld>
 </file>
 
@@ -12201,37 +12316,27 @@
               <a:rPr lang="en-US" dirty="0" err="1" smtClean="0"/>
               <a:t>Nonredundancy</a:t>
             </a:r>
-            <a:endParaRPr lang="en-US" dirty="0" smtClean="0"/>
-          </a:p>
-          <a:p>
-            <a:pPr marL="0" indent="0">
-              <a:buNone/>
-            </a:pPr>
-            <a:r>
-              <a:rPr lang="en-US" dirty="0" smtClean="0"/>
-              <a:t>Enforcement of Rules </a:t>
-            </a:r>
-          </a:p>
-          <a:p>
-            <a:r>
-              <a:rPr lang="en-US" dirty="0" smtClean="0"/>
-              <a:t>Happens across tables by ensuring </a:t>
-            </a:r>
-            <a:r>
-              <a:rPr lang="en-US" i="1" dirty="0" smtClean="0"/>
-              <a:t>e.g. </a:t>
-            </a:r>
-            <a:r>
-              <a:rPr lang="en-US" dirty="0" smtClean="0"/>
-              <a:t>that each dog only has </a:t>
-            </a:r>
-            <a:r>
-              <a:rPr lang="en-US" dirty="0"/>
-              <a:t>2</a:t>
-            </a:r>
-            <a:r>
-              <a:rPr lang="en-US" dirty="0" smtClean="0"/>
-              <a:t> breeds</a:t>
+            <a:r>
+              <a:rPr lang="en-US" dirty="0" smtClean="0"/>
+              <a:t> – Age &amp; Birth Date? </a:t>
+            </a:r>
+          </a:p>
+          <a:p>
+            <a:r>
+              <a:rPr lang="en-US" dirty="0" smtClean="0"/>
+              <a:t>Affects space</a:t>
+            </a:r>
+          </a:p>
+          <a:p>
+            <a:r>
+              <a:rPr lang="en-US" dirty="0" smtClean="0"/>
+              <a:t>Affects processing</a:t>
+            </a:r>
+          </a:p>
+          <a:p>
+            <a:r>
+              <a:rPr lang="en-US" dirty="0" smtClean="0"/>
+              <a:t>Affects consistency!! </a:t>
             </a:r>
             <a:endParaRPr lang="en-US" dirty="0"/>
           </a:p>
@@ -12254,7 +12359,7 @@
           <a:p>
             <a:fld id="{7053BEFA-1175-F644-B249-7D41D72BD3FF}" type="datetime1">
               <a:rPr lang="en-US" smtClean="0"/>
-              <a:t>1/25/15</a:t>
+              <a:t>2/14/15</a:t>
             </a:fld>
             <a:endParaRPr lang="en-US"/>
           </a:p>
@@ -12305,7 +12410,7 @@
     </p:spTree>
     <p:extLst>
       <p:ext uri="{BB962C8B-B14F-4D97-AF65-F5344CB8AC3E}">
-        <p14:creationId xmlns:p14="http://schemas.microsoft.com/office/powerpoint/2010/main" val="3461001942"/>
+        <p14:creationId xmlns:p14="http://schemas.microsoft.com/office/powerpoint/2010/main" val="3038058737"/>
       </p:ext>
     </p:extLst>
   </p:cSld>
@@ -12401,23 +12506,31 @@
             </a:pPr>
             <a:r>
               <a:rPr lang="en-US" dirty="0" smtClean="0"/>
-              <a:t>Enforcement of Rules</a:t>
-            </a:r>
-          </a:p>
-          <a:p>
-            <a:pPr marL="0" indent="0">
-              <a:buNone/>
-            </a:pPr>
-            <a:r>
-              <a:rPr lang="en-US" dirty="0" smtClean="0"/>
-              <a:t>Data Re-usability </a:t>
-            </a:r>
-          </a:p>
-          <a:p>
-            <a:pPr marL="0" indent="0">
-              <a:buNone/>
-            </a:pPr>
-            <a:endParaRPr lang="en-US" dirty="0" smtClean="0"/>
+              <a:t>Enforcement of Rules </a:t>
+            </a:r>
+          </a:p>
+          <a:p>
+            <a:r>
+              <a:rPr lang="en-US" dirty="0" smtClean="0"/>
+              <a:t>Happens across tables by ensuring </a:t>
+            </a:r>
+            <a:r>
+              <a:rPr lang="en-US" i="1" dirty="0" smtClean="0"/>
+              <a:t>e.g. </a:t>
+            </a:r>
+            <a:r>
+              <a:rPr lang="en-US" dirty="0" smtClean="0"/>
+              <a:t>that each dog only has </a:t>
+            </a:r>
+            <a:r>
+              <a:rPr lang="en-US" dirty="0"/>
+              <a:t>2</a:t>
+            </a:r>
+            <a:r>
+              <a:rPr lang="en-US" dirty="0" smtClean="0"/>
+              <a:t> breeds</a:t>
+            </a:r>
+            <a:endParaRPr lang="en-US" dirty="0"/>
           </a:p>
         </p:txBody>
       </p:sp>
@@ -12438,7 +12551,7 @@
           <a:p>
             <a:fld id="{7053BEFA-1175-F644-B249-7D41D72BD3FF}" type="datetime1">
               <a:rPr lang="en-US" smtClean="0"/>
-              <a:t>1/25/15</a:t>
+              <a:t>2/14/15</a:t>
             </a:fld>
             <a:endParaRPr lang="en-US"/>
           </a:p>
@@ -12489,7 +12602,7 @@
     </p:spTree>
     <p:extLst>
       <p:ext uri="{BB962C8B-B14F-4D97-AF65-F5344CB8AC3E}">
-        <p14:creationId xmlns:p14="http://schemas.microsoft.com/office/powerpoint/2010/main" val="2092762484"/>
+        <p14:creationId xmlns:p14="http://schemas.microsoft.com/office/powerpoint/2010/main" val="3461001942"/>
       </p:ext>
     </p:extLst>
   </p:cSld>
@@ -12601,27 +12714,6 @@
             <a:pPr marL="0" indent="0">
               <a:buNone/>
             </a:pPr>
-            <a:r>
-              <a:rPr lang="en-US" dirty="0" smtClean="0"/>
-              <a:t>Stability &amp; Flexibility</a:t>
-            </a:r>
-          </a:p>
-          <a:p>
-            <a:r>
-              <a:rPr lang="en-US" dirty="0" smtClean="0"/>
-              <a:t>Dog breeds in a separate table allows for adding the concept of “mixed” breeds</a:t>
-            </a:r>
-          </a:p>
-          <a:p>
-            <a:r>
-              <a:rPr lang="en-US" dirty="0" smtClean="0"/>
-              <a:t>But adding many breeds is awkward (how many columns?) -&gt; a new table </a:t>
-            </a:r>
-          </a:p>
-          <a:p>
-            <a:pPr marL="0" indent="0">
-              <a:buNone/>
-            </a:pPr>
             <a:endParaRPr lang="en-US" dirty="0" smtClean="0"/>
           </a:p>
         </p:txBody>
@@ -12643,7 +12735,7 @@
           <a:p>
             <a:fld id="{7053BEFA-1175-F644-B249-7D41D72BD3FF}" type="datetime1">
               <a:rPr lang="en-US" smtClean="0"/>
-              <a:t>1/25/15</a:t>
+              <a:t>2/14/15</a:t>
             </a:fld>
             <a:endParaRPr lang="en-US"/>
           </a:p>
@@ -12694,7 +12786,7 @@
     </p:spTree>
     <p:extLst>
       <p:ext uri="{BB962C8B-B14F-4D97-AF65-F5344CB8AC3E}">
-        <p14:creationId xmlns:p14="http://schemas.microsoft.com/office/powerpoint/2010/main" val="319541556"/>
+        <p14:creationId xmlns:p14="http://schemas.microsoft.com/office/powerpoint/2010/main" val="2092762484"/>
       </p:ext>
     </p:extLst>
   </p:cSld>
@@ -12812,12 +12904,15 @@
             </a:r>
           </a:p>
           <a:p>
-            <a:pPr marL="0" indent="0">
-              <a:buNone/>
-            </a:pPr>
-            <a:r>
-              <a:rPr lang="en-US" dirty="0" smtClean="0"/>
-              <a:t>Elegance -&gt; neat &amp; simple &amp; appropriate</a:t>
+            <a:r>
+              <a:rPr lang="en-US" dirty="0" smtClean="0"/>
+              <a:t>Dog breeds in a separate table allows for adding the concept of “mixed” breeds</a:t>
+            </a:r>
+          </a:p>
+          <a:p>
+            <a:r>
+              <a:rPr lang="en-US" dirty="0" smtClean="0"/>
+              <a:t>But adding many breeds is awkward (how many columns?) -&gt; a new table </a:t>
             </a:r>
           </a:p>
           <a:p>
@@ -12845,7 +12940,7 @@
           <a:p>
             <a:fld id="{7053BEFA-1175-F644-B249-7D41D72BD3FF}" type="datetime1">
               <a:rPr lang="en-US" smtClean="0"/>
-              <a:t>1/25/15</a:t>
+              <a:t>2/14/15</a:t>
             </a:fld>
             <a:endParaRPr lang="en-US"/>
           </a:p>
@@ -12896,7 +12991,7 @@
     </p:spTree>
     <p:extLst>
       <p:ext uri="{BB962C8B-B14F-4D97-AF65-F5344CB8AC3E}">
-        <p14:creationId xmlns:p14="http://schemas.microsoft.com/office/powerpoint/2010/main" val="2641636026"/>
+        <p14:creationId xmlns:p14="http://schemas.microsoft.com/office/powerpoint/2010/main" val="319541556"/>
       </p:ext>
     </p:extLst>
   </p:cSld>
@@ -13019,17 +13114,14 @@
             </a:pPr>
             <a:r>
               <a:rPr lang="en-US" dirty="0" smtClean="0"/>
-              <a:t>Elegance </a:t>
+              <a:t>Elegance -&gt; neat &amp; simple &amp; appropriate</a:t>
             </a:r>
           </a:p>
           <a:p>
             <a:pPr marL="0" indent="0">
               <a:buNone/>
             </a:pPr>
-            <a:r>
-              <a:rPr lang="en-US" dirty="0" smtClean="0"/>
-              <a:t>Communication (people again!)</a:t>
-            </a:r>
+            <a:endParaRPr lang="en-US" dirty="0" smtClean="0"/>
           </a:p>
         </p:txBody>
       </p:sp>
@@ -13050,7 +13142,7 @@
           <a:p>
             <a:fld id="{7053BEFA-1175-F644-B249-7D41D72BD3FF}" type="datetime1">
               <a:rPr lang="en-US" smtClean="0"/>
-              <a:t>1/25/15</a:t>
+              <a:t>2/14/15</a:t>
             </a:fld>
             <a:endParaRPr lang="en-US"/>
           </a:p>
@@ -13101,7 +13193,7 @@
     </p:spTree>
     <p:extLst>
       <p:ext uri="{BB962C8B-B14F-4D97-AF65-F5344CB8AC3E}">
-        <p14:creationId xmlns:p14="http://schemas.microsoft.com/office/powerpoint/2010/main" val="1117071535"/>
+        <p14:creationId xmlns:p14="http://schemas.microsoft.com/office/powerpoint/2010/main" val="2641636026"/>
       </p:ext>
     </p:extLst>
   </p:cSld>
@@ -13233,16 +13325,7 @@
             </a:pPr>
             <a:r>
               <a:rPr lang="en-US" dirty="0" smtClean="0"/>
-              <a:t>Communication</a:t>
-            </a:r>
-          </a:p>
-          <a:p>
-            <a:pPr marL="0" indent="0">
-              <a:buNone/>
-            </a:pPr>
-            <a:r>
-              <a:rPr lang="en-US" dirty="0" smtClean="0"/>
-              <a:t>Performance? -&gt; more of a software and hardware issue (ideally)</a:t>
+              <a:t>Communication (people again!)</a:t>
             </a:r>
           </a:p>
         </p:txBody>
@@ -13264,7 +13347,7 @@
           <a:p>
             <a:fld id="{7053BEFA-1175-F644-B249-7D41D72BD3FF}" type="datetime1">
               <a:rPr lang="en-US" smtClean="0"/>
-              <a:t>1/25/15</a:t>
+              <a:t>2/14/15</a:t>
             </a:fld>
             <a:endParaRPr lang="en-US"/>
           </a:p>
@@ -13315,7 +13398,7 @@
     </p:spTree>
     <p:extLst>
       <p:ext uri="{BB962C8B-B14F-4D97-AF65-F5344CB8AC3E}">
-        <p14:creationId xmlns:p14="http://schemas.microsoft.com/office/powerpoint/2010/main" val="3910965864"/>
+        <p14:creationId xmlns:p14="http://schemas.microsoft.com/office/powerpoint/2010/main" val="1117071535"/>
       </p:ext>
     </p:extLst>
   </p:cSld>
@@ -13366,7 +13449,7 @@
           <a:p>
             <a:r>
               <a:rPr lang="en-US" dirty="0" smtClean="0"/>
-              <a:t>What is a Database?</a:t>
+              <a:t>What makes a good data model?</a:t>
             </a:r>
             <a:endParaRPr lang="en-US" dirty="0"/>
           </a:p>
@@ -13392,13 +13475,17 @@
             </a:pPr>
             <a:r>
               <a:rPr lang="en-US" dirty="0" smtClean="0"/>
-              <a:t>Stores Information</a:t>
+              <a:t>Completeness</a:t>
             </a:r>
           </a:p>
           <a:p>
             <a:pPr marL="0" indent="0">
               <a:buNone/>
             </a:pPr>
+            <a:r>
+              <a:rPr lang="en-US" dirty="0" err="1" smtClean="0"/>
+              <a:t>Nonredundancy</a:t>
+            </a:r>
             <a:endParaRPr lang="en-US" dirty="0" smtClean="0"/>
           </a:p>
           <a:p>
@@ -13407,22 +13494,17 @@
             </a:pPr>
             <a:r>
               <a:rPr lang="en-US" dirty="0" smtClean="0"/>
-              <a:t>Separates logical (schema) physical (storage) and control (queries </a:t>
-            </a:r>
-            <a:r>
-              <a:rPr lang="en-US" i="1" dirty="0" smtClean="0"/>
-              <a:t>etc.</a:t>
-            </a:r>
-            <a:r>
-              <a:rPr lang="en-US" dirty="0" smtClean="0"/>
-              <a:t>)</a:t>
+              <a:t>Enforcement of Rules</a:t>
             </a:r>
           </a:p>
           <a:p>
             <a:pPr marL="0" indent="0">
               <a:buNone/>
             </a:pPr>
-            <a:endParaRPr lang="en-US" dirty="0" smtClean="0"/>
+            <a:r>
+              <a:rPr lang="en-US" dirty="0" smtClean="0"/>
+              <a:t>Data Re-usability </a:t>
+            </a:r>
           </a:p>
           <a:p>
             <a:pPr marL="0" indent="0">
@@ -13430,7 +13512,34 @@
             </a:pPr>
             <a:r>
               <a:rPr lang="en-US" dirty="0" smtClean="0"/>
-              <a:t>Other jobs?</a:t>
+              <a:t>Stability &amp; Flexibility</a:t>
+            </a:r>
+          </a:p>
+          <a:p>
+            <a:pPr marL="0" indent="0">
+              <a:buNone/>
+            </a:pPr>
+            <a:r>
+              <a:rPr lang="en-US" dirty="0" smtClean="0"/>
+              <a:t>Elegance </a:t>
+            </a:r>
+          </a:p>
+          <a:p>
+            <a:pPr marL="0" indent="0">
+              <a:buNone/>
+            </a:pPr>
+            <a:r>
+              <a:rPr lang="en-US" dirty="0" smtClean="0"/>
+              <a:t>Communication</a:t>
+            </a:r>
+          </a:p>
+          <a:p>
+            <a:pPr marL="0" indent="0">
+              <a:buNone/>
+            </a:pPr>
+            <a:r>
+              <a:rPr lang="en-US" dirty="0" smtClean="0"/>
+              <a:t>Performance? -&gt; more of a software and hardware issue (ideally)</a:t>
             </a:r>
           </a:p>
         </p:txBody>
@@ -13452,7 +13561,7 @@
           <a:p>
             <a:fld id="{7053BEFA-1175-F644-B249-7D41D72BD3FF}" type="datetime1">
               <a:rPr lang="en-US" smtClean="0"/>
-              <a:t>1/25/15</a:t>
+              <a:t>2/14/15</a:t>
             </a:fld>
             <a:endParaRPr lang="en-US"/>
           </a:p>
@@ -13503,7 +13612,7 @@
     </p:spTree>
     <p:extLst>
       <p:ext uri="{BB962C8B-B14F-4D97-AF65-F5344CB8AC3E}">
-        <p14:creationId xmlns:p14="http://schemas.microsoft.com/office/powerpoint/2010/main" val="99290824"/>
+        <p14:creationId xmlns:p14="http://schemas.microsoft.com/office/powerpoint/2010/main" val="3910965864"/>
       </p:ext>
     </p:extLst>
   </p:cSld>
@@ -13554,7 +13663,7 @@
           <a:p>
             <a:r>
               <a:rPr lang="en-US" dirty="0" smtClean="0"/>
-              <a:t>Query Language (Typically SQL)</a:t>
+              <a:t>What is a Database?</a:t>
             </a:r>
             <a:endParaRPr lang="en-US" dirty="0"/>
           </a:p>
@@ -13580,9 +13689,46 @@
             </a:pPr>
             <a:r>
               <a:rPr lang="en-US" dirty="0" smtClean="0"/>
-              <a:t>Structured language, very widely adopted</a:t>
-            </a:r>
-            <a:endParaRPr lang="en-US" dirty="0"/>
+              <a:t>Stores Information</a:t>
+            </a:r>
+          </a:p>
+          <a:p>
+            <a:pPr marL="0" indent="0">
+              <a:buNone/>
+            </a:pPr>
+            <a:endParaRPr lang="en-US" dirty="0" smtClean="0"/>
+          </a:p>
+          <a:p>
+            <a:pPr marL="0" indent="0">
+              <a:buNone/>
+            </a:pPr>
+            <a:r>
+              <a:rPr lang="en-US" dirty="0" smtClean="0"/>
+              <a:t>Separates logical (schema) physical (storage) and control (queries </a:t>
+            </a:r>
+            <a:r>
+              <a:rPr lang="en-US" i="1" dirty="0" smtClean="0"/>
+              <a:t>etc.</a:t>
+            </a:r>
+            <a:r>
+              <a:rPr lang="en-US" dirty="0" smtClean="0"/>
+              <a:t>)</a:t>
+            </a:r>
+          </a:p>
+          <a:p>
+            <a:pPr marL="0" indent="0">
+              <a:buNone/>
+            </a:pPr>
+            <a:endParaRPr lang="en-US" dirty="0" smtClean="0"/>
+          </a:p>
+          <a:p>
+            <a:pPr marL="0" indent="0">
+              <a:buNone/>
+            </a:pPr>
+            <a:r>
+              <a:rPr lang="en-US" dirty="0" smtClean="0"/>
+              <a:t>Other jobs?</a:t>
+            </a:r>
           </a:p>
         </p:txBody>
       </p:sp>
@@ -13603,7 +13749,7 @@
           <a:p>
             <a:fld id="{7053BEFA-1175-F644-B249-7D41D72BD3FF}" type="datetime1">
               <a:rPr lang="en-US" smtClean="0"/>
-              <a:t>1/25/15</a:t>
+              <a:t>2/14/15</a:t>
             </a:fld>
             <a:endParaRPr lang="en-US"/>
           </a:p>
@@ -13654,7 +13800,7 @@
     </p:spTree>
     <p:extLst>
       <p:ext uri="{BB962C8B-B14F-4D97-AF65-F5344CB8AC3E}">
-        <p14:creationId xmlns:p14="http://schemas.microsoft.com/office/powerpoint/2010/main" val="4275976873"/>
+        <p14:creationId xmlns:p14="http://schemas.microsoft.com/office/powerpoint/2010/main" val="99290824"/>
       </p:ext>
     </p:extLst>
   </p:cSld>
@@ -13705,7 +13851,7 @@
           <a:p>
             <a:r>
               <a:rPr lang="en-US" dirty="0" smtClean="0"/>
-              <a:t>Implementation Issues</a:t>
+              <a:t>Query Language (Typically SQL)</a:t>
             </a:r>
             <a:endParaRPr lang="en-US" dirty="0"/>
           </a:p>
@@ -13730,64 +13876,9 @@
               <a:buNone/>
             </a:pPr>
             <a:r>
-              <a:rPr lang="en-US" dirty="0"/>
-              <a:t>Schema design affects the kinds of queries we can ask </a:t>
-            </a:r>
-            <a:r>
-              <a:rPr lang="en-US" dirty="0" smtClean="0"/>
-              <a:t>efficiently</a:t>
-            </a:r>
-          </a:p>
-          <a:p>
-            <a:pPr marL="0" indent="0">
-              <a:buNone/>
-            </a:pPr>
-            <a:r>
-              <a:rPr lang="en-US" dirty="0" smtClean="0"/>
-              <a:t>So may the underlying engine</a:t>
-            </a:r>
-          </a:p>
-          <a:p>
-            <a:pPr lvl="1"/>
-            <a:r>
-              <a:rPr lang="en-US" dirty="0"/>
-              <a:t>Ability to handle big data (</a:t>
-            </a:r>
-            <a:r>
-              <a:rPr lang="en-US" i="1" dirty="0"/>
-              <a:t>e.g. </a:t>
-            </a:r>
-            <a:r>
-              <a:rPr lang="en-US" i="1" dirty="0" err="1"/>
-              <a:t>mongodb</a:t>
-            </a:r>
-            <a:r>
-              <a:rPr lang="en-US" dirty="0"/>
-              <a:t>) </a:t>
-            </a:r>
-          </a:p>
-          <a:p>
-            <a:pPr lvl="1"/>
-            <a:r>
-              <a:rPr lang="en-US" dirty="0" err="1"/>
-              <a:t>Debuggability</a:t>
-            </a:r>
-            <a:endParaRPr lang="en-US" dirty="0"/>
-          </a:p>
-          <a:p>
-            <a:pPr lvl="1"/>
-            <a:r>
-              <a:rPr lang="en-US" dirty="0"/>
-              <a:t>Accessibility of raw data </a:t>
-            </a:r>
-          </a:p>
-          <a:p>
-            <a:pPr marL="0" indent="0">
-              <a:buNone/>
-            </a:pPr>
-            <a:endParaRPr lang="en-US" dirty="0" smtClean="0"/>
-          </a:p>
-          <a:p>
+              <a:rPr lang="en-US" dirty="0" smtClean="0"/>
+              <a:t>Structured language, very widely adopted</a:t>
+            </a:r>
             <a:endParaRPr lang="en-US" dirty="0"/>
           </a:p>
         </p:txBody>
@@ -13809,7 +13900,7 @@
           <a:p>
             <a:fld id="{7053BEFA-1175-F644-B249-7D41D72BD3FF}" type="datetime1">
               <a:rPr lang="en-US" smtClean="0"/>
-              <a:t>1/25/15</a:t>
+              <a:t>2/14/15</a:t>
             </a:fld>
             <a:endParaRPr lang="en-US"/>
           </a:p>
@@ -13860,7 +13951,7 @@
     </p:spTree>
     <p:extLst>
       <p:ext uri="{BB962C8B-B14F-4D97-AF65-F5344CB8AC3E}">
-        <p14:creationId xmlns:p14="http://schemas.microsoft.com/office/powerpoint/2010/main" val="401190124"/>
+        <p14:creationId xmlns:p14="http://schemas.microsoft.com/office/powerpoint/2010/main" val="4275976873"/>
       </p:ext>
     </p:extLst>
   </p:cSld>
@@ -13911,7 +14002,7 @@
           <a:p>
             <a:r>
               <a:rPr lang="en-US" dirty="0" smtClean="0"/>
-              <a:t>Special Kinds of Data</a:t>
+              <a:t>Implementation Issues</a:t>
             </a:r>
             <a:endParaRPr lang="en-US" dirty="0"/>
           </a:p>
@@ -13936,8 +14027,12 @@
               <a:buNone/>
             </a:pPr>
             <a:r>
-              <a:rPr lang="en-US" dirty="0" smtClean="0"/>
-              <a:t>Uncertain Data </a:t>
+              <a:rPr lang="en-US" dirty="0"/>
+              <a:t>Schema design affects the kinds of queries we can ask </a:t>
+            </a:r>
+            <a:r>
+              <a:rPr lang="en-US" dirty="0" smtClean="0"/>
+              <a:t>efficiently</a:t>
             </a:r>
           </a:p>
           <a:p>
@@ -13946,14 +14041,42 @@
             </a:pPr>
             <a:r>
               <a:rPr lang="en-US" dirty="0" smtClean="0"/>
-              <a:t>Spatial Data </a:t>
-            </a:r>
-          </a:p>
-          <a:p>
-            <a:pPr marL="0" indent="0">
-              <a:buNone/>
-            </a:pPr>
-            <a:endParaRPr lang="en-US" dirty="0"/>
+              <a:t>So may the underlying engine</a:t>
+            </a:r>
+          </a:p>
+          <a:p>
+            <a:pPr lvl="1"/>
+            <a:r>
+              <a:rPr lang="en-US" dirty="0"/>
+              <a:t>Ability to handle big data (</a:t>
+            </a:r>
+            <a:r>
+              <a:rPr lang="en-US" i="1" dirty="0"/>
+              <a:t>e.g. </a:t>
+            </a:r>
+            <a:r>
+              <a:rPr lang="en-US" i="1" dirty="0" err="1"/>
+              <a:t>mongodb</a:t>
+            </a:r>
+            <a:r>
+              <a:rPr lang="en-US" dirty="0"/>
+              <a:t>) </a:t>
+            </a:r>
+          </a:p>
+          <a:p>
+            <a:pPr lvl="1"/>
+            <a:r>
+              <a:rPr lang="en-US" dirty="0" err="1"/>
+              <a:t>Debuggability</a:t>
+            </a:r>
+            <a:endParaRPr lang="en-US" dirty="0"/>
+          </a:p>
+          <a:p>
+            <a:pPr lvl="1"/>
+            <a:r>
+              <a:rPr lang="en-US" dirty="0"/>
+              <a:t>Accessibility of raw data </a:t>
+            </a:r>
           </a:p>
           <a:p>
             <a:pPr marL="0" indent="0">
@@ -13962,13 +14085,7 @@
             <a:endParaRPr lang="en-US" dirty="0" smtClean="0"/>
           </a:p>
           <a:p>
-            <a:pPr marL="0" indent="0">
-              <a:buNone/>
-            </a:pPr>
-            <a:r>
-              <a:rPr lang="en-US" dirty="0" smtClean="0"/>
-              <a:t>Pair off: Have you ever used either kind of data? Come up with an example</a:t>
-            </a:r>
+            <a:endParaRPr lang="en-US" dirty="0"/>
           </a:p>
         </p:txBody>
       </p:sp>
@@ -13989,7 +14106,7 @@
           <a:p>
             <a:fld id="{7053BEFA-1175-F644-B249-7D41D72BD3FF}" type="datetime1">
               <a:rPr lang="en-US" smtClean="0"/>
-              <a:t>1/25/15</a:t>
+              <a:t>2/14/15</a:t>
             </a:fld>
             <a:endParaRPr lang="en-US"/>
           </a:p>
@@ -14040,7 +14157,7 @@
     </p:spTree>
     <p:extLst>
       <p:ext uri="{BB962C8B-B14F-4D97-AF65-F5344CB8AC3E}">
-        <p14:creationId xmlns:p14="http://schemas.microsoft.com/office/powerpoint/2010/main" val="1017482662"/>
+        <p14:creationId xmlns:p14="http://schemas.microsoft.com/office/powerpoint/2010/main" val="401190124"/>
       </p:ext>
     </p:extLst>
   </p:cSld>
@@ -14091,7 +14208,7 @@
           <a:p>
             <a:r>
               <a:rPr lang="en-US" dirty="0" smtClean="0"/>
-              <a:t>What is Data?</a:t>
+              <a:t>Readings Starting up</a:t>
             </a:r>
             <a:endParaRPr lang="en-US" dirty="0"/>
           </a:p>
@@ -14112,7 +14229,64 @@
           <a:bodyPr/>
           <a:lstStyle/>
           <a:p>
-            <a:endParaRPr lang="en-US"/>
+            <a:pPr marL="0" indent="0">
+              <a:buNone/>
+            </a:pPr>
+            <a:r>
+              <a:rPr lang="en-US" dirty="0" smtClean="0"/>
+              <a:t>Optional</a:t>
+            </a:r>
+            <a:r>
+              <a:rPr lang="en-US" dirty="0"/>
+              <a:t>: </a:t>
+            </a:r>
+            <a:r>
+              <a:rPr lang="en-US" dirty="0" err="1"/>
+              <a:t>Stonebraker</a:t>
+            </a:r>
+            <a:r>
+              <a:rPr lang="en-US" dirty="0"/>
+              <a:t> &amp; </a:t>
+            </a:r>
+            <a:r>
+              <a:rPr lang="en-US" dirty="0" err="1"/>
+              <a:t>Hellerstein</a:t>
+            </a:r>
+            <a:r>
+              <a:rPr lang="en-US" dirty="0"/>
+              <a:t>: What Goes Around Comes Around </a:t>
+            </a:r>
+            <a:endParaRPr lang="en-US" dirty="0" smtClean="0"/>
+          </a:p>
+          <a:p>
+            <a:pPr marL="0" indent="0">
+              <a:buNone/>
+            </a:pPr>
+            <a:r>
+              <a:rPr lang="en-US" dirty="0" smtClean="0"/>
+              <a:t>(can be found </a:t>
+            </a:r>
+            <a:r>
+              <a:rPr lang="en-US" dirty="0"/>
+              <a:t>on http://</a:t>
+            </a:r>
+            <a:r>
+              <a:rPr lang="en-US" dirty="0" err="1"/>
+              <a:t>data.cmubi.org</a:t>
+            </a:r>
+            <a:r>
+              <a:rPr lang="en-US" dirty="0"/>
+              <a:t>/</a:t>
+            </a:r>
+            <a:r>
+              <a:rPr lang="en-US" dirty="0" smtClean="0"/>
+              <a:t>calendar; first required reading due next Tuesday. Should discuss </a:t>
+            </a:r>
+            <a:r>
+              <a:rPr lang="en-US" smtClean="0"/>
+              <a:t>on Piazza). </a:t>
+            </a:r>
+            <a:endParaRPr lang="en-US" dirty="0"/>
           </a:p>
         </p:txBody>
       </p:sp>
@@ -14133,7 +14307,7 @@
           <a:p>
             <a:fld id="{7053BEFA-1175-F644-B249-7D41D72BD3FF}" type="datetime1">
               <a:rPr lang="en-US" smtClean="0"/>
-              <a:t>1/25/15</a:t>
+              <a:t>2/14/15</a:t>
             </a:fld>
             <a:endParaRPr lang="en-US"/>
           </a:p>
@@ -14184,20 +14358,13 @@
     </p:spTree>
     <p:extLst>
       <p:ext uri="{BB962C8B-B14F-4D97-AF65-F5344CB8AC3E}">
-        <p14:creationId xmlns:p14="http://schemas.microsoft.com/office/powerpoint/2010/main" val="1405784729"/>
+        <p14:creationId xmlns:p14="http://schemas.microsoft.com/office/powerpoint/2010/main" val="2825193249"/>
       </p:ext>
     </p:extLst>
   </p:cSld>
   <p:clrMapOvr>
     <a:masterClrMapping/>
   </p:clrMapOvr>
-  <p:timing>
-    <p:tnLst>
-      <p:par>
-        <p:cTn xmlns:p14="http://schemas.microsoft.com/office/powerpoint/2010/main" id="1" dur="indefinite" restart="never" nodeType="tmRoot"/>
-      </p:par>
-    </p:tnLst>
-  </p:timing>
 </p:sld>
 </file>
 
@@ -14235,7 +14402,7 @@
           <a:p>
             <a:r>
               <a:rPr lang="en-US" dirty="0" smtClean="0"/>
-              <a:t>Spatial Data</a:t>
+              <a:t>Special Kinds of Data</a:t>
             </a:r>
             <a:endParaRPr lang="en-US" dirty="0"/>
           </a:p>
@@ -14256,82 +14423,42 @@
           <a:bodyPr/>
           <a:lstStyle/>
           <a:p>
-            <a:pPr marL="228600" lvl="1" indent="0">
-              <a:lnSpc>
-                <a:spcPct val="150000"/>
-              </a:lnSpc>
+            <a:pPr marL="0" indent="0">
               <a:buNone/>
             </a:pPr>
             <a:r>
-              <a:rPr lang="en-US" sz="2400" dirty="0" smtClean="0"/>
-              <a:t>Census </a:t>
-            </a:r>
-            <a:r>
-              <a:rPr lang="en-US" sz="2400" dirty="0"/>
-              <a:t>Data</a:t>
-            </a:r>
-          </a:p>
-          <a:p>
-            <a:pPr marL="228600" lvl="1" indent="0">
-              <a:lnSpc>
-                <a:spcPct val="150000"/>
-              </a:lnSpc>
+              <a:rPr lang="en-US" dirty="0" smtClean="0"/>
+              <a:t>Uncertain Data </a:t>
+            </a:r>
+          </a:p>
+          <a:p>
+            <a:pPr marL="0" indent="0">
               <a:buNone/>
             </a:pPr>
             <a:r>
-              <a:rPr lang="en-US" sz="2400" dirty="0"/>
-              <a:t>Climate Data </a:t>
-            </a:r>
-          </a:p>
-          <a:p>
-            <a:pPr marL="228600" lvl="1" indent="0">
-              <a:lnSpc>
-                <a:spcPct val="150000"/>
-              </a:lnSpc>
+              <a:rPr lang="en-US" dirty="0" smtClean="0"/>
+              <a:t>Spatial Data </a:t>
+            </a:r>
+          </a:p>
+          <a:p>
+            <a:pPr marL="0" indent="0">
               <a:buNone/>
             </a:pPr>
-            <a:r>
-              <a:rPr lang="en-US" sz="2400" dirty="0"/>
-              <a:t>Satellite Images</a:t>
-            </a:r>
-          </a:p>
-          <a:p>
-            <a:pPr marL="228600" lvl="1" indent="0">
-              <a:lnSpc>
-                <a:spcPct val="150000"/>
-              </a:lnSpc>
+            <a:endParaRPr lang="en-US" dirty="0"/>
+          </a:p>
+          <a:p>
+            <a:pPr marL="0" indent="0">
               <a:buNone/>
             </a:pPr>
-            <a:r>
-              <a:rPr lang="en-US" sz="2400" dirty="0"/>
-              <a:t>Byte 2 Data </a:t>
-            </a:r>
-          </a:p>
-          <a:p>
-            <a:pPr marL="228600" lvl="1" indent="0">
-              <a:lnSpc>
-                <a:spcPct val="150000"/>
-              </a:lnSpc>
+            <a:endParaRPr lang="en-US" dirty="0" smtClean="0"/>
+          </a:p>
+          <a:p>
+            <a:pPr marL="0" indent="0">
               <a:buNone/>
             </a:pPr>
             <a:r>
-              <a:rPr lang="en-US" sz="2400" dirty="0" smtClean="0"/>
-              <a:t>Medical Imaging</a:t>
-            </a:r>
-          </a:p>
-          <a:p>
-            <a:pPr marL="228600" lvl="1" indent="0">
-              <a:buNone/>
-            </a:pPr>
-            <a:endParaRPr lang="en-US" sz="2400" dirty="0"/>
-          </a:p>
-          <a:p>
-            <a:pPr marL="0" indent="0">
-              <a:buNone/>
-            </a:pPr>
-            <a:r>
-              <a:rPr lang="en-US" dirty="0" smtClean="0"/>
-              <a:t> </a:t>
+              <a:rPr lang="en-US" dirty="0" smtClean="0"/>
+              <a:t>Pair off: Have you ever used either kind of data? Come up with an example</a:t>
             </a:r>
           </a:p>
         </p:txBody>
@@ -14353,7 +14480,7 @@
           <a:p>
             <a:fld id="{7053BEFA-1175-F644-B249-7D41D72BD3FF}" type="datetime1">
               <a:rPr lang="en-US" smtClean="0"/>
-              <a:t>1/25/15</a:t>
+              <a:t>2/14/15</a:t>
             </a:fld>
             <a:endParaRPr lang="en-US"/>
           </a:p>
@@ -14404,7 +14531,7 @@
     </p:spTree>
     <p:extLst>
       <p:ext uri="{BB962C8B-B14F-4D97-AF65-F5344CB8AC3E}">
-        <p14:creationId xmlns:p14="http://schemas.microsoft.com/office/powerpoint/2010/main" val="1384093771"/>
+        <p14:creationId xmlns:p14="http://schemas.microsoft.com/office/powerpoint/2010/main" val="1017482662"/>
       </p:ext>
     </p:extLst>
   </p:cSld>
@@ -14455,7 +14582,7 @@
           <a:p>
             <a:r>
               <a:rPr lang="en-US" dirty="0" smtClean="0"/>
-              <a:t>Questions you could ask?</a:t>
+              <a:t>Spatial Data</a:t>
             </a:r>
             <a:endParaRPr lang="en-US" dirty="0"/>
           </a:p>
@@ -14535,7 +14662,7 @@
               <a:buNone/>
             </a:pPr>
             <a:r>
-              <a:rPr lang="en-US" sz="2400" dirty="0"/>
+              <a:rPr lang="en-US" sz="2400" dirty="0" smtClean="0"/>
               <a:t>Medical Imaging</a:t>
             </a:r>
           </a:p>
@@ -14573,7 +14700,7 @@
           <a:p>
             <a:fld id="{7053BEFA-1175-F644-B249-7D41D72BD3FF}" type="datetime1">
               <a:rPr lang="en-US" smtClean="0"/>
-              <a:t>1/25/15</a:t>
+              <a:t>2/14/15</a:t>
             </a:fld>
             <a:endParaRPr lang="en-US"/>
           </a:p>
@@ -14624,7 +14751,7 @@
     </p:spTree>
     <p:extLst>
       <p:ext uri="{BB962C8B-B14F-4D97-AF65-F5344CB8AC3E}">
-        <p14:creationId xmlns:p14="http://schemas.microsoft.com/office/powerpoint/2010/main" val="2408615049"/>
+        <p14:creationId xmlns:p14="http://schemas.microsoft.com/office/powerpoint/2010/main" val="1384093771"/>
       </p:ext>
     </p:extLst>
   </p:cSld>
@@ -14704,9 +14831,12 @@
             </a:pPr>
             <a:r>
               <a:rPr lang="en-US" sz="2400" dirty="0" smtClean="0"/>
-              <a:t>Census Data</a:t>
-            </a:r>
-            <a:endParaRPr lang="en-US" sz="2400" dirty="0"/>
+              <a:t>Census </a:t>
+            </a:r>
+            <a:r>
+              <a:rPr lang="en-US" sz="2400" dirty="0"/>
+              <a:t>Data</a:t>
+            </a:r>
           </a:p>
           <a:p>
             <a:pPr marL="228600" lvl="1" indent="0">
@@ -14790,7 +14920,7 @@
           <a:p>
             <a:fld id="{7053BEFA-1175-F644-B249-7D41D72BD3FF}" type="datetime1">
               <a:rPr lang="en-US" smtClean="0"/>
-              <a:t>1/25/15</a:t>
+              <a:t>2/14/15</a:t>
             </a:fld>
             <a:endParaRPr lang="en-US"/>
           </a:p>
@@ -14838,111 +14968,23 @@
           </a:p>
         </p:txBody>
       </p:sp>
-      <p:sp>
-        <p:nvSpPr>
-          <p:cNvPr id="7" name="TextBox 6"/>
-          <p:cNvSpPr txBox="1"/>
-          <p:nvPr/>
-        </p:nvSpPr>
-        <p:spPr>
-          <a:xfrm>
-            <a:off x="4220977" y="4578976"/>
-            <a:ext cx="4057140" cy="1477328"/>
-          </a:xfrm>
-          <a:prstGeom prst="rect">
-            <a:avLst/>
-          </a:prstGeom>
-          <a:noFill/>
-        </p:spPr>
-        <p:txBody>
-          <a:bodyPr wrap="square" rtlCol="0">
-            <a:spAutoFit/>
-          </a:bodyPr>
-          <a:lstStyle/>
-          <a:p>
-            <a:r>
-              <a:rPr lang="en-US" dirty="0"/>
-              <a:t>Based on this patient's  MRI,  have we treated somebody with a similar condition ?</a:t>
-            </a:r>
-          </a:p>
-          <a:p>
-            <a:endParaRPr lang="en-US" dirty="0"/>
-          </a:p>
-          <a:p>
-            <a:endParaRPr lang="en-US" dirty="0"/>
-          </a:p>
-        </p:txBody>
-      </p:sp>
-      <p:sp>
-        <p:nvSpPr>
-          <p:cNvPr id="8" name="TextBox 7"/>
-          <p:cNvSpPr txBox="1"/>
-          <p:nvPr/>
-        </p:nvSpPr>
-        <p:spPr>
-          <a:xfrm>
-            <a:off x="4219698" y="3948781"/>
-            <a:ext cx="4057140" cy="646331"/>
-          </a:xfrm>
-          <a:prstGeom prst="rect">
-            <a:avLst/>
-          </a:prstGeom>
-          <a:noFill/>
-        </p:spPr>
-        <p:txBody>
-          <a:bodyPr wrap="square" rtlCol="0">
-            <a:spAutoFit/>
-          </a:bodyPr>
-          <a:lstStyle/>
-          <a:p>
-            <a:r>
-              <a:rPr lang="en-US" dirty="0" smtClean="0"/>
-              <a:t>Are certain breeds found more commonly in urban areas?</a:t>
-            </a:r>
-            <a:endParaRPr lang="en-US" dirty="0"/>
-          </a:p>
-        </p:txBody>
-      </p:sp>
-      <p:sp>
-        <p:nvSpPr>
-          <p:cNvPr id="9" name="TextBox 8"/>
-          <p:cNvSpPr txBox="1"/>
-          <p:nvPr/>
-        </p:nvSpPr>
-        <p:spPr>
-          <a:xfrm>
-            <a:off x="4238617" y="3253808"/>
-            <a:ext cx="4057140" cy="646331"/>
-          </a:xfrm>
-          <a:prstGeom prst="rect">
-            <a:avLst/>
-          </a:prstGeom>
-          <a:noFill/>
-        </p:spPr>
-        <p:txBody>
-          <a:bodyPr wrap="square" rtlCol="0">
-            <a:spAutoFit/>
-          </a:bodyPr>
-          <a:lstStyle/>
-          <a:p>
-            <a:r>
-              <a:rPr lang="en-US" dirty="0" smtClean="0"/>
-              <a:t>How do trees affect the prevalence of Lyme disease?</a:t>
-            </a:r>
-            <a:endParaRPr lang="en-US" dirty="0"/>
-          </a:p>
-        </p:txBody>
-      </p:sp>
     </p:spTree>
     <p:extLst>
       <p:ext uri="{BB962C8B-B14F-4D97-AF65-F5344CB8AC3E}">
-        <p14:creationId xmlns:p14="http://schemas.microsoft.com/office/powerpoint/2010/main" val="3702149012"/>
+        <p14:creationId xmlns:p14="http://schemas.microsoft.com/office/powerpoint/2010/main" val="2408615049"/>
       </p:ext>
     </p:extLst>
   </p:cSld>
   <p:clrMapOvr>
     <a:masterClrMapping/>
   </p:clrMapOvr>
+  <p:timing>
+    <p:tnLst>
+      <p:par>
+        <p:cTn xmlns:p14="http://schemas.microsoft.com/office/powerpoint/2010/main" id="1" dur="indefinite" restart="never" nodeType="tmRoot"/>
+      </p:par>
+    </p:tnLst>
+  </p:timing>
 </p:sld>
 </file>
 
@@ -14980,7 +15022,7 @@
           <a:p>
             <a:r>
               <a:rPr lang="en-US" dirty="0" smtClean="0"/>
-              <a:t>Specialty Tools</a:t>
+              <a:t>Questions you could ask?</a:t>
             </a:r>
             <a:endParaRPr lang="en-US" dirty="0"/>
           </a:p>
@@ -15001,107 +15043,80 @@
           <a:bodyPr/>
           <a:lstStyle/>
           <a:p>
+            <a:pPr marL="228600" lvl="1" indent="0">
+              <a:lnSpc>
+                <a:spcPct val="150000"/>
+              </a:lnSpc>
+              <a:buNone/>
+            </a:pPr>
+            <a:r>
+              <a:rPr lang="en-US" sz="2400" dirty="0" smtClean="0"/>
+              <a:t>Census Data</a:t>
+            </a:r>
+            <a:endParaRPr lang="en-US" sz="2400" dirty="0"/>
+          </a:p>
+          <a:p>
+            <a:pPr marL="228600" lvl="1" indent="0">
+              <a:lnSpc>
+                <a:spcPct val="150000"/>
+              </a:lnSpc>
+              <a:buNone/>
+            </a:pPr>
+            <a:r>
+              <a:rPr lang="en-US" sz="2400" dirty="0"/>
+              <a:t>Climate Data </a:t>
+            </a:r>
+          </a:p>
+          <a:p>
+            <a:pPr marL="228600" lvl="1" indent="0">
+              <a:lnSpc>
+                <a:spcPct val="150000"/>
+              </a:lnSpc>
+              <a:buNone/>
+            </a:pPr>
+            <a:r>
+              <a:rPr lang="en-US" sz="2400" dirty="0"/>
+              <a:t>Satellite Images</a:t>
+            </a:r>
+          </a:p>
+          <a:p>
+            <a:pPr marL="228600" lvl="1" indent="0">
+              <a:lnSpc>
+                <a:spcPct val="150000"/>
+              </a:lnSpc>
+              <a:buNone/>
+            </a:pPr>
+            <a:r>
+              <a:rPr lang="en-US" sz="2400" dirty="0"/>
+              <a:t>Byte 2 Data </a:t>
+            </a:r>
+          </a:p>
+          <a:p>
+            <a:pPr marL="228600" lvl="1" indent="0">
+              <a:lnSpc>
+                <a:spcPct val="150000"/>
+              </a:lnSpc>
+              <a:buNone/>
+            </a:pPr>
+            <a:r>
+              <a:rPr lang="en-US" sz="2400" dirty="0"/>
+              <a:t>Medical Imaging</a:t>
+            </a:r>
+          </a:p>
+          <a:p>
+            <a:pPr marL="228600" lvl="1" indent="0">
+              <a:buNone/>
+            </a:pPr>
+            <a:endParaRPr lang="en-US" sz="2400" dirty="0"/>
+          </a:p>
+          <a:p>
             <a:pPr marL="0" indent="0">
               <a:buNone/>
             </a:pPr>
             <a:r>
               <a:rPr lang="en-US" dirty="0" smtClean="0"/>
-              <a:t>Uncertain Data (</a:t>
-            </a:r>
-            <a:r>
-              <a:rPr lang="en-US" i="1" dirty="0" smtClean="0"/>
-              <a:t>e.g., </a:t>
-            </a:r>
-            <a:r>
-              <a:rPr lang="en-US" dirty="0" smtClean="0"/>
-              <a:t>TRIO)</a:t>
-            </a:r>
-          </a:p>
-          <a:p>
-            <a:pPr lvl="1"/>
-            <a:r>
-              <a:rPr lang="en-US" dirty="0" smtClean="0"/>
-              <a:t>Confidence</a:t>
-            </a:r>
-          </a:p>
-          <a:p>
-            <a:pPr lvl="1"/>
-            <a:r>
-              <a:rPr lang="en-US" dirty="0" smtClean="0"/>
-              <a:t>Lineage</a:t>
-            </a:r>
-          </a:p>
-          <a:p>
-            <a:pPr marL="0" indent="0">
-              <a:buNone/>
-            </a:pPr>
-            <a:r>
-              <a:rPr lang="en-US" dirty="0" smtClean="0"/>
-              <a:t>Spatial Data </a:t>
-            </a:r>
-          </a:p>
-          <a:p>
-            <a:pPr lvl="1"/>
-            <a:r>
-              <a:rPr lang="en-US" dirty="0" smtClean="0"/>
-              <a:t>Polyline support (describe a region)</a:t>
-            </a:r>
-          </a:p>
-          <a:p>
-            <a:pPr lvl="1"/>
-            <a:r>
-              <a:rPr lang="en-US" dirty="0" smtClean="0"/>
-              <a:t>Hierarchy of space (building with floors, rooms, </a:t>
-            </a:r>
-            <a:r>
-              <a:rPr lang="en-US" i="1" dirty="0" smtClean="0"/>
-              <a:t>etc.</a:t>
-            </a:r>
-            <a:r>
-              <a:rPr lang="en-US" dirty="0" smtClean="0"/>
-              <a:t>)</a:t>
-            </a:r>
-          </a:p>
-          <a:p>
-            <a:pPr lvl="1"/>
-            <a:r>
-              <a:rPr lang="en-US" dirty="0" smtClean="0"/>
-              <a:t>Search based on 2d relationship</a:t>
-            </a:r>
-          </a:p>
-          <a:p>
-            <a:pPr lvl="1"/>
-            <a:r>
-              <a:rPr lang="en-US" dirty="0" smtClean="0"/>
-              <a:t>Calculate area</a:t>
-            </a:r>
-          </a:p>
-          <a:p>
-            <a:pPr lvl="1"/>
-            <a:r>
-              <a:rPr lang="en-US" dirty="0" smtClean="0"/>
-              <a:t>Model data in space (</a:t>
-            </a:r>
-            <a:r>
-              <a:rPr lang="en-US" i="1" dirty="0" smtClean="0"/>
-              <a:t>e.g. </a:t>
-            </a:r>
-            <a:r>
-              <a:rPr lang="en-US" dirty="0" smtClean="0"/>
-              <a:t>things may move)</a:t>
-            </a:r>
-          </a:p>
-          <a:p>
-            <a:pPr marL="0" indent="0">
-              <a:buNone/>
-            </a:pPr>
-            <a:endParaRPr lang="en-US" dirty="0"/>
-          </a:p>
-          <a:p>
-            <a:pPr marL="0" indent="0">
-              <a:buNone/>
-            </a:pPr>
-            <a:endParaRPr lang="en-US" dirty="0" smtClean="0"/>
+              <a:t> </a:t>
+            </a:r>
           </a:p>
         </p:txBody>
       </p:sp>
@@ -15122,7 +15137,7 @@
           <a:p>
             <a:fld id="{7053BEFA-1175-F644-B249-7D41D72BD3FF}" type="datetime1">
               <a:rPr lang="en-US" smtClean="0"/>
-              <a:t>1/25/15</a:t>
+              <a:t>2/14/15</a:t>
             </a:fld>
             <a:endParaRPr lang="en-US"/>
           </a:p>
@@ -15165,6 +15180,338 @@
             <a:fld id="{17E276FA-8F89-B34D-A726-BE3FA1F8DD97}" type="slidenum">
               <a:rPr lang="en-US" smtClean="0"/>
               <a:t>33</a:t>
+            </a:fld>
+            <a:endParaRPr lang="en-US" dirty="0"/>
+          </a:p>
+        </p:txBody>
+      </p:sp>
+      <p:sp>
+        <p:nvSpPr>
+          <p:cNvPr id="7" name="TextBox 6"/>
+          <p:cNvSpPr txBox="1"/>
+          <p:nvPr/>
+        </p:nvSpPr>
+        <p:spPr>
+          <a:xfrm>
+            <a:off x="4220977" y="4578976"/>
+            <a:ext cx="4057140" cy="1477328"/>
+          </a:xfrm>
+          <a:prstGeom prst="rect">
+            <a:avLst/>
+          </a:prstGeom>
+          <a:noFill/>
+        </p:spPr>
+        <p:txBody>
+          <a:bodyPr wrap="square" rtlCol="0">
+            <a:spAutoFit/>
+          </a:bodyPr>
+          <a:lstStyle/>
+          <a:p>
+            <a:r>
+              <a:rPr lang="en-US" dirty="0"/>
+              <a:t>Based on this patient's  MRI,  have we treated somebody with a similar condition ?</a:t>
+            </a:r>
+          </a:p>
+          <a:p>
+            <a:endParaRPr lang="en-US" dirty="0"/>
+          </a:p>
+          <a:p>
+            <a:endParaRPr lang="en-US" dirty="0"/>
+          </a:p>
+        </p:txBody>
+      </p:sp>
+      <p:sp>
+        <p:nvSpPr>
+          <p:cNvPr id="8" name="TextBox 7"/>
+          <p:cNvSpPr txBox="1"/>
+          <p:nvPr/>
+        </p:nvSpPr>
+        <p:spPr>
+          <a:xfrm>
+            <a:off x="4219698" y="3948781"/>
+            <a:ext cx="4057140" cy="646331"/>
+          </a:xfrm>
+          <a:prstGeom prst="rect">
+            <a:avLst/>
+          </a:prstGeom>
+          <a:noFill/>
+        </p:spPr>
+        <p:txBody>
+          <a:bodyPr wrap="square" rtlCol="0">
+            <a:spAutoFit/>
+          </a:bodyPr>
+          <a:lstStyle/>
+          <a:p>
+            <a:r>
+              <a:rPr lang="en-US" dirty="0" smtClean="0"/>
+              <a:t>Are certain breeds found more commonly in urban areas?</a:t>
+            </a:r>
+            <a:endParaRPr lang="en-US" dirty="0"/>
+          </a:p>
+        </p:txBody>
+      </p:sp>
+      <p:sp>
+        <p:nvSpPr>
+          <p:cNvPr id="9" name="TextBox 8"/>
+          <p:cNvSpPr txBox="1"/>
+          <p:nvPr/>
+        </p:nvSpPr>
+        <p:spPr>
+          <a:xfrm>
+            <a:off x="4238617" y="3253808"/>
+            <a:ext cx="4057140" cy="646331"/>
+          </a:xfrm>
+          <a:prstGeom prst="rect">
+            <a:avLst/>
+          </a:prstGeom>
+          <a:noFill/>
+        </p:spPr>
+        <p:txBody>
+          <a:bodyPr wrap="square" rtlCol="0">
+            <a:spAutoFit/>
+          </a:bodyPr>
+          <a:lstStyle/>
+          <a:p>
+            <a:r>
+              <a:rPr lang="en-US" dirty="0" smtClean="0"/>
+              <a:t>How do trees affect the prevalence of Lyme disease?</a:t>
+            </a:r>
+            <a:endParaRPr lang="en-US" dirty="0"/>
+          </a:p>
+        </p:txBody>
+      </p:sp>
+    </p:spTree>
+    <p:extLst>
+      <p:ext uri="{BB962C8B-B14F-4D97-AF65-F5344CB8AC3E}">
+        <p14:creationId xmlns:p14="http://schemas.microsoft.com/office/powerpoint/2010/main" val="3702149012"/>
+      </p:ext>
+    </p:extLst>
+  </p:cSld>
+  <p:clrMapOvr>
+    <a:masterClrMapping/>
+  </p:clrMapOvr>
+</p:sld>
+</file>
+
+<file path=ppt/slides/slide34.xml><?xml version="1.0" encoding="utf-8"?>
+<p:sld xmlns:a="http://schemas.openxmlformats.org/drawingml/2006/main" xmlns:r="http://schemas.openxmlformats.org/officeDocument/2006/relationships" xmlns:p="http://schemas.openxmlformats.org/presentationml/2006/main">
+  <p:cSld>
+    <p:spTree>
+      <p:nvGrpSpPr>
+        <p:cNvPr id="1" name=""/>
+        <p:cNvGrpSpPr/>
+        <p:nvPr/>
+      </p:nvGrpSpPr>
+      <p:grpSpPr>
+        <a:xfrm>
+          <a:off x="0" y="0"/>
+          <a:ext cx="0" cy="0"/>
+          <a:chOff x="0" y="0"/>
+          <a:chExt cx="0" cy="0"/>
+        </a:xfrm>
+      </p:grpSpPr>
+      <p:sp>
+        <p:nvSpPr>
+          <p:cNvPr id="2" name="Title 1"/>
+          <p:cNvSpPr>
+            <a:spLocks noGrp="1"/>
+          </p:cNvSpPr>
+          <p:nvPr>
+            <p:ph type="title"/>
+          </p:nvPr>
+        </p:nvSpPr>
+        <p:spPr/>
+        <p:txBody>
+          <a:bodyPr/>
+          <a:lstStyle/>
+          <a:p>
+            <a:r>
+              <a:rPr lang="en-US" dirty="0" smtClean="0"/>
+              <a:t>Specialty Tools</a:t>
+            </a:r>
+            <a:endParaRPr lang="en-US" dirty="0"/>
+          </a:p>
+        </p:txBody>
+      </p:sp>
+      <p:sp>
+        <p:nvSpPr>
+          <p:cNvPr id="3" name="Content Placeholder 2"/>
+          <p:cNvSpPr>
+            <a:spLocks noGrp="1"/>
+          </p:cNvSpPr>
+          <p:nvPr>
+            <p:ph idx="1"/>
+          </p:nvPr>
+        </p:nvSpPr>
+        <p:spPr/>
+        <p:txBody>
+          <a:bodyPr/>
+          <a:lstStyle/>
+          <a:p>
+            <a:pPr marL="0" indent="0">
+              <a:buNone/>
+            </a:pPr>
+            <a:r>
+              <a:rPr lang="en-US" dirty="0" smtClean="0"/>
+              <a:t>Uncertain Data (</a:t>
+            </a:r>
+            <a:r>
+              <a:rPr lang="en-US" i="1" dirty="0" smtClean="0"/>
+              <a:t>e.g., </a:t>
+            </a:r>
+            <a:r>
+              <a:rPr lang="en-US" dirty="0" smtClean="0"/>
+              <a:t>TRIO)</a:t>
+            </a:r>
+          </a:p>
+          <a:p>
+            <a:pPr lvl="1"/>
+            <a:r>
+              <a:rPr lang="en-US" dirty="0" smtClean="0"/>
+              <a:t>Confidence</a:t>
+            </a:r>
+          </a:p>
+          <a:p>
+            <a:pPr lvl="1"/>
+            <a:r>
+              <a:rPr lang="en-US" dirty="0" smtClean="0"/>
+              <a:t>Lineage</a:t>
+            </a:r>
+          </a:p>
+          <a:p>
+            <a:pPr marL="0" indent="0">
+              <a:buNone/>
+            </a:pPr>
+            <a:r>
+              <a:rPr lang="en-US" dirty="0" smtClean="0"/>
+              <a:t>Spatial Data </a:t>
+            </a:r>
+          </a:p>
+          <a:p>
+            <a:pPr lvl="1"/>
+            <a:r>
+              <a:rPr lang="en-US" dirty="0" smtClean="0"/>
+              <a:t>Polyline support (describe a region)</a:t>
+            </a:r>
+          </a:p>
+          <a:p>
+            <a:pPr lvl="1"/>
+            <a:r>
+              <a:rPr lang="en-US" dirty="0" smtClean="0"/>
+              <a:t>Hierarchy of space (building with floors, rooms, </a:t>
+            </a:r>
+            <a:r>
+              <a:rPr lang="en-US" i="1" dirty="0" smtClean="0"/>
+              <a:t>etc.</a:t>
+            </a:r>
+            <a:r>
+              <a:rPr lang="en-US" dirty="0" smtClean="0"/>
+              <a:t>)</a:t>
+            </a:r>
+          </a:p>
+          <a:p>
+            <a:pPr lvl="1"/>
+            <a:r>
+              <a:rPr lang="en-US" dirty="0" smtClean="0"/>
+              <a:t>Search based on 2d relationship</a:t>
+            </a:r>
+          </a:p>
+          <a:p>
+            <a:pPr lvl="1"/>
+            <a:r>
+              <a:rPr lang="en-US" dirty="0" smtClean="0"/>
+              <a:t>Calculate area</a:t>
+            </a:r>
+          </a:p>
+          <a:p>
+            <a:pPr lvl="1"/>
+            <a:r>
+              <a:rPr lang="en-US" dirty="0" smtClean="0"/>
+              <a:t>Model data in space (</a:t>
+            </a:r>
+            <a:r>
+              <a:rPr lang="en-US" i="1" dirty="0" smtClean="0"/>
+              <a:t>e.g. </a:t>
+            </a:r>
+            <a:r>
+              <a:rPr lang="en-US" dirty="0" smtClean="0"/>
+              <a:t>things may move)</a:t>
+            </a:r>
+          </a:p>
+          <a:p>
+            <a:pPr marL="0" indent="0">
+              <a:buNone/>
+            </a:pPr>
+            <a:endParaRPr lang="en-US" dirty="0"/>
+          </a:p>
+          <a:p>
+            <a:pPr marL="0" indent="0">
+              <a:buNone/>
+            </a:pPr>
+            <a:endParaRPr lang="en-US" dirty="0" smtClean="0"/>
+          </a:p>
+        </p:txBody>
+      </p:sp>
+      <p:sp>
+        <p:nvSpPr>
+          <p:cNvPr id="4" name="Date Placeholder 3"/>
+          <p:cNvSpPr>
+            <a:spLocks noGrp="1"/>
+          </p:cNvSpPr>
+          <p:nvPr>
+            <p:ph type="dt" sz="half" idx="10"/>
+          </p:nvPr>
+        </p:nvSpPr>
+        <p:spPr/>
+        <p:txBody>
+          <a:bodyPr/>
+          <a:lstStyle/>
+          <a:p>
+            <a:fld id="{7053BEFA-1175-F644-B249-7D41D72BD3FF}" type="datetime1">
+              <a:rPr lang="en-US" smtClean="0"/>
+              <a:t>2/14/15</a:t>
+            </a:fld>
+            <a:endParaRPr lang="en-US"/>
+          </a:p>
+        </p:txBody>
+      </p:sp>
+      <p:sp>
+        <p:nvSpPr>
+          <p:cNvPr id="5" name="Footer Placeholder 4"/>
+          <p:cNvSpPr>
+            <a:spLocks noGrp="1"/>
+          </p:cNvSpPr>
+          <p:nvPr>
+            <p:ph type="ftr" sz="quarter" idx="11"/>
+          </p:nvPr>
+        </p:nvSpPr>
+        <p:spPr/>
+        <p:txBody>
+          <a:bodyPr/>
+          <a:lstStyle/>
+          <a:p>
+            <a:endParaRPr lang="en-US" dirty="0"/>
+          </a:p>
+        </p:txBody>
+      </p:sp>
+      <p:sp>
+        <p:nvSpPr>
+          <p:cNvPr id="6" name="Slide Number Placeholder 5"/>
+          <p:cNvSpPr>
+            <a:spLocks noGrp="1"/>
+          </p:cNvSpPr>
+          <p:nvPr>
+            <p:ph type="sldNum" sz="quarter" idx="12"/>
+          </p:nvPr>
+        </p:nvSpPr>
+        <p:spPr/>
+        <p:txBody>
+          <a:bodyPr/>
+          <a:lstStyle/>
+          <a:p>
+            <a:fld id="{17E276FA-8F89-B34D-A726-BE3FA1F8DD97}" type="slidenum">
+              <a:rPr lang="en-US" smtClean="0"/>
+              <a:t>34</a:t>
             </a:fld>
             <a:endParaRPr lang="en-US" dirty="0"/>
           </a:p>
@@ -15217,7 +15564,7 @@
           <a:p>
             <a:r>
               <a:rPr lang="en-US" dirty="0" smtClean="0"/>
-              <a:t>Data Management</a:t>
+              <a:t>What is Data?</a:t>
             </a:r>
             <a:endParaRPr lang="en-US" dirty="0"/>
           </a:p>
@@ -15238,79 +15585,7 @@
           <a:bodyPr/>
           <a:lstStyle/>
           <a:p>
-            <a:pPr marL="0" indent="0">
-              <a:buNone/>
-            </a:pPr>
-            <a:r>
-              <a:rPr lang="en-US" dirty="0"/>
-              <a:t>Information is an organizational resource</a:t>
-            </a:r>
-          </a:p>
-          <a:p>
-            <a:pPr lvl="1"/>
-            <a:r>
-              <a:rPr lang="en-US" dirty="0"/>
-              <a:t>Just like people, capital, and equipment</a:t>
-            </a:r>
-          </a:p>
-          <a:p>
-            <a:pPr lvl="1"/>
-            <a:r>
-              <a:rPr lang="en-US" dirty="0"/>
-              <a:t>It must be managed </a:t>
-            </a:r>
-            <a:r>
-              <a:rPr lang="en-US" dirty="0" smtClean="0"/>
-              <a:t>effectively</a:t>
-            </a:r>
-          </a:p>
-          <a:p>
-            <a:pPr marL="0" indent="0">
-              <a:buNone/>
-            </a:pPr>
-            <a:r>
-              <a:rPr lang="en-US" dirty="0" smtClean="0"/>
-              <a:t>Who should oversee it?</a:t>
-            </a:r>
-          </a:p>
-          <a:p>
-            <a:pPr lvl="1"/>
-            <a:r>
-              <a:rPr lang="en-US" dirty="0" smtClean="0"/>
-              <a:t>Who owns it</a:t>
-            </a:r>
-          </a:p>
-          <a:p>
-            <a:pPr lvl="1"/>
-            <a:r>
-              <a:rPr lang="en-US" dirty="0" smtClean="0"/>
-              <a:t>Who is responsible for the four Cs? (Completeness, Coherence, Correctness, </a:t>
-            </a:r>
-            <a:r>
-              <a:rPr lang="en-US" dirty="0" err="1" smtClean="0"/>
-              <a:t>AcCountability</a:t>
-            </a:r>
-            <a:r>
-              <a:rPr lang="en-US" dirty="0" smtClean="0"/>
-              <a:t>)</a:t>
-            </a:r>
-          </a:p>
-          <a:p>
-            <a:pPr marL="0" indent="0">
-              <a:buNone/>
-            </a:pPr>
-            <a:r>
-              <a:rPr lang="en-US" dirty="0" smtClean="0"/>
-              <a:t>Requires lots of attention, over time, regular checks, </a:t>
-            </a:r>
-            <a:r>
-              <a:rPr lang="en-US" i="1" dirty="0" smtClean="0"/>
-              <a:t>etc.</a:t>
-            </a:r>
-            <a:endParaRPr lang="en-US" dirty="0"/>
-          </a:p>
-          <a:p>
-            <a:endParaRPr lang="en-US" dirty="0"/>
+            <a:endParaRPr lang="en-US"/>
           </a:p>
         </p:txBody>
       </p:sp>
@@ -15331,7 +15606,7 @@
           <a:p>
             <a:fld id="{7053BEFA-1175-F644-B249-7D41D72BD3FF}" type="datetime1">
               <a:rPr lang="en-US" smtClean="0"/>
-              <a:t>1/25/15</a:t>
+              <a:t>2/14/15</a:t>
             </a:fld>
             <a:endParaRPr lang="en-US"/>
           </a:p>
@@ -15382,13 +15657,20 @@
     </p:spTree>
     <p:extLst>
       <p:ext uri="{BB962C8B-B14F-4D97-AF65-F5344CB8AC3E}">
-        <p14:creationId xmlns:p14="http://schemas.microsoft.com/office/powerpoint/2010/main" val="4254068576"/>
+        <p14:creationId xmlns:p14="http://schemas.microsoft.com/office/powerpoint/2010/main" val="1405784729"/>
       </p:ext>
     </p:extLst>
   </p:cSld>
   <p:clrMapOvr>
     <a:masterClrMapping/>
   </p:clrMapOvr>
+  <p:timing>
+    <p:tnLst>
+      <p:par>
+        <p:cTn xmlns:p14="http://schemas.microsoft.com/office/powerpoint/2010/main" id="1" dur="indefinite" restart="never" nodeType="tmRoot"/>
+      </p:par>
+    </p:tnLst>
+  </p:timing>
 </p:sld>
 </file>
 
@@ -15426,7 +15708,7 @@
           <a:p>
             <a:r>
               <a:rPr lang="en-US" dirty="0" smtClean="0"/>
-              <a:t>Types of Data</a:t>
+              <a:t>Data Management</a:t>
             </a:r>
             <a:endParaRPr lang="en-US" dirty="0"/>
           </a:p>
@@ -15447,46 +15729,78 @@
           <a:bodyPr/>
           <a:lstStyle/>
           <a:p>
-            <a:r>
-              <a:rPr lang="en-US" dirty="0" smtClean="0"/>
-              <a:t>Unstructured – </a:t>
+            <a:pPr marL="0" indent="0">
+              <a:buNone/>
+            </a:pPr>
+            <a:r>
+              <a:rPr lang="en-US" dirty="0"/>
+              <a:t>Information is an organizational resource</a:t>
+            </a:r>
+          </a:p>
+          <a:p>
+            <a:pPr lvl="1"/>
+            <a:r>
+              <a:rPr lang="en-US" dirty="0"/>
+              <a:t>Just like people, capital, and equipment</a:t>
+            </a:r>
+          </a:p>
+          <a:p>
+            <a:pPr lvl="1"/>
+            <a:r>
+              <a:rPr lang="en-US" dirty="0"/>
+              <a:t>It must be managed </a:t>
+            </a:r>
+            <a:r>
+              <a:rPr lang="en-US" dirty="0" smtClean="0"/>
+              <a:t>effectively</a:t>
+            </a:r>
+          </a:p>
+          <a:p>
+            <a:pPr marL="0" indent="0">
+              <a:buNone/>
+            </a:pPr>
+            <a:r>
+              <a:rPr lang="en-US" dirty="0" smtClean="0"/>
+              <a:t>Who should oversee it?</a:t>
+            </a:r>
+          </a:p>
+          <a:p>
+            <a:pPr lvl="1"/>
+            <a:r>
+              <a:rPr lang="en-US" dirty="0" smtClean="0"/>
+              <a:t>Who owns it</a:t>
+            </a:r>
+          </a:p>
+          <a:p>
+            <a:pPr lvl="1"/>
+            <a:r>
+              <a:rPr lang="en-US" dirty="0" smtClean="0"/>
+              <a:t>Who is responsible for the four Cs? (Completeness, Coherence, Correctness, </a:t>
+            </a:r>
+            <a:r>
+              <a:rPr lang="en-US" dirty="0" err="1" smtClean="0"/>
+              <a:t>AcCountability</a:t>
+            </a:r>
+            <a:r>
+              <a:rPr lang="en-US" dirty="0" smtClean="0"/>
+              <a:t>)</a:t>
+            </a:r>
+          </a:p>
+          <a:p>
+            <a:pPr marL="0" indent="0">
+              <a:buNone/>
+            </a:pPr>
+            <a:r>
+              <a:rPr lang="en-US" dirty="0" smtClean="0"/>
+              <a:t>Requires lots of attention, over time, regular checks, </a:t>
             </a:r>
             <a:r>
               <a:rPr lang="en-US" i="1" dirty="0" smtClean="0"/>
-              <a:t>e.g. </a:t>
-            </a:r>
-            <a:r>
-              <a:rPr lang="en-US" dirty="0" smtClean="0"/>
-              <a:t>text</a:t>
-            </a:r>
-          </a:p>
-          <a:p>
-            <a:r>
-              <a:rPr lang="en-US" dirty="0" smtClean="0"/>
-              <a:t>Semi-Structured – </a:t>
-            </a:r>
-            <a:r>
-              <a:rPr lang="en-US" i="1" dirty="0" smtClean="0"/>
-              <a:t>e.g. </a:t>
-            </a:r>
-            <a:r>
-              <a:rPr lang="en-US" dirty="0" smtClean="0"/>
-              <a:t>XML (RSS feeds are a specific example of this)</a:t>
-            </a:r>
-          </a:p>
-          <a:p>
-            <a:r>
-              <a:rPr lang="en-US" dirty="0" smtClean="0"/>
-              <a:t>Structured – </a:t>
-            </a:r>
-            <a:r>
-              <a:rPr lang="en-US" i="1" dirty="0" smtClean="0"/>
-              <a:t>e.g. </a:t>
-            </a:r>
-            <a:r>
-              <a:rPr lang="en-US" dirty="0" smtClean="0"/>
-              <a:t>a MySQL database</a:t>
-            </a:r>
+              <a:t>etc.</a:t>
+            </a:r>
+            <a:endParaRPr lang="en-US" dirty="0"/>
+          </a:p>
+          <a:p>
             <a:endParaRPr lang="en-US" dirty="0"/>
           </a:p>
         </p:txBody>
@@ -15508,7 +15822,7 @@
           <a:p>
             <a:fld id="{7053BEFA-1175-F644-B249-7D41D72BD3FF}" type="datetime1">
               <a:rPr lang="en-US" smtClean="0"/>
-              <a:t>1/25/15</a:t>
+              <a:t>2/14/15</a:t>
             </a:fld>
             <a:endParaRPr lang="en-US"/>
           </a:p>
@@ -15559,20 +15873,13 @@
     </p:spTree>
     <p:extLst>
       <p:ext uri="{BB962C8B-B14F-4D97-AF65-F5344CB8AC3E}">
-        <p14:creationId xmlns:p14="http://schemas.microsoft.com/office/powerpoint/2010/main" val="1082504122"/>
+        <p14:creationId xmlns:p14="http://schemas.microsoft.com/office/powerpoint/2010/main" val="4254068576"/>
       </p:ext>
     </p:extLst>
   </p:cSld>
   <p:clrMapOvr>
     <a:masterClrMapping/>
   </p:clrMapOvr>
-  <p:timing>
-    <p:tnLst>
-      <p:par>
-        <p:cTn xmlns:p14="http://schemas.microsoft.com/office/powerpoint/2010/main" id="1" dur="indefinite" restart="never" nodeType="tmRoot"/>
-      </p:par>
-    </p:tnLst>
-  </p:timing>
 </p:sld>
 </file>
 
@@ -15610,7 +15917,7 @@
           <a:p>
             <a:r>
               <a:rPr lang="en-US" dirty="0" smtClean="0"/>
-              <a:t>Unstructured Data</a:t>
+              <a:t>Types of Data</a:t>
             </a:r>
             <a:endParaRPr lang="en-US" dirty="0"/>
           </a:p>
@@ -15632,24 +15939,46 @@
           <a:lstStyle/>
           <a:p>
             <a:r>
-              <a:rPr lang="en-US" dirty="0"/>
-              <a:t>Text with a table in it (or just text)</a:t>
-            </a:r>
-          </a:p>
-          <a:p>
-            <a:r>
-              <a:rPr lang="en-US" dirty="0" smtClean="0"/>
-              <a:t>Twitter posts (actually: semi-structured. Why?)</a:t>
-            </a:r>
-          </a:p>
-          <a:p>
-            <a:r>
-              <a:rPr lang="en-US" dirty="0" smtClean="0"/>
-              <a:t>HTML (potentially)</a:t>
-            </a:r>
-          </a:p>
-          <a:p>
-            <a:endParaRPr lang="en-US" dirty="0" smtClean="0"/>
+              <a:rPr lang="en-US" dirty="0" smtClean="0"/>
+              <a:t>Unstructured – </a:t>
+            </a:r>
+            <a:r>
+              <a:rPr lang="en-US" i="1" dirty="0" smtClean="0"/>
+              <a:t>e.g. </a:t>
+            </a:r>
+            <a:r>
+              <a:rPr lang="en-US" dirty="0" smtClean="0"/>
+              <a:t>text</a:t>
+            </a:r>
+          </a:p>
+          <a:p>
+            <a:r>
+              <a:rPr lang="en-US" dirty="0" smtClean="0"/>
+              <a:t>Semi-Structured – </a:t>
+            </a:r>
+            <a:r>
+              <a:rPr lang="en-US" i="1" dirty="0" smtClean="0"/>
+              <a:t>e.g. </a:t>
+            </a:r>
+            <a:r>
+              <a:rPr lang="en-US" dirty="0" smtClean="0"/>
+              <a:t>XML (RSS feeds are a specific example of this)</a:t>
+            </a:r>
+          </a:p>
+          <a:p>
+            <a:r>
+              <a:rPr lang="en-US" dirty="0" smtClean="0"/>
+              <a:t>Structured – </a:t>
+            </a:r>
+            <a:r>
+              <a:rPr lang="en-US" i="1" dirty="0" smtClean="0"/>
+              <a:t>e.g. </a:t>
+            </a:r>
+            <a:r>
+              <a:rPr lang="en-US" dirty="0" smtClean="0"/>
+              <a:t>a MySQL database</a:t>
+            </a:r>
+            <a:endParaRPr lang="en-US" dirty="0"/>
           </a:p>
         </p:txBody>
       </p:sp>
@@ -15670,7 +15999,7 @@
           <a:p>
             <a:fld id="{7053BEFA-1175-F644-B249-7D41D72BD3FF}" type="datetime1">
               <a:rPr lang="en-US" smtClean="0"/>
-              <a:t>1/25/15</a:t>
+              <a:t>2/14/15</a:t>
             </a:fld>
             <a:endParaRPr lang="en-US"/>
           </a:p>
@@ -15721,7 +16050,7 @@
     </p:spTree>
     <p:extLst>
       <p:ext uri="{BB962C8B-B14F-4D97-AF65-F5344CB8AC3E}">
-        <p14:creationId xmlns:p14="http://schemas.microsoft.com/office/powerpoint/2010/main" val="589055938"/>
+        <p14:creationId xmlns:p14="http://schemas.microsoft.com/office/powerpoint/2010/main" val="1082504122"/>
       </p:ext>
     </p:extLst>
   </p:cSld>
@@ -15772,7 +16101,7 @@
           <a:p>
             <a:r>
               <a:rPr lang="en-US" dirty="0" smtClean="0"/>
-              <a:t>Semi-structured Data</a:t>
+              <a:t>Unstructured Data</a:t>
             </a:r>
             <a:endParaRPr lang="en-US" dirty="0"/>
           </a:p>
@@ -15793,46 +16122,25 @@
           <a:bodyPr/>
           <a:lstStyle/>
           <a:p>
-            <a:pPr marL="0" indent="0">
-              <a:buNone/>
-            </a:pPr>
-            <a:r>
-              <a:rPr lang="en-US" dirty="0" smtClean="0"/>
-              <a:t>Ad-hoc</a:t>
-            </a:r>
-          </a:p>
-          <a:p>
-            <a:pPr marL="0" indent="0">
-              <a:buNone/>
-            </a:pPr>
-            <a:r>
-              <a:rPr lang="en-US" dirty="0" smtClean="0"/>
-              <a:t>May not all be identically structured</a:t>
-            </a:r>
-          </a:p>
-          <a:p>
-            <a:pPr marL="0" indent="0">
-              <a:buNone/>
-            </a:pPr>
-            <a:r>
-              <a:rPr lang="en-US" dirty="0" smtClean="0"/>
-              <a:t>Schema not known in advance</a:t>
-            </a:r>
-          </a:p>
-          <a:p>
-            <a:pPr marL="0" indent="0">
-              <a:buNone/>
-            </a:pPr>
-            <a:r>
-              <a:rPr lang="en-US" dirty="0" smtClean="0"/>
-              <a:t>“self-describing” </a:t>
-            </a:r>
-          </a:p>
-          <a:p>
-            <a:pPr marL="0" indent="0">
-              <a:buNone/>
-            </a:pPr>
-            <a:endParaRPr lang="en-US" dirty="0"/>
+            <a:r>
+              <a:rPr lang="en-US" dirty="0"/>
+              <a:t>Text with a table in it (or just text)</a:t>
+            </a:r>
+          </a:p>
+          <a:p>
+            <a:r>
+              <a:rPr lang="en-US" dirty="0" smtClean="0"/>
+              <a:t>Twitter posts (actually: semi-structured. Why?)</a:t>
+            </a:r>
+          </a:p>
+          <a:p>
+            <a:r>
+              <a:rPr lang="en-US" dirty="0" smtClean="0"/>
+              <a:t>HTML (potentially)</a:t>
+            </a:r>
+          </a:p>
+          <a:p>
+            <a:endParaRPr lang="en-US" dirty="0" smtClean="0"/>
           </a:p>
         </p:txBody>
       </p:sp>
@@ -15853,7 +16161,7 @@
           <a:p>
             <a:fld id="{7053BEFA-1175-F644-B249-7D41D72BD3FF}" type="datetime1">
               <a:rPr lang="en-US" smtClean="0"/>
-              <a:t>1/25/15</a:t>
+              <a:t>2/14/15</a:t>
             </a:fld>
             <a:endParaRPr lang="en-US"/>
           </a:p>
@@ -15901,36 +16209,10 @@
           </a:p>
         </p:txBody>
       </p:sp>
-      <p:sp>
-        <p:nvSpPr>
-          <p:cNvPr id="8" name="TextBox 7"/>
-          <p:cNvSpPr txBox="1"/>
-          <p:nvPr/>
-        </p:nvSpPr>
-        <p:spPr>
-          <a:xfrm>
-            <a:off x="1481738" y="4110390"/>
-            <a:ext cx="184666" cy="369332"/>
-          </a:xfrm>
-          <a:prstGeom prst="rect">
-            <a:avLst/>
-          </a:prstGeom>
-          <a:noFill/>
-        </p:spPr>
-        <p:txBody>
-          <a:bodyPr wrap="none" rtlCol="0">
-            <a:spAutoFit/>
-          </a:bodyPr>
-          <a:lstStyle/>
-          <a:p>
-            <a:endParaRPr lang="en-US" dirty="0"/>
-          </a:p>
-        </p:txBody>
-      </p:sp>
     </p:spTree>
     <p:extLst>
       <p:ext uri="{BB962C8B-B14F-4D97-AF65-F5344CB8AC3E}">
-        <p14:creationId xmlns:p14="http://schemas.microsoft.com/office/powerpoint/2010/main" val="4191292735"/>
+        <p14:creationId xmlns:p14="http://schemas.microsoft.com/office/powerpoint/2010/main" val="589055938"/>
       </p:ext>
     </p:extLst>
   </p:cSld>
@@ -15981,7 +16263,7 @@
           <a:p>
             <a:r>
               <a:rPr lang="en-US" dirty="0" smtClean="0"/>
-              <a:t>XML (prototypical example)</a:t>
+              <a:t>Semi-structured Data</a:t>
             </a:r>
             <a:endParaRPr lang="en-US" dirty="0"/>
           </a:p>
@@ -15997,60 +16279,51 @@
             <p:ph idx="1"/>
           </p:nvPr>
         </p:nvSpPr>
-        <p:spPr>
-          <a:xfrm>
-            <a:off x="1128943" y="1847153"/>
-            <a:ext cx="5080245" cy="4379976"/>
-          </a:xfrm>
-        </p:spPr>
-        <p:txBody>
-          <a:bodyPr/>
-          <a:lstStyle/>
-          <a:p>
-            <a:pPr marL="0" lvl="1" indent="0">
-              <a:buClr>
-                <a:schemeClr val="accent3"/>
-              </a:buClr>
-              <a:buSzTx/>
+        <p:spPr/>
+        <p:txBody>
+          <a:bodyPr/>
+          <a:lstStyle/>
+          <a:p>
+            <a:pPr marL="0" indent="0">
               <a:buNone/>
             </a:pPr>
             <a:r>
-              <a:rPr lang="en-US" sz="2400" dirty="0" smtClean="0"/>
-              <a:t>XML </a:t>
-            </a:r>
-            <a:r>
-              <a:rPr lang="en-US" sz="2400" dirty="0"/>
-              <a:t>can be used to provide more information about the structure and meaning of the data in the Web pages rather than just specifying how the Web pages are formatted for display on the screen. </a:t>
-            </a:r>
-            <a:endParaRPr lang="en-US" sz="2400" dirty="0" smtClean="0"/>
-          </a:p>
-          <a:p>
-            <a:pPr marL="0" lvl="1" indent="0">
-              <a:buClr>
-                <a:schemeClr val="accent3"/>
-              </a:buClr>
-              <a:buSzTx/>
+              <a:rPr lang="en-US" dirty="0" smtClean="0"/>
+              <a:t>Ad-hoc</a:t>
+            </a:r>
+          </a:p>
+          <a:p>
+            <a:pPr marL="0" indent="0">
               <a:buNone/>
             </a:pPr>
-            <a:endParaRPr lang="en-US" sz="2400" dirty="0"/>
-          </a:p>
-          <a:p>
-            <a:pPr marL="0" lvl="1" indent="0">
-              <a:buClr>
-                <a:schemeClr val="accent3"/>
-              </a:buClr>
-              <a:buSzTx/>
+            <a:r>
+              <a:rPr lang="en-US" dirty="0" smtClean="0"/>
+              <a:t>May not all be identically structured</a:t>
+            </a:r>
+          </a:p>
+          <a:p>
+            <a:pPr marL="0" indent="0">
               <a:buNone/>
             </a:pPr>
             <a:r>
-              <a:rPr lang="en-US" sz="2400" dirty="0"/>
-              <a:t>Example: http://www.w3schools.com/xml/</a:t>
-            </a:r>
-            <a:r>
-              <a:rPr lang="en-US" sz="2400" dirty="0" err="1"/>
-              <a:t>cd_catalog.xml</a:t>
-            </a:r>
-            <a:endParaRPr lang="en-US" sz="2400" dirty="0"/>
+              <a:rPr lang="en-US" dirty="0" smtClean="0"/>
+              <a:t>Schema not known in advance</a:t>
+            </a:r>
+          </a:p>
+          <a:p>
+            <a:pPr marL="0" indent="0">
+              <a:buNone/>
+            </a:pPr>
+            <a:r>
+              <a:rPr lang="en-US" dirty="0" smtClean="0"/>
+              <a:t>“self-describing” </a:t>
+            </a:r>
+          </a:p>
+          <a:p>
+            <a:pPr marL="0" indent="0">
+              <a:buNone/>
+            </a:pPr>
+            <a:endParaRPr lang="en-US" dirty="0"/>
           </a:p>
         </p:txBody>
       </p:sp>
@@ -16071,7 +16344,7 @@
           <a:p>
             <a:fld id="{7053BEFA-1175-F644-B249-7D41D72BD3FF}" type="datetime1">
               <a:rPr lang="en-US" smtClean="0"/>
-              <a:t>1/25/15</a:t>
+              <a:t>2/14/15</a:t>
             </a:fld>
             <a:endParaRPr lang="en-US"/>
           </a:p>
@@ -16116,182 +16389,6 @@
               <a:t>8</a:t>
             </a:fld>
             <a:endParaRPr lang="en-US" dirty="0"/>
-          </a:p>
-        </p:txBody>
-      </p:sp>
-      <p:sp>
-        <p:nvSpPr>
-          <p:cNvPr id="7" name="Rectangle 6"/>
-          <p:cNvSpPr/>
-          <p:nvPr/>
-        </p:nvSpPr>
-        <p:spPr>
-          <a:xfrm>
-            <a:off x="6491424" y="831998"/>
-            <a:ext cx="4572000" cy="5478422"/>
-          </a:xfrm>
-          <a:prstGeom prst="rect">
-            <a:avLst/>
-          </a:prstGeom>
-        </p:spPr>
-        <p:txBody>
-          <a:bodyPr>
-            <a:spAutoFit/>
-          </a:bodyPr>
-          <a:lstStyle/>
-          <a:p>
-            <a:r>
-              <a:rPr lang="en-US" sz="1400" dirty="0" smtClean="0"/>
-              <a:t>&lt;</a:t>
-            </a:r>
-            <a:r>
-              <a:rPr lang="en-US" sz="1400" dirty="0"/>
-              <a:t>CATALOG&gt;</a:t>
-            </a:r>
-          </a:p>
-          <a:p>
-            <a:r>
-              <a:rPr lang="en-US" sz="1400" dirty="0"/>
-              <a:t>&lt;CD&gt;</a:t>
-            </a:r>
-          </a:p>
-          <a:p>
-            <a:r>
-              <a:rPr lang="en-US" sz="1400" dirty="0"/>
-              <a:t>&lt;TITLE&gt;Empire Burlesque&lt;/TITLE&gt;</a:t>
-            </a:r>
-          </a:p>
-          <a:p>
-            <a:r>
-              <a:rPr lang="en-US" sz="1400" dirty="0"/>
-              <a:t>&lt;ARTIST&gt;Bob Dylan&lt;/ARTIST&gt;</a:t>
-            </a:r>
-          </a:p>
-          <a:p>
-            <a:r>
-              <a:rPr lang="en-US" sz="1400" dirty="0"/>
-              <a:t>&lt;COUNTRY&gt;USA&lt;/COUNTRY&gt;</a:t>
-            </a:r>
-          </a:p>
-          <a:p>
-            <a:r>
-              <a:rPr lang="en-US" sz="1400" dirty="0"/>
-              <a:t>&lt;COMPANY&gt;Columbia&lt;/COMPANY&gt;</a:t>
-            </a:r>
-          </a:p>
-          <a:p>
-            <a:r>
-              <a:rPr lang="en-US" sz="1400" dirty="0"/>
-              <a:t>&lt;PRICE&gt;10.90&lt;/PRICE&gt;</a:t>
-            </a:r>
-          </a:p>
-          <a:p>
-            <a:r>
-              <a:rPr lang="en-US" sz="1400" dirty="0"/>
-              <a:t>&lt;YEAR&gt;1985&lt;/YEAR&gt;</a:t>
-            </a:r>
-          </a:p>
-          <a:p>
-            <a:r>
-              <a:rPr lang="en-US" sz="1400" dirty="0"/>
-              <a:t>&lt;/CD&gt;</a:t>
-            </a:r>
-          </a:p>
-          <a:p>
-            <a:r>
-              <a:rPr lang="en-US" sz="1400" dirty="0"/>
-              <a:t>&lt;CD&gt;</a:t>
-            </a:r>
-          </a:p>
-          <a:p>
-            <a:r>
-              <a:rPr lang="en-US" sz="1400" dirty="0"/>
-              <a:t>&lt;TITLE&gt;Hide your heart&lt;/TITLE&gt;</a:t>
-            </a:r>
-          </a:p>
-          <a:p>
-            <a:r>
-              <a:rPr lang="en-US" sz="1400" dirty="0"/>
-              <a:t>&lt;ARTIST&gt;Bonnie Tyler&lt;/ARTIST&gt;</a:t>
-            </a:r>
-          </a:p>
-          <a:p>
-            <a:r>
-              <a:rPr lang="en-US" sz="1400" dirty="0"/>
-              <a:t>&lt;COUNTRY&gt;UK&lt;/COUNTRY&gt;</a:t>
-            </a:r>
-          </a:p>
-          <a:p>
-            <a:r>
-              <a:rPr lang="en-US" sz="1400" dirty="0"/>
-              <a:t>&lt;COMPANY&gt;CBS Records&lt;/COMPANY&gt;</a:t>
-            </a:r>
-          </a:p>
-          <a:p>
-            <a:r>
-              <a:rPr lang="en-US" sz="1400" dirty="0"/>
-              <a:t>&lt;PRICE&gt;9.90&lt;/PRICE&gt;</a:t>
-            </a:r>
-          </a:p>
-          <a:p>
-            <a:r>
-              <a:rPr lang="en-US" sz="1400" dirty="0"/>
-              <a:t>&lt;YEAR&gt;1988&lt;/YEAR&gt;</a:t>
-            </a:r>
-          </a:p>
-          <a:p>
-            <a:r>
-              <a:rPr lang="en-US" sz="1400" dirty="0"/>
-              <a:t>&lt;/CD&gt;</a:t>
-            </a:r>
-          </a:p>
-          <a:p>
-            <a:r>
-              <a:rPr lang="en-US" sz="1400" dirty="0"/>
-              <a:t>&lt;CD&gt;</a:t>
-            </a:r>
-          </a:p>
-          <a:p>
-            <a:r>
-              <a:rPr lang="en-US" sz="1400" dirty="0"/>
-              <a:t>&lt;TITLE&gt;Greatest Hits&lt;/TITLE&gt;</a:t>
-            </a:r>
-          </a:p>
-          <a:p>
-            <a:r>
-              <a:rPr lang="en-US" sz="1400" dirty="0"/>
-              <a:t>&lt;ARTIST&gt;Dolly Parton&lt;/ARTIST&gt;</a:t>
-            </a:r>
-          </a:p>
-          <a:p>
-            <a:r>
-              <a:rPr lang="en-US" sz="1400" dirty="0"/>
-              <a:t>&lt;COUNTRY&gt;USA&lt;/COUNTRY&gt;</a:t>
-            </a:r>
-          </a:p>
-          <a:p>
-            <a:r>
-              <a:rPr lang="en-US" sz="1400" dirty="0"/>
-              <a:t>&lt;COMPANY&gt;RCA&lt;/COMPANY&gt;</a:t>
-            </a:r>
-          </a:p>
-          <a:p>
-            <a:r>
-              <a:rPr lang="en-US" sz="1400" dirty="0"/>
-              <a:t>&lt;PRICE&gt;9.90&lt;/PRICE&gt;</a:t>
-            </a:r>
-          </a:p>
-          <a:p>
-            <a:r>
-              <a:rPr lang="en-US" sz="1400" dirty="0"/>
-              <a:t>&lt;YEAR&gt;1982&lt;/YEAR&gt;</a:t>
-            </a:r>
-          </a:p>
-          <a:p>
-            <a:r>
-              <a:rPr lang="en-US" sz="1400" dirty="0"/>
-              <a:t>&lt;/CD&gt;</a:t>
-            </a:r>
           </a:p>
         </p:txBody>
       </p:sp>
@@ -16324,7 +16421,7 @@
     </p:spTree>
     <p:extLst>
       <p:ext uri="{BB962C8B-B14F-4D97-AF65-F5344CB8AC3E}">
-        <p14:creationId xmlns:p14="http://schemas.microsoft.com/office/powerpoint/2010/main" val="3327868801"/>
+        <p14:creationId xmlns:p14="http://schemas.microsoft.com/office/powerpoint/2010/main" val="4191292735"/>
       </p:ext>
     </p:extLst>
   </p:cSld>
@@ -16373,11 +16470,11 @@
           <a:bodyPr/>
           <a:lstStyle/>
           <a:p>
-            <a:pPr marL="0" indent="0"/>
-            <a:r>
-              <a:rPr lang="en-US" dirty="0"/>
-              <a:t>JSON is another example</a:t>
-            </a:r>
+            <a:r>
+              <a:rPr lang="en-US" dirty="0" smtClean="0"/>
+              <a:t>XML (prototypical example)</a:t>
+            </a:r>
+            <a:endParaRPr lang="en-US" dirty="0"/>
           </a:p>
         </p:txBody>
       </p:sp>
@@ -16393,8 +16490,8 @@
         </p:nvSpPr>
         <p:spPr>
           <a:xfrm>
-            <a:off x="1128942" y="1811871"/>
-            <a:ext cx="7655647" cy="4379976"/>
+            <a:off x="1128943" y="1847153"/>
+            <a:ext cx="5080245" cy="4379976"/>
           </a:xfrm>
         </p:spPr>
         <p:txBody>
@@ -16409,9 +16506,14 @@
               <a:buNone/>
             </a:pPr>
             <a:r>
-              <a:rPr lang="en-US" sz="2800" dirty="0" smtClean="0"/>
-              <a:t>Originally a text format for storing JavaScript objects but widely adopted</a:t>
-            </a:r>
+              <a:rPr lang="en-US" sz="2400" dirty="0" smtClean="0"/>
+              <a:t>XML </a:t>
+            </a:r>
+            <a:r>
+              <a:rPr lang="en-US" sz="2400" dirty="0"/>
+              <a:t>can be used to provide more information about the structure and meaning of the data in the Web pages rather than just specifying how the Web pages are formatted for display on the screen. </a:t>
+            </a:r>
+            <a:endParaRPr lang="en-US" sz="2400" dirty="0" smtClean="0"/>
           </a:p>
           <a:p>
             <a:pPr marL="0" lvl="1" indent="0">
@@ -16421,34 +16523,7 @@
               <a:buSzTx/>
               <a:buNone/>
             </a:pPr>
-            <a:r>
-              <a:rPr lang="en-US" sz="2800" dirty="0" smtClean="0"/>
-              <a:t>Includes </a:t>
-            </a:r>
-            <a:r>
-              <a:rPr lang="en-US" sz="2800" i="1" dirty="0" smtClean="0"/>
-              <a:t>type </a:t>
-            </a:r>
-            <a:r>
-              <a:rPr lang="en-US" sz="2800" dirty="0" smtClean="0"/>
-              <a:t>information (number, </a:t>
-            </a:r>
-            <a:r>
-              <a:rPr lang="en-US" sz="2800" dirty="0" err="1" smtClean="0"/>
-              <a:t>bool</a:t>
-            </a:r>
-            <a:r>
-              <a:rPr lang="en-US" sz="2800" dirty="0" smtClean="0"/>
-              <a:t>, string, array, object, empty or </a:t>
-            </a:r>
-            <a:r>
-              <a:rPr lang="en-US" sz="2800" i="1" dirty="0" smtClean="0"/>
-              <a:t>null</a:t>
-            </a:r>
-            <a:r>
-              <a:rPr lang="en-US" sz="2800" dirty="0" smtClean="0"/>
-              <a:t>)</a:t>
-            </a:r>
+            <a:endParaRPr lang="en-US" sz="2400" dirty="0"/>
           </a:p>
           <a:p>
             <a:pPr marL="0" lvl="1" indent="0">
@@ -16459,61 +16534,14 @@
               <a:buNone/>
             </a:pPr>
             <a:r>
-              <a:rPr lang="en-US" sz="2800" dirty="0" smtClean="0"/>
-              <a:t>Everything has a ‘label’: Translates into nested dictionaries from a python perspective</a:t>
-            </a:r>
-          </a:p>
-          <a:p>
-            <a:pPr marL="0" lvl="1" indent="0">
-              <a:buClr>
-                <a:schemeClr val="accent3"/>
-              </a:buClr>
-              <a:buSzTx/>
-              <a:buNone/>
-            </a:pPr>
-            <a:r>
-              <a:rPr lang="en-US" sz="2800" dirty="0" smtClean="0"/>
-              <a:t>Type is up to the creator (</a:t>
-            </a:r>
-            <a:r>
-              <a:rPr lang="en-US" sz="2800" i="1" dirty="0" smtClean="0"/>
-              <a:t>e.g. </a:t>
-            </a:r>
-            <a:r>
-              <a:rPr lang="en-US" sz="2800" dirty="0" smtClean="0"/>
-              <a:t>is a zip a string?)</a:t>
-            </a:r>
-          </a:p>
-          <a:p>
-            <a:pPr marL="0" lvl="1" indent="0">
-              <a:buClr>
-                <a:schemeClr val="accent3"/>
-              </a:buClr>
-              <a:buSzTx/>
-              <a:buNone/>
-            </a:pPr>
-            <a:r>
-              <a:rPr lang="en-US" sz="2800" dirty="0"/>
-              <a:t>Example: Twitter Tweets: https://</a:t>
-            </a:r>
-            <a:r>
-              <a:rPr lang="en-US" sz="2800" dirty="0" err="1"/>
-              <a:t>dev.twitter.com</a:t>
-            </a:r>
-            <a:r>
-              <a:rPr lang="en-US" sz="2800" dirty="0"/>
-              <a:t>/docs/platform-objects/tweets</a:t>
-            </a:r>
-          </a:p>
-          <a:p>
-            <a:pPr marL="0" lvl="1" indent="0">
-              <a:buClr>
-                <a:schemeClr val="accent3"/>
-              </a:buClr>
-              <a:buSzTx/>
-              <a:buNone/>
-            </a:pPr>
-            <a:endParaRPr lang="en-US" sz="2800" dirty="0" smtClean="0"/>
+              <a:rPr lang="en-US" sz="2400" dirty="0"/>
+              <a:t>Example: http://www.w3schools.com/xml/</a:t>
+            </a:r>
+            <a:r>
+              <a:rPr lang="en-US" sz="2400" dirty="0" err="1"/>
+              <a:t>cd_catalog.xml</a:t>
+            </a:r>
+            <a:endParaRPr lang="en-US" sz="2400" dirty="0"/>
           </a:p>
         </p:txBody>
       </p:sp>
@@ -16534,7 +16562,7 @@
           <a:p>
             <a:fld id="{7053BEFA-1175-F644-B249-7D41D72BD3FF}" type="datetime1">
               <a:rPr lang="en-US" smtClean="0"/>
-              <a:t>1/25/15</a:t>
+              <a:t>2/14/15</a:t>
             </a:fld>
             <a:endParaRPr lang="en-US"/>
           </a:p>
@@ -16579,6 +16607,182 @@
               <a:t>9</a:t>
             </a:fld>
             <a:endParaRPr lang="en-US" dirty="0"/>
+          </a:p>
+        </p:txBody>
+      </p:sp>
+      <p:sp>
+        <p:nvSpPr>
+          <p:cNvPr id="7" name="Rectangle 6"/>
+          <p:cNvSpPr/>
+          <p:nvPr/>
+        </p:nvSpPr>
+        <p:spPr>
+          <a:xfrm>
+            <a:off x="6491424" y="831998"/>
+            <a:ext cx="4572000" cy="5478422"/>
+          </a:xfrm>
+          <a:prstGeom prst="rect">
+            <a:avLst/>
+          </a:prstGeom>
+        </p:spPr>
+        <p:txBody>
+          <a:bodyPr>
+            <a:spAutoFit/>
+          </a:bodyPr>
+          <a:lstStyle/>
+          <a:p>
+            <a:r>
+              <a:rPr lang="en-US" sz="1400" dirty="0" smtClean="0"/>
+              <a:t>&lt;</a:t>
+            </a:r>
+            <a:r>
+              <a:rPr lang="en-US" sz="1400" dirty="0"/>
+              <a:t>CATALOG&gt;</a:t>
+            </a:r>
+          </a:p>
+          <a:p>
+            <a:r>
+              <a:rPr lang="en-US" sz="1400" dirty="0"/>
+              <a:t>&lt;CD&gt;</a:t>
+            </a:r>
+          </a:p>
+          <a:p>
+            <a:r>
+              <a:rPr lang="en-US" sz="1400" dirty="0"/>
+              <a:t>&lt;TITLE&gt;Empire Burlesque&lt;/TITLE&gt;</a:t>
+            </a:r>
+          </a:p>
+          <a:p>
+            <a:r>
+              <a:rPr lang="en-US" sz="1400" dirty="0"/>
+              <a:t>&lt;ARTIST&gt;Bob Dylan&lt;/ARTIST&gt;</a:t>
+            </a:r>
+          </a:p>
+          <a:p>
+            <a:r>
+              <a:rPr lang="en-US" sz="1400" dirty="0"/>
+              <a:t>&lt;COUNTRY&gt;USA&lt;/COUNTRY&gt;</a:t>
+            </a:r>
+          </a:p>
+          <a:p>
+            <a:r>
+              <a:rPr lang="en-US" sz="1400" dirty="0"/>
+              <a:t>&lt;COMPANY&gt;Columbia&lt;/COMPANY&gt;</a:t>
+            </a:r>
+          </a:p>
+          <a:p>
+            <a:r>
+              <a:rPr lang="en-US" sz="1400" dirty="0"/>
+              <a:t>&lt;PRICE&gt;10.90&lt;/PRICE&gt;</a:t>
+            </a:r>
+          </a:p>
+          <a:p>
+            <a:r>
+              <a:rPr lang="en-US" sz="1400" dirty="0"/>
+              <a:t>&lt;YEAR&gt;1985&lt;/YEAR&gt;</a:t>
+            </a:r>
+          </a:p>
+          <a:p>
+            <a:r>
+              <a:rPr lang="en-US" sz="1400" dirty="0"/>
+              <a:t>&lt;/CD&gt;</a:t>
+            </a:r>
+          </a:p>
+          <a:p>
+            <a:r>
+              <a:rPr lang="en-US" sz="1400" dirty="0"/>
+              <a:t>&lt;CD&gt;</a:t>
+            </a:r>
+          </a:p>
+          <a:p>
+            <a:r>
+              <a:rPr lang="en-US" sz="1400" dirty="0"/>
+              <a:t>&lt;TITLE&gt;Hide your heart&lt;/TITLE&gt;</a:t>
+            </a:r>
+          </a:p>
+          <a:p>
+            <a:r>
+              <a:rPr lang="en-US" sz="1400" dirty="0"/>
+              <a:t>&lt;ARTIST&gt;Bonnie Tyler&lt;/ARTIST&gt;</a:t>
+            </a:r>
+          </a:p>
+          <a:p>
+            <a:r>
+              <a:rPr lang="en-US" sz="1400" dirty="0"/>
+              <a:t>&lt;COUNTRY&gt;UK&lt;/COUNTRY&gt;</a:t>
+            </a:r>
+          </a:p>
+          <a:p>
+            <a:r>
+              <a:rPr lang="en-US" sz="1400" dirty="0"/>
+              <a:t>&lt;COMPANY&gt;CBS Records&lt;/COMPANY&gt;</a:t>
+            </a:r>
+          </a:p>
+          <a:p>
+            <a:r>
+              <a:rPr lang="en-US" sz="1400" dirty="0"/>
+              <a:t>&lt;PRICE&gt;9.90&lt;/PRICE&gt;</a:t>
+            </a:r>
+          </a:p>
+          <a:p>
+            <a:r>
+              <a:rPr lang="en-US" sz="1400" dirty="0"/>
+              <a:t>&lt;YEAR&gt;1988&lt;/YEAR&gt;</a:t>
+            </a:r>
+          </a:p>
+          <a:p>
+            <a:r>
+              <a:rPr lang="en-US" sz="1400" dirty="0"/>
+              <a:t>&lt;/CD&gt;</a:t>
+            </a:r>
+          </a:p>
+          <a:p>
+            <a:r>
+              <a:rPr lang="en-US" sz="1400" dirty="0"/>
+              <a:t>&lt;CD&gt;</a:t>
+            </a:r>
+          </a:p>
+          <a:p>
+            <a:r>
+              <a:rPr lang="en-US" sz="1400" dirty="0"/>
+              <a:t>&lt;TITLE&gt;Greatest Hits&lt;/TITLE&gt;</a:t>
+            </a:r>
+          </a:p>
+          <a:p>
+            <a:r>
+              <a:rPr lang="en-US" sz="1400" dirty="0"/>
+              <a:t>&lt;ARTIST&gt;Dolly Parton&lt;/ARTIST&gt;</a:t>
+            </a:r>
+          </a:p>
+          <a:p>
+            <a:r>
+              <a:rPr lang="en-US" sz="1400" dirty="0"/>
+              <a:t>&lt;COUNTRY&gt;USA&lt;/COUNTRY&gt;</a:t>
+            </a:r>
+          </a:p>
+          <a:p>
+            <a:r>
+              <a:rPr lang="en-US" sz="1400" dirty="0"/>
+              <a:t>&lt;COMPANY&gt;RCA&lt;/COMPANY&gt;</a:t>
+            </a:r>
+          </a:p>
+          <a:p>
+            <a:r>
+              <a:rPr lang="en-US" sz="1400" dirty="0"/>
+              <a:t>&lt;PRICE&gt;9.90&lt;/PRICE&gt;</a:t>
+            </a:r>
+          </a:p>
+          <a:p>
+            <a:r>
+              <a:rPr lang="en-US" sz="1400" dirty="0"/>
+              <a:t>&lt;YEAR&gt;1982&lt;/YEAR&gt;</a:t>
+            </a:r>
+          </a:p>
+          <a:p>
+            <a:r>
+              <a:rPr lang="en-US" sz="1400" dirty="0"/>
+              <a:t>&lt;/CD&gt;</a:t>
+            </a:r>
           </a:p>
         </p:txBody>
       </p:sp>
@@ -16611,7 +16815,7 @@
     </p:spTree>
     <p:extLst>
       <p:ext uri="{BB962C8B-B14F-4D97-AF65-F5344CB8AC3E}">
-        <p14:creationId xmlns:p14="http://schemas.microsoft.com/office/powerpoint/2010/main" val="2294058340"/>
+        <p14:creationId xmlns:p14="http://schemas.microsoft.com/office/powerpoint/2010/main" val="3327868801"/>
       </p:ext>
     </p:extLst>
   </p:cSld>

</xml_diff>

<commit_message>
added lots of summary slides
Also created final exam review deck.
</commit_message>
<xml_diff>
--- a/Lectures/3 Data Storage.pptx
+++ b/Lectures/3 Data Storage.pptx
@@ -5,10 +5,10 @@
     <p:sldMasterId id="2147483648" r:id="rId1"/>
   </p:sldMasterIdLst>
   <p:notesMasterIdLst>
-    <p:notesMasterId r:id="rId36"/>
+    <p:notesMasterId r:id="rId38"/>
   </p:notesMasterIdLst>
   <p:handoutMasterIdLst>
-    <p:handoutMasterId r:id="rId37"/>
+    <p:handoutMasterId r:id="rId39"/>
   </p:handoutMasterIdLst>
   <p:sldIdLst>
     <p:sldId id="256" r:id="rId2"/>
@@ -45,6 +45,8 @@
     <p:sldId id="407" r:id="rId33"/>
     <p:sldId id="408" r:id="rId34"/>
     <p:sldId id="410" r:id="rId35"/>
+    <p:sldId id="428" r:id="rId36"/>
+    <p:sldId id="429" r:id="rId37"/>
   </p:sldIdLst>
   <p:sldSz cx="9144000" cy="6858000" type="screen4x3"/>
   <p:notesSz cx="6858000" cy="9144000"/>
@@ -228,7 +230,7 @@
           <a:p>
             <a:fld id="{D3AAB66F-B1B7-D045-B4E8-4F60236F228D}" type="datetimeFigureOut">
               <a:rPr lang="en-US" smtClean="0"/>
-              <a:t>2/14/15</a:t>
+              <a:t>4/21/15</a:t>
             </a:fld>
             <a:endParaRPr lang="en-US"/>
           </a:p>
@@ -394,7 +396,7 @@
           <a:p>
             <a:fld id="{BCCF8E76-06A6-164E-A6FA-EC32C13EB232}" type="datetimeFigureOut">
               <a:rPr lang="en-US" smtClean="0"/>
-              <a:t>2/14/15</a:t>
+              <a:t>4/21/15</a:t>
             </a:fld>
             <a:endParaRPr lang="en-US"/>
           </a:p>
@@ -1376,6 +1378,180 @@
 </p:notes>
 </file>
 
+<file path=ppt/notesSlides/notesSlide16.xml><?xml version="1.0" encoding="utf-8"?>
+<p:notes xmlns:a="http://schemas.openxmlformats.org/drawingml/2006/main" xmlns:r="http://schemas.openxmlformats.org/officeDocument/2006/relationships" xmlns:p="http://schemas.openxmlformats.org/presentationml/2006/main">
+  <p:cSld>
+    <p:spTree>
+      <p:nvGrpSpPr>
+        <p:cNvPr id="1" name=""/>
+        <p:cNvGrpSpPr/>
+        <p:nvPr/>
+      </p:nvGrpSpPr>
+      <p:grpSpPr>
+        <a:xfrm>
+          <a:off x="0" y="0"/>
+          <a:ext cx="0" cy="0"/>
+          <a:chOff x="0" y="0"/>
+          <a:chExt cx="0" cy="0"/>
+        </a:xfrm>
+      </p:grpSpPr>
+      <p:sp>
+        <p:nvSpPr>
+          <p:cNvPr id="2" name="Slide Image Placeholder 1"/>
+          <p:cNvSpPr>
+            <a:spLocks noGrp="1" noRot="1" noChangeAspect="1"/>
+          </p:cNvSpPr>
+          <p:nvPr>
+            <p:ph type="sldImg"/>
+          </p:nvPr>
+        </p:nvSpPr>
+        <p:spPr/>
+      </p:sp>
+      <p:sp>
+        <p:nvSpPr>
+          <p:cNvPr id="3" name="Notes Placeholder 2"/>
+          <p:cNvSpPr>
+            <a:spLocks noGrp="1"/>
+          </p:cNvSpPr>
+          <p:nvPr>
+            <p:ph type="body" idx="1"/>
+          </p:nvPr>
+        </p:nvSpPr>
+        <p:spPr/>
+        <p:txBody>
+          <a:bodyPr/>
+          <a:lstStyle/>
+          <a:p>
+            <a:endParaRPr lang="en-US" dirty="0"/>
+          </a:p>
+        </p:txBody>
+      </p:sp>
+      <p:sp>
+        <p:nvSpPr>
+          <p:cNvPr id="4" name="Slide Number Placeholder 3"/>
+          <p:cNvSpPr>
+            <a:spLocks noGrp="1"/>
+          </p:cNvSpPr>
+          <p:nvPr>
+            <p:ph type="sldNum" sz="quarter" idx="10"/>
+          </p:nvPr>
+        </p:nvSpPr>
+        <p:spPr/>
+        <p:txBody>
+          <a:bodyPr/>
+          <a:lstStyle/>
+          <a:p>
+            <a:fld id="{FD66F34B-9C4D-8640-BB34-4C24A79C9FFB}" type="slidenum">
+              <a:rPr lang="en-US" smtClean="0"/>
+              <a:t>35</a:t>
+            </a:fld>
+            <a:endParaRPr lang="en-US"/>
+          </a:p>
+        </p:txBody>
+      </p:sp>
+    </p:spTree>
+    <p:extLst>
+      <p:ext uri="{BB962C8B-B14F-4D97-AF65-F5344CB8AC3E}">
+        <p14:creationId xmlns:p14="http://schemas.microsoft.com/office/powerpoint/2010/main" val="3231593724"/>
+      </p:ext>
+    </p:extLst>
+  </p:cSld>
+  <p:clrMapOvr>
+    <a:masterClrMapping/>
+  </p:clrMapOvr>
+</p:notes>
+</file>
+
+<file path=ppt/notesSlides/notesSlide17.xml><?xml version="1.0" encoding="utf-8"?>
+<p:notes xmlns:a="http://schemas.openxmlformats.org/drawingml/2006/main" xmlns:r="http://schemas.openxmlformats.org/officeDocument/2006/relationships" xmlns:p="http://schemas.openxmlformats.org/presentationml/2006/main">
+  <p:cSld>
+    <p:spTree>
+      <p:nvGrpSpPr>
+        <p:cNvPr id="1" name=""/>
+        <p:cNvGrpSpPr/>
+        <p:nvPr/>
+      </p:nvGrpSpPr>
+      <p:grpSpPr>
+        <a:xfrm>
+          <a:off x="0" y="0"/>
+          <a:ext cx="0" cy="0"/>
+          <a:chOff x="0" y="0"/>
+          <a:chExt cx="0" cy="0"/>
+        </a:xfrm>
+      </p:grpSpPr>
+      <p:sp>
+        <p:nvSpPr>
+          <p:cNvPr id="2" name="Slide Image Placeholder 1"/>
+          <p:cNvSpPr>
+            <a:spLocks noGrp="1" noRot="1" noChangeAspect="1"/>
+          </p:cNvSpPr>
+          <p:nvPr>
+            <p:ph type="sldImg"/>
+          </p:nvPr>
+        </p:nvSpPr>
+        <p:spPr/>
+      </p:sp>
+      <p:sp>
+        <p:nvSpPr>
+          <p:cNvPr id="3" name="Notes Placeholder 2"/>
+          <p:cNvSpPr>
+            <a:spLocks noGrp="1"/>
+          </p:cNvSpPr>
+          <p:nvPr>
+            <p:ph type="body" idx="1"/>
+          </p:nvPr>
+        </p:nvSpPr>
+        <p:spPr/>
+        <p:txBody>
+          <a:bodyPr/>
+          <a:lstStyle/>
+          <a:p>
+            <a:r>
+              <a:rPr lang="en-US" dirty="0" smtClean="0"/>
+              <a:t>For programs: </a:t>
+            </a:r>
+          </a:p>
+          <a:p>
+            <a:endParaRPr lang="en-US" dirty="0" smtClean="0"/>
+          </a:p>
+        </p:txBody>
+      </p:sp>
+      <p:sp>
+        <p:nvSpPr>
+          <p:cNvPr id="4" name="Slide Number Placeholder 3"/>
+          <p:cNvSpPr>
+            <a:spLocks noGrp="1"/>
+          </p:cNvSpPr>
+          <p:nvPr>
+            <p:ph type="sldNum" sz="quarter" idx="10"/>
+          </p:nvPr>
+        </p:nvSpPr>
+        <p:spPr/>
+        <p:txBody>
+          <a:bodyPr/>
+          <a:lstStyle/>
+          <a:p>
+            <a:fld id="{FD66F34B-9C4D-8640-BB34-4C24A79C9FFB}" type="slidenum">
+              <a:rPr lang="en-US" smtClean="0"/>
+              <a:t>36</a:t>
+            </a:fld>
+            <a:endParaRPr lang="en-US"/>
+          </a:p>
+        </p:txBody>
+      </p:sp>
+    </p:spTree>
+    <p:extLst>
+      <p:ext uri="{BB962C8B-B14F-4D97-AF65-F5344CB8AC3E}">
+        <p14:creationId xmlns:p14="http://schemas.microsoft.com/office/powerpoint/2010/main" val="3681764730"/>
+      </p:ext>
+    </p:extLst>
+  </p:cSld>
+  <p:clrMapOvr>
+    <a:masterClrMapping/>
+  </p:clrMapOvr>
+</p:notes>
+</file>
+
 <file path=ppt/notesSlides/notesSlide2.xml><?xml version="1.0" encoding="utf-8"?>
 <p:notes xmlns:a="http://schemas.openxmlformats.org/drawingml/2006/main" xmlns:r="http://schemas.openxmlformats.org/officeDocument/2006/relationships" xmlns:p="http://schemas.openxmlformats.org/presentationml/2006/main">
   <p:cSld>
@@ -2615,7 +2791,7 @@
             <a:fld id="{FA3C144B-2939-9A49-B014-915EC3E81866}" type="datetime1">
               <a:rPr lang="en-US" smtClean="0"/>
               <a:pPr/>
-              <a:t>2/14/15</a:t>
+              <a:t>4/21/15</a:t>
             </a:fld>
             <a:endParaRPr lang="en-US" dirty="0"/>
           </a:p>
@@ -3044,7 +3220,7 @@
           <a:p>
             <a:fld id="{76838339-A875-5E45-AB3F-AAABD270346A}" type="datetime1">
               <a:rPr lang="en-US" smtClean="0"/>
-              <a:t>2/14/15</a:t>
+              <a:t>4/21/15</a:t>
             </a:fld>
             <a:endParaRPr lang="en-US"/>
           </a:p>
@@ -3330,7 +3506,7 @@
             <a:fld id="{FA3C144B-2939-9A49-B014-915EC3E81866}" type="datetime1">
               <a:rPr lang="en-US" smtClean="0"/>
               <a:pPr/>
-              <a:t>2/14/15</a:t>
+              <a:t>4/21/15</a:t>
             </a:fld>
             <a:endParaRPr lang="en-US" dirty="0"/>
           </a:p>
@@ -3812,7 +3988,7 @@
           <a:p>
             <a:fld id="{A73F672F-A5FB-5745-934A-1BF51CA5539C}" type="datetime1">
               <a:rPr lang="en-US" smtClean="0"/>
-              <a:t>2/14/15</a:t>
+              <a:t>4/21/15</a:t>
             </a:fld>
             <a:endParaRPr lang="en-US"/>
           </a:p>
@@ -4154,7 +4330,7 @@
             <a:fld id="{FA3C144B-2939-9A49-B014-915EC3E81866}" type="datetime1">
               <a:rPr lang="en-US" smtClean="0"/>
               <a:pPr/>
-              <a:t>2/14/15</a:t>
+              <a:t>4/21/15</a:t>
             </a:fld>
             <a:endParaRPr lang="en-US" dirty="0"/>
           </a:p>
@@ -4618,7 +4794,7 @@
           <a:p>
             <a:fld id="{6AFE6A63-5EBE-3E48-B0AE-DF655A1ECE76}" type="datetime1">
               <a:rPr lang="en-US" smtClean="0"/>
-              <a:t>2/14/15</a:t>
+              <a:t>4/21/15</a:t>
             </a:fld>
             <a:endParaRPr lang="en-US"/>
           </a:p>
@@ -4937,7 +5113,7 @@
           <a:p>
             <a:fld id="{4A019F0C-9D18-B54A-9AC9-18AA74EDB034}" type="datetime1">
               <a:rPr lang="en-US" smtClean="0"/>
-              <a:t>2/14/15</a:t>
+              <a:t>4/21/15</a:t>
             </a:fld>
             <a:endParaRPr lang="en-US"/>
           </a:p>
@@ -5247,7 +5423,7 @@
             <a:fld id="{FA3C144B-2939-9A49-B014-915EC3E81866}" type="datetime1">
               <a:rPr lang="en-US" smtClean="0"/>
               <a:pPr/>
-              <a:t>2/14/15</a:t>
+              <a:t>4/21/15</a:t>
             </a:fld>
             <a:endParaRPr lang="en-US" dirty="0"/>
           </a:p>
@@ -5510,7 +5686,7 @@
           <a:p>
             <a:fld id="{FA3C144B-2939-9A49-B014-915EC3E81866}" type="datetime1">
               <a:rPr lang="en-US" smtClean="0"/>
-              <a:t>2/14/15</a:t>
+              <a:t>4/21/15</a:t>
             </a:fld>
             <a:endParaRPr lang="en-US" dirty="0"/>
           </a:p>
@@ -5878,7 +6054,7 @@
           <a:p>
             <a:fld id="{7053BEFA-1175-F644-B249-7D41D72BD3FF}" type="datetime1">
               <a:rPr lang="en-US" smtClean="0"/>
-              <a:t>2/14/15</a:t>
+              <a:t>4/21/15</a:t>
             </a:fld>
             <a:endParaRPr lang="en-US"/>
           </a:p>
@@ -5997,7 +6173,7 @@
             <a:fld id="{FA3C144B-2939-9A49-B014-915EC3E81866}" type="datetime1">
               <a:rPr lang="en-US" smtClean="0"/>
               <a:pPr/>
-              <a:t>2/14/15</a:t>
+              <a:t>4/21/15</a:t>
             </a:fld>
             <a:endParaRPr lang="en-US" dirty="0"/>
           </a:p>
@@ -6214,7 +6390,7 @@
             <a:fld id="{FA3C144B-2939-9A49-B014-915EC3E81866}" type="datetime1">
               <a:rPr lang="en-US" smtClean="0"/>
               <a:pPr/>
-              <a:t>2/14/15</a:t>
+              <a:t>4/21/15</a:t>
             </a:fld>
             <a:endParaRPr lang="en-US" dirty="0"/>
           </a:p>
@@ -6459,7 +6635,7 @@
             <a:fld id="{FA3C144B-2939-9A49-B014-915EC3E81866}" type="datetime1">
               <a:rPr lang="en-US" smtClean="0"/>
               <a:pPr/>
-              <a:t>2/14/15</a:t>
+              <a:t>4/21/15</a:t>
             </a:fld>
             <a:endParaRPr lang="en-US" dirty="0"/>
           </a:p>
@@ -6837,7 +7013,7 @@
           <a:p>
             <a:fld id="{111EEF3B-ABF2-AA4E-9E24-0C6256942674}" type="datetime1">
               <a:rPr lang="en-US" smtClean="0"/>
-              <a:t>2/14/15</a:t>
+              <a:t>4/21/15</a:t>
             </a:fld>
             <a:endParaRPr lang="en-US"/>
           </a:p>
@@ -7001,7 +7177,7 @@
             <a:fld id="{FA3C144B-2939-9A49-B014-915EC3E81866}" type="datetime1">
               <a:rPr lang="en-US" smtClean="0"/>
               <a:pPr/>
-              <a:t>2/14/15</a:t>
+              <a:t>4/21/15</a:t>
             </a:fld>
             <a:endParaRPr lang="en-US" dirty="0"/>
           </a:p>
@@ -7418,7 +7594,7 @@
             <a:fld id="{FA3C144B-2939-9A49-B014-915EC3E81866}" type="datetime1">
               <a:rPr lang="en-US" smtClean="0"/>
               <a:pPr/>
-              <a:t>2/14/15</a:t>
+              <a:t>4/21/15</a:t>
             </a:fld>
             <a:endParaRPr lang="en-US" dirty="0"/>
           </a:p>
@@ -7734,7 +7910,7 @@
             <a:fld id="{FA3C144B-2939-9A49-B014-915EC3E81866}" type="datetime1">
               <a:rPr lang="en-US" smtClean="0"/>
               <a:pPr/>
-              <a:t>2/14/15</a:t>
+              <a:t>4/21/15</a:t>
             </a:fld>
             <a:endParaRPr lang="en-US" dirty="0"/>
           </a:p>
@@ -8400,7 +8576,7 @@
             <a:fld id="{FA3C144B-2939-9A49-B014-915EC3E81866}" type="datetime1">
               <a:rPr lang="en-US" smtClean="0"/>
               <a:pPr/>
-              <a:t>2/14/15</a:t>
+              <a:t>4/21/15</a:t>
             </a:fld>
             <a:endParaRPr lang="en-US" dirty="0"/>
           </a:p>
@@ -9643,7 +9819,7 @@
           <a:p>
             <a:fld id="{7053BEFA-1175-F644-B249-7D41D72BD3FF}" type="datetime1">
               <a:rPr lang="en-US" smtClean="0"/>
-              <a:t>2/14/15</a:t>
+              <a:t>4/21/15</a:t>
             </a:fld>
             <a:endParaRPr lang="en-US"/>
           </a:p>
@@ -9843,7 +10019,7 @@
           <a:p>
             <a:fld id="{7053BEFA-1175-F644-B249-7D41D72BD3FF}" type="datetime1">
               <a:rPr lang="en-US" smtClean="0"/>
-              <a:t>2/14/15</a:t>
+              <a:t>4/21/15</a:t>
             </a:fld>
             <a:endParaRPr lang="en-US"/>
           </a:p>
@@ -10054,7 +10230,7 @@
           <a:p>
             <a:fld id="{7053BEFA-1175-F644-B249-7D41D72BD3FF}" type="datetime1">
               <a:rPr lang="en-US" smtClean="0"/>
-              <a:t>2/14/15</a:t>
+              <a:t>4/21/15</a:t>
             </a:fld>
             <a:endParaRPr lang="en-US"/>
           </a:p>
@@ -10198,7 +10374,7 @@
           <a:p>
             <a:fld id="{7053BEFA-1175-F644-B249-7D41D72BD3FF}" type="datetime1">
               <a:rPr lang="en-US" smtClean="0"/>
-              <a:t>2/14/15</a:t>
+              <a:t>4/21/15</a:t>
             </a:fld>
             <a:endParaRPr lang="en-US"/>
           </a:p>
@@ -10409,7 +10585,7 @@
           <a:p>
             <a:fld id="{7053BEFA-1175-F644-B249-7D41D72BD3FF}" type="datetime1">
               <a:rPr lang="en-US" smtClean="0"/>
-              <a:t>2/14/15</a:t>
+              <a:t>4/21/15</a:t>
             </a:fld>
             <a:endParaRPr lang="en-US"/>
           </a:p>
@@ -10627,7 +10803,7 @@
           <a:p>
             <a:fld id="{7053BEFA-1175-F644-B249-7D41D72BD3FF}" type="datetime1">
               <a:rPr lang="en-US" smtClean="0"/>
-              <a:t>2/14/15</a:t>
+              <a:t>4/21/15</a:t>
             </a:fld>
             <a:endParaRPr lang="en-US"/>
           </a:p>
@@ -10818,7 +10994,7 @@
           <a:p>
             <a:fld id="{7053BEFA-1175-F644-B249-7D41D72BD3FF}" type="datetime1">
               <a:rPr lang="en-US" smtClean="0"/>
-              <a:t>2/14/15</a:t>
+              <a:t>4/21/15</a:t>
             </a:fld>
             <a:endParaRPr lang="en-US"/>
           </a:p>
@@ -10974,7 +11150,7 @@
           <a:p>
             <a:fld id="{7053BEFA-1175-F644-B249-7D41D72BD3FF}" type="datetime1">
               <a:rPr lang="en-US" smtClean="0"/>
-              <a:t>2/14/15</a:t>
+              <a:t>4/21/15</a:t>
             </a:fld>
             <a:endParaRPr lang="en-US"/>
           </a:p>
@@ -11362,7 +11538,7 @@
           <a:p>
             <a:fld id="{7053BEFA-1175-F644-B249-7D41D72BD3FF}" type="datetime1">
               <a:rPr lang="en-US" smtClean="0"/>
-              <a:t>2/14/15</a:t>
+              <a:t>4/21/15</a:t>
             </a:fld>
             <a:endParaRPr lang="en-US"/>
           </a:p>
@@ -11974,7 +12150,7 @@
           <a:p>
             <a:fld id="{7053BEFA-1175-F644-B249-7D41D72BD3FF}" type="datetime1">
               <a:rPr lang="en-US" smtClean="0"/>
-              <a:t>2/14/15</a:t>
+              <a:t>4/21/15</a:t>
             </a:fld>
             <a:endParaRPr lang="en-US"/>
           </a:p>
@@ -12359,7 +12535,7 @@
           <a:p>
             <a:fld id="{7053BEFA-1175-F644-B249-7D41D72BD3FF}" type="datetime1">
               <a:rPr lang="en-US" smtClean="0"/>
-              <a:t>2/14/15</a:t>
+              <a:t>4/21/15</a:t>
             </a:fld>
             <a:endParaRPr lang="en-US"/>
           </a:p>
@@ -12551,7 +12727,7 @@
           <a:p>
             <a:fld id="{7053BEFA-1175-F644-B249-7D41D72BD3FF}" type="datetime1">
               <a:rPr lang="en-US" smtClean="0"/>
-              <a:t>2/14/15</a:t>
+              <a:t>4/21/15</a:t>
             </a:fld>
             <a:endParaRPr lang="en-US"/>
           </a:p>
@@ -12735,7 +12911,7 @@
           <a:p>
             <a:fld id="{7053BEFA-1175-F644-B249-7D41D72BD3FF}" type="datetime1">
               <a:rPr lang="en-US" smtClean="0"/>
-              <a:t>2/14/15</a:t>
+              <a:t>4/21/15</a:t>
             </a:fld>
             <a:endParaRPr lang="en-US"/>
           </a:p>
@@ -12940,7 +13116,7 @@
           <a:p>
             <a:fld id="{7053BEFA-1175-F644-B249-7D41D72BD3FF}" type="datetime1">
               <a:rPr lang="en-US" smtClean="0"/>
-              <a:t>2/14/15</a:t>
+              <a:t>4/21/15</a:t>
             </a:fld>
             <a:endParaRPr lang="en-US"/>
           </a:p>
@@ -13142,7 +13318,7 @@
           <a:p>
             <a:fld id="{7053BEFA-1175-F644-B249-7D41D72BD3FF}" type="datetime1">
               <a:rPr lang="en-US" smtClean="0"/>
-              <a:t>2/14/15</a:t>
+              <a:t>4/21/15</a:t>
             </a:fld>
             <a:endParaRPr lang="en-US"/>
           </a:p>
@@ -13347,7 +13523,7 @@
           <a:p>
             <a:fld id="{7053BEFA-1175-F644-B249-7D41D72BD3FF}" type="datetime1">
               <a:rPr lang="en-US" smtClean="0"/>
-              <a:t>2/14/15</a:t>
+              <a:t>4/21/15</a:t>
             </a:fld>
             <a:endParaRPr lang="en-US"/>
           </a:p>
@@ -13561,7 +13737,7 @@
           <a:p>
             <a:fld id="{7053BEFA-1175-F644-B249-7D41D72BD3FF}" type="datetime1">
               <a:rPr lang="en-US" smtClean="0"/>
-              <a:t>2/14/15</a:t>
+              <a:t>4/21/15</a:t>
             </a:fld>
             <a:endParaRPr lang="en-US"/>
           </a:p>
@@ -13749,7 +13925,7 @@
           <a:p>
             <a:fld id="{7053BEFA-1175-F644-B249-7D41D72BD3FF}" type="datetime1">
               <a:rPr lang="en-US" smtClean="0"/>
-              <a:t>2/14/15</a:t>
+              <a:t>4/21/15</a:t>
             </a:fld>
             <a:endParaRPr lang="en-US"/>
           </a:p>
@@ -13900,7 +14076,7 @@
           <a:p>
             <a:fld id="{7053BEFA-1175-F644-B249-7D41D72BD3FF}" type="datetime1">
               <a:rPr lang="en-US" smtClean="0"/>
-              <a:t>2/14/15</a:t>
+              <a:t>4/21/15</a:t>
             </a:fld>
             <a:endParaRPr lang="en-US"/>
           </a:p>
@@ -14106,7 +14282,7 @@
           <a:p>
             <a:fld id="{7053BEFA-1175-F644-B249-7D41D72BD3FF}" type="datetime1">
               <a:rPr lang="en-US" smtClean="0"/>
-              <a:t>2/14/15</a:t>
+              <a:t>4/21/15</a:t>
             </a:fld>
             <a:endParaRPr lang="en-US"/>
           </a:p>
@@ -14307,7 +14483,7 @@
           <a:p>
             <a:fld id="{7053BEFA-1175-F644-B249-7D41D72BD3FF}" type="datetime1">
               <a:rPr lang="en-US" smtClean="0"/>
-              <a:t>2/14/15</a:t>
+              <a:t>4/21/15</a:t>
             </a:fld>
             <a:endParaRPr lang="en-US"/>
           </a:p>
@@ -14480,7 +14656,7 @@
           <a:p>
             <a:fld id="{7053BEFA-1175-F644-B249-7D41D72BD3FF}" type="datetime1">
               <a:rPr lang="en-US" smtClean="0"/>
-              <a:t>2/14/15</a:t>
+              <a:t>4/21/15</a:t>
             </a:fld>
             <a:endParaRPr lang="en-US"/>
           </a:p>
@@ -14700,7 +14876,7 @@
           <a:p>
             <a:fld id="{7053BEFA-1175-F644-B249-7D41D72BD3FF}" type="datetime1">
               <a:rPr lang="en-US" smtClean="0"/>
-              <a:t>2/14/15</a:t>
+              <a:t>4/21/15</a:t>
             </a:fld>
             <a:endParaRPr lang="en-US"/>
           </a:p>
@@ -14920,7 +15096,7 @@
           <a:p>
             <a:fld id="{7053BEFA-1175-F644-B249-7D41D72BD3FF}" type="datetime1">
               <a:rPr lang="en-US" smtClean="0"/>
-              <a:t>2/14/15</a:t>
+              <a:t>4/21/15</a:t>
             </a:fld>
             <a:endParaRPr lang="en-US"/>
           </a:p>
@@ -15137,7 +15313,7 @@
           <a:p>
             <a:fld id="{7053BEFA-1175-F644-B249-7D41D72BD3FF}" type="datetime1">
               <a:rPr lang="en-US" smtClean="0"/>
-              <a:t>2/14/15</a:t>
+              <a:t>4/21/15</a:t>
             </a:fld>
             <a:endParaRPr lang="en-US"/>
           </a:p>
@@ -15469,7 +15645,7 @@
           <a:p>
             <a:fld id="{7053BEFA-1175-F644-B249-7D41D72BD3FF}" type="datetime1">
               <a:rPr lang="en-US" smtClean="0"/>
-              <a:t>2/14/15</a:t>
+              <a:t>4/21/15</a:t>
             </a:fld>
             <a:endParaRPr lang="en-US"/>
           </a:p>
@@ -15527,6 +15703,482 @@
   <p:clrMapOvr>
     <a:masterClrMapping/>
   </p:clrMapOvr>
+</p:sld>
+</file>
+
+<file path=ppt/slides/slide35.xml><?xml version="1.0" encoding="utf-8"?>
+<p:sld xmlns:a="http://schemas.openxmlformats.org/drawingml/2006/main" xmlns:r="http://schemas.openxmlformats.org/officeDocument/2006/relationships" xmlns:p="http://schemas.openxmlformats.org/presentationml/2006/main">
+  <p:cSld>
+    <p:spTree>
+      <p:nvGrpSpPr>
+        <p:cNvPr id="1" name=""/>
+        <p:cNvGrpSpPr/>
+        <p:nvPr/>
+      </p:nvGrpSpPr>
+      <p:grpSpPr>
+        <a:xfrm>
+          <a:off x="0" y="0"/>
+          <a:ext cx="0" cy="0"/>
+          <a:chOff x="0" y="0"/>
+          <a:chExt cx="0" cy="0"/>
+        </a:xfrm>
+      </p:grpSpPr>
+      <p:sp>
+        <p:nvSpPr>
+          <p:cNvPr id="2" name="Title 1"/>
+          <p:cNvSpPr>
+            <a:spLocks noGrp="1"/>
+          </p:cNvSpPr>
+          <p:nvPr>
+            <p:ph type="title"/>
+          </p:nvPr>
+        </p:nvSpPr>
+        <p:spPr/>
+        <p:txBody>
+          <a:bodyPr/>
+          <a:lstStyle/>
+          <a:p>
+            <a:r>
+              <a:rPr lang="en-US" smtClean="0"/>
+              <a:t>Summary</a:t>
+            </a:r>
+            <a:endParaRPr lang="en-US" dirty="0"/>
+          </a:p>
+        </p:txBody>
+      </p:sp>
+      <p:sp>
+        <p:nvSpPr>
+          <p:cNvPr id="3" name="Content Placeholder 2"/>
+          <p:cNvSpPr>
+            <a:spLocks noGrp="1"/>
+          </p:cNvSpPr>
+          <p:nvPr>
+            <p:ph idx="1"/>
+          </p:nvPr>
+        </p:nvSpPr>
+        <p:spPr/>
+        <p:txBody>
+          <a:bodyPr/>
+          <a:lstStyle/>
+          <a:p>
+            <a:pPr marL="0" indent="0">
+              <a:buNone/>
+            </a:pPr>
+            <a:r>
+              <a:rPr lang="en-US" sz="3200" dirty="0" smtClean="0"/>
+              <a:t>Data Management is a people problem</a:t>
+            </a:r>
+          </a:p>
+          <a:p>
+            <a:pPr marL="228600" lvl="1" indent="0">
+              <a:buNone/>
+            </a:pPr>
+            <a:r>
+              <a:rPr lang="en-US" sz="2400" dirty="0" smtClean="0"/>
+              <a:t>Who </a:t>
+            </a:r>
+            <a:r>
+              <a:rPr lang="en-US" sz="2400" dirty="0" smtClean="0"/>
+              <a:t>should oversee it</a:t>
+            </a:r>
+            <a:r>
+              <a:rPr lang="en-US" sz="2400" dirty="0" smtClean="0"/>
+              <a:t>? </a:t>
+            </a:r>
+          </a:p>
+          <a:p>
+            <a:pPr marL="228600" lvl="1" indent="0">
+              <a:buNone/>
+            </a:pPr>
+            <a:r>
+              <a:rPr lang="en-US" sz="2400" dirty="0"/>
+              <a:t>Requires lots of attention, over time, regular checks, </a:t>
+            </a:r>
+            <a:r>
+              <a:rPr lang="en-US" sz="2400" i="1" dirty="0"/>
+              <a:t>etc</a:t>
+            </a:r>
+            <a:r>
+              <a:rPr lang="en-US" sz="2400" i="1" dirty="0" smtClean="0"/>
+              <a:t>.</a:t>
+            </a:r>
+            <a:r>
+              <a:rPr lang="en-US" sz="2400" dirty="0" smtClean="0"/>
+              <a:t> </a:t>
+            </a:r>
+          </a:p>
+          <a:p>
+            <a:pPr marL="228600" lvl="1" indent="0">
+              <a:buNone/>
+            </a:pPr>
+            <a:r>
+              <a:rPr lang="en-US" sz="2400" dirty="0" smtClean="0"/>
+              <a:t>Who </a:t>
+            </a:r>
+            <a:r>
+              <a:rPr lang="en-US" sz="2400" dirty="0" smtClean="0"/>
+              <a:t>is responsible for the four Cs? (Completeness, Coherence, Correctness, </a:t>
+            </a:r>
+            <a:r>
+              <a:rPr lang="en-US" sz="2400" dirty="0" err="1" smtClean="0"/>
+              <a:t>AcCountability</a:t>
+            </a:r>
+            <a:r>
+              <a:rPr lang="en-US" sz="2400" dirty="0" smtClean="0"/>
+              <a:t>)</a:t>
+            </a:r>
+          </a:p>
+          <a:p>
+            <a:pPr marL="0" indent="0">
+              <a:buNone/>
+            </a:pPr>
+            <a:r>
+              <a:rPr lang="en-US" sz="3200" dirty="0" smtClean="0"/>
+              <a:t>Types of data</a:t>
+            </a:r>
+          </a:p>
+          <a:p>
+            <a:pPr marL="228600" lvl="1" indent="0">
+              <a:buNone/>
+            </a:pPr>
+            <a:r>
+              <a:rPr lang="en-US" sz="2400" dirty="0" smtClean="0"/>
+              <a:t>Unstructured/</a:t>
+            </a:r>
+            <a:r>
+              <a:rPr lang="en-US" sz="2400" dirty="0" err="1" smtClean="0"/>
+              <a:t>semistructured</a:t>
+            </a:r>
+            <a:r>
+              <a:rPr lang="en-US" sz="2400" dirty="0" smtClean="0"/>
+              <a:t>/structured</a:t>
+            </a:r>
+          </a:p>
+        </p:txBody>
+      </p:sp>
+      <p:sp>
+        <p:nvSpPr>
+          <p:cNvPr id="4" name="Date Placeholder 3"/>
+          <p:cNvSpPr>
+            <a:spLocks noGrp="1"/>
+          </p:cNvSpPr>
+          <p:nvPr>
+            <p:ph type="dt" sz="half" idx="10"/>
+          </p:nvPr>
+        </p:nvSpPr>
+        <p:spPr/>
+        <p:txBody>
+          <a:bodyPr/>
+          <a:lstStyle/>
+          <a:p>
+            <a:fld id="{7053BEFA-1175-F644-B249-7D41D72BD3FF}" type="datetime1">
+              <a:rPr lang="en-US" smtClean="0"/>
+              <a:t>4/21/15</a:t>
+            </a:fld>
+            <a:endParaRPr lang="en-US"/>
+          </a:p>
+        </p:txBody>
+      </p:sp>
+      <p:sp>
+        <p:nvSpPr>
+          <p:cNvPr id="5" name="Footer Placeholder 4"/>
+          <p:cNvSpPr>
+            <a:spLocks noGrp="1"/>
+          </p:cNvSpPr>
+          <p:nvPr>
+            <p:ph type="ftr" sz="quarter" idx="11"/>
+          </p:nvPr>
+        </p:nvSpPr>
+        <p:spPr/>
+        <p:txBody>
+          <a:bodyPr/>
+          <a:lstStyle/>
+          <a:p>
+            <a:endParaRPr lang="en-US" dirty="0"/>
+          </a:p>
+        </p:txBody>
+      </p:sp>
+      <p:sp>
+        <p:nvSpPr>
+          <p:cNvPr id="6" name="Slide Number Placeholder 5"/>
+          <p:cNvSpPr>
+            <a:spLocks noGrp="1"/>
+          </p:cNvSpPr>
+          <p:nvPr>
+            <p:ph type="sldNum" sz="quarter" idx="12"/>
+          </p:nvPr>
+        </p:nvSpPr>
+        <p:spPr/>
+        <p:txBody>
+          <a:bodyPr/>
+          <a:lstStyle/>
+          <a:p>
+            <a:fld id="{17E276FA-8F89-B34D-A726-BE3FA1F8DD97}" type="slidenum">
+              <a:rPr lang="en-US" smtClean="0"/>
+              <a:t>35</a:t>
+            </a:fld>
+            <a:endParaRPr lang="en-US" dirty="0"/>
+          </a:p>
+        </p:txBody>
+      </p:sp>
+    </p:spTree>
+    <p:extLst>
+      <p:ext uri="{BB962C8B-B14F-4D97-AF65-F5344CB8AC3E}">
+        <p14:creationId xmlns:p14="http://schemas.microsoft.com/office/powerpoint/2010/main" val="3804823784"/>
+      </p:ext>
+    </p:extLst>
+  </p:cSld>
+  <p:clrMapOvr>
+    <a:masterClrMapping/>
+  </p:clrMapOvr>
+</p:sld>
+</file>
+
+<file path=ppt/slides/slide36.xml><?xml version="1.0" encoding="utf-8"?>
+<p:sld xmlns:a="http://schemas.openxmlformats.org/drawingml/2006/main" xmlns:r="http://schemas.openxmlformats.org/officeDocument/2006/relationships" xmlns:p="http://schemas.openxmlformats.org/presentationml/2006/main">
+  <p:cSld>
+    <p:spTree>
+      <p:nvGrpSpPr>
+        <p:cNvPr id="1" name=""/>
+        <p:cNvGrpSpPr/>
+        <p:nvPr/>
+      </p:nvGrpSpPr>
+      <p:grpSpPr>
+        <a:xfrm>
+          <a:off x="0" y="0"/>
+          <a:ext cx="0" cy="0"/>
+          <a:chOff x="0" y="0"/>
+          <a:chExt cx="0" cy="0"/>
+        </a:xfrm>
+      </p:grpSpPr>
+      <p:sp>
+        <p:nvSpPr>
+          <p:cNvPr id="2" name="Title 1"/>
+          <p:cNvSpPr>
+            <a:spLocks noGrp="1"/>
+          </p:cNvSpPr>
+          <p:nvPr>
+            <p:ph type="title"/>
+          </p:nvPr>
+        </p:nvSpPr>
+        <p:spPr/>
+        <p:txBody>
+          <a:bodyPr/>
+          <a:lstStyle/>
+          <a:p>
+            <a:r>
+              <a:rPr lang="en-US" dirty="0" smtClean="0"/>
+              <a:t>What is a Data Model?</a:t>
+            </a:r>
+            <a:endParaRPr lang="en-US" dirty="0"/>
+          </a:p>
+        </p:txBody>
+      </p:sp>
+      <p:sp>
+        <p:nvSpPr>
+          <p:cNvPr id="3" name="Content Placeholder 2"/>
+          <p:cNvSpPr>
+            <a:spLocks noGrp="1"/>
+          </p:cNvSpPr>
+          <p:nvPr>
+            <p:ph idx="1"/>
+          </p:nvPr>
+        </p:nvSpPr>
+        <p:spPr/>
+        <p:txBody>
+          <a:bodyPr/>
+          <a:lstStyle/>
+          <a:p>
+            <a:pPr marL="0" indent="0">
+              <a:buNone/>
+            </a:pPr>
+            <a:r>
+              <a:rPr lang="en-US" dirty="0"/>
+              <a:t>What data is </a:t>
+            </a:r>
+            <a:r>
+              <a:rPr lang="en-US" dirty="0" smtClean="0"/>
+              <a:t>stored and </a:t>
+            </a:r>
+            <a:r>
+              <a:rPr lang="en-US" dirty="0"/>
+              <a:t>how it is </a:t>
+            </a:r>
+            <a:r>
+              <a:rPr lang="en-US" dirty="0" smtClean="0"/>
+              <a:t>organized</a:t>
+            </a:r>
+            <a:endParaRPr lang="en-US" dirty="0" smtClean="0"/>
+          </a:p>
+          <a:p>
+            <a:pPr marL="0" indent="0">
+              <a:buNone/>
+            </a:pPr>
+            <a:r>
+              <a:rPr lang="en-US" dirty="0" smtClean="0"/>
+              <a:t>Key benefits:</a:t>
+            </a:r>
+          </a:p>
+          <a:p>
+            <a:r>
+              <a:rPr lang="en-US" dirty="0" smtClean="0"/>
+              <a:t>Leverage  </a:t>
+            </a:r>
+            <a:r>
+              <a:rPr lang="en-US" dirty="0"/>
+              <a:t>(big impact on programming; cost; </a:t>
+            </a:r>
+            <a:r>
+              <a:rPr lang="en-US" i="1" dirty="0" smtClean="0"/>
+              <a:t>etc.</a:t>
+            </a:r>
+            <a:r>
+              <a:rPr lang="en-US" dirty="0" smtClean="0"/>
+              <a:t>)</a:t>
+            </a:r>
+            <a:endParaRPr lang="en-US" dirty="0"/>
+          </a:p>
+          <a:p>
+            <a:r>
+              <a:rPr lang="en-US" dirty="0"/>
+              <a:t>Conciseness (implies an interaction model)</a:t>
+            </a:r>
+          </a:p>
+          <a:p>
+            <a:r>
+              <a:rPr lang="en-US" dirty="0"/>
+              <a:t>Can encode integrity constraints </a:t>
+            </a:r>
+            <a:endParaRPr lang="en-US" dirty="0" smtClean="0"/>
+          </a:p>
+          <a:p>
+            <a:pPr marL="0" indent="0">
+              <a:buNone/>
+            </a:pPr>
+            <a:r>
+              <a:rPr lang="en-US" dirty="0"/>
+              <a:t>Know what makes a good data model  (concise, stable &amp; flexible, quick, elegant…)</a:t>
+            </a:r>
+          </a:p>
+          <a:p>
+            <a:pPr marL="0" indent="0">
+              <a:buNone/>
+            </a:pPr>
+            <a:endParaRPr lang="en-US" dirty="0"/>
+          </a:p>
+          <a:p>
+            <a:endParaRPr lang="en-US" dirty="0"/>
+          </a:p>
+        </p:txBody>
+      </p:sp>
+      <p:sp>
+        <p:nvSpPr>
+          <p:cNvPr id="4" name="Date Placeholder 3"/>
+          <p:cNvSpPr>
+            <a:spLocks noGrp="1"/>
+          </p:cNvSpPr>
+          <p:nvPr>
+            <p:ph type="dt" sz="half" idx="10"/>
+          </p:nvPr>
+        </p:nvSpPr>
+        <p:spPr/>
+        <p:txBody>
+          <a:bodyPr/>
+          <a:lstStyle/>
+          <a:p>
+            <a:fld id="{7053BEFA-1175-F644-B249-7D41D72BD3FF}" type="datetime1">
+              <a:rPr lang="en-US" smtClean="0"/>
+              <a:t>4/21/15</a:t>
+            </a:fld>
+            <a:endParaRPr lang="en-US"/>
+          </a:p>
+        </p:txBody>
+      </p:sp>
+      <p:sp>
+        <p:nvSpPr>
+          <p:cNvPr id="5" name="Footer Placeholder 4"/>
+          <p:cNvSpPr>
+            <a:spLocks noGrp="1"/>
+          </p:cNvSpPr>
+          <p:nvPr>
+            <p:ph type="ftr" sz="quarter" idx="11"/>
+          </p:nvPr>
+        </p:nvSpPr>
+        <p:spPr/>
+        <p:txBody>
+          <a:bodyPr/>
+          <a:lstStyle/>
+          <a:p>
+            <a:endParaRPr lang="en-US" dirty="0"/>
+          </a:p>
+        </p:txBody>
+      </p:sp>
+      <p:sp>
+        <p:nvSpPr>
+          <p:cNvPr id="6" name="Slide Number Placeholder 5"/>
+          <p:cNvSpPr>
+            <a:spLocks noGrp="1"/>
+          </p:cNvSpPr>
+          <p:nvPr>
+            <p:ph type="sldNum" sz="quarter" idx="12"/>
+          </p:nvPr>
+        </p:nvSpPr>
+        <p:spPr/>
+        <p:txBody>
+          <a:bodyPr/>
+          <a:lstStyle/>
+          <a:p>
+            <a:fld id="{17E276FA-8F89-B34D-A726-BE3FA1F8DD97}" type="slidenum">
+              <a:rPr lang="en-US" smtClean="0"/>
+              <a:t>36</a:t>
+            </a:fld>
+            <a:endParaRPr lang="en-US" dirty="0"/>
+          </a:p>
+        </p:txBody>
+      </p:sp>
+      <p:sp>
+        <p:nvSpPr>
+          <p:cNvPr id="7" name="TextBox 6"/>
+          <p:cNvSpPr txBox="1"/>
+          <p:nvPr/>
+        </p:nvSpPr>
+        <p:spPr>
+          <a:xfrm>
+            <a:off x="3362451" y="3473351"/>
+            <a:ext cx="184666" cy="369332"/>
+          </a:xfrm>
+          <a:prstGeom prst="rect">
+            <a:avLst/>
+          </a:prstGeom>
+          <a:noFill/>
+        </p:spPr>
+        <p:txBody>
+          <a:bodyPr wrap="none" rtlCol="0">
+            <a:spAutoFit/>
+          </a:bodyPr>
+          <a:lstStyle/>
+          <a:p>
+            <a:endParaRPr lang="en-US" dirty="0"/>
+          </a:p>
+        </p:txBody>
+      </p:sp>
+    </p:spTree>
+    <p:extLst>
+      <p:ext uri="{BB962C8B-B14F-4D97-AF65-F5344CB8AC3E}">
+        <p14:creationId xmlns:p14="http://schemas.microsoft.com/office/powerpoint/2010/main" val="3885288321"/>
+      </p:ext>
+    </p:extLst>
+  </p:cSld>
+  <p:clrMapOvr>
+    <a:masterClrMapping/>
+  </p:clrMapOvr>
+  <p:timing>
+    <p:tnLst>
+      <p:par>
+        <p:cTn xmlns:p14="http://schemas.microsoft.com/office/powerpoint/2010/main" id="1" dur="indefinite" restart="never" nodeType="tmRoot"/>
+      </p:par>
+    </p:tnLst>
+  </p:timing>
 </p:sld>
 </file>
 
@@ -15606,7 +16258,7 @@
           <a:p>
             <a:fld id="{7053BEFA-1175-F644-B249-7D41D72BD3FF}" type="datetime1">
               <a:rPr lang="en-US" smtClean="0"/>
-              <a:t>2/14/15</a:t>
+              <a:t>4/21/15</a:t>
             </a:fld>
             <a:endParaRPr lang="en-US"/>
           </a:p>
@@ -15822,7 +16474,7 @@
           <a:p>
             <a:fld id="{7053BEFA-1175-F644-B249-7D41D72BD3FF}" type="datetime1">
               <a:rPr lang="en-US" smtClean="0"/>
-              <a:t>2/14/15</a:t>
+              <a:t>4/21/15</a:t>
             </a:fld>
             <a:endParaRPr lang="en-US"/>
           </a:p>
@@ -15999,7 +16651,7 @@
           <a:p>
             <a:fld id="{7053BEFA-1175-F644-B249-7D41D72BD3FF}" type="datetime1">
               <a:rPr lang="en-US" smtClean="0"/>
-              <a:t>2/14/15</a:t>
+              <a:t>4/21/15</a:t>
             </a:fld>
             <a:endParaRPr lang="en-US"/>
           </a:p>
@@ -16161,7 +16813,7 @@
           <a:p>
             <a:fld id="{7053BEFA-1175-F644-B249-7D41D72BD3FF}" type="datetime1">
               <a:rPr lang="en-US" smtClean="0"/>
-              <a:t>2/14/15</a:t>
+              <a:t>4/21/15</a:t>
             </a:fld>
             <a:endParaRPr lang="en-US"/>
           </a:p>
@@ -16344,7 +16996,7 @@
           <a:p>
             <a:fld id="{7053BEFA-1175-F644-B249-7D41D72BD3FF}" type="datetime1">
               <a:rPr lang="en-US" smtClean="0"/>
-              <a:t>2/14/15</a:t>
+              <a:t>4/21/15</a:t>
             </a:fld>
             <a:endParaRPr lang="en-US"/>
           </a:p>
@@ -16562,7 +17214,7 @@
           <a:p>
             <a:fld id="{7053BEFA-1175-F644-B249-7D41D72BD3FF}" type="datetime1">
               <a:rPr lang="en-US" smtClean="0"/>
-              <a:t>2/14/15</a:t>
+              <a:t>4/21/15</a:t>
             </a:fld>
             <a:endParaRPr lang="en-US"/>
           </a:p>

</xml_diff>

<commit_message>
Fixed reading from optional to not, other changes
</commit_message>
<xml_diff>
--- a/Lectures/3 Data Storage.pptx
+++ b/Lectures/3 Data Storage.pptx
@@ -231,7 +231,7 @@
           <a:p>
             <a:fld id="{D3AAB66F-B1B7-D045-B4E8-4F60236F228D}" type="datetimeFigureOut">
               <a:rPr lang="en-US" smtClean="0"/>
-              <a:t>1/17/16</a:t>
+              <a:t>1/21/16</a:t>
             </a:fld>
             <a:endParaRPr lang="en-US"/>
           </a:p>
@@ -397,7 +397,7 @@
           <a:p>
             <a:fld id="{BCCF8E76-06A6-164E-A6FA-EC32C13EB232}" type="datetimeFigureOut">
               <a:rPr lang="en-US" smtClean="0"/>
-              <a:t>1/17/16</a:t>
+              <a:t>1/21/16</a:t>
             </a:fld>
             <a:endParaRPr lang="en-US"/>
           </a:p>
@@ -710,62 +710,6 @@
           <a:bodyPr/>
           <a:lstStyle/>
           <a:p>
-            <a:pPr>
-              <a:lnSpc>
-                <a:spcPct val="90000"/>
-              </a:lnSpc>
-            </a:pPr>
-            <a:r>
-              <a:rPr lang="en-US" sz="2400" b="1" dirty="0" smtClean="0"/>
-              <a:t>Semi-Structured</a:t>
-            </a:r>
-            <a:r>
-              <a:rPr lang="en-US" sz="2400" dirty="0" smtClean="0"/>
-              <a:t> Data:</a:t>
-            </a:r>
-          </a:p>
-          <a:p>
-            <a:pPr lvl="1">
-              <a:lnSpc>
-                <a:spcPct val="90000"/>
-              </a:lnSpc>
-            </a:pPr>
-            <a:r>
-              <a:rPr lang="en-US" sz="2400" dirty="0" smtClean="0"/>
-              <a:t>In some applications, data is collected in an ad-hoc manner before it is known how it will be stored and managed.</a:t>
-            </a:r>
-          </a:p>
-          <a:p>
-            <a:pPr lvl="1">
-              <a:lnSpc>
-                <a:spcPct val="90000"/>
-              </a:lnSpc>
-            </a:pPr>
-            <a:r>
-              <a:rPr lang="en-US" sz="2400" dirty="0" smtClean="0"/>
-              <a:t>This data may have a certain structure, but not all the information collected will have identical structure. This type of data is known as </a:t>
-            </a:r>
-            <a:r>
-              <a:rPr lang="en-US" sz="2400" b="1" dirty="0" smtClean="0"/>
-              <a:t>semi-structured</a:t>
-            </a:r>
-            <a:r>
-              <a:rPr lang="en-US" sz="2400" dirty="0" smtClean="0"/>
-              <a:t> data.</a:t>
-            </a:r>
-          </a:p>
-          <a:p>
-            <a:pPr lvl="1">
-              <a:lnSpc>
-                <a:spcPct val="90000"/>
-              </a:lnSpc>
-            </a:pPr>
-            <a:r>
-              <a:rPr lang="en-US" sz="2400" dirty="0" smtClean="0"/>
-              <a:t>In semi-structured data, the schema information is mixed in with the data values, since each data object can have different attributes that are not known in advance. Hence, this type of data is sometimes referred to as self-describing data.</a:t>
-            </a:r>
-          </a:p>
-          <a:p>
             <a:endParaRPr lang="en-US" dirty="0"/>
           </a:p>
         </p:txBody>
@@ -787,7 +731,7 @@
           <a:p>
             <a:fld id="{FD66F34B-9C4D-8640-BB34-4C24A79C9FFB}" type="slidenum">
               <a:rPr lang="en-US" smtClean="0"/>
-              <a:t>8</a:t>
+              <a:t>1</a:t>
             </a:fld>
             <a:endParaRPr lang="en-US"/>
           </a:p>
@@ -796,7 +740,7 @@
     </p:spTree>
     <p:extLst>
       <p:ext uri="{BB962C8B-B14F-4D97-AF65-F5344CB8AC3E}">
-        <p14:creationId xmlns:p14="http://schemas.microsoft.com/office/powerpoint/2010/main" val="1281031893"/>
+        <p14:creationId xmlns:p14="http://schemas.microsoft.com/office/powerpoint/2010/main" val="3835788488"/>
       </p:ext>
     </p:extLst>
   </p:cSld>
@@ -871,7 +815,7 @@
           <a:p>
             <a:fld id="{FD66F34B-9C4D-8640-BB34-4C24A79C9FFB}" type="slidenum">
               <a:rPr lang="en-US" smtClean="0"/>
-              <a:t>26</a:t>
+              <a:t>25</a:t>
             </a:fld>
             <a:endParaRPr lang="en-US"/>
           </a:p>
@@ -934,30 +878,6 @@
           <a:bodyPr/>
           <a:lstStyle/>
           <a:p>
-            <a:r>
-              <a:rPr lang="en-US" dirty="0" smtClean="0"/>
-              <a:t>Borrowed: Collections of information</a:t>
-            </a:r>
-          </a:p>
-          <a:p>
-            <a:r>
-              <a:rPr lang="en-US" dirty="0" smtClean="0"/>
-              <a:t>Created with logical structures</a:t>
-            </a:r>
-          </a:p>
-          <a:p>
-            <a:r>
-              <a:rPr lang="en-US" dirty="0" smtClean="0"/>
-              <a:t>With logical ties within the information</a:t>
-            </a:r>
-          </a:p>
-          <a:p>
-            <a:r>
-              <a:rPr lang="en-US" dirty="0" smtClean="0"/>
-              <a:t>With built-in integrity constraints</a:t>
-            </a:r>
-          </a:p>
-          <a:p>
             <a:endParaRPr lang="en-US" dirty="0"/>
           </a:p>
         </p:txBody>
@@ -979,7 +899,7 @@
           <a:p>
             <a:fld id="{FD66F34B-9C4D-8640-BB34-4C24A79C9FFB}" type="slidenum">
               <a:rPr lang="en-US" smtClean="0"/>
-              <a:t>27</a:t>
+              <a:t>26</a:t>
             </a:fld>
             <a:endParaRPr lang="en-US"/>
           </a:p>
@@ -988,7 +908,7 @@
     </p:spTree>
     <p:extLst>
       <p:ext uri="{BB962C8B-B14F-4D97-AF65-F5344CB8AC3E}">
-        <p14:creationId xmlns:p14="http://schemas.microsoft.com/office/powerpoint/2010/main" val="3653120636"/>
+        <p14:creationId xmlns:p14="http://schemas.microsoft.com/office/powerpoint/2010/main" val="3813499597"/>
       </p:ext>
     </p:extLst>
   </p:cSld>
@@ -1043,47 +963,29 @@
           <a:lstStyle/>
           <a:p>
             <a:r>
-              <a:rPr lang="en-US" dirty="0" err="1" smtClean="0"/>
-              <a:t>Mongo</a:t>
-            </a:r>
-            <a:r>
-              <a:rPr lang="en-US" baseline="0" dirty="0" err="1" smtClean="0"/>
-              <a:t>db</a:t>
-            </a:r>
-            <a:r>
-              <a:rPr lang="en-US" baseline="0" dirty="0" smtClean="0"/>
-              <a:t> is </a:t>
-            </a:r>
-            <a:r>
-              <a:rPr lang="en-US" baseline="0" dirty="0" err="1" smtClean="0"/>
-              <a:t>nosql</a:t>
-            </a:r>
-            <a:r>
-              <a:rPr lang="en-US" baseline="0" dirty="0" smtClean="0"/>
-              <a:t>  </a:t>
-            </a:r>
-          </a:p>
-          <a:p>
-            <a:endParaRPr lang="en-US" baseline="0" dirty="0" smtClean="0"/>
-          </a:p>
-          <a:p>
-            <a:pPr marL="0" marR="0" indent="0" algn="l" defTabSz="457200" rtl="0" eaLnBrk="1" fontAlgn="auto" latinLnBrk="0" hangingPunct="1">
-              <a:lnSpc>
-                <a:spcPct val="100000"/>
-              </a:lnSpc>
-              <a:spcBef>
-                <a:spcPts val="0"/>
-              </a:spcBef>
-              <a:spcAft>
-                <a:spcPts val="0"/>
-              </a:spcAft>
-              <a:buClrTx/>
-              <a:buSzTx/>
-              <a:buFontTx/>
-              <a:buNone/>
-              <a:tabLst/>
-              <a:defRPr/>
-            </a:pPr>
+              <a:rPr lang="en-US" dirty="0" smtClean="0"/>
+              <a:t>Borrowed: Collections of information</a:t>
+            </a:r>
+          </a:p>
+          <a:p>
+            <a:r>
+              <a:rPr lang="en-US" dirty="0" smtClean="0"/>
+              <a:t>Created with logical structures</a:t>
+            </a:r>
+          </a:p>
+          <a:p>
+            <a:r>
+              <a:rPr lang="en-US" dirty="0" smtClean="0"/>
+              <a:t>With logical ties within the information</a:t>
+            </a:r>
+          </a:p>
+          <a:p>
+            <a:r>
+              <a:rPr lang="en-US" dirty="0" smtClean="0"/>
+              <a:t>With built-in integrity constraints</a:t>
+            </a:r>
+          </a:p>
+          <a:p>
             <a:endParaRPr lang="en-US" dirty="0"/>
           </a:p>
         </p:txBody>
@@ -1105,7 +1007,7 @@
           <a:p>
             <a:fld id="{FD66F34B-9C4D-8640-BB34-4C24A79C9FFB}" type="slidenum">
               <a:rPr lang="en-US" smtClean="0"/>
-              <a:t>29</a:t>
+              <a:t>27</a:t>
             </a:fld>
             <a:endParaRPr lang="en-US"/>
           </a:p>
@@ -1114,7 +1016,7 @@
     </p:spTree>
     <p:extLst>
       <p:ext uri="{BB962C8B-B14F-4D97-AF65-F5344CB8AC3E}">
-        <p14:creationId xmlns:p14="http://schemas.microsoft.com/office/powerpoint/2010/main" val="3192264024"/>
+        <p14:creationId xmlns:p14="http://schemas.microsoft.com/office/powerpoint/2010/main" val="3653120636"/>
       </p:ext>
     </p:extLst>
   </p:cSld>
@@ -1169,30 +1071,47 @@
           <a:lstStyle/>
           <a:p>
             <a:r>
-              <a:rPr lang="en-US" dirty="0" smtClean="0"/>
-              <a:t>a non-relational and largely distributed database system that enables rapid, ad-hoc organization and analysis of extremely high-volume, disparate data types. </a:t>
-            </a:r>
-            <a:r>
               <a:rPr lang="en-US" dirty="0" err="1" smtClean="0"/>
-              <a:t>NoSQL</a:t>
-            </a:r>
-            <a:r>
-              <a:rPr lang="en-US" dirty="0" smtClean="0"/>
-              <a:t> databases are sometimes referred to as cloud databases, non-relational databases</a:t>
-            </a:r>
-          </a:p>
-          <a:p>
-            <a:endParaRPr lang="en-US" dirty="0" smtClean="0"/>
-          </a:p>
-          <a:p>
-            <a:r>
-              <a:rPr lang="en-US" dirty="0" smtClean="0"/>
-              <a:t>More</a:t>
+              <a:t>Mongo</a:t>
+            </a:r>
+            <a:r>
+              <a:rPr lang="en-US" baseline="0" dirty="0" err="1" smtClean="0"/>
+              <a:t>db</a:t>
             </a:r>
             <a:r>
               <a:rPr lang="en-US" baseline="0" dirty="0" smtClean="0"/>
-              <a:t> on this in a future lecture on big data</a:t>
-            </a:r>
+              <a:t> is </a:t>
+            </a:r>
+            <a:r>
+              <a:rPr lang="en-US" baseline="0" dirty="0" err="1" smtClean="0"/>
+              <a:t>nosql</a:t>
+            </a:r>
+            <a:r>
+              <a:rPr lang="en-US" baseline="0" dirty="0" smtClean="0"/>
+              <a:t>  </a:t>
+            </a:r>
+          </a:p>
+          <a:p>
+            <a:endParaRPr lang="en-US" baseline="0" dirty="0" smtClean="0"/>
+          </a:p>
+          <a:p>
+            <a:pPr marL="0" marR="0" indent="0" algn="l" defTabSz="457200" rtl="0" eaLnBrk="1" fontAlgn="auto" latinLnBrk="0" hangingPunct="1">
+              <a:lnSpc>
+                <a:spcPct val="100000"/>
+              </a:lnSpc>
+              <a:spcBef>
+                <a:spcPts val="0"/>
+              </a:spcBef>
+              <a:spcAft>
+                <a:spcPts val="0"/>
+              </a:spcAft>
+              <a:buClrTx/>
+              <a:buSzTx/>
+              <a:buFontTx/>
+              <a:buNone/>
+              <a:tabLst/>
+              <a:defRPr/>
+            </a:pPr>
             <a:endParaRPr lang="en-US" dirty="0"/>
           </a:p>
         </p:txBody>
@@ -1214,7 +1133,7 @@
           <a:p>
             <a:fld id="{FD66F34B-9C4D-8640-BB34-4C24A79C9FFB}" type="slidenum">
               <a:rPr lang="en-US" smtClean="0"/>
-              <a:t>30</a:t>
+              <a:t>29</a:t>
             </a:fld>
             <a:endParaRPr lang="en-US"/>
           </a:p>
@@ -1223,7 +1142,7 @@
     </p:spTree>
     <p:extLst>
       <p:ext uri="{BB962C8B-B14F-4D97-AF65-F5344CB8AC3E}">
-        <p14:creationId xmlns:p14="http://schemas.microsoft.com/office/powerpoint/2010/main" val="2245122856"/>
+        <p14:creationId xmlns:p14="http://schemas.microsoft.com/office/powerpoint/2010/main" val="3192264024"/>
       </p:ext>
     </p:extLst>
   </p:cSld>
@@ -1279,20 +1198,28 @@
           <a:p>
             <a:r>
               <a:rPr lang="en-US" dirty="0" smtClean="0"/>
-              <a:t>Make sure to DEFINE uncertain and spatial before we ask the class to discuss them! </a:t>
-            </a:r>
-          </a:p>
-          <a:p>
-            <a:endParaRPr lang="en-US" smtClean="0"/>
-          </a:p>
-          <a:p>
-            <a:r>
-              <a:rPr lang="en-US" smtClean="0"/>
-              <a:t>Have </a:t>
-            </a:r>
-            <a:r>
-              <a:rPr lang="en-US" dirty="0" smtClean="0"/>
-              <a:t>special structure that makes this type of data easier to handle .. .but we deal with it all the time outside of these tools</a:t>
+              <a:t>a non-relational and largely distributed database system that enables rapid, ad-hoc organization and analysis of extremely high-volume, disparate data types. </a:t>
+            </a:r>
+            <a:r>
+              <a:rPr lang="en-US" dirty="0" err="1" smtClean="0"/>
+              <a:t>NoSQL</a:t>
+            </a:r>
+            <a:r>
+              <a:rPr lang="en-US" dirty="0" smtClean="0"/>
+              <a:t> databases are sometimes referred to as cloud databases, non-relational databases</a:t>
+            </a:r>
+          </a:p>
+          <a:p>
+            <a:endParaRPr lang="en-US" dirty="0" smtClean="0"/>
+          </a:p>
+          <a:p>
+            <a:r>
+              <a:rPr lang="en-US" dirty="0" smtClean="0"/>
+              <a:t>More</a:t>
+            </a:r>
+            <a:r>
+              <a:rPr lang="en-US" baseline="0" dirty="0" smtClean="0"/>
+              <a:t> on this in a future lecture on big data</a:t>
             </a:r>
             <a:endParaRPr lang="en-US" dirty="0"/>
           </a:p>
@@ -1315,7 +1242,7 @@
           <a:p>
             <a:fld id="{FD66F34B-9C4D-8640-BB34-4C24A79C9FFB}" type="slidenum">
               <a:rPr lang="en-US" smtClean="0"/>
-              <a:t>31</a:t>
+              <a:t>30</a:t>
             </a:fld>
             <a:endParaRPr lang="en-US"/>
           </a:p>
@@ -1324,7 +1251,7 @@
     </p:spTree>
     <p:extLst>
       <p:ext uri="{BB962C8B-B14F-4D97-AF65-F5344CB8AC3E}">
-        <p14:creationId xmlns:p14="http://schemas.microsoft.com/office/powerpoint/2010/main" val="2841721663"/>
+        <p14:creationId xmlns:p14="http://schemas.microsoft.com/office/powerpoint/2010/main" val="2245122856"/>
       </p:ext>
     </p:extLst>
   </p:cSld>
@@ -1380,7 +1307,20 @@
           <a:p>
             <a:r>
               <a:rPr lang="en-US" dirty="0" smtClean="0"/>
-              <a:t>It’s not all about maps!</a:t>
+              <a:t>Make sure to DEFINE uncertain and spatial before we ask the class to discuss them! </a:t>
+            </a:r>
+          </a:p>
+          <a:p>
+            <a:endParaRPr lang="en-US" smtClean="0"/>
+          </a:p>
+          <a:p>
+            <a:r>
+              <a:rPr lang="en-US" smtClean="0"/>
+              <a:t>Have </a:t>
+            </a:r>
+            <a:r>
+              <a:rPr lang="en-US" dirty="0" smtClean="0"/>
+              <a:t>special structure that makes this type of data easier to handle .. .but we deal with it all the time outside of these tools</a:t>
             </a:r>
             <a:endParaRPr lang="en-US" dirty="0"/>
           </a:p>
@@ -1403,7 +1343,7 @@
           <a:p>
             <a:fld id="{FD66F34B-9C4D-8640-BB34-4C24A79C9FFB}" type="slidenum">
               <a:rPr lang="en-US" smtClean="0"/>
-              <a:t>33</a:t>
+              <a:t>31</a:t>
             </a:fld>
             <a:endParaRPr lang="en-US"/>
           </a:p>
@@ -1412,7 +1352,7 @@
     </p:spTree>
     <p:extLst>
       <p:ext uri="{BB962C8B-B14F-4D97-AF65-F5344CB8AC3E}">
-        <p14:creationId xmlns:p14="http://schemas.microsoft.com/office/powerpoint/2010/main" val="787802053"/>
+        <p14:creationId xmlns:p14="http://schemas.microsoft.com/office/powerpoint/2010/main" val="2841721663"/>
       </p:ext>
     </p:extLst>
   </p:cSld>
@@ -1468,13 +1408,8 @@
           <a:p>
             <a:r>
               <a:rPr lang="en-US" dirty="0" smtClean="0"/>
-              <a:t>Based on this patient's  MRI,  have we treated somebody with a similar condition ?</a:t>
-            </a:r>
-          </a:p>
-          <a:p>
-            <a:endParaRPr lang="en-US" dirty="0" smtClean="0"/>
-          </a:p>
-          <a:p>
+              <a:t>It’s not all about maps!</a:t>
+            </a:r>
             <a:endParaRPr lang="en-US" dirty="0"/>
           </a:p>
         </p:txBody>
@@ -1496,7 +1431,7 @@
           <a:p>
             <a:fld id="{FD66F34B-9C4D-8640-BB34-4C24A79C9FFB}" type="slidenum">
               <a:rPr lang="en-US" smtClean="0"/>
-              <a:t>34</a:t>
+              <a:t>33</a:t>
             </a:fld>
             <a:endParaRPr lang="en-US"/>
           </a:p>
@@ -1561,17 +1496,11 @@
           <a:p>
             <a:r>
               <a:rPr lang="en-US" dirty="0" smtClean="0"/>
-              <a:t>Have special structure that makes this type of data easier to handle .. .but we deal with it all the time outside of these tools</a:t>
-            </a:r>
-          </a:p>
-          <a:p>
-            <a:r>
-              <a:rPr lang="en-US" dirty="0" smtClean="0"/>
-              <a:t>Lots of complexity here</a:t>
-            </a:r>
-          </a:p>
-          <a:p>
-            <a:endParaRPr lang="en-US" smtClean="0"/>
+              <a:t>Based on this patient's  MRI,  have we treated somebody with a similar condition ?</a:t>
+            </a:r>
+          </a:p>
+          <a:p>
+            <a:endParaRPr lang="en-US" dirty="0" smtClean="0"/>
           </a:p>
           <a:p>
             <a:endParaRPr lang="en-US" dirty="0"/>
@@ -1595,7 +1524,7 @@
           <a:p>
             <a:fld id="{FD66F34B-9C4D-8640-BB34-4C24A79C9FFB}" type="slidenum">
               <a:rPr lang="en-US" smtClean="0"/>
-              <a:t>35</a:t>
+              <a:t>34</a:t>
             </a:fld>
             <a:endParaRPr lang="en-US"/>
           </a:p>
@@ -1604,7 +1533,7 @@
     </p:spTree>
     <p:extLst>
       <p:ext uri="{BB962C8B-B14F-4D97-AF65-F5344CB8AC3E}">
-        <p14:creationId xmlns:p14="http://schemas.microsoft.com/office/powerpoint/2010/main" val="2841721663"/>
+        <p14:creationId xmlns:p14="http://schemas.microsoft.com/office/powerpoint/2010/main" val="787802053"/>
       </p:ext>
     </p:extLst>
   </p:cSld>
@@ -1658,6 +1587,21 @@
           <a:bodyPr/>
           <a:lstStyle/>
           <a:p>
+            <a:r>
+              <a:rPr lang="en-US" dirty="0" smtClean="0"/>
+              <a:t>Have special structure that makes this type of data easier to handle .. .but we deal with it all the time outside of these tools</a:t>
+            </a:r>
+          </a:p>
+          <a:p>
+            <a:r>
+              <a:rPr lang="en-US" dirty="0" smtClean="0"/>
+              <a:t>Lots of complexity here</a:t>
+            </a:r>
+          </a:p>
+          <a:p>
+            <a:endParaRPr lang="en-US" smtClean="0"/>
+          </a:p>
+          <a:p>
             <a:endParaRPr lang="en-US" dirty="0"/>
           </a:p>
         </p:txBody>
@@ -1679,7 +1623,7 @@
           <a:p>
             <a:fld id="{FD66F34B-9C4D-8640-BB34-4C24A79C9FFB}" type="slidenum">
               <a:rPr lang="en-US" smtClean="0"/>
-              <a:t>36</a:t>
+              <a:t>35</a:t>
             </a:fld>
             <a:endParaRPr lang="en-US"/>
           </a:p>
@@ -1688,7 +1632,7 @@
     </p:spTree>
     <p:extLst>
       <p:ext uri="{BB962C8B-B14F-4D97-AF65-F5344CB8AC3E}">
-        <p14:creationId xmlns:p14="http://schemas.microsoft.com/office/powerpoint/2010/main" val="3231593724"/>
+        <p14:creationId xmlns:p14="http://schemas.microsoft.com/office/powerpoint/2010/main" val="2841721663"/>
       </p:ext>
     </p:extLst>
   </p:cSld>
@@ -1742,13 +1686,7 @@
           <a:bodyPr/>
           <a:lstStyle/>
           <a:p>
-            <a:r>
-              <a:rPr lang="en-US" dirty="0" smtClean="0"/>
-              <a:t>For programs: </a:t>
-            </a:r>
-          </a:p>
-          <a:p>
-            <a:endParaRPr lang="en-US" dirty="0" smtClean="0"/>
+            <a:endParaRPr lang="en-US" dirty="0"/>
           </a:p>
         </p:txBody>
       </p:sp>
@@ -1769,7 +1707,7 @@
           <a:p>
             <a:fld id="{FD66F34B-9C4D-8640-BB34-4C24A79C9FFB}" type="slidenum">
               <a:rPr lang="en-US" smtClean="0"/>
-              <a:t>37</a:t>
+              <a:t>36</a:t>
             </a:fld>
             <a:endParaRPr lang="en-US"/>
           </a:p>
@@ -1778,7 +1716,7 @@
     </p:spTree>
     <p:extLst>
       <p:ext uri="{BB962C8B-B14F-4D97-AF65-F5344CB8AC3E}">
-        <p14:creationId xmlns:p14="http://schemas.microsoft.com/office/powerpoint/2010/main" val="3681764730"/>
+        <p14:creationId xmlns:p14="http://schemas.microsoft.com/office/powerpoint/2010/main" val="3231593724"/>
       </p:ext>
     </p:extLst>
   </p:cSld>
@@ -1832,14 +1770,62 @@
           <a:bodyPr/>
           <a:lstStyle/>
           <a:p>
-            <a:r>
-              <a:rPr lang="en-US" dirty="0" smtClean="0"/>
-              <a:t>Also see </a:t>
-            </a:r>
-            <a:r>
-              <a:rPr lang="en-US" dirty="0" err="1" smtClean="0"/>
-              <a:t>yaml</a:t>
-            </a:r>
+            <a:pPr>
+              <a:lnSpc>
+                <a:spcPct val="90000"/>
+              </a:lnSpc>
+            </a:pPr>
+            <a:r>
+              <a:rPr lang="en-US" sz="2400" b="1" dirty="0" smtClean="0"/>
+              <a:t>Semi-Structured</a:t>
+            </a:r>
+            <a:r>
+              <a:rPr lang="en-US" sz="2400" dirty="0" smtClean="0"/>
+              <a:t> Data:</a:t>
+            </a:r>
+          </a:p>
+          <a:p>
+            <a:pPr lvl="1">
+              <a:lnSpc>
+                <a:spcPct val="90000"/>
+              </a:lnSpc>
+            </a:pPr>
+            <a:r>
+              <a:rPr lang="en-US" sz="2400" dirty="0" smtClean="0"/>
+              <a:t>In some applications, data is collected in an ad-hoc manner before it is known how it will be stored and managed.</a:t>
+            </a:r>
+          </a:p>
+          <a:p>
+            <a:pPr lvl="1">
+              <a:lnSpc>
+                <a:spcPct val="90000"/>
+              </a:lnSpc>
+            </a:pPr>
+            <a:r>
+              <a:rPr lang="en-US" sz="2400" dirty="0" smtClean="0"/>
+              <a:t>This data may have a certain structure, but not all the information collected will have identical structure. This type of data is known as </a:t>
+            </a:r>
+            <a:r>
+              <a:rPr lang="en-US" sz="2400" b="1" dirty="0" smtClean="0"/>
+              <a:t>semi-structured</a:t>
+            </a:r>
+            <a:r>
+              <a:rPr lang="en-US" sz="2400" dirty="0" smtClean="0"/>
+              <a:t> data.</a:t>
+            </a:r>
+          </a:p>
+          <a:p>
+            <a:pPr lvl="1">
+              <a:lnSpc>
+                <a:spcPct val="90000"/>
+              </a:lnSpc>
+            </a:pPr>
+            <a:r>
+              <a:rPr lang="en-US" sz="2400" dirty="0" smtClean="0"/>
+              <a:t>In semi-structured data, the schema information is mixed in with the data values, since each data object can have different attributes that are not known in advance. Hence, this type of data is sometimes referred to as self-describing data.</a:t>
+            </a:r>
+          </a:p>
+          <a:p>
             <a:endParaRPr lang="en-US" dirty="0"/>
           </a:p>
         </p:txBody>
@@ -1861,7 +1847,7 @@
           <a:p>
             <a:fld id="{FD66F34B-9C4D-8640-BB34-4C24A79C9FFB}" type="slidenum">
               <a:rPr lang="en-US" smtClean="0"/>
-              <a:t>10</a:t>
+              <a:t>8</a:t>
             </a:fld>
             <a:endParaRPr lang="en-US"/>
           </a:p>
@@ -1870,7 +1856,97 @@
     </p:spTree>
     <p:extLst>
       <p:ext uri="{BB962C8B-B14F-4D97-AF65-F5344CB8AC3E}">
-        <p14:creationId xmlns:p14="http://schemas.microsoft.com/office/powerpoint/2010/main" val="100628773"/>
+        <p14:creationId xmlns:p14="http://schemas.microsoft.com/office/powerpoint/2010/main" val="1281031893"/>
+      </p:ext>
+    </p:extLst>
+  </p:cSld>
+  <p:clrMapOvr>
+    <a:masterClrMapping/>
+  </p:clrMapOvr>
+</p:notes>
+</file>
+
+<file path=ppt/notesSlides/notesSlide20.xml><?xml version="1.0" encoding="utf-8"?>
+<p:notes xmlns:a="http://schemas.openxmlformats.org/drawingml/2006/main" xmlns:r="http://schemas.openxmlformats.org/officeDocument/2006/relationships" xmlns:p="http://schemas.openxmlformats.org/presentationml/2006/main">
+  <p:cSld>
+    <p:spTree>
+      <p:nvGrpSpPr>
+        <p:cNvPr id="1" name=""/>
+        <p:cNvGrpSpPr/>
+        <p:nvPr/>
+      </p:nvGrpSpPr>
+      <p:grpSpPr>
+        <a:xfrm>
+          <a:off x="0" y="0"/>
+          <a:ext cx="0" cy="0"/>
+          <a:chOff x="0" y="0"/>
+          <a:chExt cx="0" cy="0"/>
+        </a:xfrm>
+      </p:grpSpPr>
+      <p:sp>
+        <p:nvSpPr>
+          <p:cNvPr id="2" name="Slide Image Placeholder 1"/>
+          <p:cNvSpPr>
+            <a:spLocks noGrp="1" noRot="1" noChangeAspect="1"/>
+          </p:cNvSpPr>
+          <p:nvPr>
+            <p:ph type="sldImg"/>
+          </p:nvPr>
+        </p:nvSpPr>
+        <p:spPr/>
+      </p:sp>
+      <p:sp>
+        <p:nvSpPr>
+          <p:cNvPr id="3" name="Notes Placeholder 2"/>
+          <p:cNvSpPr>
+            <a:spLocks noGrp="1"/>
+          </p:cNvSpPr>
+          <p:nvPr>
+            <p:ph type="body" idx="1"/>
+          </p:nvPr>
+        </p:nvSpPr>
+        <p:spPr/>
+        <p:txBody>
+          <a:bodyPr/>
+          <a:lstStyle/>
+          <a:p>
+            <a:r>
+              <a:rPr lang="en-US" dirty="0" smtClean="0"/>
+              <a:t>For programs: </a:t>
+            </a:r>
+          </a:p>
+          <a:p>
+            <a:endParaRPr lang="en-US" dirty="0" smtClean="0"/>
+          </a:p>
+        </p:txBody>
+      </p:sp>
+      <p:sp>
+        <p:nvSpPr>
+          <p:cNvPr id="4" name="Slide Number Placeholder 3"/>
+          <p:cNvSpPr>
+            <a:spLocks noGrp="1"/>
+          </p:cNvSpPr>
+          <p:nvPr>
+            <p:ph type="sldNum" sz="quarter" idx="10"/>
+          </p:nvPr>
+        </p:nvSpPr>
+        <p:spPr/>
+        <p:txBody>
+          <a:bodyPr/>
+          <a:lstStyle/>
+          <a:p>
+            <a:fld id="{FD66F34B-9C4D-8640-BB34-4C24A79C9FFB}" type="slidenum">
+              <a:rPr lang="en-US" smtClean="0"/>
+              <a:t>37</a:t>
+            </a:fld>
+            <a:endParaRPr lang="en-US"/>
+          </a:p>
+        </p:txBody>
+      </p:sp>
+    </p:spTree>
+    <p:extLst>
+      <p:ext uri="{BB962C8B-B14F-4D97-AF65-F5344CB8AC3E}">
+        <p14:creationId xmlns:p14="http://schemas.microsoft.com/office/powerpoint/2010/main" val="3681764730"/>
       </p:ext>
     </p:extLst>
   </p:cSld>
@@ -1926,11 +2002,11 @@
           <a:p>
             <a:r>
               <a:rPr lang="en-US" dirty="0" smtClean="0"/>
-              <a:t>XML may not even be</a:t>
-            </a:r>
-            <a:r>
-              <a:rPr lang="en-US" baseline="0" dirty="0" smtClean="0"/>
-              <a:t> “valid” (e.g. two roots; bad syntax)</a:t>
+              <a:t>Also see </a:t>
+            </a:r>
+            <a:r>
+              <a:rPr lang="en-US" dirty="0" err="1" smtClean="0"/>
+              <a:t>yaml</a:t>
             </a:r>
             <a:endParaRPr lang="en-US" dirty="0"/>
           </a:p>
@@ -1953,7 +2029,7 @@
           <a:p>
             <a:fld id="{FD66F34B-9C4D-8640-BB34-4C24A79C9FFB}" type="slidenum">
               <a:rPr lang="en-US" smtClean="0"/>
-              <a:t>11</a:t>
+              <a:t>10</a:t>
             </a:fld>
             <a:endParaRPr lang="en-US"/>
           </a:p>
@@ -1962,7 +2038,7 @@
     </p:spTree>
     <p:extLst>
       <p:ext uri="{BB962C8B-B14F-4D97-AF65-F5344CB8AC3E}">
-        <p14:creationId xmlns:p14="http://schemas.microsoft.com/office/powerpoint/2010/main" val="3217609994"/>
+        <p14:creationId xmlns:p14="http://schemas.microsoft.com/office/powerpoint/2010/main" val="100628773"/>
       </p:ext>
     </p:extLst>
   </p:cSld>
@@ -2018,13 +2094,13 @@
           <a:p>
             <a:r>
               <a:rPr lang="en-US" dirty="0" smtClean="0"/>
-              <a:t>Often both </a:t>
-            </a:r>
-            <a:r>
-              <a:rPr lang="en-US" smtClean="0"/>
-              <a:t>are supported</a:t>
-            </a:r>
-            <a:endParaRPr lang="en-US"/>
+              <a:t>XML may not even be</a:t>
+            </a:r>
+            <a:r>
+              <a:rPr lang="en-US" baseline="0" dirty="0" smtClean="0"/>
+              <a:t> “valid” (e.g. two roots; bad syntax)</a:t>
+            </a:r>
+            <a:endParaRPr lang="en-US" dirty="0"/>
           </a:p>
         </p:txBody>
       </p:sp>
@@ -2045,7 +2121,7 @@
           <a:p>
             <a:fld id="{FD66F34B-9C4D-8640-BB34-4C24A79C9FFB}" type="slidenum">
               <a:rPr lang="en-US" smtClean="0"/>
-              <a:t>12</a:t>
+              <a:t>11</a:t>
             </a:fld>
             <a:endParaRPr lang="en-US"/>
           </a:p>
@@ -2054,7 +2130,7 @@
     </p:spTree>
     <p:extLst>
       <p:ext uri="{BB962C8B-B14F-4D97-AF65-F5344CB8AC3E}">
-        <p14:creationId xmlns:p14="http://schemas.microsoft.com/office/powerpoint/2010/main" val="2449821412"/>
+        <p14:creationId xmlns:p14="http://schemas.microsoft.com/office/powerpoint/2010/main" val="3217609994"/>
       </p:ext>
     </p:extLst>
   </p:cSld>
@@ -2110,17 +2186,13 @@
           <a:p>
             <a:r>
               <a:rPr lang="en-US" dirty="0" smtClean="0"/>
-              <a:t>Strict format</a:t>
-            </a:r>
-          </a:p>
-          <a:p>
-            <a:r>
-              <a:rPr lang="en-US" dirty="0" smtClean="0"/>
-              <a:t>Typically stored in databases</a:t>
-            </a:r>
-          </a:p>
-          <a:p>
-            <a:endParaRPr lang="en-US" dirty="0"/>
+              <a:t>Often both </a:t>
+            </a:r>
+            <a:r>
+              <a:rPr lang="en-US" smtClean="0"/>
+              <a:t>are supported</a:t>
+            </a:r>
+            <a:endParaRPr lang="en-US"/>
           </a:p>
         </p:txBody>
       </p:sp>
@@ -2141,7 +2213,7 @@
           <a:p>
             <a:fld id="{FD66F34B-9C4D-8640-BB34-4C24A79C9FFB}" type="slidenum">
               <a:rPr lang="en-US" smtClean="0"/>
-              <a:t>13</a:t>
+              <a:t>12</a:t>
             </a:fld>
             <a:endParaRPr lang="en-US"/>
           </a:p>
@@ -2150,7 +2222,7 @@
     </p:spTree>
     <p:extLst>
       <p:ext uri="{BB962C8B-B14F-4D97-AF65-F5344CB8AC3E}">
-        <p14:creationId xmlns:p14="http://schemas.microsoft.com/office/powerpoint/2010/main" val="3873871785"/>
+        <p14:creationId xmlns:p14="http://schemas.microsoft.com/office/powerpoint/2010/main" val="2449821412"/>
       </p:ext>
     </p:extLst>
   </p:cSld>
@@ -2206,11 +2278,17 @@
           <a:p>
             <a:r>
               <a:rPr lang="en-US" dirty="0" smtClean="0"/>
-              <a:t>For programs: </a:t>
-            </a:r>
-          </a:p>
-          <a:p>
-            <a:endParaRPr lang="en-US" dirty="0" smtClean="0"/>
+              <a:t>Strict format</a:t>
+            </a:r>
+          </a:p>
+          <a:p>
+            <a:r>
+              <a:rPr lang="en-US" dirty="0" smtClean="0"/>
+              <a:t>Typically stored in databases</a:t>
+            </a:r>
+          </a:p>
+          <a:p>
+            <a:endParaRPr lang="en-US" dirty="0"/>
           </a:p>
         </p:txBody>
       </p:sp>
@@ -2231,7 +2309,7 @@
           <a:p>
             <a:fld id="{FD66F34B-9C4D-8640-BB34-4C24A79C9FFB}" type="slidenum">
               <a:rPr lang="en-US" smtClean="0"/>
-              <a:t>14</a:t>
+              <a:t>13</a:t>
             </a:fld>
             <a:endParaRPr lang="en-US"/>
           </a:p>
@@ -2240,7 +2318,7 @@
     </p:spTree>
     <p:extLst>
       <p:ext uri="{BB962C8B-B14F-4D97-AF65-F5344CB8AC3E}">
-        <p14:creationId xmlns:p14="http://schemas.microsoft.com/office/powerpoint/2010/main" val="3681764730"/>
+        <p14:creationId xmlns:p14="http://schemas.microsoft.com/office/powerpoint/2010/main" val="3873871785"/>
       </p:ext>
     </p:extLst>
   </p:cSld>
@@ -2296,13 +2374,11 @@
           <a:p>
             <a:r>
               <a:rPr lang="en-US" dirty="0" smtClean="0"/>
-              <a:t>Is this an issue</a:t>
-            </a:r>
-            <a:r>
-              <a:rPr lang="en-US" baseline="0" dirty="0" smtClean="0"/>
-              <a:t> when we are just “using” data instead of collecting it?</a:t>
-            </a:r>
-            <a:endParaRPr lang="en-US" dirty="0"/>
+              <a:t>For programs: </a:t>
+            </a:r>
+          </a:p>
+          <a:p>
+            <a:endParaRPr lang="en-US" dirty="0" smtClean="0"/>
           </a:p>
         </p:txBody>
       </p:sp>
@@ -2323,7 +2399,7 @@
           <a:p>
             <a:fld id="{FD66F34B-9C4D-8640-BB34-4C24A79C9FFB}" type="slidenum">
               <a:rPr lang="en-US" smtClean="0"/>
-              <a:t>23</a:t>
+              <a:t>14</a:t>
             </a:fld>
             <a:endParaRPr lang="en-US"/>
           </a:p>
@@ -2332,7 +2408,7 @@
     </p:spTree>
     <p:extLst>
       <p:ext uri="{BB962C8B-B14F-4D97-AF65-F5344CB8AC3E}">
-        <p14:creationId xmlns:p14="http://schemas.microsoft.com/office/powerpoint/2010/main" val="3813499597"/>
+        <p14:creationId xmlns:p14="http://schemas.microsoft.com/office/powerpoint/2010/main" val="3681764730"/>
       </p:ext>
     </p:extLst>
   </p:cSld>
@@ -2386,6 +2462,14 @@
           <a:bodyPr/>
           <a:lstStyle/>
           <a:p>
+            <a:r>
+              <a:rPr lang="en-US" dirty="0" smtClean="0"/>
+              <a:t>Is this an issue</a:t>
+            </a:r>
+            <a:r>
+              <a:rPr lang="en-US" baseline="0" dirty="0" smtClean="0"/>
+              <a:t> when we are just “using” data instead of collecting it?</a:t>
+            </a:r>
             <a:endParaRPr lang="en-US" dirty="0"/>
           </a:p>
         </p:txBody>
@@ -2407,7 +2491,7 @@
           <a:p>
             <a:fld id="{FD66F34B-9C4D-8640-BB34-4C24A79C9FFB}" type="slidenum">
               <a:rPr lang="en-US" smtClean="0"/>
-              <a:t>24</a:t>
+              <a:t>23</a:t>
             </a:fld>
             <a:endParaRPr lang="en-US"/>
           </a:p>
@@ -2491,7 +2575,7 @@
           <a:p>
             <a:fld id="{FD66F34B-9C4D-8640-BB34-4C24A79C9FFB}" type="slidenum">
               <a:rPr lang="en-US" smtClean="0"/>
-              <a:t>25</a:t>
+              <a:t>24</a:t>
             </a:fld>
             <a:endParaRPr lang="en-US"/>
           </a:p>
@@ -3027,7 +3111,7 @@
             <a:fld id="{FA3C144B-2939-9A49-B014-915EC3E81866}" type="datetime1">
               <a:rPr lang="en-US" smtClean="0"/>
               <a:pPr/>
-              <a:t>1/17/16</a:t>
+              <a:t>1/21/16</a:t>
             </a:fld>
             <a:endParaRPr lang="en-US" dirty="0"/>
           </a:p>
@@ -3456,7 +3540,7 @@
           <a:p>
             <a:fld id="{76838339-A875-5E45-AB3F-AAABD270346A}" type="datetime1">
               <a:rPr lang="en-US" smtClean="0"/>
-              <a:t>1/17/16</a:t>
+              <a:t>1/21/16</a:t>
             </a:fld>
             <a:endParaRPr lang="en-US"/>
           </a:p>
@@ -3742,7 +3826,7 @@
             <a:fld id="{FA3C144B-2939-9A49-B014-915EC3E81866}" type="datetime1">
               <a:rPr lang="en-US" smtClean="0"/>
               <a:pPr/>
-              <a:t>1/17/16</a:t>
+              <a:t>1/21/16</a:t>
             </a:fld>
             <a:endParaRPr lang="en-US" dirty="0"/>
           </a:p>
@@ -4224,7 +4308,7 @@
           <a:p>
             <a:fld id="{A73F672F-A5FB-5745-934A-1BF51CA5539C}" type="datetime1">
               <a:rPr lang="en-US" smtClean="0"/>
-              <a:t>1/17/16</a:t>
+              <a:t>1/21/16</a:t>
             </a:fld>
             <a:endParaRPr lang="en-US"/>
           </a:p>
@@ -4566,7 +4650,7 @@
             <a:fld id="{FA3C144B-2939-9A49-B014-915EC3E81866}" type="datetime1">
               <a:rPr lang="en-US" smtClean="0"/>
               <a:pPr/>
-              <a:t>1/17/16</a:t>
+              <a:t>1/21/16</a:t>
             </a:fld>
             <a:endParaRPr lang="en-US" dirty="0"/>
           </a:p>
@@ -5030,7 +5114,7 @@
           <a:p>
             <a:fld id="{6AFE6A63-5EBE-3E48-B0AE-DF655A1ECE76}" type="datetime1">
               <a:rPr lang="en-US" smtClean="0"/>
-              <a:t>1/17/16</a:t>
+              <a:t>1/21/16</a:t>
             </a:fld>
             <a:endParaRPr lang="en-US"/>
           </a:p>
@@ -5349,7 +5433,7 @@
           <a:p>
             <a:fld id="{4A019F0C-9D18-B54A-9AC9-18AA74EDB034}" type="datetime1">
               <a:rPr lang="en-US" smtClean="0"/>
-              <a:t>1/17/16</a:t>
+              <a:t>1/21/16</a:t>
             </a:fld>
             <a:endParaRPr lang="en-US"/>
           </a:p>
@@ -5659,7 +5743,7 @@
             <a:fld id="{FA3C144B-2939-9A49-B014-915EC3E81866}" type="datetime1">
               <a:rPr lang="en-US" smtClean="0"/>
               <a:pPr/>
-              <a:t>1/17/16</a:t>
+              <a:t>1/21/16</a:t>
             </a:fld>
             <a:endParaRPr lang="en-US" dirty="0"/>
           </a:p>
@@ -5922,7 +6006,7 @@
           <a:p>
             <a:fld id="{FA3C144B-2939-9A49-B014-915EC3E81866}" type="datetime1">
               <a:rPr lang="en-US" smtClean="0"/>
-              <a:t>1/17/16</a:t>
+              <a:t>1/21/16</a:t>
             </a:fld>
             <a:endParaRPr lang="en-US" dirty="0"/>
           </a:p>
@@ -6290,7 +6374,7 @@
           <a:p>
             <a:fld id="{7053BEFA-1175-F644-B249-7D41D72BD3FF}" type="datetime1">
               <a:rPr lang="en-US" smtClean="0"/>
-              <a:t>1/17/16</a:t>
+              <a:t>1/21/16</a:t>
             </a:fld>
             <a:endParaRPr lang="en-US"/>
           </a:p>
@@ -6409,7 +6493,7 @@
             <a:fld id="{FA3C144B-2939-9A49-B014-915EC3E81866}" type="datetime1">
               <a:rPr lang="en-US" smtClean="0"/>
               <a:pPr/>
-              <a:t>1/17/16</a:t>
+              <a:t>1/21/16</a:t>
             </a:fld>
             <a:endParaRPr lang="en-US" dirty="0"/>
           </a:p>
@@ -6626,7 +6710,7 @@
             <a:fld id="{FA3C144B-2939-9A49-B014-915EC3E81866}" type="datetime1">
               <a:rPr lang="en-US" smtClean="0"/>
               <a:pPr/>
-              <a:t>1/17/16</a:t>
+              <a:t>1/21/16</a:t>
             </a:fld>
             <a:endParaRPr lang="en-US" dirty="0"/>
           </a:p>
@@ -6871,7 +6955,7 @@
             <a:fld id="{FA3C144B-2939-9A49-B014-915EC3E81866}" type="datetime1">
               <a:rPr lang="en-US" smtClean="0"/>
               <a:pPr/>
-              <a:t>1/17/16</a:t>
+              <a:t>1/21/16</a:t>
             </a:fld>
             <a:endParaRPr lang="en-US" dirty="0"/>
           </a:p>
@@ -7249,7 +7333,7 @@
           <a:p>
             <a:fld id="{111EEF3B-ABF2-AA4E-9E24-0C6256942674}" type="datetime1">
               <a:rPr lang="en-US" smtClean="0"/>
-              <a:t>1/17/16</a:t>
+              <a:t>1/21/16</a:t>
             </a:fld>
             <a:endParaRPr lang="en-US"/>
           </a:p>
@@ -7413,7 +7497,7 @@
             <a:fld id="{FA3C144B-2939-9A49-B014-915EC3E81866}" type="datetime1">
               <a:rPr lang="en-US" smtClean="0"/>
               <a:pPr/>
-              <a:t>1/17/16</a:t>
+              <a:t>1/21/16</a:t>
             </a:fld>
             <a:endParaRPr lang="en-US" dirty="0"/>
           </a:p>
@@ -7830,7 +7914,7 @@
             <a:fld id="{FA3C144B-2939-9A49-B014-915EC3E81866}" type="datetime1">
               <a:rPr lang="en-US" smtClean="0"/>
               <a:pPr/>
-              <a:t>1/17/16</a:t>
+              <a:t>1/21/16</a:t>
             </a:fld>
             <a:endParaRPr lang="en-US" dirty="0"/>
           </a:p>
@@ -8146,7 +8230,7 @@
             <a:fld id="{FA3C144B-2939-9A49-B014-915EC3E81866}" type="datetime1">
               <a:rPr lang="en-US" smtClean="0"/>
               <a:pPr/>
-              <a:t>1/17/16</a:t>
+              <a:t>1/21/16</a:t>
             </a:fld>
             <a:endParaRPr lang="en-US" dirty="0"/>
           </a:p>
@@ -8812,7 +8896,7 @@
             <a:fld id="{FA3C144B-2939-9A49-B014-915EC3E81866}" type="datetime1">
               <a:rPr lang="en-US" smtClean="0"/>
               <a:pPr/>
-              <a:t>1/17/16</a:t>
+              <a:t>1/21/16</a:t>
             </a:fld>
             <a:endParaRPr lang="en-US" dirty="0"/>
           </a:p>
@@ -9611,7 +9695,7 @@
           <p:nvPr/>
         </p:nvPicPr>
         <p:blipFill>
-          <a:blip r:embed="rId2"/>
+          <a:blip r:embed="rId3"/>
           <a:stretch>
             <a:fillRect/>
           </a:stretch>
@@ -10055,7 +10139,7 @@
           <a:p>
             <a:fld id="{7053BEFA-1175-F644-B249-7D41D72BD3FF}" type="datetime1">
               <a:rPr lang="en-US" smtClean="0"/>
-              <a:t>1/17/16</a:t>
+              <a:t>1/21/16</a:t>
             </a:fld>
             <a:endParaRPr lang="en-US"/>
           </a:p>
@@ -10255,7 +10339,7 @@
           <a:p>
             <a:fld id="{7053BEFA-1175-F644-B249-7D41D72BD3FF}" type="datetime1">
               <a:rPr lang="en-US" smtClean="0"/>
-              <a:t>1/17/16</a:t>
+              <a:t>1/21/16</a:t>
             </a:fld>
             <a:endParaRPr lang="en-US"/>
           </a:p>
@@ -10466,7 +10550,7 @@
           <a:p>
             <a:fld id="{7053BEFA-1175-F644-B249-7D41D72BD3FF}" type="datetime1">
               <a:rPr lang="en-US" smtClean="0"/>
-              <a:t>1/17/16</a:t>
+              <a:t>1/21/16</a:t>
             </a:fld>
             <a:endParaRPr lang="en-US"/>
           </a:p>
@@ -10610,7 +10694,7 @@
           <a:p>
             <a:fld id="{7053BEFA-1175-F644-B249-7D41D72BD3FF}" type="datetime1">
               <a:rPr lang="en-US" smtClean="0"/>
-              <a:t>1/17/16</a:t>
+              <a:t>1/21/16</a:t>
             </a:fld>
             <a:endParaRPr lang="en-US"/>
           </a:p>
@@ -10821,7 +10905,7 @@
           <a:p>
             <a:fld id="{7053BEFA-1175-F644-B249-7D41D72BD3FF}" type="datetime1">
               <a:rPr lang="en-US" smtClean="0"/>
-              <a:t>1/17/16</a:t>
+              <a:t>1/21/16</a:t>
             </a:fld>
             <a:endParaRPr lang="en-US"/>
           </a:p>
@@ -10984,17 +11068,8 @@
             </a:pPr>
             <a:r>
               <a:rPr lang="en-US" dirty="0" smtClean="0"/>
-              <a:t>Example from </a:t>
-            </a:r>
-            <a:r>
-              <a:rPr lang="en-US" dirty="0" smtClean="0"/>
-              <a:t>Fusion Byte</a:t>
-            </a:r>
-            <a:r>
-              <a:rPr lang="en-US" dirty="0" smtClean="0"/>
-              <a:t>: </a:t>
-            </a:r>
-            <a:endParaRPr lang="en-US" dirty="0" smtClean="0"/>
+              <a:t>Example from Fusion Byte: </a:t>
+            </a:r>
           </a:p>
           <a:p>
             <a:pPr lvl="1"/>
@@ -11048,7 +11123,7 @@
           <a:p>
             <a:fld id="{7053BEFA-1175-F644-B249-7D41D72BD3FF}" type="datetime1">
               <a:rPr lang="en-US" smtClean="0"/>
-              <a:t>1/17/16</a:t>
+              <a:t>1/21/16</a:t>
             </a:fld>
             <a:endParaRPr lang="en-US"/>
           </a:p>
@@ -11239,7 +11314,7 @@
           <a:p>
             <a:fld id="{7053BEFA-1175-F644-B249-7D41D72BD3FF}" type="datetime1">
               <a:rPr lang="en-US" smtClean="0"/>
-              <a:t>1/17/16</a:t>
+              <a:t>1/21/16</a:t>
             </a:fld>
             <a:endParaRPr lang="en-US"/>
           </a:p>
@@ -11395,7 +11470,7 @@
           <a:p>
             <a:fld id="{7053BEFA-1175-F644-B249-7D41D72BD3FF}" type="datetime1">
               <a:rPr lang="en-US" smtClean="0"/>
-              <a:t>1/17/16</a:t>
+              <a:t>1/21/16</a:t>
             </a:fld>
             <a:endParaRPr lang="en-US"/>
           </a:p>
@@ -11783,7 +11858,7 @@
           <a:p>
             <a:fld id="{7053BEFA-1175-F644-B249-7D41D72BD3FF}" type="datetime1">
               <a:rPr lang="en-US" smtClean="0"/>
-              <a:t>1/17/16</a:t>
+              <a:t>1/21/16</a:t>
             </a:fld>
             <a:endParaRPr lang="en-US"/>
           </a:p>
@@ -12395,7 +12470,7 @@
           <a:p>
             <a:fld id="{7053BEFA-1175-F644-B249-7D41D72BD3FF}" type="datetime1">
               <a:rPr lang="en-US" smtClean="0"/>
-              <a:t>1/17/16</a:t>
+              <a:t>1/21/16</a:t>
             </a:fld>
             <a:endParaRPr lang="en-US"/>
           </a:p>
@@ -12780,7 +12855,7 @@
           <a:p>
             <a:fld id="{7053BEFA-1175-F644-B249-7D41D72BD3FF}" type="datetime1">
               <a:rPr lang="en-US" smtClean="0"/>
-              <a:t>1/17/16</a:t>
+              <a:t>1/21/16</a:t>
             </a:fld>
             <a:endParaRPr lang="en-US"/>
           </a:p>
@@ -12972,7 +13047,7 @@
           <a:p>
             <a:fld id="{7053BEFA-1175-F644-B249-7D41D72BD3FF}" type="datetime1">
               <a:rPr lang="en-US" smtClean="0"/>
-              <a:t>1/17/16</a:t>
+              <a:t>1/21/16</a:t>
             </a:fld>
             <a:endParaRPr lang="en-US"/>
           </a:p>
@@ -13156,7 +13231,7 @@
           <a:p>
             <a:fld id="{7053BEFA-1175-F644-B249-7D41D72BD3FF}" type="datetime1">
               <a:rPr lang="en-US" smtClean="0"/>
-              <a:t>1/17/16</a:t>
+              <a:t>1/21/16</a:t>
             </a:fld>
             <a:endParaRPr lang="en-US"/>
           </a:p>
@@ -13361,7 +13436,7 @@
           <a:p>
             <a:fld id="{7053BEFA-1175-F644-B249-7D41D72BD3FF}" type="datetime1">
               <a:rPr lang="en-US" smtClean="0"/>
-              <a:t>1/17/16</a:t>
+              <a:t>1/21/16</a:t>
             </a:fld>
             <a:endParaRPr lang="en-US"/>
           </a:p>
@@ -13563,7 +13638,7 @@
           <a:p>
             <a:fld id="{7053BEFA-1175-F644-B249-7D41D72BD3FF}" type="datetime1">
               <a:rPr lang="en-US" smtClean="0"/>
-              <a:t>1/17/16</a:t>
+              <a:t>1/21/16</a:t>
             </a:fld>
             <a:endParaRPr lang="en-US"/>
           </a:p>
@@ -13768,7 +13843,7 @@
           <a:p>
             <a:fld id="{7053BEFA-1175-F644-B249-7D41D72BD3FF}" type="datetime1">
               <a:rPr lang="en-US" smtClean="0"/>
-              <a:t>1/17/16</a:t>
+              <a:t>1/21/16</a:t>
             </a:fld>
             <a:endParaRPr lang="en-US"/>
           </a:p>
@@ -13982,7 +14057,7 @@
           <a:p>
             <a:fld id="{7053BEFA-1175-F644-B249-7D41D72BD3FF}" type="datetime1">
               <a:rPr lang="en-US" smtClean="0"/>
-              <a:t>1/17/16</a:t>
+              <a:t>1/21/16</a:t>
             </a:fld>
             <a:endParaRPr lang="en-US"/>
           </a:p>
@@ -14170,7 +14245,7 @@
           <a:p>
             <a:fld id="{7053BEFA-1175-F644-B249-7D41D72BD3FF}" type="datetime1">
               <a:rPr lang="en-US" smtClean="0"/>
-              <a:t>1/17/16</a:t>
+              <a:t>1/21/16</a:t>
             </a:fld>
             <a:endParaRPr lang="en-US"/>
           </a:p>
@@ -14321,7 +14396,7 @@
           <a:p>
             <a:fld id="{7053BEFA-1175-F644-B249-7D41D72BD3FF}" type="datetime1">
               <a:rPr lang="en-US" smtClean="0"/>
-              <a:t>1/17/16</a:t>
+              <a:t>1/21/16</a:t>
             </a:fld>
             <a:endParaRPr lang="en-US"/>
           </a:p>
@@ -14528,7 +14603,7 @@
           <a:p>
             <a:fld id="{7053BEFA-1175-F644-B249-7D41D72BD3FF}" type="datetime1">
               <a:rPr lang="en-US" smtClean="0"/>
-              <a:t>1/17/16</a:t>
+              <a:t>1/21/16</a:t>
             </a:fld>
             <a:endParaRPr lang="en-US"/>
           </a:p>
@@ -14655,20 +14730,16 @@
               <a:buNone/>
             </a:pPr>
             <a:r>
-              <a:rPr lang="en-US" dirty="0" smtClean="0"/>
-              <a:t>Optional</a:t>
+              <a:rPr lang="en-US" smtClean="0"/>
+              <a:t>Stonebraker</a:t>
+            </a:r>
+            <a:r>
+              <a:rPr lang="en-US" dirty="0" smtClean="0"/>
+              <a:t> </a:t>
             </a:r>
             <a:r>
               <a:rPr lang="en-US" dirty="0"/>
-              <a:t>: </a:t>
-            </a:r>
-            <a:r>
-              <a:rPr lang="en-US" dirty="0" err="1"/>
-              <a:t>Stonebraker</a:t>
-            </a:r>
-            <a:r>
-              <a:rPr lang="en-US" dirty="0"/>
-              <a:t> &amp; </a:t>
+              <a:t>&amp; </a:t>
             </a:r>
             <a:r>
               <a:rPr lang="en-US" dirty="0" err="1"/>
@@ -14697,11 +14768,11 @@
               <a:t>data.cmubi.org</a:t>
             </a:r>
             <a:r>
-              <a:rPr lang="en-US"/>
+              <a:rPr lang="en-US" dirty="0"/>
               <a:t>/</a:t>
             </a:r>
             <a:r>
-              <a:rPr lang="en-US" smtClean="0"/>
+              <a:rPr lang="en-US" dirty="0" smtClean="0"/>
               <a:t>calendar)</a:t>
             </a:r>
             <a:endParaRPr lang="en-US" dirty="0"/>
@@ -14725,7 +14796,7 @@
           <a:p>
             <a:fld id="{7053BEFA-1175-F644-B249-7D41D72BD3FF}" type="datetime1">
               <a:rPr lang="en-US" smtClean="0"/>
-              <a:t>1/17/16</a:t>
+              <a:t>1/21/16</a:t>
             </a:fld>
             <a:endParaRPr lang="en-US"/>
           </a:p>
@@ -14963,7 +15034,7 @@
           <a:p>
             <a:fld id="{7053BEFA-1175-F644-B249-7D41D72BD3FF}" type="datetime1">
               <a:rPr lang="en-US" smtClean="0"/>
-              <a:t>1/17/16</a:t>
+              <a:t>1/21/16</a:t>
             </a:fld>
             <a:endParaRPr lang="en-US"/>
           </a:p>
@@ -15136,7 +15207,7 @@
           <a:p>
             <a:fld id="{7053BEFA-1175-F644-B249-7D41D72BD3FF}" type="datetime1">
               <a:rPr lang="en-US" smtClean="0"/>
-              <a:t>1/17/16</a:t>
+              <a:t>1/21/16</a:t>
             </a:fld>
             <a:endParaRPr lang="en-US"/>
           </a:p>
@@ -15360,7 +15431,7 @@
           <a:p>
             <a:fld id="{7053BEFA-1175-F644-B249-7D41D72BD3FF}" type="datetime1">
               <a:rPr lang="en-US" smtClean="0"/>
-              <a:t>1/17/16</a:t>
+              <a:t>1/21/16</a:t>
             </a:fld>
             <a:endParaRPr lang="en-US"/>
           </a:p>
@@ -15580,7 +15651,7 @@
           <a:p>
             <a:fld id="{7053BEFA-1175-F644-B249-7D41D72BD3FF}" type="datetime1">
               <a:rPr lang="en-US" smtClean="0"/>
-              <a:t>1/17/16</a:t>
+              <a:t>1/21/16</a:t>
             </a:fld>
             <a:endParaRPr lang="en-US"/>
           </a:p>
@@ -15797,7 +15868,7 @@
           <a:p>
             <a:fld id="{7053BEFA-1175-F644-B249-7D41D72BD3FF}" type="datetime1">
               <a:rPr lang="en-US" smtClean="0"/>
-              <a:t>1/17/16</a:t>
+              <a:t>1/21/16</a:t>
             </a:fld>
             <a:endParaRPr lang="en-US"/>
           </a:p>
@@ -16129,7 +16200,7 @@
           <a:p>
             <a:fld id="{7053BEFA-1175-F644-B249-7D41D72BD3FF}" type="datetime1">
               <a:rPr lang="en-US" smtClean="0"/>
-              <a:t>1/17/16</a:t>
+              <a:t>1/21/16</a:t>
             </a:fld>
             <a:endParaRPr lang="en-US"/>
           </a:p>
@@ -16345,7 +16416,7 @@
           <a:p>
             <a:fld id="{7053BEFA-1175-F644-B249-7D41D72BD3FF}" type="datetime1">
               <a:rPr lang="en-US" smtClean="0"/>
-              <a:t>1/17/16</a:t>
+              <a:t>1/21/16</a:t>
             </a:fld>
             <a:endParaRPr lang="en-US"/>
           </a:p>
@@ -16559,7 +16630,7 @@
           <a:p>
             <a:fld id="{7053BEFA-1175-F644-B249-7D41D72BD3FF}" type="datetime1">
               <a:rPr lang="en-US" smtClean="0"/>
-              <a:t>1/17/16</a:t>
+              <a:t>1/21/16</a:t>
             </a:fld>
             <a:endParaRPr lang="en-US"/>
           </a:p>
@@ -16729,7 +16800,7 @@
           <a:p>
             <a:fld id="{7053BEFA-1175-F644-B249-7D41D72BD3FF}" type="datetime1">
               <a:rPr lang="en-US" smtClean="0"/>
-              <a:t>1/17/16</a:t>
+              <a:t>1/21/16</a:t>
             </a:fld>
             <a:endParaRPr lang="en-US"/>
           </a:p>
@@ -16898,15 +16969,7 @@
             <a:pPr lvl="1"/>
             <a:r>
               <a:rPr lang="en-US" dirty="0" smtClean="0"/>
-              <a:t>Who is responsible for </a:t>
-            </a:r>
-            <a:r>
-              <a:rPr lang="en-US" dirty="0" smtClean="0"/>
-              <a:t>Quality? </a:t>
-            </a:r>
-            <a:r>
-              <a:rPr lang="en-US" dirty="0" smtClean="0"/>
-              <a:t>(Completeness, Coherence, Correctness, </a:t>
+              <a:t>Who is responsible for Quality? (Completeness, Coherence, Correctness, </a:t>
             </a:r>
             <a:r>
               <a:rPr lang="en-US" dirty="0" err="1" smtClean="0"/>
@@ -16953,7 +17016,7 @@
           <a:p>
             <a:fld id="{7053BEFA-1175-F644-B249-7D41D72BD3FF}" type="datetime1">
               <a:rPr lang="en-US" smtClean="0"/>
-              <a:t>1/17/16</a:t>
+              <a:t>1/21/16</a:t>
             </a:fld>
             <a:endParaRPr lang="en-US"/>
           </a:p>
@@ -17130,7 +17193,7 @@
           <a:p>
             <a:fld id="{7053BEFA-1175-F644-B249-7D41D72BD3FF}" type="datetime1">
               <a:rPr lang="en-US" smtClean="0"/>
-              <a:t>1/17/16</a:t>
+              <a:t>1/21/16</a:t>
             </a:fld>
             <a:endParaRPr lang="en-US"/>
           </a:p>
@@ -17292,7 +17355,7 @@
           <a:p>
             <a:fld id="{7053BEFA-1175-F644-B249-7D41D72BD3FF}" type="datetime1">
               <a:rPr lang="en-US" smtClean="0"/>
-              <a:t>1/17/16</a:t>
+              <a:t>1/21/16</a:t>
             </a:fld>
             <a:endParaRPr lang="en-US"/>
           </a:p>
@@ -17475,7 +17538,7 @@
           <a:p>
             <a:fld id="{7053BEFA-1175-F644-B249-7D41D72BD3FF}" type="datetime1">
               <a:rPr lang="en-US" smtClean="0"/>
-              <a:t>1/17/16</a:t>
+              <a:t>1/21/16</a:t>
             </a:fld>
             <a:endParaRPr lang="en-US"/>
           </a:p>
@@ -17693,7 +17756,7 @@
           <a:p>
             <a:fld id="{7053BEFA-1175-F644-B249-7D41D72BD3FF}" type="datetime1">
               <a:rPr lang="en-US" smtClean="0"/>
-              <a:t>1/17/16</a:t>
+              <a:t>1/21/16</a:t>
             </a:fld>
             <a:endParaRPr lang="en-US"/>
           </a:p>

</xml_diff>